<commit_message>
do first couple slides of presentation
</commit_message>
<xml_diff>
--- a/Presentation/End_of_internship.pptx
+++ b/Presentation/End_of_internship.pptx
@@ -5,21 +5,22 @@
     <p:sldMasterId id="2147483648" r:id="rId1"/>
   </p:sldMasterIdLst>
   <p:notesMasterIdLst>
-    <p:notesMasterId r:id="rId14"/>
+    <p:notesMasterId r:id="rId15"/>
   </p:notesMasterIdLst>
   <p:sldIdLst>
     <p:sldId id="256" r:id="rId2"/>
     <p:sldId id="257" r:id="rId3"/>
     <p:sldId id="268" r:id="rId4"/>
-    <p:sldId id="260" r:id="rId5"/>
-    <p:sldId id="263" r:id="rId6"/>
-    <p:sldId id="265" r:id="rId7"/>
-    <p:sldId id="264" r:id="rId8"/>
-    <p:sldId id="258" r:id="rId9"/>
-    <p:sldId id="259" r:id="rId10"/>
-    <p:sldId id="261" r:id="rId11"/>
-    <p:sldId id="266" r:id="rId12"/>
-    <p:sldId id="267" r:id="rId13"/>
+    <p:sldId id="263" r:id="rId5"/>
+    <p:sldId id="269" r:id="rId6"/>
+    <p:sldId id="270" r:id="rId7"/>
+    <p:sldId id="265" r:id="rId8"/>
+    <p:sldId id="264" r:id="rId9"/>
+    <p:sldId id="258" r:id="rId10"/>
+    <p:sldId id="259" r:id="rId11"/>
+    <p:sldId id="261" r:id="rId12"/>
+    <p:sldId id="266" r:id="rId13"/>
+    <p:sldId id="267" r:id="rId14"/>
   </p:sldIdLst>
   <p:sldSz cx="12192000" cy="6858000"/>
   <p:notesSz cx="6858000" cy="9144000"/>
@@ -545,6 +546,666 @@
     <p:extLst>
       <p:ext uri="{BB962C8B-B14F-4D97-AF65-F5344CB8AC3E}">
         <p14:creationId xmlns:p14="http://schemas.microsoft.com/office/powerpoint/2010/main" val="3982505118"/>
+      </p:ext>
+    </p:extLst>
+  </p:cSld>
+  <p:clrMapOvr>
+    <a:masterClrMapping/>
+  </p:clrMapOvr>
+</p:notes>
+</file>
+
+<file path=ppt/notesSlides/notesSlide2.xml><?xml version="1.0" encoding="utf-8"?>
+<p:notes xmlns:a="http://schemas.openxmlformats.org/drawingml/2006/main" xmlns:r="http://schemas.openxmlformats.org/officeDocument/2006/relationships" xmlns:p="http://schemas.openxmlformats.org/presentationml/2006/main">
+  <p:cSld>
+    <p:spTree>
+      <p:nvGrpSpPr>
+        <p:cNvPr id="1" name=""/>
+        <p:cNvGrpSpPr/>
+        <p:nvPr/>
+      </p:nvGrpSpPr>
+      <p:grpSpPr>
+        <a:xfrm>
+          <a:off x="0" y="0"/>
+          <a:ext cx="0" cy="0"/>
+          <a:chOff x="0" y="0"/>
+          <a:chExt cx="0" cy="0"/>
+        </a:xfrm>
+      </p:grpSpPr>
+      <p:sp>
+        <p:nvSpPr>
+          <p:cNvPr id="2" name="Slide Image Placeholder 1"/>
+          <p:cNvSpPr>
+            <a:spLocks noGrp="1" noRot="1" noChangeAspect="1"/>
+          </p:cNvSpPr>
+          <p:nvPr>
+            <p:ph type="sldImg"/>
+          </p:nvPr>
+        </p:nvSpPr>
+        <p:spPr/>
+      </p:sp>
+      <p:sp>
+        <p:nvSpPr>
+          <p:cNvPr id="3" name="Notes Placeholder 2"/>
+          <p:cNvSpPr>
+            <a:spLocks noGrp="1"/>
+          </p:cNvSpPr>
+          <p:nvPr>
+            <p:ph type="body" idx="1"/>
+          </p:nvPr>
+        </p:nvSpPr>
+        <p:spPr/>
+        <p:txBody>
+          <a:bodyPr/>
+          <a:lstStyle/>
+          <a:p>
+            <a:r>
+              <a:rPr lang="en-US" dirty="0"/>
+              <a:t>Ever heard of DNA, composed of A,C,G,T?</a:t>
+            </a:r>
+          </a:p>
+          <a:p>
+            <a:r>
+              <a:rPr lang="en-US" dirty="0"/>
+              <a:t>Genome is the building plan every cell on planet Earth. We, humans share about 99.9% of their genetic material. Actually, we share more than 60% with bananas and 87% with donkeys some maybe even a little bit more. But the most interesting is the remaining 0.1% which explains all the differences between us, they are mutations. Those small snippets of our DNA which generally only exist in two forms called SNPs are not only responsible for some people being able bigger or smaller than others, but also for genetic diseases such as certain cancer types, autism. </a:t>
+            </a:r>
+          </a:p>
+        </p:txBody>
+      </p:sp>
+      <p:sp>
+        <p:nvSpPr>
+          <p:cNvPr id="4" name="Slide Number Placeholder 3"/>
+          <p:cNvSpPr>
+            <a:spLocks noGrp="1"/>
+          </p:cNvSpPr>
+          <p:nvPr>
+            <p:ph type="sldNum" sz="quarter" idx="5"/>
+          </p:nvPr>
+        </p:nvSpPr>
+        <p:spPr/>
+        <p:txBody>
+          <a:bodyPr/>
+          <a:lstStyle/>
+          <a:p>
+            <a:fld id="{D3E4D156-9788-E94C-969D-835AC55077E3}" type="slidenum">
+              <a:rPr lang="en-US" smtClean="0"/>
+              <a:t>2</a:t>
+            </a:fld>
+            <a:endParaRPr lang="en-US"/>
+          </a:p>
+        </p:txBody>
+      </p:sp>
+    </p:spTree>
+    <p:extLst>
+      <p:ext uri="{BB962C8B-B14F-4D97-AF65-F5344CB8AC3E}">
+        <p14:creationId xmlns:p14="http://schemas.microsoft.com/office/powerpoint/2010/main" val="691112507"/>
+      </p:ext>
+    </p:extLst>
+  </p:cSld>
+  <p:clrMapOvr>
+    <a:masterClrMapping/>
+  </p:clrMapOvr>
+</p:notes>
+</file>
+
+<file path=ppt/notesSlides/notesSlide3.xml><?xml version="1.0" encoding="utf-8"?>
+<p:notes xmlns:a="http://schemas.openxmlformats.org/drawingml/2006/main" xmlns:r="http://schemas.openxmlformats.org/officeDocument/2006/relationships" xmlns:p="http://schemas.openxmlformats.org/presentationml/2006/main">
+  <p:cSld>
+    <p:spTree>
+      <p:nvGrpSpPr>
+        <p:cNvPr id="1" name=""/>
+        <p:cNvGrpSpPr/>
+        <p:nvPr/>
+      </p:nvGrpSpPr>
+      <p:grpSpPr>
+        <a:xfrm>
+          <a:off x="0" y="0"/>
+          <a:ext cx="0" cy="0"/>
+          <a:chOff x="0" y="0"/>
+          <a:chExt cx="0" cy="0"/>
+        </a:xfrm>
+      </p:grpSpPr>
+      <p:sp>
+        <p:nvSpPr>
+          <p:cNvPr id="2" name="Slide Image Placeholder 1"/>
+          <p:cNvSpPr>
+            <a:spLocks noGrp="1" noRot="1" noChangeAspect="1"/>
+          </p:cNvSpPr>
+          <p:nvPr>
+            <p:ph type="sldImg"/>
+          </p:nvPr>
+        </p:nvSpPr>
+        <p:spPr/>
+      </p:sp>
+      <p:sp>
+        <p:nvSpPr>
+          <p:cNvPr id="3" name="Notes Placeholder 2"/>
+          <p:cNvSpPr>
+            <a:spLocks noGrp="1"/>
+          </p:cNvSpPr>
+          <p:nvPr>
+            <p:ph type="body" idx="1"/>
+          </p:nvPr>
+        </p:nvSpPr>
+        <p:spPr/>
+        <p:txBody>
+          <a:bodyPr/>
+          <a:lstStyle/>
+          <a:p>
+            <a:r>
+              <a:rPr lang="en-US" dirty="0"/>
+              <a:t>Not always clear how the relations are, for example in Alzheimer or some psychiatric traits. GWAS aims to identify responsible SNPs out of the over one million SNPs. (3billion base pairs total). </a:t>
+            </a:r>
+          </a:p>
+          <a:p>
+            <a:endParaRPr lang="en-US" dirty="0"/>
+          </a:p>
+          <a:p>
+            <a:r>
+              <a:rPr lang="en-US" dirty="0"/>
+              <a:t>This makes huge files, more than 100 subjects which is the data we work with is half GB but this is small for GWAS. And if the problem was not already hard enough, we know it is in NP. </a:t>
+            </a:r>
+          </a:p>
+        </p:txBody>
+      </p:sp>
+      <p:sp>
+        <p:nvSpPr>
+          <p:cNvPr id="4" name="Slide Number Placeholder 3"/>
+          <p:cNvSpPr>
+            <a:spLocks noGrp="1"/>
+          </p:cNvSpPr>
+          <p:nvPr>
+            <p:ph type="sldNum" sz="quarter" idx="5"/>
+          </p:nvPr>
+        </p:nvSpPr>
+        <p:spPr/>
+        <p:txBody>
+          <a:bodyPr/>
+          <a:lstStyle/>
+          <a:p>
+            <a:fld id="{D3E4D156-9788-E94C-969D-835AC55077E3}" type="slidenum">
+              <a:rPr lang="en-US" smtClean="0"/>
+              <a:t>3</a:t>
+            </a:fld>
+            <a:endParaRPr lang="en-US"/>
+          </a:p>
+        </p:txBody>
+      </p:sp>
+    </p:spTree>
+    <p:extLst>
+      <p:ext uri="{BB962C8B-B14F-4D97-AF65-F5344CB8AC3E}">
+        <p14:creationId xmlns:p14="http://schemas.microsoft.com/office/powerpoint/2010/main" val="1186200187"/>
+      </p:ext>
+    </p:extLst>
+  </p:cSld>
+  <p:clrMapOvr>
+    <a:masterClrMapping/>
+  </p:clrMapOvr>
+</p:notes>
+</file>
+
+<file path=ppt/notesSlides/notesSlide4.xml><?xml version="1.0" encoding="utf-8"?>
+<p:notes xmlns:a="http://schemas.openxmlformats.org/drawingml/2006/main" xmlns:r="http://schemas.openxmlformats.org/officeDocument/2006/relationships" xmlns:p="http://schemas.openxmlformats.org/presentationml/2006/main">
+  <p:cSld>
+    <p:spTree>
+      <p:nvGrpSpPr>
+        <p:cNvPr id="1" name=""/>
+        <p:cNvGrpSpPr/>
+        <p:nvPr/>
+      </p:nvGrpSpPr>
+      <p:grpSpPr>
+        <a:xfrm>
+          <a:off x="0" y="0"/>
+          <a:ext cx="0" cy="0"/>
+          <a:chOff x="0" y="0"/>
+          <a:chExt cx="0" cy="0"/>
+        </a:xfrm>
+      </p:grpSpPr>
+      <p:sp>
+        <p:nvSpPr>
+          <p:cNvPr id="2" name="Slide Image Placeholder 1"/>
+          <p:cNvSpPr>
+            <a:spLocks noGrp="1" noRot="1" noChangeAspect="1"/>
+          </p:cNvSpPr>
+          <p:nvPr>
+            <p:ph type="sldImg"/>
+          </p:nvPr>
+        </p:nvSpPr>
+        <p:spPr/>
+      </p:sp>
+      <p:sp>
+        <p:nvSpPr>
+          <p:cNvPr id="3" name="Notes Placeholder 2"/>
+          <p:cNvSpPr>
+            <a:spLocks noGrp="1"/>
+          </p:cNvSpPr>
+          <p:nvPr>
+            <p:ph type="body" idx="1"/>
+          </p:nvPr>
+        </p:nvSpPr>
+        <p:spPr/>
+        <p:txBody>
+          <a:bodyPr/>
+          <a:lstStyle/>
+          <a:p>
+            <a:r>
+              <a:rPr lang="en-US" dirty="0"/>
+              <a:t>Today GWAS is done using the frequencies of appearance of the less common variant called risk allele. One can calculate an effect size for every SNP. Combining them gives us a polygenic risk score. This tells us how likely a person is to have the phenotype, which is just a fancy way of saying observing the disease. This methods does not directly identify SNPs responsible, but rather you can look at the effect sizes and take an educated guess. </a:t>
+            </a:r>
+          </a:p>
+          <a:p>
+            <a:endParaRPr lang="en-US" dirty="0"/>
+          </a:p>
+          <a:p>
+            <a:r>
+              <a:rPr lang="en-US" dirty="0"/>
+              <a:t>We aim to fix this, for this we want to use Espresso but before we can do that, we have to translate genetic data into understandable form. </a:t>
+            </a:r>
+          </a:p>
+          <a:p>
+            <a:endParaRPr lang="en-US" dirty="0"/>
+          </a:p>
+        </p:txBody>
+      </p:sp>
+      <p:sp>
+        <p:nvSpPr>
+          <p:cNvPr id="4" name="Slide Number Placeholder 3"/>
+          <p:cNvSpPr>
+            <a:spLocks noGrp="1"/>
+          </p:cNvSpPr>
+          <p:nvPr>
+            <p:ph type="sldNum" sz="quarter" idx="5"/>
+          </p:nvPr>
+        </p:nvSpPr>
+        <p:spPr/>
+        <p:txBody>
+          <a:bodyPr/>
+          <a:lstStyle/>
+          <a:p>
+            <a:fld id="{D3E4D156-9788-E94C-969D-835AC55077E3}" type="slidenum">
+              <a:rPr lang="en-US" smtClean="0"/>
+              <a:t>4</a:t>
+            </a:fld>
+            <a:endParaRPr lang="en-US"/>
+          </a:p>
+        </p:txBody>
+      </p:sp>
+    </p:spTree>
+    <p:extLst>
+      <p:ext uri="{BB962C8B-B14F-4D97-AF65-F5344CB8AC3E}">
+        <p14:creationId xmlns:p14="http://schemas.microsoft.com/office/powerpoint/2010/main" val="3190669994"/>
+      </p:ext>
+    </p:extLst>
+  </p:cSld>
+  <p:clrMapOvr>
+    <a:masterClrMapping/>
+  </p:clrMapOvr>
+</p:notes>
+</file>
+
+<file path=ppt/notesSlides/notesSlide5.xml><?xml version="1.0" encoding="utf-8"?>
+<p:notes xmlns:a="http://schemas.openxmlformats.org/drawingml/2006/main" xmlns:r="http://schemas.openxmlformats.org/officeDocument/2006/relationships" xmlns:p="http://schemas.openxmlformats.org/presentationml/2006/main">
+  <p:cSld>
+    <p:spTree>
+      <p:nvGrpSpPr>
+        <p:cNvPr id="1" name=""/>
+        <p:cNvGrpSpPr/>
+        <p:nvPr/>
+      </p:nvGrpSpPr>
+      <p:grpSpPr>
+        <a:xfrm>
+          <a:off x="0" y="0"/>
+          <a:ext cx="0" cy="0"/>
+          <a:chOff x="0" y="0"/>
+          <a:chExt cx="0" cy="0"/>
+        </a:xfrm>
+      </p:grpSpPr>
+      <p:sp>
+        <p:nvSpPr>
+          <p:cNvPr id="2" name="Slide Image Placeholder 1"/>
+          <p:cNvSpPr>
+            <a:spLocks noGrp="1" noRot="1" noChangeAspect="1"/>
+          </p:cNvSpPr>
+          <p:nvPr>
+            <p:ph type="sldImg"/>
+          </p:nvPr>
+        </p:nvSpPr>
+        <p:spPr/>
+      </p:sp>
+      <p:sp>
+        <p:nvSpPr>
+          <p:cNvPr id="3" name="Notes Placeholder 2"/>
+          <p:cNvSpPr>
+            <a:spLocks noGrp="1"/>
+          </p:cNvSpPr>
+          <p:nvPr>
+            <p:ph type="body" idx="1"/>
+          </p:nvPr>
+        </p:nvSpPr>
+        <p:spPr/>
+        <p:txBody>
+          <a:bodyPr/>
+          <a:lstStyle/>
+          <a:p>
+            <a:r>
+              <a:rPr lang="en-GB" dirty="0"/>
+              <a:t>Ternary to binary</a:t>
+            </a:r>
+          </a:p>
+        </p:txBody>
+      </p:sp>
+      <p:sp>
+        <p:nvSpPr>
+          <p:cNvPr id="4" name="Slide Number Placeholder 3"/>
+          <p:cNvSpPr>
+            <a:spLocks noGrp="1"/>
+          </p:cNvSpPr>
+          <p:nvPr>
+            <p:ph type="sldNum" sz="quarter" idx="5"/>
+          </p:nvPr>
+        </p:nvSpPr>
+        <p:spPr/>
+        <p:txBody>
+          <a:bodyPr/>
+          <a:lstStyle/>
+          <a:p>
+            <a:fld id="{D3E4D156-9788-E94C-969D-835AC55077E3}" type="slidenum">
+              <a:rPr lang="en-US" smtClean="0"/>
+              <a:t>5</a:t>
+            </a:fld>
+            <a:endParaRPr lang="en-US"/>
+          </a:p>
+        </p:txBody>
+      </p:sp>
+    </p:spTree>
+    <p:extLst>
+      <p:ext uri="{BB962C8B-B14F-4D97-AF65-F5344CB8AC3E}">
+        <p14:creationId xmlns:p14="http://schemas.microsoft.com/office/powerpoint/2010/main" val="131607420"/>
+      </p:ext>
+    </p:extLst>
+  </p:cSld>
+  <p:clrMapOvr>
+    <a:masterClrMapping/>
+  </p:clrMapOvr>
+</p:notes>
+</file>
+
+<file path=ppt/notesSlides/notesSlide6.xml><?xml version="1.0" encoding="utf-8"?>
+<p:notes xmlns:a="http://schemas.openxmlformats.org/drawingml/2006/main" xmlns:r="http://schemas.openxmlformats.org/officeDocument/2006/relationships" xmlns:p="http://schemas.openxmlformats.org/presentationml/2006/main">
+  <p:cSld>
+    <p:spTree>
+      <p:nvGrpSpPr>
+        <p:cNvPr id="1" name="">
+          <a:extLst>
+            <a:ext uri="{FF2B5EF4-FFF2-40B4-BE49-F238E27FC236}">
+              <a16:creationId xmlns:a16="http://schemas.microsoft.com/office/drawing/2014/main" id="{6978D0B6-4BF6-D847-8454-773C2C937179}"/>
+            </a:ext>
+          </a:extLst>
+        </p:cNvPr>
+        <p:cNvGrpSpPr/>
+        <p:nvPr/>
+      </p:nvGrpSpPr>
+      <p:grpSpPr>
+        <a:xfrm>
+          <a:off x="0" y="0"/>
+          <a:ext cx="0" cy="0"/>
+          <a:chOff x="0" y="0"/>
+          <a:chExt cx="0" cy="0"/>
+        </a:xfrm>
+      </p:grpSpPr>
+      <p:sp>
+        <p:nvSpPr>
+          <p:cNvPr id="2" name="Slide Image Placeholder 1">
+            <a:extLst>
+              <a:ext uri="{FF2B5EF4-FFF2-40B4-BE49-F238E27FC236}">
+                <a16:creationId xmlns:a16="http://schemas.microsoft.com/office/drawing/2014/main" id="{9D32FDCA-A29C-EA91-2F31-F5871B210D16}"/>
+              </a:ext>
+            </a:extLst>
+          </p:cNvPr>
+          <p:cNvSpPr>
+            <a:spLocks noGrp="1" noRot="1" noChangeAspect="1"/>
+          </p:cNvSpPr>
+          <p:nvPr>
+            <p:ph type="sldImg"/>
+          </p:nvPr>
+        </p:nvSpPr>
+        <p:spPr/>
+      </p:sp>
+      <p:sp>
+        <p:nvSpPr>
+          <p:cNvPr id="3" name="Notes Placeholder 2">
+            <a:extLst>
+              <a:ext uri="{FF2B5EF4-FFF2-40B4-BE49-F238E27FC236}">
+                <a16:creationId xmlns:a16="http://schemas.microsoft.com/office/drawing/2014/main" id="{D3870FD5-C7C6-9DE3-2E9C-F71FE4B2A0CA}"/>
+              </a:ext>
+            </a:extLst>
+          </p:cNvPr>
+          <p:cNvSpPr>
+            <a:spLocks noGrp="1"/>
+          </p:cNvSpPr>
+          <p:nvPr>
+            <p:ph type="body" idx="1"/>
+          </p:nvPr>
+        </p:nvSpPr>
+        <p:spPr/>
+        <p:txBody>
+          <a:bodyPr/>
+          <a:lstStyle/>
+          <a:p>
+            <a:r>
+              <a:rPr lang="en-GB" dirty="0"/>
+              <a:t>Ternary to binary</a:t>
+            </a:r>
+          </a:p>
+        </p:txBody>
+      </p:sp>
+      <p:sp>
+        <p:nvSpPr>
+          <p:cNvPr id="4" name="Slide Number Placeholder 3">
+            <a:extLst>
+              <a:ext uri="{FF2B5EF4-FFF2-40B4-BE49-F238E27FC236}">
+                <a16:creationId xmlns:a16="http://schemas.microsoft.com/office/drawing/2014/main" id="{EB0DACED-8DA8-D53F-811D-E73BDC06A92F}"/>
+              </a:ext>
+            </a:extLst>
+          </p:cNvPr>
+          <p:cNvSpPr>
+            <a:spLocks noGrp="1"/>
+          </p:cNvSpPr>
+          <p:nvPr>
+            <p:ph type="sldNum" sz="quarter" idx="5"/>
+          </p:nvPr>
+        </p:nvSpPr>
+        <p:spPr/>
+        <p:txBody>
+          <a:bodyPr/>
+          <a:lstStyle/>
+          <a:p>
+            <a:fld id="{D3E4D156-9788-E94C-969D-835AC55077E3}" type="slidenum">
+              <a:rPr lang="en-US" smtClean="0"/>
+              <a:t>6</a:t>
+            </a:fld>
+            <a:endParaRPr lang="en-US"/>
+          </a:p>
+        </p:txBody>
+      </p:sp>
+    </p:spTree>
+    <p:extLst>
+      <p:ext uri="{BB962C8B-B14F-4D97-AF65-F5344CB8AC3E}">
+        <p14:creationId xmlns:p14="http://schemas.microsoft.com/office/powerpoint/2010/main" val="1832706171"/>
+      </p:ext>
+    </p:extLst>
+  </p:cSld>
+  <p:clrMapOvr>
+    <a:masterClrMapping/>
+  </p:clrMapOvr>
+</p:notes>
+</file>
+
+<file path=ppt/notesSlides/notesSlide7.xml><?xml version="1.0" encoding="utf-8"?>
+<p:notes xmlns:a="http://schemas.openxmlformats.org/drawingml/2006/main" xmlns:r="http://schemas.openxmlformats.org/officeDocument/2006/relationships" xmlns:p="http://schemas.openxmlformats.org/presentationml/2006/main">
+  <p:cSld>
+    <p:spTree>
+      <p:nvGrpSpPr>
+        <p:cNvPr id="1" name=""/>
+        <p:cNvGrpSpPr/>
+        <p:nvPr/>
+      </p:nvGrpSpPr>
+      <p:grpSpPr>
+        <a:xfrm>
+          <a:off x="0" y="0"/>
+          <a:ext cx="0" cy="0"/>
+          <a:chOff x="0" y="0"/>
+          <a:chExt cx="0" cy="0"/>
+        </a:xfrm>
+      </p:grpSpPr>
+      <p:sp>
+        <p:nvSpPr>
+          <p:cNvPr id="2" name="Slide Image Placeholder 1"/>
+          <p:cNvSpPr>
+            <a:spLocks noGrp="1" noRot="1" noChangeAspect="1"/>
+          </p:cNvSpPr>
+          <p:nvPr>
+            <p:ph type="sldImg"/>
+          </p:nvPr>
+        </p:nvSpPr>
+        <p:spPr/>
+      </p:sp>
+      <p:sp>
+        <p:nvSpPr>
+          <p:cNvPr id="3" name="Notes Placeholder 2"/>
+          <p:cNvSpPr>
+            <a:spLocks noGrp="1"/>
+          </p:cNvSpPr>
+          <p:nvPr>
+            <p:ph type="body" idx="1"/>
+          </p:nvPr>
+        </p:nvSpPr>
+        <p:spPr/>
+        <p:txBody>
+          <a:bodyPr/>
+          <a:lstStyle/>
+          <a:p>
+            <a:endParaRPr lang="en-GB" dirty="0"/>
+          </a:p>
+        </p:txBody>
+      </p:sp>
+      <p:sp>
+        <p:nvSpPr>
+          <p:cNvPr id="4" name="Slide Number Placeholder 3"/>
+          <p:cNvSpPr>
+            <a:spLocks noGrp="1"/>
+          </p:cNvSpPr>
+          <p:nvPr>
+            <p:ph type="sldNum" sz="quarter" idx="5"/>
+          </p:nvPr>
+        </p:nvSpPr>
+        <p:spPr/>
+        <p:txBody>
+          <a:bodyPr/>
+          <a:lstStyle/>
+          <a:p>
+            <a:fld id="{D3E4D156-9788-E94C-969D-835AC55077E3}" type="slidenum">
+              <a:rPr lang="en-US" smtClean="0"/>
+              <a:t>7</a:t>
+            </a:fld>
+            <a:endParaRPr lang="en-US"/>
+          </a:p>
+        </p:txBody>
+      </p:sp>
+    </p:spTree>
+    <p:extLst>
+      <p:ext uri="{BB962C8B-B14F-4D97-AF65-F5344CB8AC3E}">
+        <p14:creationId xmlns:p14="http://schemas.microsoft.com/office/powerpoint/2010/main" val="3796886358"/>
+      </p:ext>
+    </p:extLst>
+  </p:cSld>
+  <p:clrMapOvr>
+    <a:masterClrMapping/>
+  </p:clrMapOvr>
+</p:notes>
+</file>
+
+<file path=ppt/notesSlides/notesSlide8.xml><?xml version="1.0" encoding="utf-8"?>
+<p:notes xmlns:a="http://schemas.openxmlformats.org/drawingml/2006/main" xmlns:r="http://schemas.openxmlformats.org/officeDocument/2006/relationships" xmlns:p="http://schemas.openxmlformats.org/presentationml/2006/main">
+  <p:cSld>
+    <p:spTree>
+      <p:nvGrpSpPr>
+        <p:cNvPr id="1" name=""/>
+        <p:cNvGrpSpPr/>
+        <p:nvPr/>
+      </p:nvGrpSpPr>
+      <p:grpSpPr>
+        <a:xfrm>
+          <a:off x="0" y="0"/>
+          <a:ext cx="0" cy="0"/>
+          <a:chOff x="0" y="0"/>
+          <a:chExt cx="0" cy="0"/>
+        </a:xfrm>
+      </p:grpSpPr>
+      <p:sp>
+        <p:nvSpPr>
+          <p:cNvPr id="2" name="Slide Image Placeholder 1"/>
+          <p:cNvSpPr>
+            <a:spLocks noGrp="1" noRot="1" noChangeAspect="1"/>
+          </p:cNvSpPr>
+          <p:nvPr>
+            <p:ph type="sldImg"/>
+          </p:nvPr>
+        </p:nvSpPr>
+        <p:spPr/>
+      </p:sp>
+      <p:sp>
+        <p:nvSpPr>
+          <p:cNvPr id="3" name="Notes Placeholder 2"/>
+          <p:cNvSpPr>
+            <a:spLocks noGrp="1"/>
+          </p:cNvSpPr>
+          <p:nvPr>
+            <p:ph type="body" idx="1"/>
+          </p:nvPr>
+        </p:nvSpPr>
+        <p:spPr/>
+        <p:txBody>
+          <a:bodyPr/>
+          <a:lstStyle/>
+          <a:p>
+            <a:r>
+              <a:rPr lang="en-GB" dirty="0"/>
+              <a:t>Donkey genes were present, hence we start with those approaches. </a:t>
+            </a:r>
+          </a:p>
+          <a:p>
+            <a:endParaRPr lang="en-GB" dirty="0"/>
+          </a:p>
+        </p:txBody>
+      </p:sp>
+      <p:sp>
+        <p:nvSpPr>
+          <p:cNvPr id="4" name="Slide Number Placeholder 3"/>
+          <p:cNvSpPr>
+            <a:spLocks noGrp="1"/>
+          </p:cNvSpPr>
+          <p:nvPr>
+            <p:ph type="sldNum" sz="quarter" idx="5"/>
+          </p:nvPr>
+        </p:nvSpPr>
+        <p:spPr/>
+        <p:txBody>
+          <a:bodyPr/>
+          <a:lstStyle/>
+          <a:p>
+            <a:fld id="{D3E4D156-9788-E94C-969D-835AC55077E3}" type="slidenum">
+              <a:rPr lang="en-US" smtClean="0"/>
+              <a:t>8</a:t>
+            </a:fld>
+            <a:endParaRPr lang="en-US"/>
+          </a:p>
+        </p:txBody>
+      </p:sp>
+    </p:spTree>
+    <p:extLst>
+      <p:ext uri="{BB962C8B-B14F-4D97-AF65-F5344CB8AC3E}">
+        <p14:creationId xmlns:p14="http://schemas.microsoft.com/office/powerpoint/2010/main" val="1599248090"/>
       </p:ext>
     </p:extLst>
   </p:cSld>
@@ -3797,7 +4458,7 @@
           <a:lstStyle/>
           <a:p>
             <a:r>
-              <a:rPr lang="en-US" dirty="0"/>
+              <a:rPr lang="en-GB" dirty="0"/>
               <a:t>GWAS using Espresso</a:t>
             </a:r>
           </a:p>
@@ -3825,7 +4486,7 @@
           <a:lstStyle/>
           <a:p>
             <a:r>
-              <a:rPr lang="en-US" dirty="0"/>
+              <a:rPr lang="en-GB" dirty="0"/>
               <a:t>Janis Waser</a:t>
             </a:r>
           </a:p>
@@ -3843,12 +4504,12 @@
   </p:clrMapOvr>
   <mc:AlternateContent xmlns:mc="http://schemas.openxmlformats.org/markup-compatibility/2006">
     <mc:Choice xmlns:p159="http://schemas.microsoft.com/office/powerpoint/2015/09/main" Requires="p159">
-      <p:transition spd="med">
+      <p:transition spd="slow">
         <p159:morph option="byObject"/>
       </p:transition>
     </mc:Choice>
     <mc:Fallback>
-      <p:transition spd="med">
+      <p:transition spd="slow">
         <p:fade/>
       </p:transition>
     </mc:Fallback>
@@ -3878,7 +4539,7 @@
           <p:cNvPr id="2" name="Title 1">
             <a:extLst>
               <a:ext uri="{FF2B5EF4-FFF2-40B4-BE49-F238E27FC236}">
-                <a16:creationId xmlns:a16="http://schemas.microsoft.com/office/drawing/2014/main" id="{0A280AAD-D661-4E87-A6B7-9703C0F13881}"/>
+                <a16:creationId xmlns:a16="http://schemas.microsoft.com/office/drawing/2014/main" id="{396077DE-5B3A-AFFA-EE46-B1EA21F30692}"/>
               </a:ext>
             </a:extLst>
           </p:cNvPr>
@@ -3896,7 +4557,7 @@
           <a:p>
             <a:r>
               <a:rPr lang="en-US" dirty="0"/>
-              <a:t>Evaluation</a:t>
+              <a:t>Group</a:t>
             </a:r>
           </a:p>
         </p:txBody>
@@ -3906,7 +4567,7 @@
           <p:cNvPr id="3" name="Content Placeholder 2">
             <a:extLst>
               <a:ext uri="{FF2B5EF4-FFF2-40B4-BE49-F238E27FC236}">
-                <a16:creationId xmlns:a16="http://schemas.microsoft.com/office/drawing/2014/main" id="{A0A4BC0B-C661-53AA-1E27-7AD714B04FC1}"/>
+                <a16:creationId xmlns:a16="http://schemas.microsoft.com/office/drawing/2014/main" id="{1D223CB3-9F5B-4415-9614-E835B9C12A2C}"/>
               </a:ext>
             </a:extLst>
           </p:cNvPr>
@@ -3922,17 +4583,14 @@
           <a:bodyPr/>
           <a:lstStyle/>
           <a:p>
-            <a:r>
-              <a:rPr lang="en-US" dirty="0"/>
-              <a:t>Highlight selected methods</a:t>
-            </a:r>
+            <a:endParaRPr lang="en-US"/>
           </a:p>
         </p:txBody>
       </p:sp>
     </p:spTree>
     <p:extLst>
       <p:ext uri="{BB962C8B-B14F-4D97-AF65-F5344CB8AC3E}">
-        <p14:creationId xmlns:p14="http://schemas.microsoft.com/office/powerpoint/2010/main" val="2570781832"/>
+        <p14:creationId xmlns:p14="http://schemas.microsoft.com/office/powerpoint/2010/main" val="3373506639"/>
       </p:ext>
     </p:extLst>
   </p:cSld>
@@ -3941,12 +4599,12 @@
   </p:clrMapOvr>
   <mc:AlternateContent xmlns:mc="http://schemas.openxmlformats.org/markup-compatibility/2006">
     <mc:Choice xmlns:p159="http://schemas.microsoft.com/office/powerpoint/2015/09/main" Requires="p159">
-      <p:transition spd="med">
+      <p:transition spd="slow">
         <p159:morph option="byObject"/>
       </p:transition>
     </mc:Choice>
     <mc:Fallback>
-      <p:transition spd="med">
+      <p:transition spd="slow">
         <p:fade/>
       </p:transition>
     </mc:Fallback>
@@ -3976,7 +4634,7 @@
           <p:cNvPr id="2" name="Title 1">
             <a:extLst>
               <a:ext uri="{FF2B5EF4-FFF2-40B4-BE49-F238E27FC236}">
-                <a16:creationId xmlns:a16="http://schemas.microsoft.com/office/drawing/2014/main" id="{2D681C11-C626-5280-1C63-7411B46BB8DB}"/>
+                <a16:creationId xmlns:a16="http://schemas.microsoft.com/office/drawing/2014/main" id="{0A280AAD-D661-4E87-A6B7-9703C0F13881}"/>
               </a:ext>
             </a:extLst>
           </p:cNvPr>
@@ -3994,7 +4652,7 @@
           <a:p>
             <a:r>
               <a:rPr lang="en-US" dirty="0"/>
-              <a:t>Could our method work?</a:t>
+              <a:t>Evaluation</a:t>
             </a:r>
           </a:p>
         </p:txBody>
@@ -4004,7 +4662,7 @@
           <p:cNvPr id="3" name="Content Placeholder 2">
             <a:extLst>
               <a:ext uri="{FF2B5EF4-FFF2-40B4-BE49-F238E27FC236}">
-                <a16:creationId xmlns:a16="http://schemas.microsoft.com/office/drawing/2014/main" id="{7DC84414-2829-4767-AFAA-6157A4F676D4}"/>
+                <a16:creationId xmlns:a16="http://schemas.microsoft.com/office/drawing/2014/main" id="{A0A4BC0B-C661-53AA-1E27-7AD714B04FC1}"/>
               </a:ext>
             </a:extLst>
           </p:cNvPr>
@@ -4022,15 +4680,45 @@
           <a:p>
             <a:r>
               <a:rPr lang="en-US" dirty="0"/>
-              <a:t>Add checks</a:t>
-            </a:r>
-          </a:p>
-        </p:txBody>
-      </p:sp>
+              <a:t>Highlight selected methods</a:t>
+            </a:r>
+          </a:p>
+        </p:txBody>
+      </p:sp>
+      <p:pic>
+        <p:nvPicPr>
+          <p:cNvPr id="4" name="Picture 3" descr="A diagram of a graph&#10;&#10;AI-generated content may be incorrect.">
+            <a:extLst>
+              <a:ext uri="{FF2B5EF4-FFF2-40B4-BE49-F238E27FC236}">
+                <a16:creationId xmlns:a16="http://schemas.microsoft.com/office/drawing/2014/main" id="{910D7FDA-2C49-E609-3CC7-B43C25B0683C}"/>
+              </a:ext>
+            </a:extLst>
+          </p:cNvPr>
+          <p:cNvPicPr>
+            <a:picLocks noChangeAspect="1"/>
+          </p:cNvPicPr>
+          <p:nvPr/>
+        </p:nvPicPr>
+        <p:blipFill>
+          <a:blip r:embed="rId2"/>
+          <a:stretch>
+            <a:fillRect/>
+          </a:stretch>
+        </p:blipFill>
+        <p:spPr>
+          <a:xfrm>
+            <a:off x="5782235" y="1135576"/>
+            <a:ext cx="6115797" cy="4586848"/>
+          </a:xfrm>
+          <a:prstGeom prst="rect">
+            <a:avLst/>
+          </a:prstGeom>
+        </p:spPr>
+      </p:pic>
     </p:spTree>
     <p:extLst>
       <p:ext uri="{BB962C8B-B14F-4D97-AF65-F5344CB8AC3E}">
-        <p14:creationId xmlns:p14="http://schemas.microsoft.com/office/powerpoint/2010/main" val="2960842149"/>
+        <p14:creationId xmlns:p14="http://schemas.microsoft.com/office/powerpoint/2010/main" val="2570781832"/>
       </p:ext>
     </p:extLst>
   </p:cSld>
@@ -4039,12 +4727,12 @@
   </p:clrMapOvr>
   <mc:AlternateContent xmlns:mc="http://schemas.openxmlformats.org/markup-compatibility/2006">
     <mc:Choice xmlns:p159="http://schemas.microsoft.com/office/powerpoint/2015/09/main" Requires="p159">
-      <p:transition spd="med">
+      <p:transition spd="slow">
         <p159:morph option="byObject"/>
       </p:transition>
     </mc:Choice>
     <mc:Fallback>
-      <p:transition spd="med">
+      <p:transition spd="slow">
         <p:fade/>
       </p:transition>
     </mc:Fallback>
@@ -4074,6 +4762,104 @@
           <p:cNvPr id="2" name="Title 1">
             <a:extLst>
               <a:ext uri="{FF2B5EF4-FFF2-40B4-BE49-F238E27FC236}">
+                <a16:creationId xmlns:a16="http://schemas.microsoft.com/office/drawing/2014/main" id="{2D681C11-C626-5280-1C63-7411B46BB8DB}"/>
+              </a:ext>
+            </a:extLst>
+          </p:cNvPr>
+          <p:cNvSpPr>
+            <a:spLocks noGrp="1"/>
+          </p:cNvSpPr>
+          <p:nvPr>
+            <p:ph type="title"/>
+          </p:nvPr>
+        </p:nvSpPr>
+        <p:spPr/>
+        <p:txBody>
+          <a:bodyPr/>
+          <a:lstStyle/>
+          <a:p>
+            <a:r>
+              <a:rPr lang="en-US" dirty="0"/>
+              <a:t>Could our method work?</a:t>
+            </a:r>
+          </a:p>
+        </p:txBody>
+      </p:sp>
+      <p:sp>
+        <p:nvSpPr>
+          <p:cNvPr id="3" name="Content Placeholder 2">
+            <a:extLst>
+              <a:ext uri="{FF2B5EF4-FFF2-40B4-BE49-F238E27FC236}">
+                <a16:creationId xmlns:a16="http://schemas.microsoft.com/office/drawing/2014/main" id="{7DC84414-2829-4767-AFAA-6157A4F676D4}"/>
+              </a:ext>
+            </a:extLst>
+          </p:cNvPr>
+          <p:cNvSpPr>
+            <a:spLocks noGrp="1"/>
+          </p:cNvSpPr>
+          <p:nvPr>
+            <p:ph idx="1"/>
+          </p:nvPr>
+        </p:nvSpPr>
+        <p:spPr/>
+        <p:txBody>
+          <a:bodyPr/>
+          <a:lstStyle/>
+          <a:p>
+            <a:r>
+              <a:rPr lang="en-US" dirty="0"/>
+              <a:t>Add checks</a:t>
+            </a:r>
+          </a:p>
+        </p:txBody>
+      </p:sp>
+    </p:spTree>
+    <p:extLst>
+      <p:ext uri="{BB962C8B-B14F-4D97-AF65-F5344CB8AC3E}">
+        <p14:creationId xmlns:p14="http://schemas.microsoft.com/office/powerpoint/2010/main" val="2960842149"/>
+      </p:ext>
+    </p:extLst>
+  </p:cSld>
+  <p:clrMapOvr>
+    <a:masterClrMapping/>
+  </p:clrMapOvr>
+  <mc:AlternateContent xmlns:mc="http://schemas.openxmlformats.org/markup-compatibility/2006">
+    <mc:Choice xmlns:p159="http://schemas.microsoft.com/office/powerpoint/2015/09/main" Requires="p159">
+      <p:transition spd="slow">
+        <p159:morph option="byObject"/>
+      </p:transition>
+    </mc:Choice>
+    <mc:Fallback>
+      <p:transition spd="slow">
+        <p:fade/>
+      </p:transition>
+    </mc:Fallback>
+  </mc:AlternateContent>
+</p:sld>
+</file>
+
+<file path=ppt/slides/slide13.xml><?xml version="1.0" encoding="utf-8"?>
+<p:sld xmlns:a="http://schemas.openxmlformats.org/drawingml/2006/main" xmlns:r="http://schemas.openxmlformats.org/officeDocument/2006/relationships" xmlns:p="http://schemas.openxmlformats.org/presentationml/2006/main">
+  <p:cSld>
+    <p:spTree>
+      <p:nvGrpSpPr>
+        <p:cNvPr id="1" name=""/>
+        <p:cNvGrpSpPr/>
+        <p:nvPr/>
+      </p:nvGrpSpPr>
+      <p:grpSpPr>
+        <a:xfrm>
+          <a:off x="0" y="0"/>
+          <a:ext cx="0" cy="0"/>
+          <a:chOff x="0" y="0"/>
+          <a:chExt cx="0" cy="0"/>
+        </a:xfrm>
+      </p:grpSpPr>
+      <p:sp>
+        <p:nvSpPr>
+          <p:cNvPr id="2" name="Title 1">
+            <a:extLst>
+              <a:ext uri="{FF2B5EF4-FFF2-40B4-BE49-F238E27FC236}">
                 <a16:creationId xmlns:a16="http://schemas.microsoft.com/office/drawing/2014/main" id="{88A66D03-1F34-7F52-4B68-F982C5AD4654}"/>
               </a:ext>
             </a:extLst>
@@ -4137,12 +4923,12 @@
   </p:clrMapOvr>
   <mc:AlternateContent xmlns:mc="http://schemas.openxmlformats.org/markup-compatibility/2006">
     <mc:Choice xmlns:p159="http://schemas.microsoft.com/office/powerpoint/2015/09/main" Requires="p159">
-      <p:transition spd="med">
+      <p:transition spd="slow">
         <p159:morph option="byObject"/>
       </p:transition>
     </mc:Choice>
     <mc:Fallback>
-      <p:transition spd="med">
+      <p:transition spd="slow">
         <p:fade/>
       </p:transition>
     </mc:Fallback>
@@ -4218,7 +5004,19 @@
           <a:p>
             <a:r>
               <a:rPr lang="en-US" dirty="0"/>
-              <a:t>To problem</a:t>
+              <a:t>Building plan for cells</a:t>
+            </a:r>
+          </a:p>
+          <a:p>
+            <a:r>
+              <a:rPr lang="en-US" dirty="0"/>
+              <a:t>Differences as SNPs</a:t>
+            </a:r>
+          </a:p>
+          <a:p>
+            <a:r>
+              <a:rPr lang="en-US" dirty="0"/>
+              <a:t>Genetic diseases</a:t>
             </a:r>
           </a:p>
           <a:p>
@@ -4228,16 +5026,10 @@
             <a:endParaRPr lang="en-US" dirty="0"/>
           </a:p>
           <a:p>
+            <a:pPr marL="0" indent="0">
+              <a:buNone/>
+            </a:pPr>
             <a:endParaRPr lang="en-US" dirty="0"/>
-          </a:p>
-          <a:p>
-            <a:endParaRPr lang="en-US" dirty="0"/>
-          </a:p>
-          <a:p>
-            <a:r>
-              <a:rPr lang="en-US" dirty="0"/>
-              <a:t>Lot of data</a:t>
-            </a:r>
           </a:p>
         </p:txBody>
       </p:sp>
@@ -4253,12 +5045,12 @@
   </p:clrMapOvr>
   <mc:AlternateContent xmlns:mc="http://schemas.openxmlformats.org/markup-compatibility/2006">
     <mc:Choice xmlns:p159="http://schemas.microsoft.com/office/powerpoint/2015/09/main" Requires="p159">
-      <p:transition spd="med">
+      <p:transition spd="slow">
         <p159:morph option="byObject"/>
       </p:transition>
     </mc:Choice>
     <mc:Fallback>
-      <p:transition spd="med">
+      <p:transition spd="slow">
         <p:fade/>
       </p:transition>
     </mc:Fallback>
@@ -4332,7 +5124,31 @@
           <a:bodyPr/>
           <a:lstStyle/>
           <a:p>
-            <a:endParaRPr lang="en-US"/>
+            <a:r>
+              <a:rPr lang="en-US" dirty="0"/>
+              <a:t>Aim to identify</a:t>
+            </a:r>
+          </a:p>
+          <a:p>
+            <a:r>
+              <a:rPr lang="en-US" dirty="0"/>
+              <a:t>&gt;1’000’000 SNPs</a:t>
+            </a:r>
+          </a:p>
+          <a:p>
+            <a:r>
+              <a:rPr lang="en-US" dirty="0"/>
+              <a:t>100+ subjects</a:t>
+            </a:r>
+          </a:p>
+          <a:p>
+            <a:r>
+              <a:rPr lang="en-US" dirty="0"/>
+              <a:t>Problem in NP</a:t>
+            </a:r>
+          </a:p>
+          <a:p>
+            <a:endParaRPr lang="en-US" dirty="0"/>
           </a:p>
         </p:txBody>
       </p:sp>
@@ -4346,6 +5162,18 @@
   <p:clrMapOvr>
     <a:masterClrMapping/>
   </p:clrMapOvr>
+  <mc:AlternateContent xmlns:mc="http://schemas.openxmlformats.org/markup-compatibility/2006">
+    <mc:Choice xmlns:p159="http://schemas.microsoft.com/office/powerpoint/2015/09/main" Requires="p159">
+      <p:transition spd="slow">
+        <p159:morph option="byObject"/>
+      </p:transition>
+    </mc:Choice>
+    <mc:Fallback>
+      <p:transition spd="slow">
+        <p:fade/>
+      </p:transition>
+    </mc:Fallback>
+  </mc:AlternateContent>
 </p:sld>
 </file>
 
@@ -4371,7 +5199,7 @@
           <p:cNvPr id="2" name="Title 1">
             <a:extLst>
               <a:ext uri="{FF2B5EF4-FFF2-40B4-BE49-F238E27FC236}">
-                <a16:creationId xmlns:a16="http://schemas.microsoft.com/office/drawing/2014/main" id="{3F5F4780-9460-A14D-EA9C-73AB7EAA8169}"/>
+                <a16:creationId xmlns:a16="http://schemas.microsoft.com/office/drawing/2014/main" id="{2394792E-3E14-FB7F-4DD4-6B9A2F804DE4}"/>
               </a:ext>
             </a:extLst>
           </p:cNvPr>
@@ -4389,7 +5217,7 @@
           <a:p>
             <a:r>
               <a:rPr lang="en-US" dirty="0"/>
-              <a:t>Data</a:t>
+              <a:t>State of the Art</a:t>
             </a:r>
           </a:p>
         </p:txBody>
@@ -4399,7 +5227,7 @@
           <p:cNvPr id="3" name="Content Placeholder 2">
             <a:extLst>
               <a:ext uri="{FF2B5EF4-FFF2-40B4-BE49-F238E27FC236}">
-                <a16:creationId xmlns:a16="http://schemas.microsoft.com/office/drawing/2014/main" id="{D141BD49-EE8F-FBEC-25CC-D9B0503CE171}"/>
+                <a16:creationId xmlns:a16="http://schemas.microsoft.com/office/drawing/2014/main" id="{E4A98BC2-DC8E-93B6-04B8-450EDA47ABF7}"/>
               </a:ext>
             </a:extLst>
           </p:cNvPr>
@@ -4417,13 +5245,34 @@
           <a:p>
             <a:r>
               <a:rPr lang="en-US" dirty="0"/>
-              <a:t>Size</a:t>
-            </a:r>
-          </a:p>
-          <a:p>
-            <a:pPr marL="0" indent="0">
-              <a:buNone/>
-            </a:pPr>
+              <a:t>Frequency of SNPs</a:t>
+            </a:r>
+          </a:p>
+          <a:p>
+            <a:r>
+              <a:rPr lang="en-US" dirty="0"/>
+              <a:t>Effect sizes</a:t>
+            </a:r>
+          </a:p>
+          <a:p>
+            <a:r>
+              <a:rPr lang="en-US" dirty="0"/>
+              <a:t>Polygenic risk score (PRS)</a:t>
+            </a:r>
+          </a:p>
+          <a:p>
+            <a:r>
+              <a:rPr lang="en-US" dirty="0"/>
+              <a:t>Predict phenotype</a:t>
+            </a:r>
+          </a:p>
+          <a:p>
+            <a:r>
+              <a:rPr lang="en-US" dirty="0"/>
+              <a:t>Not identification of SNPs</a:t>
+            </a:r>
+          </a:p>
+          <a:p>
             <a:endParaRPr lang="en-US" dirty="0"/>
           </a:p>
           <a:p>
@@ -4434,7 +5283,7 @@
     </p:spTree>
     <p:extLst>
       <p:ext uri="{BB962C8B-B14F-4D97-AF65-F5344CB8AC3E}">
-        <p14:creationId xmlns:p14="http://schemas.microsoft.com/office/powerpoint/2010/main" val="798582320"/>
+        <p14:creationId xmlns:p14="http://schemas.microsoft.com/office/powerpoint/2010/main" val="993657086"/>
       </p:ext>
     </p:extLst>
   </p:cSld>
@@ -4443,12 +5292,12 @@
   </p:clrMapOvr>
   <mc:AlternateContent xmlns:mc="http://schemas.openxmlformats.org/markup-compatibility/2006">
     <mc:Choice xmlns:p159="http://schemas.microsoft.com/office/powerpoint/2015/09/main" Requires="p159">
-      <p:transition spd="med">
+      <p:transition spd="slow">
         <p159:morph option="byObject"/>
       </p:transition>
     </mc:Choice>
     <mc:Fallback>
-      <p:transition spd="med">
+      <p:transition spd="slow">
         <p:fade/>
       </p:transition>
     </mc:Fallback>
@@ -4478,7 +5327,7 @@
           <p:cNvPr id="2" name="Title 1">
             <a:extLst>
               <a:ext uri="{FF2B5EF4-FFF2-40B4-BE49-F238E27FC236}">
-                <a16:creationId xmlns:a16="http://schemas.microsoft.com/office/drawing/2014/main" id="{2394792E-3E14-FB7F-4DD4-6B9A2F804DE4}"/>
+                <a16:creationId xmlns:a16="http://schemas.microsoft.com/office/drawing/2014/main" id="{2FC1A8C7-6BAC-373C-659A-AD9C69A10F4F}"/>
               </a:ext>
             </a:extLst>
           </p:cNvPr>
@@ -4496,40 +5345,564 @@
           <a:p>
             <a:r>
               <a:rPr lang="en-US" dirty="0"/>
-              <a:t>State of the art and our goals</a:t>
-            </a:r>
-          </a:p>
-        </p:txBody>
-      </p:sp>
-      <p:sp>
-        <p:nvSpPr>
-          <p:cNvPr id="3" name="Content Placeholder 2">
-            <a:extLst>
-              <a:ext uri="{FF2B5EF4-FFF2-40B4-BE49-F238E27FC236}">
-                <a16:creationId xmlns:a16="http://schemas.microsoft.com/office/drawing/2014/main" id="{E4A98BC2-DC8E-93B6-04B8-450EDA47ABF7}"/>
-              </a:ext>
-            </a:extLst>
-          </p:cNvPr>
-          <p:cNvSpPr>
-            <a:spLocks noGrp="1"/>
-          </p:cNvSpPr>
-          <p:nvPr>
-            <p:ph idx="1"/>
-          </p:nvPr>
-        </p:nvSpPr>
-        <p:spPr/>
-        <p:txBody>
-          <a:bodyPr/>
-          <a:lstStyle/>
-          <a:p>
-            <a:endParaRPr lang="en-US" dirty="0"/>
+              <a:t>Translation</a:t>
+            </a:r>
+          </a:p>
+        </p:txBody>
+      </p:sp>
+      <p:grpSp>
+        <p:nvGrpSpPr>
+          <p:cNvPr id="4" name="Group 3">
+            <a:extLst>
+              <a:ext uri="{FF2B5EF4-FFF2-40B4-BE49-F238E27FC236}">
+                <a16:creationId xmlns:a16="http://schemas.microsoft.com/office/drawing/2014/main" id="{5894BE26-1087-6E0D-0D14-C44090E6A34D}"/>
+              </a:ext>
+            </a:extLst>
+          </p:cNvPr>
+          <p:cNvGrpSpPr/>
+          <p:nvPr/>
+        </p:nvGrpSpPr>
+        <p:grpSpPr>
+          <a:xfrm>
+            <a:off x="1028824" y="1930921"/>
+            <a:ext cx="2590438" cy="4524315"/>
+            <a:chOff x="4445792" y="1825625"/>
+            <a:chExt cx="2590438" cy="4524315"/>
+          </a:xfrm>
+        </p:grpSpPr>
+        <p:sp>
+          <p:nvSpPr>
+            <p:cNvPr id="5" name="TextBox 4">
+              <a:extLst>
+                <a:ext uri="{FF2B5EF4-FFF2-40B4-BE49-F238E27FC236}">
+                  <a16:creationId xmlns:a16="http://schemas.microsoft.com/office/drawing/2014/main" id="{E820E4A6-B553-F763-0381-8133E9081DE0}"/>
+                </a:ext>
+              </a:extLst>
+            </p:cNvPr>
+            <p:cNvSpPr txBox="1"/>
+            <p:nvPr/>
+          </p:nvSpPr>
+          <p:spPr>
+            <a:xfrm>
+              <a:off x="4445792" y="1825625"/>
+              <a:ext cx="2590438" cy="4524315"/>
+            </a:xfrm>
+            <a:prstGeom prst="rect">
+              <a:avLst/>
+            </a:prstGeom>
+            <a:noFill/>
+          </p:spPr>
+          <p:txBody>
+            <a:bodyPr wrap="square" rtlCol="0">
+              <a:spAutoFit/>
+            </a:bodyPr>
+            <a:lstStyle/>
+            <a:p>
+              <a:r>
+                <a:rPr lang="en-US" sz="3200" dirty="0">
+                  <a:solidFill>
+                    <a:schemeClr val="bg1"/>
+                  </a:solidFill>
+                </a:rPr>
+                <a:t>AA		11</a:t>
+              </a:r>
+            </a:p>
+            <a:p>
+              <a:endParaRPr lang="en-US" sz="3200" dirty="0">
+                <a:solidFill>
+                  <a:schemeClr val="bg1"/>
+                </a:solidFill>
+              </a:endParaRPr>
+            </a:p>
+            <a:p>
+              <a:r>
+                <a:rPr lang="en-US" sz="3200" dirty="0">
+                  <a:solidFill>
+                    <a:schemeClr val="bg1"/>
+                  </a:solidFill>
+                </a:rPr>
+                <a:t>Aa		01</a:t>
+              </a:r>
+            </a:p>
+            <a:p>
+              <a:endParaRPr lang="en-US" sz="3200" dirty="0">
+                <a:solidFill>
+                  <a:schemeClr val="bg1"/>
+                </a:solidFill>
+              </a:endParaRPr>
+            </a:p>
+            <a:p>
+              <a:r>
+                <a:rPr lang="en-US" sz="3200" dirty="0" err="1">
+                  <a:solidFill>
+                    <a:schemeClr val="bg1"/>
+                  </a:solidFill>
+                </a:rPr>
+                <a:t>aA</a:t>
+              </a:r>
+              <a:r>
+                <a:rPr lang="en-US" sz="3200" dirty="0">
+                  <a:solidFill>
+                    <a:schemeClr val="bg1"/>
+                  </a:solidFill>
+                </a:rPr>
+                <a:t>		01</a:t>
+              </a:r>
+            </a:p>
+            <a:p>
+              <a:endParaRPr lang="en-US" sz="3200" dirty="0">
+                <a:solidFill>
+                  <a:schemeClr val="bg1"/>
+                </a:solidFill>
+              </a:endParaRPr>
+            </a:p>
+            <a:p>
+              <a:r>
+                <a:rPr lang="en-US" sz="3200" dirty="0">
+                  <a:solidFill>
+                    <a:schemeClr val="bg1"/>
+                  </a:solidFill>
+                </a:rPr>
+                <a:t>aa		00</a:t>
+              </a:r>
+            </a:p>
+            <a:p>
+              <a:endParaRPr lang="en-US" sz="3200" dirty="0">
+                <a:solidFill>
+                  <a:schemeClr val="bg1"/>
+                </a:solidFill>
+              </a:endParaRPr>
+            </a:p>
+            <a:p>
+              <a:r>
+                <a:rPr lang="en-US" sz="3200" dirty="0">
+                  <a:solidFill>
+                    <a:schemeClr val="bg1"/>
+                  </a:solidFill>
+                </a:rPr>
+                <a:t>00		--</a:t>
+              </a:r>
+            </a:p>
+          </p:txBody>
+        </p:sp>
+        <p:cxnSp>
+          <p:nvCxnSpPr>
+            <p:cNvPr id="6" name="Straight Arrow Connector 5">
+              <a:extLst>
+                <a:ext uri="{FF2B5EF4-FFF2-40B4-BE49-F238E27FC236}">
+                  <a16:creationId xmlns:a16="http://schemas.microsoft.com/office/drawing/2014/main" id="{AA4D8EE6-3525-F31D-40EA-34A8A7099724}"/>
+                </a:ext>
+              </a:extLst>
+            </p:cNvPr>
+            <p:cNvCxnSpPr/>
+            <p:nvPr/>
+          </p:nvCxnSpPr>
+          <p:spPr>
+            <a:xfrm>
+              <a:off x="5136355" y="2106613"/>
+              <a:ext cx="771525" cy="0"/>
+            </a:xfrm>
+            <a:prstGeom prst="straightConnector1">
+              <a:avLst/>
+            </a:prstGeom>
+            <a:ln w="53975">
+              <a:solidFill>
+                <a:schemeClr val="accent6"/>
+              </a:solidFill>
+              <a:tailEnd type="triangle"/>
+            </a:ln>
+          </p:spPr>
+          <p:style>
+            <a:lnRef idx="2">
+              <a:schemeClr val="accent1"/>
+            </a:lnRef>
+            <a:fillRef idx="0">
+              <a:schemeClr val="accent1"/>
+            </a:fillRef>
+            <a:effectRef idx="1">
+              <a:schemeClr val="accent1"/>
+            </a:effectRef>
+            <a:fontRef idx="minor">
+              <a:schemeClr val="tx1"/>
+            </a:fontRef>
+          </p:style>
+        </p:cxnSp>
+        <p:cxnSp>
+          <p:nvCxnSpPr>
+            <p:cNvPr id="7" name="Straight Arrow Connector 6">
+              <a:extLst>
+                <a:ext uri="{FF2B5EF4-FFF2-40B4-BE49-F238E27FC236}">
+                  <a16:creationId xmlns:a16="http://schemas.microsoft.com/office/drawing/2014/main" id="{BD6162CE-1D83-D5AA-978E-052332CDC47B}"/>
+                </a:ext>
+              </a:extLst>
+            </p:cNvPr>
+            <p:cNvCxnSpPr/>
+            <p:nvPr/>
+          </p:nvCxnSpPr>
+          <p:spPr>
+            <a:xfrm>
+              <a:off x="5136355" y="3087688"/>
+              <a:ext cx="771525" cy="0"/>
+            </a:xfrm>
+            <a:prstGeom prst="straightConnector1">
+              <a:avLst/>
+            </a:prstGeom>
+            <a:ln w="53975">
+              <a:solidFill>
+                <a:schemeClr val="accent6"/>
+              </a:solidFill>
+              <a:tailEnd type="triangle"/>
+            </a:ln>
+          </p:spPr>
+          <p:style>
+            <a:lnRef idx="2">
+              <a:schemeClr val="accent1"/>
+            </a:lnRef>
+            <a:fillRef idx="0">
+              <a:schemeClr val="accent1"/>
+            </a:fillRef>
+            <a:effectRef idx="1">
+              <a:schemeClr val="accent1"/>
+            </a:effectRef>
+            <a:fontRef idx="minor">
+              <a:schemeClr val="tx1"/>
+            </a:fontRef>
+          </p:style>
+        </p:cxnSp>
+        <p:cxnSp>
+          <p:nvCxnSpPr>
+            <p:cNvPr id="8" name="Straight Arrow Connector 7">
+              <a:extLst>
+                <a:ext uri="{FF2B5EF4-FFF2-40B4-BE49-F238E27FC236}">
+                  <a16:creationId xmlns:a16="http://schemas.microsoft.com/office/drawing/2014/main" id="{6F051834-29D6-33FA-C63A-D42DCC835CC8}"/>
+                </a:ext>
+              </a:extLst>
+            </p:cNvPr>
+            <p:cNvCxnSpPr/>
+            <p:nvPr/>
+          </p:nvCxnSpPr>
+          <p:spPr>
+            <a:xfrm>
+              <a:off x="5136355" y="3997325"/>
+              <a:ext cx="771525" cy="0"/>
+            </a:xfrm>
+            <a:prstGeom prst="straightConnector1">
+              <a:avLst/>
+            </a:prstGeom>
+            <a:ln w="53975">
+              <a:solidFill>
+                <a:schemeClr val="accent6"/>
+              </a:solidFill>
+              <a:tailEnd type="triangle"/>
+            </a:ln>
+          </p:spPr>
+          <p:style>
+            <a:lnRef idx="2">
+              <a:schemeClr val="accent1"/>
+            </a:lnRef>
+            <a:fillRef idx="0">
+              <a:schemeClr val="accent1"/>
+            </a:fillRef>
+            <a:effectRef idx="1">
+              <a:schemeClr val="accent1"/>
+            </a:effectRef>
+            <a:fontRef idx="minor">
+              <a:schemeClr val="tx1"/>
+            </a:fontRef>
+          </p:style>
+        </p:cxnSp>
+        <p:cxnSp>
+          <p:nvCxnSpPr>
+            <p:cNvPr id="9" name="Straight Arrow Connector 8">
+              <a:extLst>
+                <a:ext uri="{FF2B5EF4-FFF2-40B4-BE49-F238E27FC236}">
+                  <a16:creationId xmlns:a16="http://schemas.microsoft.com/office/drawing/2014/main" id="{A277EBC7-3590-2102-502C-67A22A8DF9A7}"/>
+                </a:ext>
+              </a:extLst>
+            </p:cNvPr>
+            <p:cNvCxnSpPr/>
+            <p:nvPr/>
+          </p:nvCxnSpPr>
+          <p:spPr>
+            <a:xfrm>
+              <a:off x="5136355" y="5059363"/>
+              <a:ext cx="771525" cy="0"/>
+            </a:xfrm>
+            <a:prstGeom prst="straightConnector1">
+              <a:avLst/>
+            </a:prstGeom>
+            <a:ln w="53975">
+              <a:solidFill>
+                <a:schemeClr val="accent6"/>
+              </a:solidFill>
+              <a:tailEnd type="triangle"/>
+            </a:ln>
+          </p:spPr>
+          <p:style>
+            <a:lnRef idx="2">
+              <a:schemeClr val="accent1"/>
+            </a:lnRef>
+            <a:fillRef idx="0">
+              <a:schemeClr val="accent1"/>
+            </a:fillRef>
+            <a:effectRef idx="1">
+              <a:schemeClr val="accent1"/>
+            </a:effectRef>
+            <a:fontRef idx="minor">
+              <a:schemeClr val="tx1"/>
+            </a:fontRef>
+          </p:style>
+        </p:cxnSp>
+        <p:cxnSp>
+          <p:nvCxnSpPr>
+            <p:cNvPr id="10" name="Straight Arrow Connector 9">
+              <a:extLst>
+                <a:ext uri="{FF2B5EF4-FFF2-40B4-BE49-F238E27FC236}">
+                  <a16:creationId xmlns:a16="http://schemas.microsoft.com/office/drawing/2014/main" id="{E0FD34DA-8F7E-8B76-A26A-D59EDF3379DC}"/>
+                </a:ext>
+              </a:extLst>
+            </p:cNvPr>
+            <p:cNvCxnSpPr/>
+            <p:nvPr/>
+          </p:nvCxnSpPr>
+          <p:spPr>
+            <a:xfrm>
+              <a:off x="5136355" y="5973763"/>
+              <a:ext cx="771525" cy="0"/>
+            </a:xfrm>
+            <a:prstGeom prst="straightConnector1">
+              <a:avLst/>
+            </a:prstGeom>
+            <a:ln w="53975">
+              <a:solidFill>
+                <a:schemeClr val="accent6"/>
+              </a:solidFill>
+              <a:tailEnd type="triangle"/>
+            </a:ln>
+          </p:spPr>
+          <p:style>
+            <a:lnRef idx="2">
+              <a:schemeClr val="accent1"/>
+            </a:lnRef>
+            <a:fillRef idx="0">
+              <a:schemeClr val="accent1"/>
+            </a:fillRef>
+            <a:effectRef idx="1">
+              <a:schemeClr val="accent1"/>
+            </a:effectRef>
+            <a:fontRef idx="minor">
+              <a:schemeClr val="tx1"/>
+            </a:fontRef>
+          </p:style>
+        </p:cxnSp>
+      </p:grpSp>
+      <p:pic>
+        <p:nvPicPr>
+          <p:cNvPr id="13" name="Picture 12" descr="A screenshot of a computer screen&#10;&#10;AI-generated content may be incorrect.">
+            <a:extLst>
+              <a:ext uri="{FF2B5EF4-FFF2-40B4-BE49-F238E27FC236}">
+                <a16:creationId xmlns:a16="http://schemas.microsoft.com/office/drawing/2014/main" id="{64CB599A-3A8A-9B83-363B-8FFC1D1EE982}"/>
+              </a:ext>
+            </a:extLst>
+          </p:cNvPr>
+          <p:cNvPicPr>
+            <a:picLocks noChangeAspect="1"/>
+          </p:cNvPicPr>
+          <p:nvPr/>
+        </p:nvPicPr>
+        <p:blipFill>
+          <a:blip r:embed="rId3"/>
+          <a:srcRect l="15537" t="1186" r="14247" b="1"/>
+          <a:stretch>
+            <a:fillRect/>
+          </a:stretch>
+        </p:blipFill>
+        <p:spPr>
+          <a:xfrm>
+            <a:off x="4981074" y="1592284"/>
+            <a:ext cx="7062536" cy="4969489"/>
+          </a:xfrm>
+          <a:prstGeom prst="rect">
+            <a:avLst/>
+          </a:prstGeom>
+        </p:spPr>
+      </p:pic>
+      <p:cxnSp>
+        <p:nvCxnSpPr>
+          <p:cNvPr id="17" name="Straight Arrow Connector 16">
+            <a:extLst>
+              <a:ext uri="{FF2B5EF4-FFF2-40B4-BE49-F238E27FC236}">
+                <a16:creationId xmlns:a16="http://schemas.microsoft.com/office/drawing/2014/main" id="{E5AE7539-6051-7F35-F6BB-F7197140E218}"/>
+              </a:ext>
+            </a:extLst>
+          </p:cNvPr>
+          <p:cNvCxnSpPr>
+            <a:cxnSpLocks/>
+            <a:stCxn id="18" idx="2"/>
+          </p:cNvCxnSpPr>
+          <p:nvPr/>
+        </p:nvCxnSpPr>
+        <p:spPr>
+          <a:xfrm>
+            <a:off x="7399421" y="1097748"/>
+            <a:ext cx="770021" cy="494536"/>
+          </a:xfrm>
+          <a:prstGeom prst="straightConnector1">
+            <a:avLst/>
+          </a:prstGeom>
+          <a:ln w="31750">
+            <a:tailEnd type="triangle"/>
+          </a:ln>
+        </p:spPr>
+        <p:style>
+          <a:lnRef idx="1">
+            <a:schemeClr val="accent6"/>
+          </a:lnRef>
+          <a:fillRef idx="0">
+            <a:schemeClr val="accent6"/>
+          </a:fillRef>
+          <a:effectRef idx="0">
+            <a:schemeClr val="accent6"/>
+          </a:effectRef>
+          <a:fontRef idx="minor">
+            <a:schemeClr val="tx1"/>
+          </a:fontRef>
+        </p:style>
+      </p:cxnSp>
+      <p:sp>
+        <p:nvSpPr>
+          <p:cNvPr id="18" name="TextBox 17">
+            <a:extLst>
+              <a:ext uri="{FF2B5EF4-FFF2-40B4-BE49-F238E27FC236}">
+                <a16:creationId xmlns:a16="http://schemas.microsoft.com/office/drawing/2014/main" id="{00708AA0-75C0-05CB-1A0F-EA798EF37AEB}"/>
+              </a:ext>
+            </a:extLst>
+          </p:cNvPr>
+          <p:cNvSpPr txBox="1"/>
+          <p:nvPr/>
+        </p:nvSpPr>
+        <p:spPr>
+          <a:xfrm>
+            <a:off x="6785810" y="697638"/>
+            <a:ext cx="1227221" cy="400110"/>
+          </a:xfrm>
+          <a:prstGeom prst="rect">
+            <a:avLst/>
+          </a:prstGeom>
+          <a:noFill/>
+        </p:spPr>
+        <p:txBody>
+          <a:bodyPr wrap="square" rtlCol="0">
+            <a:spAutoFit/>
+          </a:bodyPr>
+          <a:lstStyle/>
+          <a:p>
+            <a:r>
+              <a:rPr lang="en-GB" sz="2000" dirty="0">
+                <a:solidFill>
+                  <a:schemeClr val="bg1"/>
+                </a:solidFill>
+              </a:rPr>
+              <a:t>Mother</a:t>
+            </a:r>
+            <a:endParaRPr lang="en-GB" dirty="0">
+              <a:solidFill>
+                <a:schemeClr val="bg1"/>
+              </a:solidFill>
+            </a:endParaRPr>
+          </a:p>
+        </p:txBody>
+      </p:sp>
+      <p:cxnSp>
+        <p:nvCxnSpPr>
+          <p:cNvPr id="19" name="Straight Arrow Connector 18">
+            <a:extLst>
+              <a:ext uri="{FF2B5EF4-FFF2-40B4-BE49-F238E27FC236}">
+                <a16:creationId xmlns:a16="http://schemas.microsoft.com/office/drawing/2014/main" id="{D6DB50D5-4D2E-F1AC-8A35-1162E1CA5079}"/>
+              </a:ext>
+            </a:extLst>
+          </p:cNvPr>
+          <p:cNvCxnSpPr>
+            <a:cxnSpLocks/>
+            <a:stCxn id="20" idx="2"/>
+          </p:cNvCxnSpPr>
+          <p:nvPr/>
+        </p:nvCxnSpPr>
+        <p:spPr>
+          <a:xfrm flipH="1">
+            <a:off x="8394032" y="1095877"/>
+            <a:ext cx="695826" cy="498278"/>
+          </a:xfrm>
+          <a:prstGeom prst="straightConnector1">
+            <a:avLst/>
+          </a:prstGeom>
+          <a:ln w="31750">
+            <a:tailEnd type="triangle"/>
+          </a:ln>
+        </p:spPr>
+        <p:style>
+          <a:lnRef idx="1">
+            <a:schemeClr val="accent6"/>
+          </a:lnRef>
+          <a:fillRef idx="0">
+            <a:schemeClr val="accent6"/>
+          </a:fillRef>
+          <a:effectRef idx="0">
+            <a:schemeClr val="accent6"/>
+          </a:effectRef>
+          <a:fontRef idx="minor">
+            <a:schemeClr val="tx1"/>
+          </a:fontRef>
+        </p:style>
+      </p:cxnSp>
+      <p:sp>
+        <p:nvSpPr>
+          <p:cNvPr id="20" name="TextBox 19">
+            <a:extLst>
+              <a:ext uri="{FF2B5EF4-FFF2-40B4-BE49-F238E27FC236}">
+                <a16:creationId xmlns:a16="http://schemas.microsoft.com/office/drawing/2014/main" id="{07429AD7-F21F-DBB4-C8A4-D2AEDB23E909}"/>
+              </a:ext>
+            </a:extLst>
+          </p:cNvPr>
+          <p:cNvSpPr txBox="1"/>
+          <p:nvPr/>
+        </p:nvSpPr>
+        <p:spPr>
+          <a:xfrm>
+            <a:off x="8626642" y="695767"/>
+            <a:ext cx="926431" cy="400110"/>
+          </a:xfrm>
+          <a:prstGeom prst="rect">
+            <a:avLst/>
+          </a:prstGeom>
+          <a:noFill/>
+        </p:spPr>
+        <p:txBody>
+          <a:bodyPr wrap="square" rtlCol="0">
+            <a:spAutoFit/>
+          </a:bodyPr>
+          <a:lstStyle/>
+          <a:p>
+            <a:r>
+              <a:rPr lang="en-GB" sz="2000" dirty="0">
+                <a:solidFill>
+                  <a:schemeClr val="bg1"/>
+                </a:solidFill>
+              </a:rPr>
+              <a:t>Father</a:t>
+            </a:r>
+            <a:endParaRPr lang="en-GB" dirty="0">
+              <a:solidFill>
+                <a:schemeClr val="bg1"/>
+              </a:solidFill>
+            </a:endParaRPr>
           </a:p>
         </p:txBody>
       </p:sp>
     </p:spTree>
     <p:extLst>
       <p:ext uri="{BB962C8B-B14F-4D97-AF65-F5344CB8AC3E}">
-        <p14:creationId xmlns:p14="http://schemas.microsoft.com/office/powerpoint/2010/main" val="993657086"/>
+        <p14:creationId xmlns:p14="http://schemas.microsoft.com/office/powerpoint/2010/main" val="1545432624"/>
       </p:ext>
     </p:extLst>
   </p:cSld>
@@ -4538,12 +5911,12 @@
   </p:clrMapOvr>
   <mc:AlternateContent xmlns:mc="http://schemas.openxmlformats.org/markup-compatibility/2006">
     <mc:Choice xmlns:p159="http://schemas.microsoft.com/office/powerpoint/2015/09/main" Requires="p159">
-      <p:transition spd="med">
+      <p:transition spd="slow">
         <p159:morph option="byObject"/>
       </p:transition>
     </mc:Choice>
     <mc:Fallback>
-      <p:transition spd="med">
+      <p:transition spd="slow">
         <p:fade/>
       </p:transition>
     </mc:Fallback>
@@ -4556,7 +5929,13 @@
   <p:cSld>
     <p:spTree>
       <p:nvGrpSpPr>
-        <p:cNvPr id="1" name=""/>
+        <p:cNvPr id="1" name="">
+          <a:extLst>
+            <a:ext uri="{FF2B5EF4-FFF2-40B4-BE49-F238E27FC236}">
+              <a16:creationId xmlns:a16="http://schemas.microsoft.com/office/drawing/2014/main" id="{F08325F1-3D8D-04B0-B6F6-84D968F26C64}"/>
+            </a:ext>
+          </a:extLst>
+        </p:cNvPr>
         <p:cNvGrpSpPr/>
         <p:nvPr/>
       </p:nvGrpSpPr>
@@ -4573,7 +5952,7 @@
           <p:cNvPr id="2" name="Title 1">
             <a:extLst>
               <a:ext uri="{FF2B5EF4-FFF2-40B4-BE49-F238E27FC236}">
-                <a16:creationId xmlns:a16="http://schemas.microsoft.com/office/drawing/2014/main" id="{C74B9442-58DA-9B1A-5EF5-D587463E57F3}"/>
+                <a16:creationId xmlns:a16="http://schemas.microsoft.com/office/drawing/2014/main" id="{21329935-FCB1-1951-BA18-233A7BEF9F68}"/>
               </a:ext>
             </a:extLst>
           </p:cNvPr>
@@ -4582,34 +5961,6 @@
           </p:cNvSpPr>
           <p:nvPr>
             <p:ph type="title"/>
-          </p:nvPr>
-        </p:nvSpPr>
-        <p:spPr/>
-        <p:txBody>
-          <a:bodyPr/>
-          <a:lstStyle/>
-          <a:p>
-            <a:r>
-              <a:rPr lang="en-US" dirty="0"/>
-              <a:t>Espresso</a:t>
-            </a:r>
-          </a:p>
-        </p:txBody>
-      </p:sp>
-      <p:sp>
-        <p:nvSpPr>
-          <p:cNvPr id="3" name="Content Placeholder 2">
-            <a:extLst>
-              <a:ext uri="{FF2B5EF4-FFF2-40B4-BE49-F238E27FC236}">
-                <a16:creationId xmlns:a16="http://schemas.microsoft.com/office/drawing/2014/main" id="{D2CE436A-2E9B-1F9D-73F5-773BF4A04D64}"/>
-              </a:ext>
-            </a:extLst>
-          </p:cNvPr>
-          <p:cNvSpPr>
-            <a:spLocks noGrp="1"/>
-          </p:cNvSpPr>
-          <p:nvPr>
-            <p:ph idx="1"/>
           </p:nvPr>
         </p:nvSpPr>
         <p:spPr/>
@@ -4621,13 +5972,474 @@
               <a:rPr lang="en-US" dirty="0"/>
               <a:t>Translation</a:t>
             </a:r>
+          </a:p>
+        </p:txBody>
+      </p:sp>
+      <p:grpSp>
+        <p:nvGrpSpPr>
+          <p:cNvPr id="4" name="Group 3">
+            <a:extLst>
+              <a:ext uri="{FF2B5EF4-FFF2-40B4-BE49-F238E27FC236}">
+                <a16:creationId xmlns:a16="http://schemas.microsoft.com/office/drawing/2014/main" id="{060CE515-D6E2-B586-1C66-F10F5BFD71FA}"/>
+              </a:ext>
+            </a:extLst>
+          </p:cNvPr>
+          <p:cNvGrpSpPr/>
+          <p:nvPr/>
+        </p:nvGrpSpPr>
+        <p:grpSpPr>
+          <a:xfrm>
+            <a:off x="1028824" y="1930921"/>
+            <a:ext cx="2590438" cy="4524315"/>
+            <a:chOff x="4445792" y="1825625"/>
+            <a:chExt cx="2590438" cy="4524315"/>
+          </a:xfrm>
+        </p:grpSpPr>
+        <p:sp>
+          <p:nvSpPr>
+            <p:cNvPr id="5" name="TextBox 4">
+              <a:extLst>
+                <a:ext uri="{FF2B5EF4-FFF2-40B4-BE49-F238E27FC236}">
+                  <a16:creationId xmlns:a16="http://schemas.microsoft.com/office/drawing/2014/main" id="{402DBC75-08FB-E452-0F74-511A8CE942CE}"/>
+                </a:ext>
+              </a:extLst>
+            </p:cNvPr>
+            <p:cNvSpPr txBox="1"/>
+            <p:nvPr/>
+          </p:nvSpPr>
+          <p:spPr>
+            <a:xfrm>
+              <a:off x="4445792" y="1825625"/>
+              <a:ext cx="2590438" cy="4524315"/>
+            </a:xfrm>
+            <a:prstGeom prst="rect">
+              <a:avLst/>
+            </a:prstGeom>
+            <a:noFill/>
+          </p:spPr>
+          <p:txBody>
+            <a:bodyPr wrap="square" rtlCol="0">
+              <a:spAutoFit/>
+            </a:bodyPr>
+            <a:lstStyle/>
+            <a:p>
+              <a:r>
+                <a:rPr lang="en-US" sz="3200" dirty="0">
+                  <a:solidFill>
+                    <a:schemeClr val="bg1"/>
+                  </a:solidFill>
+                </a:rPr>
+                <a:t>AA		11</a:t>
+              </a:r>
+            </a:p>
+            <a:p>
+              <a:endParaRPr lang="en-US" sz="3200" dirty="0">
+                <a:solidFill>
+                  <a:schemeClr val="bg1"/>
+                </a:solidFill>
+              </a:endParaRPr>
+            </a:p>
+            <a:p>
+              <a:r>
+                <a:rPr lang="en-US" sz="3200" dirty="0">
+                  <a:solidFill>
+                    <a:schemeClr val="bg1"/>
+                  </a:solidFill>
+                </a:rPr>
+                <a:t>Aa		01</a:t>
+              </a:r>
+            </a:p>
+            <a:p>
+              <a:endParaRPr lang="en-US" sz="3200" dirty="0">
+                <a:solidFill>
+                  <a:schemeClr val="bg1"/>
+                </a:solidFill>
+              </a:endParaRPr>
+            </a:p>
+            <a:p>
+              <a:r>
+                <a:rPr lang="en-US" sz="3200" dirty="0" err="1">
+                  <a:solidFill>
+                    <a:schemeClr val="bg1"/>
+                  </a:solidFill>
+                </a:rPr>
+                <a:t>aA</a:t>
+              </a:r>
+              <a:r>
+                <a:rPr lang="en-US" sz="3200" dirty="0">
+                  <a:solidFill>
+                    <a:schemeClr val="bg1"/>
+                  </a:solidFill>
+                </a:rPr>
+                <a:t>		01</a:t>
+              </a:r>
+            </a:p>
+            <a:p>
+              <a:endParaRPr lang="en-US" sz="3200" dirty="0">
+                <a:solidFill>
+                  <a:schemeClr val="bg1"/>
+                </a:solidFill>
+              </a:endParaRPr>
+            </a:p>
+            <a:p>
+              <a:r>
+                <a:rPr lang="en-US" sz="3200" dirty="0">
+                  <a:solidFill>
+                    <a:schemeClr val="bg1"/>
+                  </a:solidFill>
+                </a:rPr>
+                <a:t>aa		00</a:t>
+              </a:r>
+            </a:p>
+            <a:p>
+              <a:endParaRPr lang="en-US" sz="3200" dirty="0">
+                <a:solidFill>
+                  <a:schemeClr val="bg1"/>
+                </a:solidFill>
+              </a:endParaRPr>
+            </a:p>
+            <a:p>
+              <a:r>
+                <a:rPr lang="en-US" sz="3200" dirty="0">
+                  <a:solidFill>
+                    <a:schemeClr val="bg1"/>
+                  </a:solidFill>
+                </a:rPr>
+                <a:t>00		--</a:t>
+              </a:r>
+            </a:p>
+          </p:txBody>
+        </p:sp>
+        <p:cxnSp>
+          <p:nvCxnSpPr>
+            <p:cNvPr id="6" name="Straight Arrow Connector 5">
+              <a:extLst>
+                <a:ext uri="{FF2B5EF4-FFF2-40B4-BE49-F238E27FC236}">
+                  <a16:creationId xmlns:a16="http://schemas.microsoft.com/office/drawing/2014/main" id="{3459302C-9DA2-6307-5196-16A602F51D30}"/>
+                </a:ext>
+              </a:extLst>
+            </p:cNvPr>
+            <p:cNvCxnSpPr/>
+            <p:nvPr/>
+          </p:nvCxnSpPr>
+          <p:spPr>
+            <a:xfrm>
+              <a:off x="5136355" y="2106613"/>
+              <a:ext cx="771525" cy="0"/>
+            </a:xfrm>
+            <a:prstGeom prst="straightConnector1">
+              <a:avLst/>
+            </a:prstGeom>
+            <a:ln w="53975">
+              <a:solidFill>
+                <a:schemeClr val="accent6"/>
+              </a:solidFill>
+              <a:tailEnd type="triangle"/>
+            </a:ln>
+          </p:spPr>
+          <p:style>
+            <a:lnRef idx="2">
+              <a:schemeClr val="accent1"/>
+            </a:lnRef>
+            <a:fillRef idx="0">
+              <a:schemeClr val="accent1"/>
+            </a:fillRef>
+            <a:effectRef idx="1">
+              <a:schemeClr val="accent1"/>
+            </a:effectRef>
+            <a:fontRef idx="minor">
+              <a:schemeClr val="tx1"/>
+            </a:fontRef>
+          </p:style>
+        </p:cxnSp>
+        <p:cxnSp>
+          <p:nvCxnSpPr>
+            <p:cNvPr id="7" name="Straight Arrow Connector 6">
+              <a:extLst>
+                <a:ext uri="{FF2B5EF4-FFF2-40B4-BE49-F238E27FC236}">
+                  <a16:creationId xmlns:a16="http://schemas.microsoft.com/office/drawing/2014/main" id="{F635833E-4A92-E314-C337-8D0DD9CF5075}"/>
+                </a:ext>
+              </a:extLst>
+            </p:cNvPr>
+            <p:cNvCxnSpPr/>
+            <p:nvPr/>
+          </p:nvCxnSpPr>
+          <p:spPr>
+            <a:xfrm>
+              <a:off x="5136355" y="3087688"/>
+              <a:ext cx="771525" cy="0"/>
+            </a:xfrm>
+            <a:prstGeom prst="straightConnector1">
+              <a:avLst/>
+            </a:prstGeom>
+            <a:ln w="53975">
+              <a:solidFill>
+                <a:schemeClr val="accent6"/>
+              </a:solidFill>
+              <a:tailEnd type="triangle"/>
+            </a:ln>
+          </p:spPr>
+          <p:style>
+            <a:lnRef idx="2">
+              <a:schemeClr val="accent1"/>
+            </a:lnRef>
+            <a:fillRef idx="0">
+              <a:schemeClr val="accent1"/>
+            </a:fillRef>
+            <a:effectRef idx="1">
+              <a:schemeClr val="accent1"/>
+            </a:effectRef>
+            <a:fontRef idx="minor">
+              <a:schemeClr val="tx1"/>
+            </a:fontRef>
+          </p:style>
+        </p:cxnSp>
+        <p:cxnSp>
+          <p:nvCxnSpPr>
+            <p:cNvPr id="8" name="Straight Arrow Connector 7">
+              <a:extLst>
+                <a:ext uri="{FF2B5EF4-FFF2-40B4-BE49-F238E27FC236}">
+                  <a16:creationId xmlns:a16="http://schemas.microsoft.com/office/drawing/2014/main" id="{71E4BF51-718D-8DE6-20F1-B24DC360C46D}"/>
+                </a:ext>
+              </a:extLst>
+            </p:cNvPr>
+            <p:cNvCxnSpPr/>
+            <p:nvPr/>
+          </p:nvCxnSpPr>
+          <p:spPr>
+            <a:xfrm>
+              <a:off x="5136355" y="3997325"/>
+              <a:ext cx="771525" cy="0"/>
+            </a:xfrm>
+            <a:prstGeom prst="straightConnector1">
+              <a:avLst/>
+            </a:prstGeom>
+            <a:ln w="53975">
+              <a:solidFill>
+                <a:schemeClr val="accent6"/>
+              </a:solidFill>
+              <a:tailEnd type="triangle"/>
+            </a:ln>
+          </p:spPr>
+          <p:style>
+            <a:lnRef idx="2">
+              <a:schemeClr val="accent1"/>
+            </a:lnRef>
+            <a:fillRef idx="0">
+              <a:schemeClr val="accent1"/>
+            </a:fillRef>
+            <a:effectRef idx="1">
+              <a:schemeClr val="accent1"/>
+            </a:effectRef>
+            <a:fontRef idx="minor">
+              <a:schemeClr val="tx1"/>
+            </a:fontRef>
+          </p:style>
+        </p:cxnSp>
+        <p:cxnSp>
+          <p:nvCxnSpPr>
+            <p:cNvPr id="9" name="Straight Arrow Connector 8">
+              <a:extLst>
+                <a:ext uri="{FF2B5EF4-FFF2-40B4-BE49-F238E27FC236}">
+                  <a16:creationId xmlns:a16="http://schemas.microsoft.com/office/drawing/2014/main" id="{33B15783-3752-B194-DC1C-32239BF5E811}"/>
+                </a:ext>
+              </a:extLst>
+            </p:cNvPr>
+            <p:cNvCxnSpPr/>
+            <p:nvPr/>
+          </p:nvCxnSpPr>
+          <p:spPr>
+            <a:xfrm>
+              <a:off x="5136355" y="5059363"/>
+              <a:ext cx="771525" cy="0"/>
+            </a:xfrm>
+            <a:prstGeom prst="straightConnector1">
+              <a:avLst/>
+            </a:prstGeom>
+            <a:ln w="53975">
+              <a:solidFill>
+                <a:schemeClr val="accent6"/>
+              </a:solidFill>
+              <a:tailEnd type="triangle"/>
+            </a:ln>
+          </p:spPr>
+          <p:style>
+            <a:lnRef idx="2">
+              <a:schemeClr val="accent1"/>
+            </a:lnRef>
+            <a:fillRef idx="0">
+              <a:schemeClr val="accent1"/>
+            </a:fillRef>
+            <a:effectRef idx="1">
+              <a:schemeClr val="accent1"/>
+            </a:effectRef>
+            <a:fontRef idx="minor">
+              <a:schemeClr val="tx1"/>
+            </a:fontRef>
+          </p:style>
+        </p:cxnSp>
+        <p:cxnSp>
+          <p:nvCxnSpPr>
+            <p:cNvPr id="10" name="Straight Arrow Connector 9">
+              <a:extLst>
+                <a:ext uri="{FF2B5EF4-FFF2-40B4-BE49-F238E27FC236}">
+                  <a16:creationId xmlns:a16="http://schemas.microsoft.com/office/drawing/2014/main" id="{2A4816DC-AD54-0076-4DEF-B2928BC2CB5C}"/>
+                </a:ext>
+              </a:extLst>
+            </p:cNvPr>
+            <p:cNvCxnSpPr/>
+            <p:nvPr/>
+          </p:nvCxnSpPr>
+          <p:spPr>
+            <a:xfrm>
+              <a:off x="5136355" y="5973763"/>
+              <a:ext cx="771525" cy="0"/>
+            </a:xfrm>
+            <a:prstGeom prst="straightConnector1">
+              <a:avLst/>
+            </a:prstGeom>
+            <a:ln w="53975">
+              <a:solidFill>
+                <a:schemeClr val="accent6"/>
+              </a:solidFill>
+              <a:tailEnd type="triangle"/>
+            </a:ln>
+          </p:spPr>
+          <p:style>
+            <a:lnRef idx="2">
+              <a:schemeClr val="accent1"/>
+            </a:lnRef>
+            <a:fillRef idx="0">
+              <a:schemeClr val="accent1"/>
+            </a:fillRef>
+            <a:effectRef idx="1">
+              <a:schemeClr val="accent1"/>
+            </a:effectRef>
+            <a:fontRef idx="minor">
+              <a:schemeClr val="tx1"/>
+            </a:fontRef>
+          </p:style>
+        </p:cxnSp>
+      </p:grpSp>
+      <p:pic>
+        <p:nvPicPr>
+          <p:cNvPr id="3" name="Picture 2">
+            <a:extLst>
+              <a:ext uri="{FF2B5EF4-FFF2-40B4-BE49-F238E27FC236}">
+                <a16:creationId xmlns:a16="http://schemas.microsoft.com/office/drawing/2014/main" id="{5EEC32C9-20A7-AF1A-2D39-25B9BCDEE2B3}"/>
+              </a:ext>
+            </a:extLst>
+          </p:cNvPr>
+          <p:cNvPicPr>
+            <a:picLocks noChangeAspect="1"/>
+          </p:cNvPicPr>
+          <p:nvPr/>
+        </p:nvPicPr>
+        <p:blipFill>
+          <a:blip r:embed="rId3"/>
+          <a:stretch>
+            <a:fillRect/>
+          </a:stretch>
+        </p:blipFill>
+        <p:spPr>
+          <a:xfrm>
+            <a:off x="4199021" y="1689311"/>
+            <a:ext cx="7992979" cy="3972368"/>
+          </a:xfrm>
+          <a:prstGeom prst="rect">
+            <a:avLst/>
+          </a:prstGeom>
+        </p:spPr>
+      </p:pic>
+      <p:cxnSp>
+        <p:nvCxnSpPr>
+          <p:cNvPr id="11" name="Straight Arrow Connector 10">
+            <a:extLst>
+              <a:ext uri="{FF2B5EF4-FFF2-40B4-BE49-F238E27FC236}">
+                <a16:creationId xmlns:a16="http://schemas.microsoft.com/office/drawing/2014/main" id="{FD826795-1DE9-2044-97DB-9CACCBA8423F}"/>
+              </a:ext>
+            </a:extLst>
+          </p:cNvPr>
+          <p:cNvCxnSpPr>
+            <a:cxnSpLocks/>
+          </p:cNvCxnSpPr>
+          <p:nvPr/>
+        </p:nvCxnSpPr>
+        <p:spPr>
+          <a:xfrm>
+            <a:off x="11353800" y="1299411"/>
+            <a:ext cx="304800" cy="1443789"/>
+          </a:xfrm>
+          <a:prstGeom prst="straightConnector1">
+            <a:avLst/>
+          </a:prstGeom>
+          <a:ln w="31750">
+            <a:tailEnd type="triangle"/>
+          </a:ln>
+        </p:spPr>
+        <p:style>
+          <a:lnRef idx="1">
+            <a:schemeClr val="accent6"/>
+          </a:lnRef>
+          <a:fillRef idx="0">
+            <a:schemeClr val="accent6"/>
+          </a:fillRef>
+          <a:effectRef idx="0">
+            <a:schemeClr val="accent6"/>
+          </a:effectRef>
+          <a:fontRef idx="minor">
+            <a:schemeClr val="tx1"/>
+          </a:fontRef>
+        </p:style>
+      </p:cxnSp>
+      <p:sp>
+        <p:nvSpPr>
+          <p:cNvPr id="15" name="TextBox 14">
+            <a:extLst>
+              <a:ext uri="{FF2B5EF4-FFF2-40B4-BE49-F238E27FC236}">
+                <a16:creationId xmlns:a16="http://schemas.microsoft.com/office/drawing/2014/main" id="{A9BFFFE5-EF11-1D3E-783A-9209098EFAAD}"/>
+              </a:ext>
+            </a:extLst>
+          </p:cNvPr>
+          <p:cNvSpPr txBox="1"/>
+          <p:nvPr/>
+        </p:nvSpPr>
+        <p:spPr>
+          <a:xfrm>
+            <a:off x="10359190" y="827851"/>
+            <a:ext cx="1457826" cy="400110"/>
+          </a:xfrm>
+          <a:prstGeom prst="rect">
+            <a:avLst/>
+          </a:prstGeom>
+          <a:noFill/>
+        </p:spPr>
+        <p:txBody>
+          <a:bodyPr wrap="square" rtlCol="0">
+            <a:spAutoFit/>
+          </a:bodyPr>
+          <a:lstStyle/>
+          <a:p>
+            <a:r>
+              <a:rPr lang="en-GB" sz="2000" dirty="0">
+                <a:solidFill>
+                  <a:schemeClr val="bg1"/>
+                </a:solidFill>
+              </a:rPr>
+              <a:t>Phenotype</a:t>
+            </a:r>
+            <a:endParaRPr lang="en-GB" dirty="0">
+              <a:solidFill>
+                <a:schemeClr val="bg1"/>
+              </a:solidFill>
+            </a:endParaRPr>
           </a:p>
         </p:txBody>
       </p:sp>
     </p:spTree>
     <p:extLst>
       <p:ext uri="{BB962C8B-B14F-4D97-AF65-F5344CB8AC3E}">
-        <p14:creationId xmlns:p14="http://schemas.microsoft.com/office/powerpoint/2010/main" val="2813823153"/>
+        <p14:creationId xmlns:p14="http://schemas.microsoft.com/office/powerpoint/2010/main" val="874479943"/>
       </p:ext>
     </p:extLst>
   </p:cSld>
@@ -4636,12 +6448,12 @@
   </p:clrMapOvr>
   <mc:AlternateContent xmlns:mc="http://schemas.openxmlformats.org/markup-compatibility/2006">
     <mc:Choice xmlns:p159="http://schemas.microsoft.com/office/powerpoint/2015/09/main" Requires="p159">
-      <p:transition spd="med">
+      <p:transition spd="slow">
         <p159:morph option="byObject"/>
       </p:transition>
     </mc:Choice>
     <mc:Fallback>
-      <p:transition spd="med">
+      <p:transition spd="slow">
         <p:fade/>
       </p:transition>
     </mc:Fallback>
@@ -4671,7 +6483,7 @@
           <p:cNvPr id="2" name="Title 1">
             <a:extLst>
               <a:ext uri="{FF2B5EF4-FFF2-40B4-BE49-F238E27FC236}">
-                <a16:creationId xmlns:a16="http://schemas.microsoft.com/office/drawing/2014/main" id="{13751D2F-A734-6117-CDDA-CAE9CCBF1E19}"/>
+                <a16:creationId xmlns:a16="http://schemas.microsoft.com/office/drawing/2014/main" id="{C74B9442-58DA-9B1A-5EF5-D587463E57F3}"/>
               </a:ext>
             </a:extLst>
           </p:cNvPr>
@@ -4689,7 +6501,7 @@
           <a:p>
             <a:r>
               <a:rPr lang="en-US" dirty="0"/>
-              <a:t>Primitive</a:t>
+              <a:t>Espresso</a:t>
             </a:r>
           </a:p>
         </p:txBody>
@@ -4699,7 +6511,7 @@
           <p:cNvPr id="3" name="Content Placeholder 2">
             <a:extLst>
               <a:ext uri="{FF2B5EF4-FFF2-40B4-BE49-F238E27FC236}">
-                <a16:creationId xmlns:a16="http://schemas.microsoft.com/office/drawing/2014/main" id="{0B44CFB8-CF30-2182-BF96-880D7C99FB25}"/>
+                <a16:creationId xmlns:a16="http://schemas.microsoft.com/office/drawing/2014/main" id="{D2CE436A-2E9B-1F9D-73F5-773BF4A04D64}"/>
               </a:ext>
             </a:extLst>
           </p:cNvPr>
@@ -4715,14 +6527,42 @@
           <a:bodyPr/>
           <a:lstStyle/>
           <a:p>
-            <a:endParaRPr lang="en-US" dirty="0"/>
+            <a:r>
+              <a:rPr lang="en-GB" noProof="0" dirty="0"/>
+              <a:t>Truth table minimisation</a:t>
+            </a:r>
+          </a:p>
+          <a:p>
+            <a:r>
+              <a:rPr lang="en-GB" dirty="0"/>
+              <a:t>Gives minimal cover as sum of products</a:t>
+            </a:r>
+            <a:endParaRPr lang="en-GB" noProof="0" dirty="0"/>
+          </a:p>
+          <a:p>
+            <a:r>
+              <a:rPr lang="en-GB" noProof="0" dirty="0"/>
+              <a:t>Heuristic approach</a:t>
+            </a:r>
+          </a:p>
+          <a:p>
+            <a:r>
+              <a:rPr lang="en-GB" dirty="0"/>
+              <a:t>No optimal solution</a:t>
+            </a:r>
+          </a:p>
+          <a:p>
+            <a:endParaRPr lang="en-GB" noProof="0" dirty="0"/>
+          </a:p>
+          <a:p>
+            <a:endParaRPr lang="en-GB" noProof="0" dirty="0"/>
           </a:p>
         </p:txBody>
       </p:sp>
     </p:spTree>
     <p:extLst>
       <p:ext uri="{BB962C8B-B14F-4D97-AF65-F5344CB8AC3E}">
-        <p14:creationId xmlns:p14="http://schemas.microsoft.com/office/powerpoint/2010/main" val="4224756309"/>
+        <p14:creationId xmlns:p14="http://schemas.microsoft.com/office/powerpoint/2010/main" val="2813823153"/>
       </p:ext>
     </p:extLst>
   </p:cSld>
@@ -4731,12 +6571,12 @@
   </p:clrMapOvr>
   <mc:AlternateContent xmlns:mc="http://schemas.openxmlformats.org/markup-compatibility/2006">
     <mc:Choice xmlns:p159="http://schemas.microsoft.com/office/powerpoint/2015/09/main" Requires="p159">
-      <p:transition spd="med">
+      <p:transition spd="slow">
         <p159:morph option="byObject"/>
       </p:transition>
     </mc:Choice>
     <mc:Fallback>
-      <p:transition spd="med">
+      <p:transition spd="slow">
         <p:fade/>
       </p:transition>
     </mc:Fallback>
@@ -4766,7 +6606,7 @@
           <p:cNvPr id="2" name="Title 1">
             <a:extLst>
               <a:ext uri="{FF2B5EF4-FFF2-40B4-BE49-F238E27FC236}">
-                <a16:creationId xmlns:a16="http://schemas.microsoft.com/office/drawing/2014/main" id="{9343E0F4-D93B-B885-D918-C2431E94CBB7}"/>
+                <a16:creationId xmlns:a16="http://schemas.microsoft.com/office/drawing/2014/main" id="{13751D2F-A734-6117-CDDA-CAE9CCBF1E19}"/>
               </a:ext>
             </a:extLst>
           </p:cNvPr>
@@ -4784,7 +6624,7 @@
           <a:p>
             <a:r>
               <a:rPr lang="en-US" dirty="0"/>
-              <a:t>Pyramid</a:t>
+              <a:t>Primitive approaches</a:t>
             </a:r>
           </a:p>
         </p:txBody>
@@ -4794,7 +6634,7 @@
           <p:cNvPr id="3" name="Content Placeholder 2">
             <a:extLst>
               <a:ext uri="{FF2B5EF4-FFF2-40B4-BE49-F238E27FC236}">
-                <a16:creationId xmlns:a16="http://schemas.microsoft.com/office/drawing/2014/main" id="{23E80E1D-F858-BD88-E249-234D95EA847E}"/>
+                <a16:creationId xmlns:a16="http://schemas.microsoft.com/office/drawing/2014/main" id="{0B44CFB8-CF30-2182-BF96-880D7C99FB25}"/>
               </a:ext>
             </a:extLst>
           </p:cNvPr>
@@ -4810,14 +6650,32 @@
           <a:bodyPr/>
           <a:lstStyle/>
           <a:p>
-            <a:endParaRPr lang="en-US"/>
+            <a:r>
+              <a:rPr lang="en-US" dirty="0"/>
+              <a:t>Entire dataset</a:t>
+            </a:r>
+          </a:p>
+          <a:p>
+            <a:r>
+              <a:rPr lang="en-US" dirty="0"/>
+              <a:t>Iterate through</a:t>
+            </a:r>
+          </a:p>
+          <a:p>
+            <a:r>
+              <a:rPr lang="en-US" dirty="0"/>
+              <a:t>Partial analysis</a:t>
+            </a:r>
+          </a:p>
+          <a:p>
+            <a:endParaRPr lang="en-US" dirty="0"/>
           </a:p>
         </p:txBody>
       </p:sp>
     </p:spTree>
     <p:extLst>
       <p:ext uri="{BB962C8B-B14F-4D97-AF65-F5344CB8AC3E}">
-        <p14:creationId xmlns:p14="http://schemas.microsoft.com/office/powerpoint/2010/main" val="3525354410"/>
+        <p14:creationId xmlns:p14="http://schemas.microsoft.com/office/powerpoint/2010/main" val="4224756309"/>
       </p:ext>
     </p:extLst>
   </p:cSld>
@@ -4826,12 +6684,12 @@
   </p:clrMapOvr>
   <mc:AlternateContent xmlns:mc="http://schemas.openxmlformats.org/markup-compatibility/2006">
     <mc:Choice xmlns:p159="http://schemas.microsoft.com/office/powerpoint/2015/09/main" Requires="p159">
-      <p:transition spd="med">
+      <p:transition spd="slow">
         <p159:morph option="byObject"/>
       </p:transition>
     </mc:Choice>
     <mc:Fallback>
-      <p:transition spd="med">
+      <p:transition spd="slow">
         <p:fade/>
       </p:transition>
     </mc:Fallback>
@@ -4861,7 +6719,7 @@
           <p:cNvPr id="2" name="Title 1">
             <a:extLst>
               <a:ext uri="{FF2B5EF4-FFF2-40B4-BE49-F238E27FC236}">
-                <a16:creationId xmlns:a16="http://schemas.microsoft.com/office/drawing/2014/main" id="{396077DE-5B3A-AFFA-EE46-B1EA21F30692}"/>
+                <a16:creationId xmlns:a16="http://schemas.microsoft.com/office/drawing/2014/main" id="{9343E0F4-D93B-B885-D918-C2431E94CBB7}"/>
               </a:ext>
             </a:extLst>
           </p:cNvPr>
@@ -4879,7 +6737,7 @@
           <a:p>
             <a:r>
               <a:rPr lang="en-US" dirty="0"/>
-              <a:t>Group</a:t>
+              <a:t>Pyramid</a:t>
             </a:r>
           </a:p>
         </p:txBody>
@@ -4889,7 +6747,7 @@
           <p:cNvPr id="3" name="Content Placeholder 2">
             <a:extLst>
               <a:ext uri="{FF2B5EF4-FFF2-40B4-BE49-F238E27FC236}">
-                <a16:creationId xmlns:a16="http://schemas.microsoft.com/office/drawing/2014/main" id="{1D223CB3-9F5B-4415-9614-E835B9C12A2C}"/>
+                <a16:creationId xmlns:a16="http://schemas.microsoft.com/office/drawing/2014/main" id="{23E80E1D-F858-BD88-E249-234D95EA847E}"/>
               </a:ext>
             </a:extLst>
           </p:cNvPr>
@@ -4912,7 +6770,7 @@
     </p:spTree>
     <p:extLst>
       <p:ext uri="{BB962C8B-B14F-4D97-AF65-F5344CB8AC3E}">
-        <p14:creationId xmlns:p14="http://schemas.microsoft.com/office/powerpoint/2010/main" val="3373506639"/>
+        <p14:creationId xmlns:p14="http://schemas.microsoft.com/office/powerpoint/2010/main" val="3525354410"/>
       </p:ext>
     </p:extLst>
   </p:cSld>
@@ -4921,12 +6779,12 @@
   </p:clrMapOvr>
   <mc:AlternateContent xmlns:mc="http://schemas.openxmlformats.org/markup-compatibility/2006">
     <mc:Choice xmlns:p159="http://schemas.microsoft.com/office/powerpoint/2015/09/main" Requires="p159">
-      <p:transition spd="med">
+      <p:transition spd="slow">
         <p159:morph option="byObject"/>
       </p:transition>
     </mc:Choice>
     <mc:Fallback>
-      <p:transition spd="med">
+      <p:transition spd="slow">
         <p:fade/>
       </p:transition>
     </mc:Fallback>

</xml_diff>

<commit_message>
additions and big improvements on ppp
</commit_message>
<xml_diff>
--- a/Presentation/End_of_internship.pptx
+++ b/Presentation/End_of_internship.pptx
@@ -5,7 +5,7 @@
     <p:sldMasterId id="2147483648" r:id="rId1"/>
   </p:sldMasterIdLst>
   <p:notesMasterIdLst>
-    <p:notesMasterId r:id="rId16"/>
+    <p:notesMasterId r:id="rId20"/>
   </p:notesMasterIdLst>
   <p:sldIdLst>
     <p:sldId id="256" r:id="rId2"/>
@@ -18,10 +18,14 @@
     <p:sldId id="271" r:id="rId9"/>
     <p:sldId id="264" r:id="rId10"/>
     <p:sldId id="258" r:id="rId11"/>
-    <p:sldId id="259" r:id="rId12"/>
-    <p:sldId id="261" r:id="rId13"/>
-    <p:sldId id="266" r:id="rId14"/>
-    <p:sldId id="267" r:id="rId15"/>
+    <p:sldId id="261" r:id="rId12"/>
+    <p:sldId id="259" r:id="rId13"/>
+    <p:sldId id="274" r:id="rId14"/>
+    <p:sldId id="266" r:id="rId15"/>
+    <p:sldId id="276" r:id="rId16"/>
+    <p:sldId id="277" r:id="rId17"/>
+    <p:sldId id="267" r:id="rId18"/>
+    <p:sldId id="273" r:id="rId19"/>
   </p:sldIdLst>
   <p:sldSz cx="12192000" cy="6858000"/>
   <p:notesSz cx="6858000" cy="9144000"/>
@@ -128,6 +132,3308 @@
 </p:presentation>
 </file>
 
+<file path=ppt/diagrams/colors1.xml><?xml version="1.0" encoding="utf-8"?>
+<dgm:colorsDef xmlns:dgm="http://schemas.openxmlformats.org/drawingml/2006/diagram" xmlns:a="http://schemas.openxmlformats.org/drawingml/2006/main" uniqueId="urn:microsoft.com/office/officeart/2005/8/colors/accent5_5">
+  <dgm:title val=""/>
+  <dgm:desc val=""/>
+  <dgm:catLst>
+    <dgm:cat type="accent5" pri="11500"/>
+  </dgm:catLst>
+  <dgm:styleLbl name="node0">
+    <dgm:fillClrLst meth="cycle">
+      <a:schemeClr val="accent5">
+        <a:alpha val="80000"/>
+      </a:schemeClr>
+    </dgm:fillClrLst>
+    <dgm:linClrLst meth="repeat">
+      <a:schemeClr val="lt1"/>
+    </dgm:linClrLst>
+    <dgm:effectClrLst/>
+    <dgm:txLinClrLst/>
+    <dgm:txFillClrLst/>
+    <dgm:txEffectClrLst/>
+  </dgm:styleLbl>
+  <dgm:styleLbl name="node1">
+    <dgm:fillClrLst>
+      <a:schemeClr val="accent5">
+        <a:alpha val="90000"/>
+      </a:schemeClr>
+      <a:schemeClr val="accent5">
+        <a:alpha val="50000"/>
+      </a:schemeClr>
+    </dgm:fillClrLst>
+    <dgm:linClrLst meth="repeat">
+      <a:schemeClr val="lt1"/>
+    </dgm:linClrLst>
+    <dgm:effectClrLst/>
+    <dgm:txLinClrLst/>
+    <dgm:txFillClrLst/>
+    <dgm:txEffectClrLst/>
+  </dgm:styleLbl>
+  <dgm:styleLbl name="alignNode1">
+    <dgm:fillClrLst>
+      <a:schemeClr val="accent5">
+        <a:alpha val="90000"/>
+      </a:schemeClr>
+      <a:schemeClr val="accent5">
+        <a:alpha val="50000"/>
+      </a:schemeClr>
+    </dgm:fillClrLst>
+    <dgm:linClrLst>
+      <a:schemeClr val="accent5">
+        <a:alpha val="90000"/>
+      </a:schemeClr>
+      <a:schemeClr val="accent5">
+        <a:alpha val="50000"/>
+      </a:schemeClr>
+    </dgm:linClrLst>
+    <dgm:effectClrLst/>
+    <dgm:txLinClrLst/>
+    <dgm:txFillClrLst/>
+    <dgm:txEffectClrLst/>
+  </dgm:styleLbl>
+  <dgm:styleLbl name="lnNode1">
+    <dgm:fillClrLst>
+      <a:schemeClr val="accent5">
+        <a:shade val="90000"/>
+      </a:schemeClr>
+      <a:schemeClr val="accent5">
+        <a:alpha val="50000"/>
+        <a:tint val="50000"/>
+      </a:schemeClr>
+    </dgm:fillClrLst>
+    <dgm:linClrLst meth="repeat">
+      <a:schemeClr val="lt1"/>
+    </dgm:linClrLst>
+    <dgm:effectClrLst/>
+    <dgm:txLinClrLst/>
+    <dgm:txFillClrLst/>
+    <dgm:txEffectClrLst/>
+  </dgm:styleLbl>
+  <dgm:styleLbl name="vennNode1">
+    <dgm:fillClrLst>
+      <a:schemeClr val="accent5">
+        <a:shade val="80000"/>
+        <a:alpha val="50000"/>
+      </a:schemeClr>
+      <a:schemeClr val="accent5">
+        <a:alpha val="20000"/>
+      </a:schemeClr>
+    </dgm:fillClrLst>
+    <dgm:linClrLst meth="repeat">
+      <a:schemeClr val="lt1"/>
+    </dgm:linClrLst>
+    <dgm:effectClrLst/>
+    <dgm:txLinClrLst/>
+    <dgm:txFillClrLst/>
+    <dgm:txEffectClrLst/>
+  </dgm:styleLbl>
+  <dgm:styleLbl name="node2">
+    <dgm:fillClrLst>
+      <a:schemeClr val="accent5">
+        <a:alpha val="70000"/>
+      </a:schemeClr>
+    </dgm:fillClrLst>
+    <dgm:linClrLst meth="repeat">
+      <a:schemeClr val="lt1"/>
+    </dgm:linClrLst>
+    <dgm:effectClrLst/>
+    <dgm:txLinClrLst/>
+    <dgm:txFillClrLst/>
+    <dgm:txEffectClrLst/>
+  </dgm:styleLbl>
+  <dgm:styleLbl name="node3">
+    <dgm:fillClrLst>
+      <a:schemeClr val="accent5">
+        <a:alpha val="50000"/>
+      </a:schemeClr>
+    </dgm:fillClrLst>
+    <dgm:linClrLst meth="repeat">
+      <a:schemeClr val="lt1"/>
+    </dgm:linClrLst>
+    <dgm:effectClrLst/>
+    <dgm:txLinClrLst/>
+    <dgm:txFillClrLst/>
+    <dgm:txEffectClrLst/>
+  </dgm:styleLbl>
+  <dgm:styleLbl name="node4">
+    <dgm:fillClrLst>
+      <a:schemeClr val="accent5">
+        <a:alpha val="30000"/>
+      </a:schemeClr>
+    </dgm:fillClrLst>
+    <dgm:linClrLst meth="repeat">
+      <a:schemeClr val="lt1"/>
+    </dgm:linClrLst>
+    <dgm:effectClrLst/>
+    <dgm:txLinClrLst/>
+    <dgm:txFillClrLst/>
+    <dgm:txEffectClrLst/>
+  </dgm:styleLbl>
+  <dgm:styleLbl name="fgImgPlace1">
+    <dgm:fillClrLst>
+      <a:schemeClr val="accent5">
+        <a:tint val="50000"/>
+        <a:alpha val="90000"/>
+      </a:schemeClr>
+      <a:schemeClr val="accent5">
+        <a:tint val="20000"/>
+        <a:alpha val="50000"/>
+      </a:schemeClr>
+    </dgm:fillClrLst>
+    <dgm:linClrLst meth="repeat">
+      <a:schemeClr val="lt1"/>
+    </dgm:linClrLst>
+    <dgm:effectClrLst/>
+    <dgm:txLinClrLst/>
+    <dgm:txFillClrLst meth="repeat">
+      <a:schemeClr val="lt1"/>
+    </dgm:txFillClrLst>
+    <dgm:txEffectClrLst/>
+  </dgm:styleLbl>
+  <dgm:styleLbl name="alignImgPlace1">
+    <dgm:fillClrLst>
+      <a:schemeClr val="accent5">
+        <a:tint val="50000"/>
+      </a:schemeClr>
+      <a:schemeClr val="accent5">
+        <a:tint val="20000"/>
+      </a:schemeClr>
+    </dgm:fillClrLst>
+    <dgm:linClrLst meth="repeat">
+      <a:schemeClr val="lt1"/>
+    </dgm:linClrLst>
+    <dgm:effectClrLst/>
+    <dgm:txLinClrLst/>
+    <dgm:txFillClrLst meth="repeat">
+      <a:schemeClr val="lt1"/>
+    </dgm:txFillClrLst>
+    <dgm:txEffectClrLst/>
+  </dgm:styleLbl>
+  <dgm:styleLbl name="bgImgPlace1">
+    <dgm:fillClrLst>
+      <a:schemeClr val="accent5">
+        <a:tint val="50000"/>
+      </a:schemeClr>
+      <a:schemeClr val="accent5">
+        <a:tint val="20000"/>
+      </a:schemeClr>
+    </dgm:fillClrLst>
+    <dgm:linClrLst meth="repeat">
+      <a:schemeClr val="lt1"/>
+    </dgm:linClrLst>
+    <dgm:effectClrLst/>
+    <dgm:txLinClrLst/>
+    <dgm:txFillClrLst meth="repeat">
+      <a:schemeClr val="lt1"/>
+    </dgm:txFillClrLst>
+    <dgm:txEffectClrLst/>
+  </dgm:styleLbl>
+  <dgm:styleLbl name="sibTrans2D1">
+    <dgm:fillClrLst>
+      <a:schemeClr val="accent5">
+        <a:shade val="90000"/>
+      </a:schemeClr>
+      <a:schemeClr val="accent5">
+        <a:tint val="50000"/>
+      </a:schemeClr>
+    </dgm:fillClrLst>
+    <dgm:linClrLst>
+      <a:schemeClr val="accent5">
+        <a:shade val="90000"/>
+      </a:schemeClr>
+      <a:schemeClr val="accent5">
+        <a:tint val="50000"/>
+      </a:schemeClr>
+    </dgm:linClrLst>
+    <dgm:effectClrLst/>
+    <dgm:txLinClrLst/>
+    <dgm:txFillClrLst/>
+    <dgm:txEffectClrLst/>
+  </dgm:styleLbl>
+  <dgm:styleLbl name="fgSibTrans2D1">
+    <dgm:fillClrLst>
+      <a:schemeClr val="accent5">
+        <a:shade val="90000"/>
+      </a:schemeClr>
+      <a:schemeClr val="accent5">
+        <a:tint val="50000"/>
+      </a:schemeClr>
+    </dgm:fillClrLst>
+    <dgm:linClrLst>
+      <a:schemeClr val="accent5">
+        <a:shade val="90000"/>
+      </a:schemeClr>
+      <a:schemeClr val="accent5">
+        <a:tint val="50000"/>
+      </a:schemeClr>
+    </dgm:linClrLst>
+    <dgm:effectClrLst/>
+    <dgm:txLinClrLst/>
+    <dgm:txFillClrLst/>
+    <dgm:txEffectClrLst/>
+  </dgm:styleLbl>
+  <dgm:styleLbl name="bgSibTrans2D1">
+    <dgm:fillClrLst>
+      <a:schemeClr val="accent5">
+        <a:shade val="90000"/>
+      </a:schemeClr>
+      <a:schemeClr val="accent5">
+        <a:tint val="50000"/>
+      </a:schemeClr>
+    </dgm:fillClrLst>
+    <dgm:linClrLst>
+      <a:schemeClr val="accent5">
+        <a:shade val="90000"/>
+      </a:schemeClr>
+      <a:schemeClr val="accent5">
+        <a:tint val="50000"/>
+      </a:schemeClr>
+    </dgm:linClrLst>
+    <dgm:effectClrLst/>
+    <dgm:txLinClrLst/>
+    <dgm:txFillClrLst/>
+    <dgm:txEffectClrLst/>
+  </dgm:styleLbl>
+  <dgm:styleLbl name="sibTrans1D1">
+    <dgm:fillClrLst>
+      <a:schemeClr val="accent5">
+        <a:shade val="90000"/>
+      </a:schemeClr>
+      <a:schemeClr val="accent5">
+        <a:tint val="50000"/>
+      </a:schemeClr>
+    </dgm:fillClrLst>
+    <dgm:linClrLst>
+      <a:schemeClr val="accent5">
+        <a:shade val="90000"/>
+      </a:schemeClr>
+      <a:schemeClr val="accent5">
+        <a:tint val="50000"/>
+      </a:schemeClr>
+    </dgm:linClrLst>
+    <dgm:effectClrLst/>
+    <dgm:txLinClrLst/>
+    <dgm:txFillClrLst meth="repeat">
+      <a:schemeClr val="tx1"/>
+    </dgm:txFillClrLst>
+    <dgm:txEffectClrLst/>
+  </dgm:styleLbl>
+  <dgm:styleLbl name="callout">
+    <dgm:fillClrLst meth="repeat">
+      <a:schemeClr val="accent5"/>
+    </dgm:fillClrLst>
+    <dgm:linClrLst meth="repeat">
+      <a:schemeClr val="accent5"/>
+    </dgm:linClrLst>
+    <dgm:effectClrLst/>
+    <dgm:txLinClrLst/>
+    <dgm:txFillClrLst meth="repeat">
+      <a:schemeClr val="tx1"/>
+    </dgm:txFillClrLst>
+    <dgm:txEffectClrLst/>
+  </dgm:styleLbl>
+  <dgm:styleLbl name="asst0">
+    <dgm:fillClrLst meth="repeat">
+      <a:schemeClr val="accent5">
+        <a:alpha val="90000"/>
+      </a:schemeClr>
+    </dgm:fillClrLst>
+    <dgm:linClrLst meth="repeat">
+      <a:schemeClr val="lt1"/>
+    </dgm:linClrLst>
+    <dgm:effectClrLst/>
+    <dgm:txLinClrLst/>
+    <dgm:txFillClrLst/>
+    <dgm:txEffectClrLst/>
+  </dgm:styleLbl>
+  <dgm:styleLbl name="asst1">
+    <dgm:fillClrLst meth="repeat">
+      <a:schemeClr val="accent5">
+        <a:alpha val="90000"/>
+      </a:schemeClr>
+    </dgm:fillClrLst>
+    <dgm:linClrLst meth="repeat">
+      <a:schemeClr val="lt1"/>
+    </dgm:linClrLst>
+    <dgm:effectClrLst/>
+    <dgm:txLinClrLst/>
+    <dgm:txFillClrLst/>
+    <dgm:txEffectClrLst/>
+  </dgm:styleLbl>
+  <dgm:styleLbl name="asst2">
+    <dgm:fillClrLst>
+      <a:schemeClr val="accent5">
+        <a:alpha val="90000"/>
+      </a:schemeClr>
+    </dgm:fillClrLst>
+    <dgm:linClrLst meth="repeat">
+      <a:schemeClr val="lt1"/>
+    </dgm:linClrLst>
+    <dgm:effectClrLst/>
+    <dgm:txLinClrLst/>
+    <dgm:txFillClrLst/>
+    <dgm:txEffectClrLst/>
+  </dgm:styleLbl>
+  <dgm:styleLbl name="asst3">
+    <dgm:fillClrLst>
+      <a:schemeClr val="accent5">
+        <a:alpha val="70000"/>
+      </a:schemeClr>
+    </dgm:fillClrLst>
+    <dgm:linClrLst meth="repeat">
+      <a:schemeClr val="lt1"/>
+    </dgm:linClrLst>
+    <dgm:effectClrLst/>
+    <dgm:txLinClrLst/>
+    <dgm:txFillClrLst/>
+    <dgm:txEffectClrLst/>
+  </dgm:styleLbl>
+  <dgm:styleLbl name="asst4">
+    <dgm:fillClrLst>
+      <a:schemeClr val="accent5">
+        <a:alpha val="50000"/>
+      </a:schemeClr>
+    </dgm:fillClrLst>
+    <dgm:linClrLst meth="repeat">
+      <a:schemeClr val="lt1"/>
+    </dgm:linClrLst>
+    <dgm:effectClrLst/>
+    <dgm:txLinClrLst/>
+    <dgm:txFillClrLst/>
+    <dgm:txEffectClrLst/>
+  </dgm:styleLbl>
+  <dgm:styleLbl name="parChTrans2D1">
+    <dgm:fillClrLst meth="repeat">
+      <a:schemeClr val="accent5">
+        <a:shade val="80000"/>
+      </a:schemeClr>
+    </dgm:fillClrLst>
+    <dgm:linClrLst meth="repeat">
+      <a:schemeClr val="accent5">
+        <a:shade val="80000"/>
+      </a:schemeClr>
+    </dgm:linClrLst>
+    <dgm:effectClrLst/>
+    <dgm:txLinClrLst/>
+    <dgm:txFillClrLst/>
+    <dgm:txEffectClrLst/>
+  </dgm:styleLbl>
+  <dgm:styleLbl name="parChTrans2D2">
+    <dgm:fillClrLst meth="repeat">
+      <a:schemeClr val="accent5">
+        <a:tint val="90000"/>
+      </a:schemeClr>
+    </dgm:fillClrLst>
+    <dgm:linClrLst meth="repeat">
+      <a:schemeClr val="accent5">
+        <a:tint val="90000"/>
+      </a:schemeClr>
+    </dgm:linClrLst>
+    <dgm:effectClrLst/>
+    <dgm:txLinClrLst/>
+    <dgm:txFillClrLst/>
+    <dgm:txEffectClrLst/>
+  </dgm:styleLbl>
+  <dgm:styleLbl name="parChTrans2D3">
+    <dgm:fillClrLst meth="repeat">
+      <a:schemeClr val="accent5">
+        <a:tint val="70000"/>
+      </a:schemeClr>
+    </dgm:fillClrLst>
+    <dgm:linClrLst meth="repeat">
+      <a:schemeClr val="accent5">
+        <a:tint val="70000"/>
+      </a:schemeClr>
+    </dgm:linClrLst>
+    <dgm:effectClrLst/>
+    <dgm:txLinClrLst/>
+    <dgm:txFillClrLst/>
+    <dgm:txEffectClrLst/>
+  </dgm:styleLbl>
+  <dgm:styleLbl name="parChTrans2D4">
+    <dgm:fillClrLst meth="repeat">
+      <a:schemeClr val="accent5">
+        <a:tint val="50000"/>
+      </a:schemeClr>
+    </dgm:fillClrLst>
+    <dgm:linClrLst meth="repeat">
+      <a:schemeClr val="accent5">
+        <a:tint val="50000"/>
+      </a:schemeClr>
+    </dgm:linClrLst>
+    <dgm:effectClrLst/>
+    <dgm:txLinClrLst/>
+    <dgm:txFillClrLst meth="repeat">
+      <a:schemeClr val="dk1"/>
+    </dgm:txFillClrLst>
+    <dgm:txEffectClrLst/>
+  </dgm:styleLbl>
+  <dgm:styleLbl name="parChTrans1D1">
+    <dgm:fillClrLst meth="repeat">
+      <a:schemeClr val="accent5">
+        <a:shade val="80000"/>
+      </a:schemeClr>
+    </dgm:fillClrLst>
+    <dgm:linClrLst meth="repeat">
+      <a:schemeClr val="accent5">
+        <a:shade val="80000"/>
+      </a:schemeClr>
+    </dgm:linClrLst>
+    <dgm:effectClrLst/>
+    <dgm:txLinClrLst/>
+    <dgm:txFillClrLst meth="repeat">
+      <a:schemeClr val="tx1"/>
+    </dgm:txFillClrLst>
+    <dgm:txEffectClrLst/>
+  </dgm:styleLbl>
+  <dgm:styleLbl name="parChTrans1D2">
+    <dgm:fillClrLst meth="repeat">
+      <a:schemeClr val="accent5">
+        <a:tint val="90000"/>
+      </a:schemeClr>
+    </dgm:fillClrLst>
+    <dgm:linClrLst meth="repeat">
+      <a:schemeClr val="accent5">
+        <a:tint val="90000"/>
+      </a:schemeClr>
+    </dgm:linClrLst>
+    <dgm:effectClrLst/>
+    <dgm:txLinClrLst/>
+    <dgm:txFillClrLst meth="repeat">
+      <a:schemeClr val="tx1"/>
+    </dgm:txFillClrLst>
+    <dgm:txEffectClrLst/>
+  </dgm:styleLbl>
+  <dgm:styleLbl name="parChTrans1D3">
+    <dgm:fillClrLst meth="repeat">
+      <a:schemeClr val="accent5">
+        <a:tint val="70000"/>
+      </a:schemeClr>
+    </dgm:fillClrLst>
+    <dgm:linClrLst meth="repeat">
+      <a:schemeClr val="accent5">
+        <a:tint val="70000"/>
+      </a:schemeClr>
+    </dgm:linClrLst>
+    <dgm:effectClrLst/>
+    <dgm:txLinClrLst/>
+    <dgm:txFillClrLst meth="repeat">
+      <a:schemeClr val="tx1"/>
+    </dgm:txFillClrLst>
+    <dgm:txEffectClrLst/>
+  </dgm:styleLbl>
+  <dgm:styleLbl name="parChTrans1D4">
+    <dgm:fillClrLst meth="repeat">
+      <a:schemeClr val="accent5">
+        <a:tint val="50000"/>
+      </a:schemeClr>
+    </dgm:fillClrLst>
+    <dgm:linClrLst meth="repeat">
+      <a:schemeClr val="accent5">
+        <a:tint val="50000"/>
+      </a:schemeClr>
+    </dgm:linClrLst>
+    <dgm:effectClrLst/>
+    <dgm:txLinClrLst/>
+    <dgm:txFillClrLst meth="repeat">
+      <a:schemeClr val="tx1"/>
+    </dgm:txFillClrLst>
+    <dgm:txEffectClrLst/>
+  </dgm:styleLbl>
+  <dgm:styleLbl name="fgAcc1">
+    <dgm:fillClrLst meth="repeat">
+      <a:schemeClr val="lt1">
+        <a:alpha val="90000"/>
+      </a:schemeClr>
+    </dgm:fillClrLst>
+    <dgm:linClrLst>
+      <a:schemeClr val="accent5">
+        <a:alpha val="90000"/>
+      </a:schemeClr>
+      <a:schemeClr val="accent5">
+        <a:alpha val="50000"/>
+      </a:schemeClr>
+    </dgm:linClrLst>
+    <dgm:effectClrLst/>
+    <dgm:txLinClrLst/>
+    <dgm:txFillClrLst meth="repeat">
+      <a:schemeClr val="dk1"/>
+    </dgm:txFillClrLst>
+    <dgm:txEffectClrLst/>
+  </dgm:styleLbl>
+  <dgm:styleLbl name="conFgAcc1">
+    <dgm:fillClrLst meth="repeat">
+      <a:schemeClr val="lt1">
+        <a:alpha val="90000"/>
+      </a:schemeClr>
+    </dgm:fillClrLst>
+    <dgm:linClrLst>
+      <a:schemeClr val="accent5">
+        <a:alpha val="90000"/>
+      </a:schemeClr>
+      <a:schemeClr val="accent5">
+        <a:alpha val="50000"/>
+      </a:schemeClr>
+    </dgm:linClrLst>
+    <dgm:effectClrLst/>
+    <dgm:txLinClrLst/>
+    <dgm:txFillClrLst meth="repeat">
+      <a:schemeClr val="dk1"/>
+    </dgm:txFillClrLst>
+    <dgm:txEffectClrLst/>
+  </dgm:styleLbl>
+  <dgm:styleLbl name="alignAcc1">
+    <dgm:fillClrLst meth="repeat">
+      <a:schemeClr val="lt1">
+        <a:alpha val="90000"/>
+      </a:schemeClr>
+    </dgm:fillClrLst>
+    <dgm:linClrLst>
+      <a:schemeClr val="accent5">
+        <a:alpha val="90000"/>
+      </a:schemeClr>
+      <a:schemeClr val="accent5">
+        <a:alpha val="50000"/>
+      </a:schemeClr>
+    </dgm:linClrLst>
+    <dgm:effectClrLst/>
+    <dgm:txLinClrLst/>
+    <dgm:txFillClrLst meth="repeat">
+      <a:schemeClr val="dk1"/>
+    </dgm:txFillClrLst>
+    <dgm:txEffectClrLst/>
+  </dgm:styleLbl>
+  <dgm:styleLbl name="trAlignAcc1">
+    <dgm:fillClrLst meth="repeat">
+      <a:schemeClr val="lt1">
+        <a:alpha val="40000"/>
+      </a:schemeClr>
+    </dgm:fillClrLst>
+    <dgm:linClrLst>
+      <a:schemeClr val="accent5">
+        <a:alpha val="90000"/>
+      </a:schemeClr>
+      <a:schemeClr val="accent5">
+        <a:alpha val="50000"/>
+      </a:schemeClr>
+    </dgm:linClrLst>
+    <dgm:effectClrLst/>
+    <dgm:txLinClrLst/>
+    <dgm:txFillClrLst meth="repeat">
+      <a:schemeClr val="dk1"/>
+    </dgm:txFillClrLst>
+    <dgm:txEffectClrLst/>
+  </dgm:styleLbl>
+  <dgm:styleLbl name="bgAcc1">
+    <dgm:fillClrLst meth="repeat">
+      <a:schemeClr val="lt1">
+        <a:alpha val="90000"/>
+      </a:schemeClr>
+    </dgm:fillClrLst>
+    <dgm:linClrLst>
+      <a:schemeClr val="accent5">
+        <a:alpha val="90000"/>
+      </a:schemeClr>
+      <a:schemeClr val="accent5">
+        <a:alpha val="50000"/>
+      </a:schemeClr>
+    </dgm:linClrLst>
+    <dgm:effectClrLst/>
+    <dgm:txLinClrLst/>
+    <dgm:txFillClrLst meth="repeat">
+      <a:schemeClr val="dk1"/>
+    </dgm:txFillClrLst>
+    <dgm:txEffectClrLst/>
+  </dgm:styleLbl>
+  <dgm:styleLbl name="solidFgAcc1">
+    <dgm:fillClrLst meth="repeat">
+      <a:schemeClr val="lt1"/>
+    </dgm:fillClrLst>
+    <dgm:linClrLst>
+      <a:schemeClr val="accent5">
+        <a:alpha val="90000"/>
+      </a:schemeClr>
+      <a:schemeClr val="accent5">
+        <a:alpha val="50000"/>
+      </a:schemeClr>
+    </dgm:linClrLst>
+    <dgm:effectClrLst/>
+    <dgm:txLinClrLst/>
+    <dgm:txFillClrLst meth="repeat">
+      <a:schemeClr val="dk1"/>
+    </dgm:txFillClrLst>
+    <dgm:txEffectClrLst/>
+  </dgm:styleLbl>
+  <dgm:styleLbl name="solidAlignAcc1">
+    <dgm:fillClrLst meth="repeat">
+      <a:schemeClr val="lt1"/>
+    </dgm:fillClrLst>
+    <dgm:linClrLst meth="repeat">
+      <a:schemeClr val="accent5"/>
+    </dgm:linClrLst>
+    <dgm:effectClrLst/>
+    <dgm:txLinClrLst/>
+    <dgm:txFillClrLst meth="repeat">
+      <a:schemeClr val="dk1"/>
+    </dgm:txFillClrLst>
+    <dgm:txEffectClrLst/>
+  </dgm:styleLbl>
+  <dgm:styleLbl name="solidBgAcc1">
+    <dgm:fillClrLst meth="repeat">
+      <a:schemeClr val="lt1"/>
+    </dgm:fillClrLst>
+    <dgm:linClrLst meth="repeat">
+      <a:schemeClr val="accent5"/>
+    </dgm:linClrLst>
+    <dgm:effectClrLst/>
+    <dgm:txLinClrLst/>
+    <dgm:txFillClrLst meth="repeat">
+      <a:schemeClr val="dk1"/>
+    </dgm:txFillClrLst>
+    <dgm:txEffectClrLst/>
+  </dgm:styleLbl>
+  <dgm:styleLbl name="fgAccFollowNode1">
+    <dgm:fillClrLst>
+      <a:schemeClr val="accent5">
+        <a:alpha val="90000"/>
+        <a:tint val="40000"/>
+      </a:schemeClr>
+      <a:schemeClr val="accent5">
+        <a:alpha val="50000"/>
+        <a:tint val="40000"/>
+      </a:schemeClr>
+    </dgm:fillClrLst>
+    <dgm:linClrLst meth="repeat">
+      <a:schemeClr val="accent5">
+        <a:alpha val="90000"/>
+        <a:tint val="40000"/>
+      </a:schemeClr>
+    </dgm:linClrLst>
+    <dgm:effectClrLst/>
+    <dgm:txLinClrLst/>
+    <dgm:txFillClrLst meth="repeat">
+      <a:schemeClr val="dk1"/>
+    </dgm:txFillClrLst>
+    <dgm:txEffectClrLst/>
+  </dgm:styleLbl>
+  <dgm:styleLbl name="alignAccFollowNode1">
+    <dgm:fillClrLst meth="repeat">
+      <a:schemeClr val="accent5">
+        <a:alpha val="90000"/>
+        <a:tint val="40000"/>
+      </a:schemeClr>
+    </dgm:fillClrLst>
+    <dgm:linClrLst meth="repeat">
+      <a:schemeClr val="accent5">
+        <a:alpha val="90000"/>
+        <a:tint val="40000"/>
+      </a:schemeClr>
+    </dgm:linClrLst>
+    <dgm:effectClrLst/>
+    <dgm:txLinClrLst/>
+    <dgm:txFillClrLst meth="repeat">
+      <a:schemeClr val="dk1"/>
+    </dgm:txFillClrLst>
+    <dgm:txEffectClrLst/>
+  </dgm:styleLbl>
+  <dgm:styleLbl name="bgAccFollowNode1">
+    <dgm:fillClrLst meth="repeat">
+      <a:schemeClr val="accent5">
+        <a:alpha val="90000"/>
+        <a:tint val="40000"/>
+      </a:schemeClr>
+    </dgm:fillClrLst>
+    <dgm:linClrLst meth="repeat">
+      <a:schemeClr val="lt1"/>
+    </dgm:linClrLst>
+    <dgm:effectClrLst/>
+    <dgm:txLinClrLst/>
+    <dgm:txFillClrLst meth="repeat">
+      <a:schemeClr val="dk1"/>
+    </dgm:txFillClrLst>
+    <dgm:txEffectClrLst/>
+  </dgm:styleLbl>
+  <dgm:styleLbl name="fgAcc0">
+    <dgm:fillClrLst meth="repeat">
+      <a:schemeClr val="lt1">
+        <a:alpha val="90000"/>
+      </a:schemeClr>
+    </dgm:fillClrLst>
+    <dgm:linClrLst meth="repeat">
+      <a:schemeClr val="accent5">
+        <a:shade val="80000"/>
+      </a:schemeClr>
+    </dgm:linClrLst>
+    <dgm:effectClrLst/>
+    <dgm:txLinClrLst/>
+    <dgm:txFillClrLst meth="repeat">
+      <a:schemeClr val="dk1"/>
+    </dgm:txFillClrLst>
+    <dgm:txEffectClrLst/>
+  </dgm:styleLbl>
+  <dgm:styleLbl name="fgAcc2">
+    <dgm:fillClrLst meth="repeat">
+      <a:schemeClr val="lt1">
+        <a:alpha val="90000"/>
+      </a:schemeClr>
+    </dgm:fillClrLst>
+    <dgm:linClrLst meth="repeat">
+      <a:schemeClr val="accent5">
+        <a:tint val="90000"/>
+      </a:schemeClr>
+    </dgm:linClrLst>
+    <dgm:effectClrLst/>
+    <dgm:txLinClrLst/>
+    <dgm:txFillClrLst meth="repeat">
+      <a:schemeClr val="dk1"/>
+    </dgm:txFillClrLst>
+    <dgm:txEffectClrLst/>
+  </dgm:styleLbl>
+  <dgm:styleLbl name="fgAcc3">
+    <dgm:fillClrLst meth="repeat">
+      <a:schemeClr val="lt1">
+        <a:alpha val="90000"/>
+      </a:schemeClr>
+    </dgm:fillClrLst>
+    <dgm:linClrLst meth="repeat">
+      <a:schemeClr val="accent5">
+        <a:tint val="70000"/>
+      </a:schemeClr>
+    </dgm:linClrLst>
+    <dgm:effectClrLst/>
+    <dgm:txLinClrLst/>
+    <dgm:txFillClrLst meth="repeat">
+      <a:schemeClr val="dk1"/>
+    </dgm:txFillClrLst>
+    <dgm:txEffectClrLst/>
+  </dgm:styleLbl>
+  <dgm:styleLbl name="fgAcc4">
+    <dgm:fillClrLst meth="repeat">
+      <a:schemeClr val="lt1">
+        <a:alpha val="90000"/>
+      </a:schemeClr>
+    </dgm:fillClrLst>
+    <dgm:linClrLst meth="repeat">
+      <a:schemeClr val="accent5">
+        <a:tint val="50000"/>
+      </a:schemeClr>
+    </dgm:linClrLst>
+    <dgm:effectClrLst/>
+    <dgm:txLinClrLst/>
+    <dgm:txFillClrLst meth="repeat">
+      <a:schemeClr val="dk1"/>
+    </dgm:txFillClrLst>
+    <dgm:txEffectClrLst/>
+  </dgm:styleLbl>
+  <dgm:styleLbl name="bgShp">
+    <dgm:fillClrLst meth="repeat">
+      <a:schemeClr val="accent5">
+        <a:tint val="40000"/>
+      </a:schemeClr>
+    </dgm:fillClrLst>
+    <dgm:linClrLst meth="repeat">
+      <a:schemeClr val="dk1"/>
+    </dgm:linClrLst>
+    <dgm:effectClrLst/>
+    <dgm:txLinClrLst/>
+    <dgm:txFillClrLst meth="repeat">
+      <a:schemeClr val="dk1"/>
+    </dgm:txFillClrLst>
+    <dgm:txEffectClrLst/>
+  </dgm:styleLbl>
+  <dgm:styleLbl name="dkBgShp">
+    <dgm:fillClrLst meth="repeat">
+      <a:schemeClr val="accent5">
+        <a:shade val="90000"/>
+      </a:schemeClr>
+    </dgm:fillClrLst>
+    <dgm:linClrLst meth="repeat">
+      <a:schemeClr val="dk1"/>
+    </dgm:linClrLst>
+    <dgm:effectClrLst/>
+    <dgm:txLinClrLst/>
+    <dgm:txFillClrLst meth="repeat">
+      <a:schemeClr val="lt1"/>
+    </dgm:txFillClrLst>
+    <dgm:txEffectClrLst/>
+  </dgm:styleLbl>
+  <dgm:styleLbl name="trBgShp">
+    <dgm:fillClrLst meth="repeat">
+      <a:schemeClr val="accent5">
+        <a:tint val="50000"/>
+        <a:alpha val="40000"/>
+      </a:schemeClr>
+    </dgm:fillClrLst>
+    <dgm:linClrLst meth="repeat">
+      <a:schemeClr val="accent5"/>
+    </dgm:linClrLst>
+    <dgm:effectClrLst/>
+    <dgm:txLinClrLst/>
+    <dgm:txFillClrLst meth="repeat">
+      <a:schemeClr val="lt1"/>
+    </dgm:txFillClrLst>
+    <dgm:txEffectClrLst/>
+  </dgm:styleLbl>
+  <dgm:styleLbl name="fgShp">
+    <dgm:fillClrLst meth="repeat">
+      <a:schemeClr val="accent5">
+        <a:tint val="40000"/>
+      </a:schemeClr>
+    </dgm:fillClrLst>
+    <dgm:linClrLst meth="repeat">
+      <a:schemeClr val="lt1"/>
+    </dgm:linClrLst>
+    <dgm:effectClrLst/>
+    <dgm:txLinClrLst/>
+    <dgm:txFillClrLst meth="repeat">
+      <a:schemeClr val="dk1"/>
+    </dgm:txFillClrLst>
+    <dgm:txEffectClrLst/>
+  </dgm:styleLbl>
+  <dgm:styleLbl name="revTx">
+    <dgm:fillClrLst meth="repeat">
+      <a:schemeClr val="lt1">
+        <a:alpha val="0"/>
+      </a:schemeClr>
+    </dgm:fillClrLst>
+    <dgm:linClrLst meth="repeat">
+      <a:schemeClr val="dk1">
+        <a:alpha val="0"/>
+      </a:schemeClr>
+    </dgm:linClrLst>
+    <dgm:effectClrLst/>
+    <dgm:txLinClrLst/>
+    <dgm:txFillClrLst meth="repeat">
+      <a:schemeClr val="tx1"/>
+    </dgm:txFillClrLst>
+    <dgm:txEffectClrLst/>
+  </dgm:styleLbl>
+</dgm:colorsDef>
+</file>
+
+<file path=ppt/diagrams/data1.xml><?xml version="1.0" encoding="utf-8"?>
+<dgm:dataModel xmlns:dgm="http://schemas.openxmlformats.org/drawingml/2006/diagram" xmlns:a="http://schemas.openxmlformats.org/drawingml/2006/main">
+  <dgm:ptLst>
+    <dgm:pt modelId="{8CB0BC2A-7A76-1948-ABD9-2B7E0BEA29BA}" type="doc">
+      <dgm:prSet loTypeId="urn:microsoft.com/office/officeart/2005/8/layout/pyramid1" loCatId="" qsTypeId="urn:microsoft.com/office/officeart/2005/8/quickstyle/3d2" qsCatId="3D" csTypeId="urn:microsoft.com/office/officeart/2005/8/colors/accent5_5" csCatId="accent5" phldr="1"/>
+      <dgm:spPr/>
+    </dgm:pt>
+    <dgm:pt modelId="{BF2DE6DD-44AC-C744-9673-A8708528B887}">
+      <dgm:prSet phldrT="[Text]" custT="1"/>
+      <dgm:spPr/>
+      <dgm:t>
+        <a:bodyPr/>
+        <a:lstStyle/>
+        <a:p>
+          <a:r>
+            <a:rPr lang="en-US" sz="4800" dirty="0"/>
+            <a:t>1</a:t>
+          </a:r>
+        </a:p>
+      </dgm:t>
+    </dgm:pt>
+    <dgm:pt modelId="{737EF33B-7E68-984E-9A12-E30317942972}" type="parTrans" cxnId="{D4077825-CC0A-F040-B5AA-DE0CF23C9E20}">
+      <dgm:prSet/>
+      <dgm:spPr/>
+      <dgm:t>
+        <a:bodyPr/>
+        <a:lstStyle/>
+        <a:p>
+          <a:endParaRPr lang="en-US"/>
+        </a:p>
+      </dgm:t>
+    </dgm:pt>
+    <dgm:pt modelId="{FA74831B-43D1-2C4E-8031-7F176E585AD6}" type="sibTrans" cxnId="{D4077825-CC0A-F040-B5AA-DE0CF23C9E20}">
+      <dgm:prSet/>
+      <dgm:spPr/>
+      <dgm:t>
+        <a:bodyPr/>
+        <a:lstStyle/>
+        <a:p>
+          <a:endParaRPr lang="en-US"/>
+        </a:p>
+      </dgm:t>
+    </dgm:pt>
+    <dgm:pt modelId="{026259E0-731C-F24F-9E11-2470D0CD9759}">
+      <dgm:prSet phldrT="[Text]" custT="1"/>
+      <dgm:spPr/>
+      <dgm:t>
+        <a:bodyPr/>
+        <a:lstStyle/>
+        <a:p>
+          <a:r>
+            <a:rPr lang="en-US" sz="4800" dirty="0"/>
+            <a:t>3</a:t>
+          </a:r>
+        </a:p>
+      </dgm:t>
+    </dgm:pt>
+    <dgm:pt modelId="{4D2F2D86-AC89-8E4F-AE81-6E2983EFB1E1}" type="parTrans" cxnId="{90FE6664-AA6C-284B-91E9-E6E865C7A9AA}">
+      <dgm:prSet/>
+      <dgm:spPr/>
+      <dgm:t>
+        <a:bodyPr/>
+        <a:lstStyle/>
+        <a:p>
+          <a:endParaRPr lang="en-US"/>
+        </a:p>
+      </dgm:t>
+    </dgm:pt>
+    <dgm:pt modelId="{768C90F8-F27F-DC4D-A42C-42A2A2B4613C}" type="sibTrans" cxnId="{90FE6664-AA6C-284B-91E9-E6E865C7A9AA}">
+      <dgm:prSet/>
+      <dgm:spPr/>
+      <dgm:t>
+        <a:bodyPr/>
+        <a:lstStyle/>
+        <a:p>
+          <a:endParaRPr lang="en-US"/>
+        </a:p>
+      </dgm:t>
+    </dgm:pt>
+    <dgm:pt modelId="{DC278865-FD33-CF47-BBCF-82A429E45E66}">
+      <dgm:prSet phldrT="[Text]" custT="1"/>
+      <dgm:spPr/>
+      <dgm:t>
+        <a:bodyPr/>
+        <a:lstStyle/>
+        <a:p>
+          <a:r>
+            <a:rPr lang="en-US" sz="4800" dirty="0"/>
+            <a:t>1</a:t>
+          </a:r>
+        </a:p>
+      </dgm:t>
+    </dgm:pt>
+    <dgm:pt modelId="{EA1AD485-30BF-524D-855A-307036E7509B}" type="sibTrans" cxnId="{A4FEC61F-4DCF-E845-B95C-9FCCDB6D59BD}">
+      <dgm:prSet/>
+      <dgm:spPr/>
+      <dgm:t>
+        <a:bodyPr/>
+        <a:lstStyle/>
+        <a:p>
+          <a:endParaRPr lang="en-US"/>
+        </a:p>
+      </dgm:t>
+    </dgm:pt>
+    <dgm:pt modelId="{35B398C0-E450-7B42-B484-B2CEF18D8E9E}" type="parTrans" cxnId="{A4FEC61F-4DCF-E845-B95C-9FCCDB6D59BD}">
+      <dgm:prSet/>
+      <dgm:spPr/>
+      <dgm:t>
+        <a:bodyPr/>
+        <a:lstStyle/>
+        <a:p>
+          <a:endParaRPr lang="en-US"/>
+        </a:p>
+      </dgm:t>
+    </dgm:pt>
+    <dgm:pt modelId="{A01E87AE-7B61-FA45-B093-83525663E8A1}">
+      <dgm:prSet custT="1"/>
+      <dgm:spPr/>
+      <dgm:t>
+        <a:bodyPr/>
+        <a:lstStyle/>
+        <a:p>
+          <a:r>
+            <a:rPr lang="en-US" sz="4800" dirty="0"/>
+            <a:t>2</a:t>
+          </a:r>
+        </a:p>
+      </dgm:t>
+    </dgm:pt>
+    <dgm:pt modelId="{82C6D10B-C076-5F4A-A6CF-441DD7558B52}" type="parTrans" cxnId="{014B5B4B-9762-6943-A304-E0BC6C0E33A4}">
+      <dgm:prSet/>
+      <dgm:spPr/>
+      <dgm:t>
+        <a:bodyPr/>
+        <a:lstStyle/>
+        <a:p>
+          <a:endParaRPr lang="en-US"/>
+        </a:p>
+      </dgm:t>
+    </dgm:pt>
+    <dgm:pt modelId="{5053E58B-869B-F444-AC48-F49CAD35DD68}" type="sibTrans" cxnId="{014B5B4B-9762-6943-A304-E0BC6C0E33A4}">
+      <dgm:prSet/>
+      <dgm:spPr/>
+      <dgm:t>
+        <a:bodyPr/>
+        <a:lstStyle/>
+        <a:p>
+          <a:endParaRPr lang="en-US"/>
+        </a:p>
+      </dgm:t>
+    </dgm:pt>
+    <dgm:pt modelId="{E09D854F-53E6-2B42-BCE5-EACF4A9117A0}">
+      <dgm:prSet custT="1"/>
+      <dgm:spPr/>
+      <dgm:t>
+        <a:bodyPr/>
+        <a:lstStyle/>
+        <a:p>
+          <a:r>
+            <a:rPr lang="en-US" sz="4800" dirty="0"/>
+            <a:t>4</a:t>
+          </a:r>
+        </a:p>
+      </dgm:t>
+    </dgm:pt>
+    <dgm:pt modelId="{2D456125-04CD-0F40-958B-81FAC39946FB}" type="parTrans" cxnId="{1D9D8545-5EF3-AA41-A816-10DA883D0739}">
+      <dgm:prSet/>
+      <dgm:spPr/>
+      <dgm:t>
+        <a:bodyPr/>
+        <a:lstStyle/>
+        <a:p>
+          <a:endParaRPr lang="en-US"/>
+        </a:p>
+      </dgm:t>
+    </dgm:pt>
+    <dgm:pt modelId="{917C493B-D1F2-5B48-B2B8-326132826AEB}" type="sibTrans" cxnId="{1D9D8545-5EF3-AA41-A816-10DA883D0739}">
+      <dgm:prSet/>
+      <dgm:spPr/>
+      <dgm:t>
+        <a:bodyPr/>
+        <a:lstStyle/>
+        <a:p>
+          <a:endParaRPr lang="en-US"/>
+        </a:p>
+      </dgm:t>
+    </dgm:pt>
+    <dgm:pt modelId="{B0A18E96-53C0-914B-B186-1F72F9290447}" type="pres">
+      <dgm:prSet presAssocID="{8CB0BC2A-7A76-1948-ABD9-2B7E0BEA29BA}" presName="Name0" presStyleCnt="0">
+        <dgm:presLayoutVars>
+          <dgm:dir/>
+          <dgm:animLvl val="lvl"/>
+          <dgm:resizeHandles val="exact"/>
+        </dgm:presLayoutVars>
+      </dgm:prSet>
+      <dgm:spPr/>
+    </dgm:pt>
+    <dgm:pt modelId="{12224130-2841-5B4F-A9EF-5241C1C03170}" type="pres">
+      <dgm:prSet presAssocID="{BF2DE6DD-44AC-C744-9673-A8708528B887}" presName="Name8" presStyleCnt="0"/>
+      <dgm:spPr/>
+    </dgm:pt>
+    <dgm:pt modelId="{D243A900-E56E-F046-97A6-E49F26E6CA67}" type="pres">
+      <dgm:prSet presAssocID="{BF2DE6DD-44AC-C744-9673-A8708528B887}" presName="level" presStyleLbl="node1" presStyleIdx="0" presStyleCnt="5">
+        <dgm:presLayoutVars>
+          <dgm:chMax val="1"/>
+          <dgm:bulletEnabled val="1"/>
+        </dgm:presLayoutVars>
+      </dgm:prSet>
+      <dgm:spPr/>
+    </dgm:pt>
+    <dgm:pt modelId="{AF32CB38-2F9E-2E45-8999-65B6D6E520A2}" type="pres">
+      <dgm:prSet presAssocID="{BF2DE6DD-44AC-C744-9673-A8708528B887}" presName="levelTx" presStyleLbl="revTx" presStyleIdx="0" presStyleCnt="0">
+        <dgm:presLayoutVars>
+          <dgm:chMax val="1"/>
+          <dgm:bulletEnabled val="1"/>
+        </dgm:presLayoutVars>
+      </dgm:prSet>
+      <dgm:spPr/>
+    </dgm:pt>
+    <dgm:pt modelId="{8FA74F91-2826-984C-9F17-D4ACD93E9BCB}" type="pres">
+      <dgm:prSet presAssocID="{E09D854F-53E6-2B42-BCE5-EACF4A9117A0}" presName="Name8" presStyleCnt="0"/>
+      <dgm:spPr/>
+    </dgm:pt>
+    <dgm:pt modelId="{B0046460-367C-5D4D-85C5-920F94A62E87}" type="pres">
+      <dgm:prSet presAssocID="{E09D854F-53E6-2B42-BCE5-EACF4A9117A0}" presName="level" presStyleLbl="node1" presStyleIdx="1" presStyleCnt="5">
+        <dgm:presLayoutVars>
+          <dgm:chMax val="1"/>
+          <dgm:bulletEnabled val="1"/>
+        </dgm:presLayoutVars>
+      </dgm:prSet>
+      <dgm:spPr/>
+    </dgm:pt>
+    <dgm:pt modelId="{B3A7E3FE-886B-5B4E-84ED-FB3DED5AF0F0}" type="pres">
+      <dgm:prSet presAssocID="{E09D854F-53E6-2B42-BCE5-EACF4A9117A0}" presName="levelTx" presStyleLbl="revTx" presStyleIdx="0" presStyleCnt="0">
+        <dgm:presLayoutVars>
+          <dgm:chMax val="1"/>
+          <dgm:bulletEnabled val="1"/>
+        </dgm:presLayoutVars>
+      </dgm:prSet>
+      <dgm:spPr/>
+    </dgm:pt>
+    <dgm:pt modelId="{321D625A-33A1-D94B-B4AA-ABC8CE350809}" type="pres">
+      <dgm:prSet presAssocID="{026259E0-731C-F24F-9E11-2470D0CD9759}" presName="Name8" presStyleCnt="0"/>
+      <dgm:spPr/>
+    </dgm:pt>
+    <dgm:pt modelId="{F9D32193-E7EF-F14F-BC92-2B9671432ABB}" type="pres">
+      <dgm:prSet presAssocID="{026259E0-731C-F24F-9E11-2470D0CD9759}" presName="level" presStyleLbl="node1" presStyleIdx="2" presStyleCnt="5">
+        <dgm:presLayoutVars>
+          <dgm:chMax val="1"/>
+          <dgm:bulletEnabled val="1"/>
+        </dgm:presLayoutVars>
+      </dgm:prSet>
+      <dgm:spPr/>
+    </dgm:pt>
+    <dgm:pt modelId="{6227753F-A38C-294C-A0C5-D9BFD0741CC7}" type="pres">
+      <dgm:prSet presAssocID="{026259E0-731C-F24F-9E11-2470D0CD9759}" presName="levelTx" presStyleLbl="revTx" presStyleIdx="0" presStyleCnt="0">
+        <dgm:presLayoutVars>
+          <dgm:chMax val="1"/>
+          <dgm:bulletEnabled val="1"/>
+        </dgm:presLayoutVars>
+      </dgm:prSet>
+      <dgm:spPr/>
+    </dgm:pt>
+    <dgm:pt modelId="{A2ED4C82-04BF-C543-BA4F-3B4370A5FD92}" type="pres">
+      <dgm:prSet presAssocID="{A01E87AE-7B61-FA45-B093-83525663E8A1}" presName="Name8" presStyleCnt="0"/>
+      <dgm:spPr/>
+    </dgm:pt>
+    <dgm:pt modelId="{4610DA63-2C96-1C4D-B81E-9ACA4E7BFA80}" type="pres">
+      <dgm:prSet presAssocID="{A01E87AE-7B61-FA45-B093-83525663E8A1}" presName="level" presStyleLbl="node1" presStyleIdx="3" presStyleCnt="5">
+        <dgm:presLayoutVars>
+          <dgm:chMax val="1"/>
+          <dgm:bulletEnabled val="1"/>
+        </dgm:presLayoutVars>
+      </dgm:prSet>
+      <dgm:spPr/>
+    </dgm:pt>
+    <dgm:pt modelId="{571E2F05-0476-AD49-BD1E-16B8697FB991}" type="pres">
+      <dgm:prSet presAssocID="{A01E87AE-7B61-FA45-B093-83525663E8A1}" presName="levelTx" presStyleLbl="revTx" presStyleIdx="0" presStyleCnt="0">
+        <dgm:presLayoutVars>
+          <dgm:chMax val="1"/>
+          <dgm:bulletEnabled val="1"/>
+        </dgm:presLayoutVars>
+      </dgm:prSet>
+      <dgm:spPr/>
+    </dgm:pt>
+    <dgm:pt modelId="{5B2218AC-3AC1-E045-86B7-4013FE68610E}" type="pres">
+      <dgm:prSet presAssocID="{DC278865-FD33-CF47-BBCF-82A429E45E66}" presName="Name8" presStyleCnt="0"/>
+      <dgm:spPr/>
+    </dgm:pt>
+    <dgm:pt modelId="{BEC8E75C-2EE1-CF47-9897-B699BFC1DC70}" type="pres">
+      <dgm:prSet presAssocID="{DC278865-FD33-CF47-BBCF-82A429E45E66}" presName="level" presStyleLbl="node1" presStyleIdx="4" presStyleCnt="5" custLinFactNeighborX="-16887" custLinFactNeighborY="13139">
+        <dgm:presLayoutVars>
+          <dgm:chMax val="1"/>
+          <dgm:bulletEnabled val="1"/>
+        </dgm:presLayoutVars>
+      </dgm:prSet>
+      <dgm:spPr/>
+    </dgm:pt>
+    <dgm:pt modelId="{E1D77D0C-0323-3F4B-9E1B-510E6B5D406C}" type="pres">
+      <dgm:prSet presAssocID="{DC278865-FD33-CF47-BBCF-82A429E45E66}" presName="levelTx" presStyleLbl="revTx" presStyleIdx="0" presStyleCnt="0">
+        <dgm:presLayoutVars>
+          <dgm:chMax val="1"/>
+          <dgm:bulletEnabled val="1"/>
+        </dgm:presLayoutVars>
+      </dgm:prSet>
+      <dgm:spPr/>
+    </dgm:pt>
+  </dgm:ptLst>
+  <dgm:cxnLst>
+    <dgm:cxn modelId="{A4FEC61F-4DCF-E845-B95C-9FCCDB6D59BD}" srcId="{8CB0BC2A-7A76-1948-ABD9-2B7E0BEA29BA}" destId="{DC278865-FD33-CF47-BBCF-82A429E45E66}" srcOrd="4" destOrd="0" parTransId="{35B398C0-E450-7B42-B484-B2CEF18D8E9E}" sibTransId="{EA1AD485-30BF-524D-855A-307036E7509B}"/>
+    <dgm:cxn modelId="{D4077825-CC0A-F040-B5AA-DE0CF23C9E20}" srcId="{8CB0BC2A-7A76-1948-ABD9-2B7E0BEA29BA}" destId="{BF2DE6DD-44AC-C744-9673-A8708528B887}" srcOrd="0" destOrd="0" parTransId="{737EF33B-7E68-984E-9A12-E30317942972}" sibTransId="{FA74831B-43D1-2C4E-8031-7F176E585AD6}"/>
+    <dgm:cxn modelId="{7BC48B34-356A-F846-9E15-77B6BC509DA2}" type="presOf" srcId="{BF2DE6DD-44AC-C744-9673-A8708528B887}" destId="{D243A900-E56E-F046-97A6-E49F26E6CA67}" srcOrd="0" destOrd="0" presId="urn:microsoft.com/office/officeart/2005/8/layout/pyramid1"/>
+    <dgm:cxn modelId="{1D9D8545-5EF3-AA41-A816-10DA883D0739}" srcId="{8CB0BC2A-7A76-1948-ABD9-2B7E0BEA29BA}" destId="{E09D854F-53E6-2B42-BCE5-EACF4A9117A0}" srcOrd="1" destOrd="0" parTransId="{2D456125-04CD-0F40-958B-81FAC39946FB}" sibTransId="{917C493B-D1F2-5B48-B2B8-326132826AEB}"/>
+    <dgm:cxn modelId="{014B5B4B-9762-6943-A304-E0BC6C0E33A4}" srcId="{8CB0BC2A-7A76-1948-ABD9-2B7E0BEA29BA}" destId="{A01E87AE-7B61-FA45-B093-83525663E8A1}" srcOrd="3" destOrd="0" parTransId="{82C6D10B-C076-5F4A-A6CF-441DD7558B52}" sibTransId="{5053E58B-869B-F444-AC48-F49CAD35DD68}"/>
+    <dgm:cxn modelId="{3210AF57-AF34-A042-A2A8-2222F8775923}" type="presOf" srcId="{026259E0-731C-F24F-9E11-2470D0CD9759}" destId="{F9D32193-E7EF-F14F-BC92-2B9671432ABB}" srcOrd="0" destOrd="0" presId="urn:microsoft.com/office/officeart/2005/8/layout/pyramid1"/>
+    <dgm:cxn modelId="{49940C5C-06F2-364A-A4BA-E74FAF1B79B6}" type="presOf" srcId="{026259E0-731C-F24F-9E11-2470D0CD9759}" destId="{6227753F-A38C-294C-A0C5-D9BFD0741CC7}" srcOrd="1" destOrd="0" presId="urn:microsoft.com/office/officeart/2005/8/layout/pyramid1"/>
+    <dgm:cxn modelId="{90FE6664-AA6C-284B-91E9-E6E865C7A9AA}" srcId="{8CB0BC2A-7A76-1948-ABD9-2B7E0BEA29BA}" destId="{026259E0-731C-F24F-9E11-2470D0CD9759}" srcOrd="2" destOrd="0" parTransId="{4D2F2D86-AC89-8E4F-AE81-6E2983EFB1E1}" sibTransId="{768C90F8-F27F-DC4D-A42C-42A2A2B4613C}"/>
+    <dgm:cxn modelId="{FC70679D-782F-3E46-898B-E68EB8B24AB5}" type="presOf" srcId="{E09D854F-53E6-2B42-BCE5-EACF4A9117A0}" destId="{B0046460-367C-5D4D-85C5-920F94A62E87}" srcOrd="0" destOrd="0" presId="urn:microsoft.com/office/officeart/2005/8/layout/pyramid1"/>
+    <dgm:cxn modelId="{95D893A9-85FB-324D-94EE-724FA2A21A4B}" type="presOf" srcId="{BF2DE6DD-44AC-C744-9673-A8708528B887}" destId="{AF32CB38-2F9E-2E45-8999-65B6D6E520A2}" srcOrd="1" destOrd="0" presId="urn:microsoft.com/office/officeart/2005/8/layout/pyramid1"/>
+    <dgm:cxn modelId="{007CD4BF-07B0-2D4A-AEA7-BE7148F14622}" type="presOf" srcId="{DC278865-FD33-CF47-BBCF-82A429E45E66}" destId="{BEC8E75C-2EE1-CF47-9897-B699BFC1DC70}" srcOrd="0" destOrd="0" presId="urn:microsoft.com/office/officeart/2005/8/layout/pyramid1"/>
+    <dgm:cxn modelId="{3E7C92D2-C3E7-AD4C-A571-83310AA086C5}" type="presOf" srcId="{A01E87AE-7B61-FA45-B093-83525663E8A1}" destId="{4610DA63-2C96-1C4D-B81E-9ACA4E7BFA80}" srcOrd="0" destOrd="0" presId="urn:microsoft.com/office/officeart/2005/8/layout/pyramid1"/>
+    <dgm:cxn modelId="{9D23DCDC-144F-5D4A-82D2-B15D487D24C8}" type="presOf" srcId="{DC278865-FD33-CF47-BBCF-82A429E45E66}" destId="{E1D77D0C-0323-3F4B-9E1B-510E6B5D406C}" srcOrd="1" destOrd="0" presId="urn:microsoft.com/office/officeart/2005/8/layout/pyramid1"/>
+    <dgm:cxn modelId="{618322EE-C1D1-8840-9F50-279E48BDA659}" type="presOf" srcId="{8CB0BC2A-7A76-1948-ABD9-2B7E0BEA29BA}" destId="{B0A18E96-53C0-914B-B186-1F72F9290447}" srcOrd="0" destOrd="0" presId="urn:microsoft.com/office/officeart/2005/8/layout/pyramid1"/>
+    <dgm:cxn modelId="{D882AFF9-F638-8B41-AB26-33B4F2F9640F}" type="presOf" srcId="{E09D854F-53E6-2B42-BCE5-EACF4A9117A0}" destId="{B3A7E3FE-886B-5B4E-84ED-FB3DED5AF0F0}" srcOrd="1" destOrd="0" presId="urn:microsoft.com/office/officeart/2005/8/layout/pyramid1"/>
+    <dgm:cxn modelId="{940A4CFA-40E7-DF4A-A1DC-295C0BD71B66}" type="presOf" srcId="{A01E87AE-7B61-FA45-B093-83525663E8A1}" destId="{571E2F05-0476-AD49-BD1E-16B8697FB991}" srcOrd="1" destOrd="0" presId="urn:microsoft.com/office/officeart/2005/8/layout/pyramid1"/>
+    <dgm:cxn modelId="{81F0A9F6-1505-9443-A783-BE11961F8C54}" type="presParOf" srcId="{B0A18E96-53C0-914B-B186-1F72F9290447}" destId="{12224130-2841-5B4F-A9EF-5241C1C03170}" srcOrd="0" destOrd="0" presId="urn:microsoft.com/office/officeart/2005/8/layout/pyramid1"/>
+    <dgm:cxn modelId="{99B97F33-4CDF-C342-8B4A-1ED2BD78761D}" type="presParOf" srcId="{12224130-2841-5B4F-A9EF-5241C1C03170}" destId="{D243A900-E56E-F046-97A6-E49F26E6CA67}" srcOrd="0" destOrd="0" presId="urn:microsoft.com/office/officeart/2005/8/layout/pyramid1"/>
+    <dgm:cxn modelId="{5F5218E5-1CC2-CD41-9759-C6A8B55C4B79}" type="presParOf" srcId="{12224130-2841-5B4F-A9EF-5241C1C03170}" destId="{AF32CB38-2F9E-2E45-8999-65B6D6E520A2}" srcOrd="1" destOrd="0" presId="urn:microsoft.com/office/officeart/2005/8/layout/pyramid1"/>
+    <dgm:cxn modelId="{35FF21A0-4972-6C4C-B3C8-82D0662164F6}" type="presParOf" srcId="{B0A18E96-53C0-914B-B186-1F72F9290447}" destId="{8FA74F91-2826-984C-9F17-D4ACD93E9BCB}" srcOrd="1" destOrd="0" presId="urn:microsoft.com/office/officeart/2005/8/layout/pyramid1"/>
+    <dgm:cxn modelId="{16AC0604-D085-E247-B83F-F56D9E3FCC65}" type="presParOf" srcId="{8FA74F91-2826-984C-9F17-D4ACD93E9BCB}" destId="{B0046460-367C-5D4D-85C5-920F94A62E87}" srcOrd="0" destOrd="0" presId="urn:microsoft.com/office/officeart/2005/8/layout/pyramid1"/>
+    <dgm:cxn modelId="{26006E77-7D13-DC4F-AC44-D62826DC4E01}" type="presParOf" srcId="{8FA74F91-2826-984C-9F17-D4ACD93E9BCB}" destId="{B3A7E3FE-886B-5B4E-84ED-FB3DED5AF0F0}" srcOrd="1" destOrd="0" presId="urn:microsoft.com/office/officeart/2005/8/layout/pyramid1"/>
+    <dgm:cxn modelId="{AE9FEF0D-9D68-E844-9F7B-A352BB8A7087}" type="presParOf" srcId="{B0A18E96-53C0-914B-B186-1F72F9290447}" destId="{321D625A-33A1-D94B-B4AA-ABC8CE350809}" srcOrd="2" destOrd="0" presId="urn:microsoft.com/office/officeart/2005/8/layout/pyramid1"/>
+    <dgm:cxn modelId="{FCC19753-705C-6040-90BD-28C0F99C3FCB}" type="presParOf" srcId="{321D625A-33A1-D94B-B4AA-ABC8CE350809}" destId="{F9D32193-E7EF-F14F-BC92-2B9671432ABB}" srcOrd="0" destOrd="0" presId="urn:microsoft.com/office/officeart/2005/8/layout/pyramid1"/>
+    <dgm:cxn modelId="{AE2E8BA8-9C4B-1348-8699-E79155A96519}" type="presParOf" srcId="{321D625A-33A1-D94B-B4AA-ABC8CE350809}" destId="{6227753F-A38C-294C-A0C5-D9BFD0741CC7}" srcOrd="1" destOrd="0" presId="urn:microsoft.com/office/officeart/2005/8/layout/pyramid1"/>
+    <dgm:cxn modelId="{4391080E-4EF5-CE42-8127-29385531BC0E}" type="presParOf" srcId="{B0A18E96-53C0-914B-B186-1F72F9290447}" destId="{A2ED4C82-04BF-C543-BA4F-3B4370A5FD92}" srcOrd="3" destOrd="0" presId="urn:microsoft.com/office/officeart/2005/8/layout/pyramid1"/>
+    <dgm:cxn modelId="{8B963E57-D1A9-5B4F-9A70-0B0F7EB22132}" type="presParOf" srcId="{A2ED4C82-04BF-C543-BA4F-3B4370A5FD92}" destId="{4610DA63-2C96-1C4D-B81E-9ACA4E7BFA80}" srcOrd="0" destOrd="0" presId="urn:microsoft.com/office/officeart/2005/8/layout/pyramid1"/>
+    <dgm:cxn modelId="{5403C33A-D37A-6D43-B301-7021AFFA0A71}" type="presParOf" srcId="{A2ED4C82-04BF-C543-BA4F-3B4370A5FD92}" destId="{571E2F05-0476-AD49-BD1E-16B8697FB991}" srcOrd="1" destOrd="0" presId="urn:microsoft.com/office/officeart/2005/8/layout/pyramid1"/>
+    <dgm:cxn modelId="{4E3D90B7-DBF1-C447-BD64-BAD7FEFA152D}" type="presParOf" srcId="{B0A18E96-53C0-914B-B186-1F72F9290447}" destId="{5B2218AC-3AC1-E045-86B7-4013FE68610E}" srcOrd="4" destOrd="0" presId="urn:microsoft.com/office/officeart/2005/8/layout/pyramid1"/>
+    <dgm:cxn modelId="{8362227E-F99A-C84B-9E2F-0CDC1F6635CB}" type="presParOf" srcId="{5B2218AC-3AC1-E045-86B7-4013FE68610E}" destId="{BEC8E75C-2EE1-CF47-9897-B699BFC1DC70}" srcOrd="0" destOrd="0" presId="urn:microsoft.com/office/officeart/2005/8/layout/pyramid1"/>
+    <dgm:cxn modelId="{CE5F0526-3944-2D42-AC93-3B14AD5FF2DD}" type="presParOf" srcId="{5B2218AC-3AC1-E045-86B7-4013FE68610E}" destId="{E1D77D0C-0323-3F4B-9E1B-510E6B5D406C}" srcOrd="1" destOrd="0" presId="urn:microsoft.com/office/officeart/2005/8/layout/pyramid1"/>
+  </dgm:cxnLst>
+  <dgm:bg/>
+  <dgm:whole/>
+  <dgm:extLst>
+    <a:ext uri="http://schemas.microsoft.com/office/drawing/2008/diagram">
+      <dsp:dataModelExt xmlns:dsp="http://schemas.microsoft.com/office/drawing/2008/diagram" relId="rId7" minVer="http://schemas.openxmlformats.org/drawingml/2006/diagram"/>
+    </a:ext>
+  </dgm:extLst>
+</dgm:dataModel>
+</file>
+
+<file path=ppt/diagrams/drawing1.xml><?xml version="1.0" encoding="utf-8"?>
+<dsp:drawing xmlns:dgm="http://schemas.openxmlformats.org/drawingml/2006/diagram" xmlns:dsp="http://schemas.microsoft.com/office/drawing/2008/diagram" xmlns:a="http://schemas.openxmlformats.org/drawingml/2006/main">
+  <dsp:spTree>
+    <dsp:nvGrpSpPr>
+      <dsp:cNvPr id="0" name=""/>
+      <dsp:cNvGrpSpPr/>
+    </dsp:nvGrpSpPr>
+    <dsp:grpSpPr/>
+    <dsp:sp modelId="{D243A900-E56E-F046-97A6-E49F26E6CA67}">
+      <dsp:nvSpPr>
+        <dsp:cNvPr id="0" name=""/>
+        <dsp:cNvSpPr/>
+      </dsp:nvSpPr>
+      <dsp:spPr>
+        <a:xfrm>
+          <a:off x="2513050" y="0"/>
+          <a:ext cx="1256525" cy="975445"/>
+        </a:xfrm>
+        <a:prstGeom prst="trapezoid">
+          <a:avLst>
+            <a:gd name="adj" fmla="val 64408"/>
+          </a:avLst>
+        </a:prstGeom>
+        <a:gradFill rotWithShape="0">
+          <a:gsLst>
+            <a:gs pos="0">
+              <a:schemeClr val="accent5">
+                <a:alpha val="90000"/>
+                <a:hueOff val="0"/>
+                <a:satOff val="0"/>
+                <a:lumOff val="0"/>
+                <a:alphaOff val="0"/>
+                <a:satMod val="103000"/>
+                <a:lumMod val="102000"/>
+                <a:tint val="94000"/>
+              </a:schemeClr>
+            </a:gs>
+            <a:gs pos="50000">
+              <a:schemeClr val="accent5">
+                <a:alpha val="90000"/>
+                <a:hueOff val="0"/>
+                <a:satOff val="0"/>
+                <a:lumOff val="0"/>
+                <a:alphaOff val="0"/>
+                <a:satMod val="110000"/>
+                <a:lumMod val="100000"/>
+                <a:shade val="100000"/>
+              </a:schemeClr>
+            </a:gs>
+            <a:gs pos="100000">
+              <a:schemeClr val="accent5">
+                <a:alpha val="90000"/>
+                <a:hueOff val="0"/>
+                <a:satOff val="0"/>
+                <a:lumOff val="0"/>
+                <a:alphaOff val="0"/>
+                <a:lumMod val="99000"/>
+                <a:satMod val="120000"/>
+                <a:shade val="78000"/>
+              </a:schemeClr>
+            </a:gs>
+          </a:gsLst>
+          <a:lin ang="5400000" scaled="0"/>
+        </a:gradFill>
+        <a:ln>
+          <a:noFill/>
+        </a:ln>
+        <a:effectLst/>
+        <a:scene3d>
+          <a:camera prst="orthographicFront"/>
+          <a:lightRig rig="threePt" dir="t">
+            <a:rot lat="0" lon="0" rev="7500000"/>
+          </a:lightRig>
+        </a:scene3d>
+        <a:sp3d prstMaterial="plastic">
+          <a:bevelT w="127000" h="25400" prst="relaxedInset"/>
+        </a:sp3d>
+      </dsp:spPr>
+      <dsp:style>
+        <a:lnRef idx="0">
+          <a:scrgbClr r="0" g="0" b="0"/>
+        </a:lnRef>
+        <a:fillRef idx="3">
+          <a:scrgbClr r="0" g="0" b="0"/>
+        </a:fillRef>
+        <a:effectRef idx="2">
+          <a:scrgbClr r="0" g="0" b="0"/>
+        </a:effectRef>
+        <a:fontRef idx="minor">
+          <a:schemeClr val="lt1"/>
+        </a:fontRef>
+      </dsp:style>
+      <dsp:txBody>
+        <a:bodyPr spcFirstLastPara="0" vert="horz" wrap="square" lIns="60960" tIns="60960" rIns="60960" bIns="60960" numCol="1" spcCol="1270" anchor="ctr" anchorCtr="0">
+          <a:noAutofit/>
+        </a:bodyPr>
+        <a:lstStyle/>
+        <a:p>
+          <a:pPr marL="0" lvl="0" indent="0" algn="ctr" defTabSz="2133600">
+            <a:lnSpc>
+              <a:spcPct val="90000"/>
+            </a:lnSpc>
+            <a:spcBef>
+              <a:spcPct val="0"/>
+            </a:spcBef>
+            <a:spcAft>
+              <a:spcPct val="35000"/>
+            </a:spcAft>
+            <a:buNone/>
+          </a:pPr>
+          <a:r>
+            <a:rPr lang="en-US" sz="4800" kern="1200" dirty="0"/>
+            <a:t>1</a:t>
+          </a:r>
+        </a:p>
+      </dsp:txBody>
+      <dsp:txXfrm>
+        <a:off x="2513050" y="0"/>
+        <a:ext cx="1256525" cy="975445"/>
+      </dsp:txXfrm>
+    </dsp:sp>
+    <dsp:sp modelId="{B0046460-367C-5D4D-85C5-920F94A62E87}">
+      <dsp:nvSpPr>
+        <dsp:cNvPr id="0" name=""/>
+        <dsp:cNvSpPr/>
+      </dsp:nvSpPr>
+      <dsp:spPr>
+        <a:xfrm>
+          <a:off x="1884787" y="975445"/>
+          <a:ext cx="2513050" cy="975445"/>
+        </a:xfrm>
+        <a:prstGeom prst="trapezoid">
+          <a:avLst>
+            <a:gd name="adj" fmla="val 64408"/>
+          </a:avLst>
+        </a:prstGeom>
+        <a:gradFill rotWithShape="0">
+          <a:gsLst>
+            <a:gs pos="0">
+              <a:schemeClr val="accent5">
+                <a:alpha val="90000"/>
+                <a:hueOff val="0"/>
+                <a:satOff val="0"/>
+                <a:lumOff val="0"/>
+                <a:alphaOff val="-10000"/>
+                <a:satMod val="103000"/>
+                <a:lumMod val="102000"/>
+                <a:tint val="94000"/>
+              </a:schemeClr>
+            </a:gs>
+            <a:gs pos="50000">
+              <a:schemeClr val="accent5">
+                <a:alpha val="90000"/>
+                <a:hueOff val="0"/>
+                <a:satOff val="0"/>
+                <a:lumOff val="0"/>
+                <a:alphaOff val="-10000"/>
+                <a:satMod val="110000"/>
+                <a:lumMod val="100000"/>
+                <a:shade val="100000"/>
+              </a:schemeClr>
+            </a:gs>
+            <a:gs pos="100000">
+              <a:schemeClr val="accent5">
+                <a:alpha val="90000"/>
+                <a:hueOff val="0"/>
+                <a:satOff val="0"/>
+                <a:lumOff val="0"/>
+                <a:alphaOff val="-10000"/>
+                <a:lumMod val="99000"/>
+                <a:satMod val="120000"/>
+                <a:shade val="78000"/>
+              </a:schemeClr>
+            </a:gs>
+          </a:gsLst>
+          <a:lin ang="5400000" scaled="0"/>
+        </a:gradFill>
+        <a:ln>
+          <a:noFill/>
+        </a:ln>
+        <a:effectLst/>
+        <a:scene3d>
+          <a:camera prst="orthographicFront"/>
+          <a:lightRig rig="threePt" dir="t">
+            <a:rot lat="0" lon="0" rev="7500000"/>
+          </a:lightRig>
+        </a:scene3d>
+        <a:sp3d prstMaterial="plastic">
+          <a:bevelT w="127000" h="25400" prst="relaxedInset"/>
+        </a:sp3d>
+      </dsp:spPr>
+      <dsp:style>
+        <a:lnRef idx="0">
+          <a:scrgbClr r="0" g="0" b="0"/>
+        </a:lnRef>
+        <a:fillRef idx="3">
+          <a:scrgbClr r="0" g="0" b="0"/>
+        </a:fillRef>
+        <a:effectRef idx="2">
+          <a:scrgbClr r="0" g="0" b="0"/>
+        </a:effectRef>
+        <a:fontRef idx="minor">
+          <a:schemeClr val="lt1"/>
+        </a:fontRef>
+      </dsp:style>
+      <dsp:txBody>
+        <a:bodyPr spcFirstLastPara="0" vert="horz" wrap="square" lIns="60960" tIns="60960" rIns="60960" bIns="60960" numCol="1" spcCol="1270" anchor="ctr" anchorCtr="0">
+          <a:noAutofit/>
+        </a:bodyPr>
+        <a:lstStyle/>
+        <a:p>
+          <a:pPr marL="0" lvl="0" indent="0" algn="ctr" defTabSz="2133600">
+            <a:lnSpc>
+              <a:spcPct val="90000"/>
+            </a:lnSpc>
+            <a:spcBef>
+              <a:spcPct val="0"/>
+            </a:spcBef>
+            <a:spcAft>
+              <a:spcPct val="35000"/>
+            </a:spcAft>
+            <a:buNone/>
+          </a:pPr>
+          <a:r>
+            <a:rPr lang="en-US" sz="4800" kern="1200" dirty="0"/>
+            <a:t>4</a:t>
+          </a:r>
+        </a:p>
+      </dsp:txBody>
+      <dsp:txXfrm>
+        <a:off x="2324571" y="975445"/>
+        <a:ext cx="1633482" cy="975445"/>
+      </dsp:txXfrm>
+    </dsp:sp>
+    <dsp:sp modelId="{F9D32193-E7EF-F14F-BC92-2B9671432ABB}">
+      <dsp:nvSpPr>
+        <dsp:cNvPr id="0" name=""/>
+        <dsp:cNvSpPr/>
+      </dsp:nvSpPr>
+      <dsp:spPr>
+        <a:xfrm>
+          <a:off x="1256524" y="1950890"/>
+          <a:ext cx="3769575" cy="975445"/>
+        </a:xfrm>
+        <a:prstGeom prst="trapezoid">
+          <a:avLst>
+            <a:gd name="adj" fmla="val 64408"/>
+          </a:avLst>
+        </a:prstGeom>
+        <a:gradFill rotWithShape="0">
+          <a:gsLst>
+            <a:gs pos="0">
+              <a:schemeClr val="accent5">
+                <a:alpha val="90000"/>
+                <a:hueOff val="0"/>
+                <a:satOff val="0"/>
+                <a:lumOff val="0"/>
+                <a:alphaOff val="-20000"/>
+                <a:satMod val="103000"/>
+                <a:lumMod val="102000"/>
+                <a:tint val="94000"/>
+              </a:schemeClr>
+            </a:gs>
+            <a:gs pos="50000">
+              <a:schemeClr val="accent5">
+                <a:alpha val="90000"/>
+                <a:hueOff val="0"/>
+                <a:satOff val="0"/>
+                <a:lumOff val="0"/>
+                <a:alphaOff val="-20000"/>
+                <a:satMod val="110000"/>
+                <a:lumMod val="100000"/>
+                <a:shade val="100000"/>
+              </a:schemeClr>
+            </a:gs>
+            <a:gs pos="100000">
+              <a:schemeClr val="accent5">
+                <a:alpha val="90000"/>
+                <a:hueOff val="0"/>
+                <a:satOff val="0"/>
+                <a:lumOff val="0"/>
+                <a:alphaOff val="-20000"/>
+                <a:lumMod val="99000"/>
+                <a:satMod val="120000"/>
+                <a:shade val="78000"/>
+              </a:schemeClr>
+            </a:gs>
+          </a:gsLst>
+          <a:lin ang="5400000" scaled="0"/>
+        </a:gradFill>
+        <a:ln>
+          <a:noFill/>
+        </a:ln>
+        <a:effectLst/>
+        <a:scene3d>
+          <a:camera prst="orthographicFront"/>
+          <a:lightRig rig="threePt" dir="t">
+            <a:rot lat="0" lon="0" rev="7500000"/>
+          </a:lightRig>
+        </a:scene3d>
+        <a:sp3d prstMaterial="plastic">
+          <a:bevelT w="127000" h="25400" prst="relaxedInset"/>
+        </a:sp3d>
+      </dsp:spPr>
+      <dsp:style>
+        <a:lnRef idx="0">
+          <a:scrgbClr r="0" g="0" b="0"/>
+        </a:lnRef>
+        <a:fillRef idx="3">
+          <a:scrgbClr r="0" g="0" b="0"/>
+        </a:fillRef>
+        <a:effectRef idx="2">
+          <a:scrgbClr r="0" g="0" b="0"/>
+        </a:effectRef>
+        <a:fontRef idx="minor">
+          <a:schemeClr val="lt1"/>
+        </a:fontRef>
+      </dsp:style>
+      <dsp:txBody>
+        <a:bodyPr spcFirstLastPara="0" vert="horz" wrap="square" lIns="60960" tIns="60960" rIns="60960" bIns="60960" numCol="1" spcCol="1270" anchor="ctr" anchorCtr="0">
+          <a:noAutofit/>
+        </a:bodyPr>
+        <a:lstStyle/>
+        <a:p>
+          <a:pPr marL="0" lvl="0" indent="0" algn="ctr" defTabSz="2133600">
+            <a:lnSpc>
+              <a:spcPct val="90000"/>
+            </a:lnSpc>
+            <a:spcBef>
+              <a:spcPct val="0"/>
+            </a:spcBef>
+            <a:spcAft>
+              <a:spcPct val="35000"/>
+            </a:spcAft>
+            <a:buNone/>
+          </a:pPr>
+          <a:r>
+            <a:rPr lang="en-US" sz="4800" kern="1200" dirty="0"/>
+            <a:t>3</a:t>
+          </a:r>
+        </a:p>
+      </dsp:txBody>
+      <dsp:txXfrm>
+        <a:off x="1916200" y="1950890"/>
+        <a:ext cx="2450223" cy="975445"/>
+      </dsp:txXfrm>
+    </dsp:sp>
+    <dsp:sp modelId="{4610DA63-2C96-1C4D-B81E-9ACA4E7BFA80}">
+      <dsp:nvSpPr>
+        <dsp:cNvPr id="0" name=""/>
+        <dsp:cNvSpPr/>
+      </dsp:nvSpPr>
+      <dsp:spPr>
+        <a:xfrm>
+          <a:off x="628262" y="2926335"/>
+          <a:ext cx="5026100" cy="975445"/>
+        </a:xfrm>
+        <a:prstGeom prst="trapezoid">
+          <a:avLst>
+            <a:gd name="adj" fmla="val 64408"/>
+          </a:avLst>
+        </a:prstGeom>
+        <a:gradFill rotWithShape="0">
+          <a:gsLst>
+            <a:gs pos="0">
+              <a:schemeClr val="accent5">
+                <a:alpha val="90000"/>
+                <a:hueOff val="0"/>
+                <a:satOff val="0"/>
+                <a:lumOff val="0"/>
+                <a:alphaOff val="-30000"/>
+                <a:satMod val="103000"/>
+                <a:lumMod val="102000"/>
+                <a:tint val="94000"/>
+              </a:schemeClr>
+            </a:gs>
+            <a:gs pos="50000">
+              <a:schemeClr val="accent5">
+                <a:alpha val="90000"/>
+                <a:hueOff val="0"/>
+                <a:satOff val="0"/>
+                <a:lumOff val="0"/>
+                <a:alphaOff val="-30000"/>
+                <a:satMod val="110000"/>
+                <a:lumMod val="100000"/>
+                <a:shade val="100000"/>
+              </a:schemeClr>
+            </a:gs>
+            <a:gs pos="100000">
+              <a:schemeClr val="accent5">
+                <a:alpha val="90000"/>
+                <a:hueOff val="0"/>
+                <a:satOff val="0"/>
+                <a:lumOff val="0"/>
+                <a:alphaOff val="-30000"/>
+                <a:lumMod val="99000"/>
+                <a:satMod val="120000"/>
+                <a:shade val="78000"/>
+              </a:schemeClr>
+            </a:gs>
+          </a:gsLst>
+          <a:lin ang="5400000" scaled="0"/>
+        </a:gradFill>
+        <a:ln>
+          <a:noFill/>
+        </a:ln>
+        <a:effectLst/>
+        <a:scene3d>
+          <a:camera prst="orthographicFront"/>
+          <a:lightRig rig="threePt" dir="t">
+            <a:rot lat="0" lon="0" rev="7500000"/>
+          </a:lightRig>
+        </a:scene3d>
+        <a:sp3d prstMaterial="plastic">
+          <a:bevelT w="127000" h="25400" prst="relaxedInset"/>
+        </a:sp3d>
+      </dsp:spPr>
+      <dsp:style>
+        <a:lnRef idx="0">
+          <a:scrgbClr r="0" g="0" b="0"/>
+        </a:lnRef>
+        <a:fillRef idx="3">
+          <a:scrgbClr r="0" g="0" b="0"/>
+        </a:fillRef>
+        <a:effectRef idx="2">
+          <a:scrgbClr r="0" g="0" b="0"/>
+        </a:effectRef>
+        <a:fontRef idx="minor">
+          <a:schemeClr val="lt1"/>
+        </a:fontRef>
+      </dsp:style>
+      <dsp:txBody>
+        <a:bodyPr spcFirstLastPara="0" vert="horz" wrap="square" lIns="60960" tIns="60960" rIns="60960" bIns="60960" numCol="1" spcCol="1270" anchor="ctr" anchorCtr="0">
+          <a:noAutofit/>
+        </a:bodyPr>
+        <a:lstStyle/>
+        <a:p>
+          <a:pPr marL="0" lvl="0" indent="0" algn="ctr" defTabSz="2133600">
+            <a:lnSpc>
+              <a:spcPct val="90000"/>
+            </a:lnSpc>
+            <a:spcBef>
+              <a:spcPct val="0"/>
+            </a:spcBef>
+            <a:spcAft>
+              <a:spcPct val="35000"/>
+            </a:spcAft>
+            <a:buNone/>
+          </a:pPr>
+          <a:r>
+            <a:rPr lang="en-US" sz="4800" kern="1200" dirty="0"/>
+            <a:t>2</a:t>
+          </a:r>
+        </a:p>
+      </dsp:txBody>
+      <dsp:txXfrm>
+        <a:off x="1507829" y="2926335"/>
+        <a:ext cx="3266965" cy="975445"/>
+      </dsp:txXfrm>
+    </dsp:sp>
+    <dsp:sp modelId="{BEC8E75C-2EE1-CF47-9897-B699BFC1DC70}">
+      <dsp:nvSpPr>
+        <dsp:cNvPr id="0" name=""/>
+        <dsp:cNvSpPr/>
+      </dsp:nvSpPr>
+      <dsp:spPr>
+        <a:xfrm>
+          <a:off x="0" y="3901780"/>
+          <a:ext cx="6282625" cy="975445"/>
+        </a:xfrm>
+        <a:prstGeom prst="trapezoid">
+          <a:avLst>
+            <a:gd name="adj" fmla="val 64408"/>
+          </a:avLst>
+        </a:prstGeom>
+        <a:gradFill rotWithShape="0">
+          <a:gsLst>
+            <a:gs pos="0">
+              <a:schemeClr val="accent5">
+                <a:alpha val="90000"/>
+                <a:hueOff val="0"/>
+                <a:satOff val="0"/>
+                <a:lumOff val="0"/>
+                <a:alphaOff val="-40000"/>
+                <a:satMod val="103000"/>
+                <a:lumMod val="102000"/>
+                <a:tint val="94000"/>
+              </a:schemeClr>
+            </a:gs>
+            <a:gs pos="50000">
+              <a:schemeClr val="accent5">
+                <a:alpha val="90000"/>
+                <a:hueOff val="0"/>
+                <a:satOff val="0"/>
+                <a:lumOff val="0"/>
+                <a:alphaOff val="-40000"/>
+                <a:satMod val="110000"/>
+                <a:lumMod val="100000"/>
+                <a:shade val="100000"/>
+              </a:schemeClr>
+            </a:gs>
+            <a:gs pos="100000">
+              <a:schemeClr val="accent5">
+                <a:alpha val="90000"/>
+                <a:hueOff val="0"/>
+                <a:satOff val="0"/>
+                <a:lumOff val="0"/>
+                <a:alphaOff val="-40000"/>
+                <a:lumMod val="99000"/>
+                <a:satMod val="120000"/>
+                <a:shade val="78000"/>
+              </a:schemeClr>
+            </a:gs>
+          </a:gsLst>
+          <a:lin ang="5400000" scaled="0"/>
+        </a:gradFill>
+        <a:ln>
+          <a:noFill/>
+        </a:ln>
+        <a:effectLst/>
+        <a:scene3d>
+          <a:camera prst="orthographicFront"/>
+          <a:lightRig rig="threePt" dir="t">
+            <a:rot lat="0" lon="0" rev="7500000"/>
+          </a:lightRig>
+        </a:scene3d>
+        <a:sp3d prstMaterial="plastic">
+          <a:bevelT w="127000" h="25400" prst="relaxedInset"/>
+        </a:sp3d>
+      </dsp:spPr>
+      <dsp:style>
+        <a:lnRef idx="0">
+          <a:scrgbClr r="0" g="0" b="0"/>
+        </a:lnRef>
+        <a:fillRef idx="3">
+          <a:scrgbClr r="0" g="0" b="0"/>
+        </a:fillRef>
+        <a:effectRef idx="2">
+          <a:scrgbClr r="0" g="0" b="0"/>
+        </a:effectRef>
+        <a:fontRef idx="minor">
+          <a:schemeClr val="lt1"/>
+        </a:fontRef>
+      </dsp:style>
+      <dsp:txBody>
+        <a:bodyPr spcFirstLastPara="0" vert="horz" wrap="square" lIns="60960" tIns="60960" rIns="60960" bIns="60960" numCol="1" spcCol="1270" anchor="ctr" anchorCtr="0">
+          <a:noAutofit/>
+        </a:bodyPr>
+        <a:lstStyle/>
+        <a:p>
+          <a:pPr marL="0" lvl="0" indent="0" algn="ctr" defTabSz="2133600">
+            <a:lnSpc>
+              <a:spcPct val="90000"/>
+            </a:lnSpc>
+            <a:spcBef>
+              <a:spcPct val="0"/>
+            </a:spcBef>
+            <a:spcAft>
+              <a:spcPct val="35000"/>
+            </a:spcAft>
+            <a:buNone/>
+          </a:pPr>
+          <a:r>
+            <a:rPr lang="en-US" sz="4800" kern="1200" dirty="0"/>
+            <a:t>1</a:t>
+          </a:r>
+        </a:p>
+      </dsp:txBody>
+      <dsp:txXfrm>
+        <a:off x="1099459" y="3901780"/>
+        <a:ext cx="4083706" cy="975445"/>
+      </dsp:txXfrm>
+    </dsp:sp>
+  </dsp:spTree>
+</dsp:drawing>
+</file>
+
+<file path=ppt/diagrams/layout1.xml><?xml version="1.0" encoding="utf-8"?>
+<dgm:layoutDef xmlns:dgm="http://schemas.openxmlformats.org/drawingml/2006/diagram" xmlns:a="http://schemas.openxmlformats.org/drawingml/2006/main" uniqueId="urn:microsoft.com/office/officeart/2005/8/layout/pyramid1">
+  <dgm:title val=""/>
+  <dgm:desc val=""/>
+  <dgm:catLst>
+    <dgm:cat type="pyramid" pri="1000"/>
+  </dgm:catLst>
+  <dgm:sampData useDef="1">
+    <dgm:dataModel>
+      <dgm:ptLst/>
+      <dgm:bg/>
+      <dgm:whole/>
+    </dgm:dataModel>
+  </dgm:sampData>
+  <dgm:styleData>
+    <dgm:dataModel>
+      <dgm:ptLst>
+        <dgm:pt modelId="0" type="doc"/>
+        <dgm:pt modelId="1"/>
+        <dgm:pt modelId="2"/>
+      </dgm:ptLst>
+      <dgm:cxnLst>
+        <dgm:cxn modelId="3" srcId="0" destId="1" srcOrd="0" destOrd="0"/>
+        <dgm:cxn modelId="4" srcId="0" destId="2" srcOrd="1" destOrd="0"/>
+      </dgm:cxnLst>
+      <dgm:bg/>
+      <dgm:whole/>
+    </dgm:dataModel>
+  </dgm:styleData>
+  <dgm:clrData>
+    <dgm:dataModel>
+      <dgm:ptLst>
+        <dgm:pt modelId="0" type="doc"/>
+        <dgm:pt modelId="1"/>
+        <dgm:pt modelId="2"/>
+        <dgm:pt modelId="3"/>
+        <dgm:pt modelId="4"/>
+      </dgm:ptLst>
+      <dgm:cxnLst>
+        <dgm:cxn modelId="5" srcId="0" destId="1" srcOrd="0" destOrd="0"/>
+        <dgm:cxn modelId="6" srcId="0" destId="2" srcOrd="1" destOrd="0"/>
+        <dgm:cxn modelId="7" srcId="0" destId="3" srcOrd="2" destOrd="0"/>
+        <dgm:cxn modelId="8" srcId="0" destId="4" srcOrd="3" destOrd="0"/>
+      </dgm:cxnLst>
+      <dgm:bg/>
+      <dgm:whole/>
+    </dgm:dataModel>
+  </dgm:clrData>
+  <dgm:layoutNode name="Name0">
+    <dgm:varLst>
+      <dgm:dir/>
+      <dgm:animLvl val="lvl"/>
+      <dgm:resizeHandles val="exact"/>
+    </dgm:varLst>
+    <dgm:choose name="Name1">
+      <dgm:if name="Name2" func="var" arg="dir" op="equ" val="norm">
+        <dgm:alg type="pyra">
+          <dgm:param type="linDir" val="fromB"/>
+          <dgm:param type="txDir" val="fromT"/>
+          <dgm:param type="pyraAcctPos" val="aft"/>
+          <dgm:param type="pyraAcctTxMar" val="step"/>
+          <dgm:param type="pyraAcctBkgdNode" val="acctBkgd"/>
+          <dgm:param type="pyraAcctTxNode" val="acctTx"/>
+          <dgm:param type="pyraLvlNode" val="level"/>
+        </dgm:alg>
+      </dgm:if>
+      <dgm:else name="Name3">
+        <dgm:alg type="pyra">
+          <dgm:param type="linDir" val="fromB"/>
+          <dgm:param type="txDir" val="fromT"/>
+          <dgm:param type="pyraAcctPos" val="bef"/>
+          <dgm:param type="pyraAcctTxMar" val="step"/>
+          <dgm:param type="pyraAcctBkgdNode" val="acctBkgd"/>
+          <dgm:param type="pyraAcctTxNode" val="acctTx"/>
+          <dgm:param type="pyraLvlNode" val="level"/>
+        </dgm:alg>
+      </dgm:else>
+    </dgm:choose>
+    <dgm:shape xmlns:r="http://schemas.openxmlformats.org/officeDocument/2006/relationships" r:blip="">
+      <dgm:adjLst/>
+    </dgm:shape>
+    <dgm:presOf/>
+    <dgm:choose name="Name4">
+      <dgm:if name="Name5" axis="root des" ptType="all node" func="maxDepth" op="gte" val="2">
+        <dgm:constrLst>
+          <dgm:constr type="primFontSz" for="des" forName="levelTx" op="equ"/>
+          <dgm:constr type="secFontSz" for="des" forName="acctTx" op="equ"/>
+          <dgm:constr type="pyraAcctRatio" val="0.32"/>
+        </dgm:constrLst>
+      </dgm:if>
+      <dgm:else name="Name6">
+        <dgm:constrLst>
+          <dgm:constr type="primFontSz" for="des" forName="levelTx" op="equ"/>
+          <dgm:constr type="secFontSz" for="des" forName="acctTx" op="equ"/>
+          <dgm:constr type="pyraAcctRatio"/>
+        </dgm:constrLst>
+      </dgm:else>
+    </dgm:choose>
+    <dgm:ruleLst/>
+    <dgm:forEach name="Name7" axis="ch" ptType="node">
+      <dgm:layoutNode name="Name8">
+        <dgm:alg type="composite">
+          <dgm:param type="horzAlign" val="none"/>
+        </dgm:alg>
+        <dgm:shape xmlns:r="http://schemas.openxmlformats.org/officeDocument/2006/relationships" r:blip="">
+          <dgm:adjLst/>
+        </dgm:shape>
+        <dgm:presOf/>
+        <dgm:choose name="Name9">
+          <dgm:if name="Name10" axis="self" ptType="node" func="pos" op="equ" val="1">
+            <dgm:constrLst>
+              <dgm:constr type="ctrX" for="ch" forName="acctBkgd" val="1"/>
+              <dgm:constr type="ctrY" for="ch" forName="acctBkgd" val="1"/>
+              <dgm:constr type="w" for="ch" forName="acctBkgd" val="1"/>
+              <dgm:constr type="h" for="ch" forName="acctBkgd" val="1"/>
+              <dgm:constr type="ctrX" for="ch" forName="acctTx" val="1"/>
+              <dgm:constr type="ctrY" for="ch" forName="acctTx" val="1"/>
+              <dgm:constr type="w" for="ch" forName="acctTx" val="1"/>
+              <dgm:constr type="h" for="ch" forName="acctTx" val="1"/>
+              <dgm:constr type="ctrX" for="ch" forName="level" val="1"/>
+              <dgm:constr type="ctrY" for="ch" forName="level" val="1"/>
+              <dgm:constr type="w" for="ch" forName="level" val="1"/>
+              <dgm:constr type="h" for="ch" forName="level" val="1"/>
+              <dgm:constr type="ctrX" for="ch" forName="levelTx" refType="ctrX" refFor="ch" refForName="level"/>
+              <dgm:constr type="ctrY" for="ch" forName="levelTx" refType="ctrY" refFor="ch" refForName="level"/>
+              <dgm:constr type="w" for="ch" forName="levelTx" refType="w" refFor="ch" refForName="level"/>
+              <dgm:constr type="h" for="ch" forName="levelTx" refType="h" refFor="ch" refForName="level"/>
+            </dgm:constrLst>
+          </dgm:if>
+          <dgm:else name="Name11">
+            <dgm:constrLst>
+              <dgm:constr type="ctrX" for="ch" forName="acctBkgd" val="1"/>
+              <dgm:constr type="ctrY" for="ch" forName="acctBkgd" val="1"/>
+              <dgm:constr type="w" for="ch" forName="acctBkgd" val="1"/>
+              <dgm:constr type="h" for="ch" forName="acctBkgd" val="1"/>
+              <dgm:constr type="ctrX" for="ch" forName="acctTx" val="1"/>
+              <dgm:constr type="ctrY" for="ch" forName="acctTx" val="1"/>
+              <dgm:constr type="w" for="ch" forName="acctTx" val="1"/>
+              <dgm:constr type="h" for="ch" forName="acctTx" val="1"/>
+              <dgm:constr type="ctrX" for="ch" forName="level" val="1"/>
+              <dgm:constr type="ctrY" for="ch" forName="level" val="1"/>
+              <dgm:constr type="w" for="ch" forName="level" val="1"/>
+              <dgm:constr type="h" for="ch" forName="level" val="1"/>
+              <dgm:constr type="ctrX" for="ch" forName="levelTx" refType="ctrX" refFor="ch" refForName="level"/>
+              <dgm:constr type="ctrY" for="ch" forName="levelTx" refType="ctrY" refFor="ch" refForName="level"/>
+              <dgm:constr type="w" for="ch" forName="levelTx" refType="w" refFor="ch" refForName="level" fact="0.65"/>
+              <dgm:constr type="h" for="ch" forName="levelTx" refType="h" refFor="ch" refForName="level"/>
+            </dgm:constrLst>
+          </dgm:else>
+        </dgm:choose>
+        <dgm:ruleLst/>
+        <dgm:choose name="Name12">
+          <dgm:if name="Name13" axis="ch" ptType="node" func="cnt" op="gte" val="1">
+            <dgm:layoutNode name="acctBkgd" styleLbl="alignAcc1">
+              <dgm:alg type="sp"/>
+              <dgm:shape xmlns:r="http://schemas.openxmlformats.org/officeDocument/2006/relationships" type="nonIsoscelesTrapezoid" r:blip="">
+                <dgm:adjLst/>
+              </dgm:shape>
+              <dgm:presOf axis="des" ptType="node"/>
+              <dgm:constrLst/>
+              <dgm:ruleLst/>
+            </dgm:layoutNode>
+            <dgm:layoutNode name="acctTx" styleLbl="alignAcc1">
+              <dgm:varLst>
+                <dgm:bulletEnabled val="1"/>
+              </dgm:varLst>
+              <dgm:alg type="tx">
+                <dgm:param type="stBulletLvl" val="1"/>
+                <dgm:param type="txAnchorVertCh" val="mid"/>
+              </dgm:alg>
+              <dgm:shape xmlns:r="http://schemas.openxmlformats.org/officeDocument/2006/relationships" type="nonIsoscelesTrapezoid" r:blip="" hideGeom="1">
+                <dgm:adjLst/>
+              </dgm:shape>
+              <dgm:presOf axis="des" ptType="node"/>
+              <dgm:constrLst>
+                <dgm:constr type="secFontSz" val="65"/>
+                <dgm:constr type="primFontSz" refType="secFontSz"/>
+                <dgm:constr type="tMarg" refType="secFontSz" fact="0.3"/>
+                <dgm:constr type="bMarg" refType="secFontSz" fact="0.3"/>
+                <dgm:constr type="lMarg" refType="secFontSz" fact="0.3"/>
+                <dgm:constr type="rMarg" refType="secFontSz" fact="0.3"/>
+              </dgm:constrLst>
+              <dgm:ruleLst>
+                <dgm:rule type="secFontSz" val="5" fact="NaN" max="NaN"/>
+              </dgm:ruleLst>
+            </dgm:layoutNode>
+          </dgm:if>
+          <dgm:else name="Name14"/>
+        </dgm:choose>
+        <dgm:layoutNode name="level">
+          <dgm:varLst>
+            <dgm:chMax val="1"/>
+            <dgm:bulletEnabled val="1"/>
+          </dgm:varLst>
+          <dgm:alg type="sp"/>
+          <dgm:shape xmlns:r="http://schemas.openxmlformats.org/officeDocument/2006/relationships" type="trapezoid" r:blip="">
+            <dgm:adjLst/>
+          </dgm:shape>
+          <dgm:presOf axis="self"/>
+          <dgm:constrLst>
+            <dgm:constr type="h" val="500"/>
+            <dgm:constr type="w" val="1"/>
+          </dgm:constrLst>
+          <dgm:ruleLst/>
+        </dgm:layoutNode>
+        <dgm:layoutNode name="levelTx" styleLbl="revTx">
+          <dgm:varLst>
+            <dgm:chMax val="1"/>
+            <dgm:bulletEnabled val="1"/>
+          </dgm:varLst>
+          <dgm:alg type="tx"/>
+          <dgm:shape xmlns:r="http://schemas.openxmlformats.org/officeDocument/2006/relationships" type="rect" r:blip="" hideGeom="1">
+            <dgm:adjLst/>
+          </dgm:shape>
+          <dgm:presOf axis="self"/>
+          <dgm:constrLst>
+            <dgm:constr type="tMarg" refType="primFontSz" fact="0.1"/>
+            <dgm:constr type="bMarg" refType="primFontSz" fact="0.1"/>
+            <dgm:constr type="lMarg" refType="primFontSz" fact="0.1"/>
+            <dgm:constr type="rMarg" refType="primFontSz" fact="0.1"/>
+            <dgm:constr type="primFontSz" val="65"/>
+          </dgm:constrLst>
+          <dgm:ruleLst>
+            <dgm:rule type="primFontSz" val="5" fact="NaN" max="NaN"/>
+          </dgm:ruleLst>
+        </dgm:layoutNode>
+      </dgm:layoutNode>
+    </dgm:forEach>
+  </dgm:layoutNode>
+</dgm:layoutDef>
+</file>
+
+<file path=ppt/diagrams/quickStyle1.xml><?xml version="1.0" encoding="utf-8"?>
+<dgm:styleDef xmlns:dgm="http://schemas.openxmlformats.org/drawingml/2006/diagram" xmlns:a="http://schemas.openxmlformats.org/drawingml/2006/main" uniqueId="urn:microsoft.com/office/officeart/2005/8/quickstyle/3d2">
+  <dgm:title val=""/>
+  <dgm:desc val=""/>
+  <dgm:catLst>
+    <dgm:cat type="3D" pri="11200"/>
+  </dgm:catLst>
+  <dgm:scene3d>
+    <a:camera prst="orthographicFront"/>
+    <a:lightRig rig="threePt" dir="t"/>
+  </dgm:scene3d>
+  <dgm:styleLbl name="node0">
+    <dgm:scene3d>
+      <a:camera prst="orthographicFront"/>
+      <a:lightRig rig="threePt" dir="t">
+        <a:rot lat="0" lon="0" rev="7500000"/>
+      </a:lightRig>
+    </dgm:scene3d>
+    <dgm:sp3d prstMaterial="plastic">
+      <a:bevelT w="127000" h="25400" prst="relaxedInset"/>
+    </dgm:sp3d>
+    <dgm:txPr/>
+    <dgm:style>
+      <a:lnRef idx="0">
+        <a:scrgbClr r="0" g="0" b="0"/>
+      </a:lnRef>
+      <a:fillRef idx="3">
+        <a:scrgbClr r="0" g="0" b="0"/>
+      </a:fillRef>
+      <a:effectRef idx="2">
+        <a:scrgbClr r="0" g="0" b="0"/>
+      </a:effectRef>
+      <a:fontRef idx="minor">
+        <a:schemeClr val="lt1"/>
+      </a:fontRef>
+    </dgm:style>
+  </dgm:styleLbl>
+  <dgm:styleLbl name="lnNode1">
+    <dgm:scene3d>
+      <a:camera prst="orthographicFront"/>
+      <a:lightRig rig="threePt" dir="t">
+        <a:rot lat="0" lon="0" rev="7500000"/>
+      </a:lightRig>
+    </dgm:scene3d>
+    <dgm:sp3d prstMaterial="plastic">
+      <a:bevelT w="127000" h="25400" prst="relaxedInset"/>
+    </dgm:sp3d>
+    <dgm:txPr/>
+    <dgm:style>
+      <a:lnRef idx="1">
+        <a:scrgbClr r="0" g="0" b="0"/>
+      </a:lnRef>
+      <a:fillRef idx="3">
+        <a:scrgbClr r="0" g="0" b="0"/>
+      </a:fillRef>
+      <a:effectRef idx="2">
+        <a:scrgbClr r="0" g="0" b="0"/>
+      </a:effectRef>
+      <a:fontRef idx="minor">
+        <a:schemeClr val="lt1"/>
+      </a:fontRef>
+    </dgm:style>
+  </dgm:styleLbl>
+  <dgm:styleLbl name="vennNode1">
+    <dgm:scene3d>
+      <a:camera prst="orthographicFront"/>
+      <a:lightRig rig="threePt" dir="t">
+        <a:rot lat="0" lon="0" rev="7500000"/>
+      </a:lightRig>
+    </dgm:scene3d>
+    <dgm:sp3d prstMaterial="plastic">
+      <a:bevelT w="127000" h="25400" prst="relaxedInset"/>
+    </dgm:sp3d>
+    <dgm:txPr/>
+    <dgm:style>
+      <a:lnRef idx="0">
+        <a:scrgbClr r="0" g="0" b="0"/>
+      </a:lnRef>
+      <a:fillRef idx="3">
+        <a:scrgbClr r="0" g="0" b="0"/>
+      </a:fillRef>
+      <a:effectRef idx="2">
+        <a:scrgbClr r="0" g="0" b="0"/>
+      </a:effectRef>
+      <a:fontRef idx="minor">
+        <a:schemeClr val="tx1"/>
+      </a:fontRef>
+    </dgm:style>
+  </dgm:styleLbl>
+  <dgm:styleLbl name="alingNode1">
+    <dgm:scene3d>
+      <a:camera prst="orthographicFront"/>
+      <a:lightRig rig="threePt" dir="t">
+        <a:rot lat="0" lon="0" rev="7500000"/>
+      </a:lightRig>
+    </dgm:scene3d>
+    <dgm:sp3d prstMaterial="plastic">
+      <a:bevelT w="127000" h="25400" prst="relaxedInset"/>
+    </dgm:sp3d>
+    <dgm:txPr/>
+    <dgm:style>
+      <a:lnRef idx="0">
+        <a:scrgbClr r="0" g="0" b="0"/>
+      </a:lnRef>
+      <a:fillRef idx="3">
+        <a:scrgbClr r="0" g="0" b="0"/>
+      </a:fillRef>
+      <a:effectRef idx="2">
+        <a:scrgbClr r="0" g="0" b="0"/>
+      </a:effectRef>
+      <a:fontRef idx="minor">
+        <a:schemeClr val="lt1"/>
+      </a:fontRef>
+    </dgm:style>
+  </dgm:styleLbl>
+  <dgm:styleLbl name="node1">
+    <dgm:scene3d>
+      <a:camera prst="orthographicFront"/>
+      <a:lightRig rig="threePt" dir="t">
+        <a:rot lat="0" lon="0" rev="7500000"/>
+      </a:lightRig>
+    </dgm:scene3d>
+    <dgm:sp3d prstMaterial="plastic">
+      <a:bevelT w="127000" h="25400" prst="relaxedInset"/>
+    </dgm:sp3d>
+    <dgm:txPr/>
+    <dgm:style>
+      <a:lnRef idx="0">
+        <a:scrgbClr r="0" g="0" b="0"/>
+      </a:lnRef>
+      <a:fillRef idx="3">
+        <a:scrgbClr r="0" g="0" b="0"/>
+      </a:fillRef>
+      <a:effectRef idx="2">
+        <a:scrgbClr r="0" g="0" b="0"/>
+      </a:effectRef>
+      <a:fontRef idx="minor">
+        <a:schemeClr val="lt1"/>
+      </a:fontRef>
+    </dgm:style>
+  </dgm:styleLbl>
+  <dgm:styleLbl name="node2">
+    <dgm:scene3d>
+      <a:camera prst="orthographicFront"/>
+      <a:lightRig rig="threePt" dir="t">
+        <a:rot lat="0" lon="0" rev="7500000"/>
+      </a:lightRig>
+    </dgm:scene3d>
+    <dgm:sp3d prstMaterial="plastic">
+      <a:bevelT w="127000" h="25400" prst="relaxedInset"/>
+    </dgm:sp3d>
+    <dgm:txPr/>
+    <dgm:style>
+      <a:lnRef idx="0">
+        <a:scrgbClr r="0" g="0" b="0"/>
+      </a:lnRef>
+      <a:fillRef idx="3">
+        <a:scrgbClr r="0" g="0" b="0"/>
+      </a:fillRef>
+      <a:effectRef idx="2">
+        <a:scrgbClr r="0" g="0" b="0"/>
+      </a:effectRef>
+      <a:fontRef idx="minor">
+        <a:schemeClr val="lt1"/>
+      </a:fontRef>
+    </dgm:style>
+  </dgm:styleLbl>
+  <dgm:styleLbl name="node3">
+    <dgm:scene3d>
+      <a:camera prst="orthographicFront"/>
+      <a:lightRig rig="threePt" dir="t">
+        <a:rot lat="0" lon="0" rev="7500000"/>
+      </a:lightRig>
+    </dgm:scene3d>
+    <dgm:sp3d prstMaterial="plastic">
+      <a:bevelT w="127000" h="25400" prst="relaxedInset"/>
+    </dgm:sp3d>
+    <dgm:txPr/>
+    <dgm:style>
+      <a:lnRef idx="0">
+        <a:scrgbClr r="0" g="0" b="0"/>
+      </a:lnRef>
+      <a:fillRef idx="3">
+        <a:scrgbClr r="0" g="0" b="0"/>
+      </a:fillRef>
+      <a:effectRef idx="2">
+        <a:scrgbClr r="0" g="0" b="0"/>
+      </a:effectRef>
+      <a:fontRef idx="minor">
+        <a:schemeClr val="lt1"/>
+      </a:fontRef>
+    </dgm:style>
+  </dgm:styleLbl>
+  <dgm:styleLbl name="node4">
+    <dgm:scene3d>
+      <a:camera prst="orthographicFront"/>
+      <a:lightRig rig="threePt" dir="t">
+        <a:rot lat="0" lon="0" rev="7500000"/>
+      </a:lightRig>
+    </dgm:scene3d>
+    <dgm:sp3d prstMaterial="plastic">
+      <a:bevelT w="127000" h="25400" prst="relaxedInset"/>
+    </dgm:sp3d>
+    <dgm:txPr/>
+    <dgm:style>
+      <a:lnRef idx="0">
+        <a:scrgbClr r="0" g="0" b="0"/>
+      </a:lnRef>
+      <a:fillRef idx="3">
+        <a:scrgbClr r="0" g="0" b="0"/>
+      </a:fillRef>
+      <a:effectRef idx="2">
+        <a:scrgbClr r="0" g="0" b="0"/>
+      </a:effectRef>
+      <a:fontRef idx="minor">
+        <a:schemeClr val="lt1"/>
+      </a:fontRef>
+    </dgm:style>
+  </dgm:styleLbl>
+  <dgm:styleLbl name="fgImgPlace1">
+    <dgm:scene3d>
+      <a:camera prst="orthographicFront"/>
+      <a:lightRig rig="threePt" dir="t">
+        <a:rot lat="0" lon="0" rev="7500000"/>
+      </a:lightRig>
+    </dgm:scene3d>
+    <dgm:sp3d z="152400" extrusionH="63500" prstMaterial="matte">
+      <a:bevelT w="50800" h="19050" prst="relaxedInset"/>
+      <a:contourClr>
+        <a:schemeClr val="bg1"/>
+      </a:contourClr>
+    </dgm:sp3d>
+    <dgm:txPr/>
+    <dgm:style>
+      <a:lnRef idx="0">
+        <a:scrgbClr r="0" g="0" b="0"/>
+      </a:lnRef>
+      <a:fillRef idx="1">
+        <a:scrgbClr r="0" g="0" b="0"/>
+      </a:fillRef>
+      <a:effectRef idx="0">
+        <a:scrgbClr r="0" g="0" b="0"/>
+      </a:effectRef>
+      <a:fontRef idx="minor"/>
+    </dgm:style>
+  </dgm:styleLbl>
+  <dgm:styleLbl name="alignImgPlace1">
+    <dgm:scene3d>
+      <a:camera prst="orthographicFront"/>
+      <a:lightRig rig="threePt" dir="t">
+        <a:rot lat="0" lon="0" rev="7500000"/>
+      </a:lightRig>
+    </dgm:scene3d>
+    <dgm:sp3d z="254000" extrusionH="63500" contourW="12700" prstMaterial="matte">
+      <a:contourClr>
+        <a:schemeClr val="lt1"/>
+      </a:contourClr>
+    </dgm:sp3d>
+    <dgm:txPr/>
+    <dgm:style>
+      <a:lnRef idx="0">
+        <a:scrgbClr r="0" g="0" b="0"/>
+      </a:lnRef>
+      <a:fillRef idx="1">
+        <a:scrgbClr r="0" g="0" b="0"/>
+      </a:fillRef>
+      <a:effectRef idx="0">
+        <a:scrgbClr r="0" g="0" b="0"/>
+      </a:effectRef>
+      <a:fontRef idx="minor"/>
+    </dgm:style>
+  </dgm:styleLbl>
+  <dgm:styleLbl name="bgImgPlace1">
+    <dgm:scene3d>
+      <a:camera prst="orthographicFront"/>
+      <a:lightRig rig="threePt" dir="t">
+        <a:rot lat="0" lon="0" rev="7500000"/>
+      </a:lightRig>
+    </dgm:scene3d>
+    <dgm:sp3d z="-152400" extrusionH="63500" contourW="12700" prstMaterial="matte">
+      <a:contourClr>
+        <a:schemeClr val="lt1"/>
+      </a:contourClr>
+    </dgm:sp3d>
+    <dgm:txPr/>
+    <dgm:style>
+      <a:lnRef idx="0">
+        <a:scrgbClr r="0" g="0" b="0"/>
+      </a:lnRef>
+      <a:fillRef idx="1">
+        <a:scrgbClr r="0" g="0" b="0"/>
+      </a:fillRef>
+      <a:effectRef idx="0">
+        <a:scrgbClr r="0" g="0" b="0"/>
+      </a:effectRef>
+      <a:fontRef idx="minor"/>
+    </dgm:style>
+  </dgm:styleLbl>
+  <dgm:styleLbl name="sibTrans2D1">
+    <dgm:scene3d>
+      <a:camera prst="orthographicFront"/>
+      <a:lightRig rig="threePt" dir="t">
+        <a:rot lat="0" lon="0" rev="7500000"/>
+      </a:lightRig>
+    </dgm:scene3d>
+    <dgm:sp3d z="-70000" extrusionH="63500" prstMaterial="matte">
+      <a:bevelT w="25400" h="6350" prst="relaxedInset"/>
+      <a:contourClr>
+        <a:schemeClr val="bg1"/>
+      </a:contourClr>
+    </dgm:sp3d>
+    <dgm:txPr/>
+    <dgm:style>
+      <a:lnRef idx="0">
+        <a:scrgbClr r="0" g="0" b="0"/>
+      </a:lnRef>
+      <a:fillRef idx="1">
+        <a:scrgbClr r="0" g="0" b="0"/>
+      </a:fillRef>
+      <a:effectRef idx="2">
+        <a:scrgbClr r="0" g="0" b="0"/>
+      </a:effectRef>
+      <a:fontRef idx="minor">
+        <a:schemeClr val="lt1"/>
+      </a:fontRef>
+    </dgm:style>
+  </dgm:styleLbl>
+  <dgm:styleLbl name="fgSibTrans2D1">
+    <dgm:scene3d>
+      <a:camera prst="orthographicFront"/>
+      <a:lightRig rig="threePt" dir="t">
+        <a:rot lat="0" lon="0" rev="7500000"/>
+      </a:lightRig>
+    </dgm:scene3d>
+    <dgm:sp3d z="152400" extrusionH="63500" prstMaterial="matte">
+      <a:bevelT w="25400" h="6350" prst="relaxedInset"/>
+      <a:contourClr>
+        <a:schemeClr val="bg1"/>
+      </a:contourClr>
+    </dgm:sp3d>
+    <dgm:txPr/>
+    <dgm:style>
+      <a:lnRef idx="0">
+        <a:scrgbClr r="0" g="0" b="0"/>
+      </a:lnRef>
+      <a:fillRef idx="1">
+        <a:scrgbClr r="0" g="0" b="0"/>
+      </a:fillRef>
+      <a:effectRef idx="2">
+        <a:scrgbClr r="0" g="0" b="0"/>
+      </a:effectRef>
+      <a:fontRef idx="minor">
+        <a:schemeClr val="lt1"/>
+      </a:fontRef>
+    </dgm:style>
+  </dgm:styleLbl>
+  <dgm:styleLbl name="bgSibTrans2D1">
+    <dgm:scene3d>
+      <a:camera prst="orthographicFront"/>
+      <a:lightRig rig="threePt" dir="t">
+        <a:rot lat="0" lon="0" rev="7500000"/>
+      </a:lightRig>
+    </dgm:scene3d>
+    <dgm:sp3d z="-152400" extrusionH="63500" prstMaterial="matte">
+      <a:bevelT w="25400" h="6350" prst="relaxedInset"/>
+      <a:contourClr>
+        <a:schemeClr val="bg1"/>
+      </a:contourClr>
+    </dgm:sp3d>
+    <dgm:txPr/>
+    <dgm:style>
+      <a:lnRef idx="0">
+        <a:scrgbClr r="0" g="0" b="0"/>
+      </a:lnRef>
+      <a:fillRef idx="1">
+        <a:scrgbClr r="0" g="0" b="0"/>
+      </a:fillRef>
+      <a:effectRef idx="2">
+        <a:scrgbClr r="0" g="0" b="0"/>
+      </a:effectRef>
+      <a:fontRef idx="minor">
+        <a:schemeClr val="lt1"/>
+      </a:fontRef>
+    </dgm:style>
+  </dgm:styleLbl>
+  <dgm:styleLbl name="sibTrans1D1">
+    <dgm:scene3d>
+      <a:camera prst="orthographicFront"/>
+      <a:lightRig rig="threePt" dir="t">
+        <a:rot lat="0" lon="0" rev="7500000"/>
+      </a:lightRig>
+    </dgm:scene3d>
+    <dgm:sp3d z="-40000" prstMaterial="matte"/>
+    <dgm:txPr/>
+    <dgm:style>
+      <a:lnRef idx="1">
+        <a:scrgbClr r="0" g="0" b="0"/>
+      </a:lnRef>
+      <a:fillRef idx="0">
+        <a:scrgbClr r="0" g="0" b="0"/>
+      </a:fillRef>
+      <a:effectRef idx="0">
+        <a:scrgbClr r="0" g="0" b="0"/>
+      </a:effectRef>
+      <a:fontRef idx="minor"/>
+    </dgm:style>
+  </dgm:styleLbl>
+  <dgm:styleLbl name="callout">
+    <dgm:scene3d>
+      <a:camera prst="orthographicFront"/>
+      <a:lightRig rig="threePt" dir="t">
+        <a:rot lat="0" lon="0" rev="7500000"/>
+      </a:lightRig>
+    </dgm:scene3d>
+    <dgm:sp3d z="127000" prstMaterial="matte"/>
+    <dgm:txPr/>
+    <dgm:style>
+      <a:lnRef idx="2">
+        <a:scrgbClr r="0" g="0" b="0"/>
+      </a:lnRef>
+      <a:fillRef idx="1">
+        <a:scrgbClr r="0" g="0" b="0"/>
+      </a:fillRef>
+      <a:effectRef idx="0">
+        <a:scrgbClr r="0" g="0" b="0"/>
+      </a:effectRef>
+      <a:fontRef idx="minor"/>
+    </dgm:style>
+  </dgm:styleLbl>
+  <dgm:styleLbl name="asst0">
+    <dgm:scene3d>
+      <a:camera prst="orthographicFront"/>
+      <a:lightRig rig="threePt" dir="t">
+        <a:rot lat="0" lon="0" rev="7500000"/>
+      </a:lightRig>
+    </dgm:scene3d>
+    <dgm:sp3d prstMaterial="plastic">
+      <a:bevelT w="127000" h="25400" prst="relaxedInset"/>
+    </dgm:sp3d>
+    <dgm:txPr/>
+    <dgm:style>
+      <a:lnRef idx="0">
+        <a:scrgbClr r="0" g="0" b="0"/>
+      </a:lnRef>
+      <a:fillRef idx="3">
+        <a:scrgbClr r="0" g="0" b="0"/>
+      </a:fillRef>
+      <a:effectRef idx="2">
+        <a:scrgbClr r="0" g="0" b="0"/>
+      </a:effectRef>
+      <a:fontRef idx="minor">
+        <a:schemeClr val="lt1"/>
+      </a:fontRef>
+    </dgm:style>
+  </dgm:styleLbl>
+  <dgm:styleLbl name="asst1">
+    <dgm:scene3d>
+      <a:camera prst="orthographicFront"/>
+      <a:lightRig rig="threePt" dir="t">
+        <a:rot lat="0" lon="0" rev="7500000"/>
+      </a:lightRig>
+    </dgm:scene3d>
+    <dgm:sp3d prstMaterial="plastic">
+      <a:bevelT w="127000" h="25400" prst="relaxedInset"/>
+    </dgm:sp3d>
+    <dgm:txPr/>
+    <dgm:style>
+      <a:lnRef idx="0">
+        <a:scrgbClr r="0" g="0" b="0"/>
+      </a:lnRef>
+      <a:fillRef idx="3">
+        <a:scrgbClr r="0" g="0" b="0"/>
+      </a:fillRef>
+      <a:effectRef idx="2">
+        <a:scrgbClr r="0" g="0" b="0"/>
+      </a:effectRef>
+      <a:fontRef idx="minor">
+        <a:schemeClr val="lt1"/>
+      </a:fontRef>
+    </dgm:style>
+  </dgm:styleLbl>
+  <dgm:styleLbl name="asst2">
+    <dgm:scene3d>
+      <a:camera prst="orthographicFront"/>
+      <a:lightRig rig="threePt" dir="t">
+        <a:rot lat="0" lon="0" rev="7500000"/>
+      </a:lightRig>
+    </dgm:scene3d>
+    <dgm:sp3d prstMaterial="plastic">
+      <a:bevelT w="127000" h="25400" prst="relaxedInset"/>
+    </dgm:sp3d>
+    <dgm:txPr/>
+    <dgm:style>
+      <a:lnRef idx="0">
+        <a:scrgbClr r="0" g="0" b="0"/>
+      </a:lnRef>
+      <a:fillRef idx="3">
+        <a:scrgbClr r="0" g="0" b="0"/>
+      </a:fillRef>
+      <a:effectRef idx="2">
+        <a:scrgbClr r="0" g="0" b="0"/>
+      </a:effectRef>
+      <a:fontRef idx="minor">
+        <a:schemeClr val="lt1"/>
+      </a:fontRef>
+    </dgm:style>
+  </dgm:styleLbl>
+  <dgm:styleLbl name="asst3">
+    <dgm:scene3d>
+      <a:camera prst="orthographicFront"/>
+      <a:lightRig rig="threePt" dir="t">
+        <a:rot lat="0" lon="0" rev="7500000"/>
+      </a:lightRig>
+    </dgm:scene3d>
+    <dgm:sp3d prstMaterial="plastic">
+      <a:bevelT w="127000" h="25400" prst="relaxedInset"/>
+    </dgm:sp3d>
+    <dgm:txPr/>
+    <dgm:style>
+      <a:lnRef idx="0">
+        <a:scrgbClr r="0" g="0" b="0"/>
+      </a:lnRef>
+      <a:fillRef idx="3">
+        <a:scrgbClr r="0" g="0" b="0"/>
+      </a:fillRef>
+      <a:effectRef idx="2">
+        <a:scrgbClr r="0" g="0" b="0"/>
+      </a:effectRef>
+      <a:fontRef idx="minor">
+        <a:schemeClr val="lt1"/>
+      </a:fontRef>
+    </dgm:style>
+  </dgm:styleLbl>
+  <dgm:styleLbl name="parChTrans2D1">
+    <dgm:scene3d>
+      <a:camera prst="orthographicFront"/>
+      <a:lightRig rig="threePt" dir="t">
+        <a:rot lat="0" lon="0" rev="7500000"/>
+      </a:lightRig>
+    </dgm:scene3d>
+    <dgm:sp3d extrusionH="63500" prstMaterial="matte">
+      <a:bevelT w="50800" h="19050" prst="relaxedInset"/>
+      <a:contourClr>
+        <a:schemeClr val="bg1"/>
+      </a:contourClr>
+    </dgm:sp3d>
+    <dgm:txPr/>
+    <dgm:style>
+      <a:lnRef idx="0">
+        <a:scrgbClr r="0" g="0" b="0"/>
+      </a:lnRef>
+      <a:fillRef idx="1">
+        <a:scrgbClr r="0" g="0" b="0"/>
+      </a:fillRef>
+      <a:effectRef idx="2">
+        <a:scrgbClr r="0" g="0" b="0"/>
+      </a:effectRef>
+      <a:fontRef idx="minor">
+        <a:schemeClr val="lt1"/>
+      </a:fontRef>
+    </dgm:style>
+  </dgm:styleLbl>
+  <dgm:styleLbl name="parChTrans2D2">
+    <dgm:scene3d>
+      <a:camera prst="orthographicFront"/>
+      <a:lightRig rig="threePt" dir="t">
+        <a:rot lat="0" lon="0" rev="7500000"/>
+      </a:lightRig>
+    </dgm:scene3d>
+    <dgm:sp3d extrusionH="63500" prstMaterial="matte">
+      <a:bevelT w="50800" h="19050" prst="relaxedInset"/>
+      <a:contourClr>
+        <a:schemeClr val="bg1"/>
+      </a:contourClr>
+    </dgm:sp3d>
+    <dgm:txPr/>
+    <dgm:style>
+      <a:lnRef idx="0">
+        <a:scrgbClr r="0" g="0" b="0"/>
+      </a:lnRef>
+      <a:fillRef idx="1">
+        <a:scrgbClr r="0" g="0" b="0"/>
+      </a:fillRef>
+      <a:effectRef idx="0">
+        <a:scrgbClr r="0" g="0" b="0"/>
+      </a:effectRef>
+      <a:fontRef idx="minor">
+        <a:schemeClr val="lt1"/>
+      </a:fontRef>
+    </dgm:style>
+  </dgm:styleLbl>
+  <dgm:styleLbl name="parChTrans2D3">
+    <dgm:scene3d>
+      <a:camera prst="orthographicFront"/>
+      <a:lightRig rig="threePt" dir="t">
+        <a:rot lat="0" lon="0" rev="7500000"/>
+      </a:lightRig>
+    </dgm:scene3d>
+    <dgm:sp3d z="60000" prstMaterial="flat">
+      <a:bevelT w="120900" h="88900"/>
+    </dgm:sp3d>
+    <dgm:txPr/>
+    <dgm:style>
+      <a:lnRef idx="0">
+        <a:scrgbClr r="0" g="0" b="0"/>
+      </a:lnRef>
+      <a:fillRef idx="3">
+        <a:scrgbClr r="0" g="0" b="0"/>
+      </a:fillRef>
+      <a:effectRef idx="1">
+        <a:scrgbClr r="0" g="0" b="0"/>
+      </a:effectRef>
+      <a:fontRef idx="minor">
+        <a:schemeClr val="lt1"/>
+      </a:fontRef>
+    </dgm:style>
+  </dgm:styleLbl>
+  <dgm:styleLbl name="parChTrans2D4">
+    <dgm:scene3d>
+      <a:camera prst="orthographicFront"/>
+      <a:lightRig rig="threePt" dir="t">
+        <a:rot lat="0" lon="0" rev="7500000"/>
+      </a:lightRig>
+    </dgm:scene3d>
+    <dgm:sp3d z="60000" prstMaterial="flat">
+      <a:bevelT w="120900" h="88900"/>
+    </dgm:sp3d>
+    <dgm:txPr/>
+    <dgm:style>
+      <a:lnRef idx="0">
+        <a:scrgbClr r="0" g="0" b="0"/>
+      </a:lnRef>
+      <a:fillRef idx="3">
+        <a:scrgbClr r="0" g="0" b="0"/>
+      </a:fillRef>
+      <a:effectRef idx="1">
+        <a:scrgbClr r="0" g="0" b="0"/>
+      </a:effectRef>
+      <a:fontRef idx="minor">
+        <a:schemeClr val="lt1"/>
+      </a:fontRef>
+    </dgm:style>
+  </dgm:styleLbl>
+  <dgm:styleLbl name="parChTrans1D1">
+    <dgm:scene3d>
+      <a:camera prst="orthographicFront"/>
+      <a:lightRig rig="threePt" dir="t">
+        <a:rot lat="0" lon="0" rev="7500000"/>
+      </a:lightRig>
+    </dgm:scene3d>
+    <dgm:sp3d z="-40000" prstMaterial="matte"/>
+    <dgm:txPr/>
+    <dgm:style>
+      <a:lnRef idx="2">
+        <a:scrgbClr r="0" g="0" b="0"/>
+      </a:lnRef>
+      <a:fillRef idx="0">
+        <a:scrgbClr r="0" g="0" b="0"/>
+      </a:fillRef>
+      <a:effectRef idx="0">
+        <a:scrgbClr r="0" g="0" b="0"/>
+      </a:effectRef>
+      <a:fontRef idx="minor"/>
+    </dgm:style>
+  </dgm:styleLbl>
+  <dgm:styleLbl name="parChTrans1D2">
+    <dgm:scene3d>
+      <a:camera prst="orthographicFront"/>
+      <a:lightRig rig="threePt" dir="t">
+        <a:rot lat="0" lon="0" rev="7500000"/>
+      </a:lightRig>
+    </dgm:scene3d>
+    <dgm:sp3d z="-40000" prstMaterial="matte"/>
+    <dgm:txPr/>
+    <dgm:style>
+      <a:lnRef idx="2">
+        <a:scrgbClr r="0" g="0" b="0"/>
+      </a:lnRef>
+      <a:fillRef idx="0">
+        <a:scrgbClr r="0" g="0" b="0"/>
+      </a:fillRef>
+      <a:effectRef idx="0">
+        <a:scrgbClr r="0" g="0" b="0"/>
+      </a:effectRef>
+      <a:fontRef idx="minor"/>
+    </dgm:style>
+  </dgm:styleLbl>
+  <dgm:styleLbl name="parChTrans1D3">
+    <dgm:scene3d>
+      <a:camera prst="orthographicFront"/>
+      <a:lightRig rig="threePt" dir="t">
+        <a:rot lat="0" lon="0" rev="7500000"/>
+      </a:lightRig>
+    </dgm:scene3d>
+    <dgm:sp3d z="-40000" prstMaterial="matte"/>
+    <dgm:txPr/>
+    <dgm:style>
+      <a:lnRef idx="2">
+        <a:scrgbClr r="0" g="0" b="0"/>
+      </a:lnRef>
+      <a:fillRef idx="0">
+        <a:scrgbClr r="0" g="0" b="0"/>
+      </a:fillRef>
+      <a:effectRef idx="0">
+        <a:scrgbClr r="0" g="0" b="0"/>
+      </a:effectRef>
+      <a:fontRef idx="minor"/>
+    </dgm:style>
+  </dgm:styleLbl>
+  <dgm:styleLbl name="parChTrans1D4">
+    <dgm:scene3d>
+      <a:camera prst="orthographicFront"/>
+      <a:lightRig rig="threePt" dir="t">
+        <a:rot lat="0" lon="0" rev="7500000"/>
+      </a:lightRig>
+    </dgm:scene3d>
+    <dgm:sp3d z="-40000" prstMaterial="matte"/>
+    <dgm:txPr/>
+    <dgm:style>
+      <a:lnRef idx="2">
+        <a:scrgbClr r="0" g="0" b="0"/>
+      </a:lnRef>
+      <a:fillRef idx="0">
+        <a:scrgbClr r="0" g="0" b="0"/>
+      </a:fillRef>
+      <a:effectRef idx="0">
+        <a:scrgbClr r="0" g="0" b="0"/>
+      </a:effectRef>
+      <a:fontRef idx="minor"/>
+    </dgm:style>
+  </dgm:styleLbl>
+  <dgm:styleLbl name="fgAcc1">
+    <dgm:scene3d>
+      <a:camera prst="orthographicFront"/>
+      <a:lightRig rig="threePt" dir="t">
+        <a:rot lat="0" lon="0" rev="7500000"/>
+      </a:lightRig>
+    </dgm:scene3d>
+    <dgm:sp3d z="152400" extrusionH="63500" prstMaterial="dkEdge">
+      <a:bevelT w="135400" h="16350" prst="relaxedInset"/>
+      <a:contourClr>
+        <a:schemeClr val="bg1"/>
+      </a:contourClr>
+    </dgm:sp3d>
+    <dgm:txPr/>
+    <dgm:style>
+      <a:lnRef idx="1">
+        <a:scrgbClr r="0" g="0" b="0"/>
+      </a:lnRef>
+      <a:fillRef idx="1">
+        <a:scrgbClr r="0" g="0" b="0"/>
+      </a:fillRef>
+      <a:effectRef idx="2">
+        <a:scrgbClr r="0" g="0" b="0"/>
+      </a:effectRef>
+      <a:fontRef idx="minor"/>
+    </dgm:style>
+  </dgm:styleLbl>
+  <dgm:styleLbl name="conFgAcc1">
+    <dgm:scene3d>
+      <a:camera prst="orthographicFront"/>
+      <a:lightRig rig="threePt" dir="t">
+        <a:rot lat="0" lon="0" rev="7500000"/>
+      </a:lightRig>
+    </dgm:scene3d>
+    <dgm:sp3d z="152400" extrusionH="63500" prstMaterial="dkEdge">
+      <a:bevelT w="135400" h="16350" prst="relaxedInset"/>
+      <a:contourClr>
+        <a:schemeClr val="bg1"/>
+      </a:contourClr>
+    </dgm:sp3d>
+    <dgm:txPr/>
+    <dgm:style>
+      <a:lnRef idx="1">
+        <a:scrgbClr r="0" g="0" b="0"/>
+      </a:lnRef>
+      <a:fillRef idx="1">
+        <a:scrgbClr r="0" g="0" b="0"/>
+      </a:fillRef>
+      <a:effectRef idx="2">
+        <a:scrgbClr r="0" g="0" b="0"/>
+      </a:effectRef>
+      <a:fontRef idx="minor"/>
+    </dgm:style>
+  </dgm:styleLbl>
+  <dgm:styleLbl name="alignAcc1">
+    <dgm:scene3d>
+      <a:camera prst="orthographicFront"/>
+      <a:lightRig rig="threePt" dir="t">
+        <a:rot lat="0" lon="0" rev="7500000"/>
+      </a:lightRig>
+    </dgm:scene3d>
+    <dgm:sp3d extrusionH="190500" prstMaterial="dkEdge">
+      <a:bevelT w="135400" h="16350" prst="relaxedInset"/>
+      <a:contourClr>
+        <a:schemeClr val="bg1"/>
+      </a:contourClr>
+    </dgm:sp3d>
+    <dgm:txPr/>
+    <dgm:style>
+      <a:lnRef idx="1">
+        <a:scrgbClr r="0" g="0" b="0"/>
+      </a:lnRef>
+      <a:fillRef idx="1">
+        <a:scrgbClr r="0" g="0" b="0"/>
+      </a:fillRef>
+      <a:effectRef idx="2">
+        <a:scrgbClr r="0" g="0" b="0"/>
+      </a:effectRef>
+      <a:fontRef idx="minor"/>
+    </dgm:style>
+  </dgm:styleLbl>
+  <dgm:styleLbl name="trAlignAcc1">
+    <dgm:scene3d>
+      <a:camera prst="orthographicFront"/>
+      <a:lightRig rig="threePt" dir="t">
+        <a:rot lat="0" lon="0" rev="7500000"/>
+      </a:lightRig>
+    </dgm:scene3d>
+    <dgm:sp3d prstMaterial="plastic">
+      <a:bevelT w="127000" h="35400"/>
+    </dgm:sp3d>
+    <dgm:txPr/>
+    <dgm:style>
+      <a:lnRef idx="1">
+        <a:scrgbClr r="0" g="0" b="0"/>
+      </a:lnRef>
+      <a:fillRef idx="1">
+        <a:scrgbClr r="0" g="0" b="0"/>
+      </a:fillRef>
+      <a:effectRef idx="2">
+        <a:scrgbClr r="0" g="0" b="0"/>
+      </a:effectRef>
+      <a:fontRef idx="minor">
+        <a:schemeClr val="lt1"/>
+      </a:fontRef>
+    </dgm:style>
+  </dgm:styleLbl>
+  <dgm:styleLbl name="bgAcc1">
+    <dgm:scene3d>
+      <a:camera prst="orthographicFront"/>
+      <a:lightRig rig="threePt" dir="t">
+        <a:rot lat="0" lon="0" rev="7500000"/>
+      </a:lightRig>
+    </dgm:scene3d>
+    <dgm:sp3d z="-152400" extrusionH="63500" prstMaterial="dkEdge">
+      <a:bevelT w="124450" h="16350" prst="relaxedInset"/>
+      <a:contourClr>
+        <a:schemeClr val="bg1"/>
+      </a:contourClr>
+    </dgm:sp3d>
+    <dgm:txPr/>
+    <dgm:style>
+      <a:lnRef idx="1">
+        <a:scrgbClr r="0" g="0" b="0"/>
+      </a:lnRef>
+      <a:fillRef idx="1">
+        <a:scrgbClr r="0" g="0" b="0"/>
+      </a:fillRef>
+      <a:effectRef idx="0">
+        <a:scrgbClr r="0" g="0" b="0"/>
+      </a:effectRef>
+      <a:fontRef idx="minor"/>
+    </dgm:style>
+  </dgm:styleLbl>
+  <dgm:styleLbl name="solidFgAcc1">
+    <dgm:scene3d>
+      <a:camera prst="orthographicFront"/>
+      <a:lightRig rig="threePt" dir="t">
+        <a:rot lat="0" lon="0" rev="7500000"/>
+      </a:lightRig>
+    </dgm:scene3d>
+    <dgm:sp3d z="152400" extrusionH="63500" prstMaterial="dkEdge">
+      <a:bevelT w="120800" h="19050" prst="relaxedInset"/>
+      <a:contourClr>
+        <a:schemeClr val="bg1"/>
+      </a:contourClr>
+    </dgm:sp3d>
+    <dgm:txPr/>
+    <dgm:style>
+      <a:lnRef idx="1">
+        <a:scrgbClr r="0" g="0" b="0"/>
+      </a:lnRef>
+      <a:fillRef idx="1">
+        <a:scrgbClr r="0" g="0" b="0"/>
+      </a:fillRef>
+      <a:effectRef idx="2">
+        <a:scrgbClr r="0" g="0" b="0"/>
+      </a:effectRef>
+      <a:fontRef idx="minor"/>
+    </dgm:style>
+  </dgm:styleLbl>
+  <dgm:styleLbl name="solidAlignAcc1">
+    <dgm:scene3d>
+      <a:camera prst="orthographicFront"/>
+      <a:lightRig rig="threePt" dir="t">
+        <a:rot lat="0" lon="0" rev="7500000"/>
+      </a:lightRig>
+    </dgm:scene3d>
+    <dgm:sp3d extrusionH="190500" prstMaterial="dkEdge">
+      <a:bevelT w="120650" h="38100" prst="relaxedInset"/>
+      <a:contourClr>
+        <a:schemeClr val="bg1"/>
+      </a:contourClr>
+    </dgm:sp3d>
+    <dgm:txPr/>
+    <dgm:style>
+      <a:lnRef idx="1">
+        <a:scrgbClr r="0" g="0" b="0"/>
+      </a:lnRef>
+      <a:fillRef idx="1">
+        <a:scrgbClr r="0" g="0" b="0"/>
+      </a:fillRef>
+      <a:effectRef idx="2">
+        <a:scrgbClr r="0" g="0" b="0"/>
+      </a:effectRef>
+      <a:fontRef idx="minor"/>
+    </dgm:style>
+  </dgm:styleLbl>
+  <dgm:styleLbl name="solidBgAcc1">
+    <dgm:scene3d>
+      <a:camera prst="orthographicFront"/>
+      <a:lightRig rig="threePt" dir="t">
+        <a:rot lat="0" lon="0" rev="7500000"/>
+      </a:lightRig>
+    </dgm:scene3d>
+    <dgm:sp3d z="-152400" extrusionH="63500" prstMaterial="dkEdge">
+      <a:bevelT w="144450" h="36350" prst="relaxedInset"/>
+      <a:contourClr>
+        <a:schemeClr val="bg1"/>
+      </a:contourClr>
+    </dgm:sp3d>
+    <dgm:txPr/>
+    <dgm:style>
+      <a:lnRef idx="1">
+        <a:scrgbClr r="0" g="0" b="0"/>
+      </a:lnRef>
+      <a:fillRef idx="1">
+        <a:scrgbClr r="0" g="0" b="0"/>
+      </a:fillRef>
+      <a:effectRef idx="0">
+        <a:scrgbClr r="0" g="0" b="0"/>
+      </a:effectRef>
+      <a:fontRef idx="minor"/>
+    </dgm:style>
+  </dgm:styleLbl>
+  <dgm:styleLbl name="fgAccFollowNode1">
+    <dgm:scene3d>
+      <a:camera prst="orthographicFront"/>
+      <a:lightRig rig="threePt" dir="t">
+        <a:rot lat="0" lon="0" rev="7500000"/>
+      </a:lightRig>
+    </dgm:scene3d>
+    <dgm:sp3d z="152400" extrusionH="63500" prstMaterial="dkEdge">
+      <a:bevelT w="125400" h="36350" prst="relaxedInset"/>
+      <a:contourClr>
+        <a:schemeClr val="bg1"/>
+      </a:contourClr>
+    </dgm:sp3d>
+    <dgm:txPr/>
+    <dgm:style>
+      <a:lnRef idx="1">
+        <a:scrgbClr r="0" g="0" b="0"/>
+      </a:lnRef>
+      <a:fillRef idx="1">
+        <a:scrgbClr r="0" g="0" b="0"/>
+      </a:fillRef>
+      <a:effectRef idx="0">
+        <a:scrgbClr r="0" g="0" b="0"/>
+      </a:effectRef>
+      <a:fontRef idx="minor"/>
+    </dgm:style>
+  </dgm:styleLbl>
+  <dgm:styleLbl name="alignAccFollowNode1">
+    <dgm:scene3d>
+      <a:camera prst="orthographicFront"/>
+      <a:lightRig rig="threePt" dir="t">
+        <a:rot lat="0" lon="0" rev="7500000"/>
+      </a:lightRig>
+    </dgm:scene3d>
+    <dgm:sp3d extrusionH="190500" prstMaterial="dkEdge">
+      <a:bevelT w="120650" h="38100" prst="relaxedInset"/>
+      <a:bevelB w="120650" h="57150" prst="relaxedInset"/>
+      <a:contourClr>
+        <a:schemeClr val="bg1"/>
+      </a:contourClr>
+    </dgm:sp3d>
+    <dgm:txPr/>
+    <dgm:style>
+      <a:lnRef idx="1">
+        <a:scrgbClr r="0" g="0" b="0"/>
+      </a:lnRef>
+      <a:fillRef idx="1">
+        <a:scrgbClr r="0" g="0" b="0"/>
+      </a:fillRef>
+      <a:effectRef idx="2">
+        <a:scrgbClr r="0" g="0" b="0"/>
+      </a:effectRef>
+      <a:fontRef idx="minor"/>
+    </dgm:style>
+  </dgm:styleLbl>
+  <dgm:styleLbl name="bgAccFollowNode1">
+    <dgm:scene3d>
+      <a:camera prst="orthographicFront"/>
+      <a:lightRig rig="threePt" dir="t">
+        <a:rot lat="0" lon="0" rev="7500000"/>
+      </a:lightRig>
+    </dgm:scene3d>
+    <dgm:sp3d z="-152400" extrusionH="63500" prstMaterial="dkEdge">
+      <a:bevelT w="144450" h="36350" prst="relaxedInset"/>
+      <a:contourClr>
+        <a:schemeClr val="bg1"/>
+      </a:contourClr>
+    </dgm:sp3d>
+    <dgm:txPr/>
+    <dgm:style>
+      <a:lnRef idx="1">
+        <a:scrgbClr r="0" g="0" b="0"/>
+      </a:lnRef>
+      <a:fillRef idx="1">
+        <a:scrgbClr r="0" g="0" b="0"/>
+      </a:fillRef>
+      <a:effectRef idx="2">
+        <a:scrgbClr r="0" g="0" b="0"/>
+      </a:effectRef>
+      <a:fontRef idx="minor"/>
+    </dgm:style>
+  </dgm:styleLbl>
+  <dgm:styleLbl name="fgAcc0">
+    <dgm:scene3d>
+      <a:camera prst="orthographicFront"/>
+      <a:lightRig rig="threePt" dir="t">
+        <a:rot lat="0" lon="0" rev="7500000"/>
+      </a:lightRig>
+    </dgm:scene3d>
+    <dgm:sp3d z="152400" extrusionH="63500" prstMaterial="dkEdge">
+      <a:bevelT w="125400" h="36350" prst="relaxedInset"/>
+      <a:contourClr>
+        <a:schemeClr val="bg1"/>
+      </a:contourClr>
+    </dgm:sp3d>
+    <dgm:txPr/>
+    <dgm:style>
+      <a:lnRef idx="1">
+        <a:scrgbClr r="0" g="0" b="0"/>
+      </a:lnRef>
+      <a:fillRef idx="1">
+        <a:scrgbClr r="0" g="0" b="0"/>
+      </a:fillRef>
+      <a:effectRef idx="2">
+        <a:scrgbClr r="0" g="0" b="0"/>
+      </a:effectRef>
+      <a:fontRef idx="minor"/>
+    </dgm:style>
+  </dgm:styleLbl>
+  <dgm:styleLbl name="fgAcc2">
+    <dgm:scene3d>
+      <a:camera prst="orthographicFront"/>
+      <a:lightRig rig="threePt" dir="t">
+        <a:rot lat="0" lon="0" rev="7500000"/>
+      </a:lightRig>
+    </dgm:scene3d>
+    <dgm:sp3d z="152400" extrusionH="63500" prstMaterial="dkEdge">
+      <a:bevelT w="125400" h="36350" prst="relaxedInset"/>
+      <a:contourClr>
+        <a:schemeClr val="bg1"/>
+      </a:contourClr>
+    </dgm:sp3d>
+    <dgm:txPr/>
+    <dgm:style>
+      <a:lnRef idx="1">
+        <a:scrgbClr r="0" g="0" b="0"/>
+      </a:lnRef>
+      <a:fillRef idx="1">
+        <a:scrgbClr r="0" g="0" b="0"/>
+      </a:fillRef>
+      <a:effectRef idx="2">
+        <a:scrgbClr r="0" g="0" b="0"/>
+      </a:effectRef>
+      <a:fontRef idx="minor"/>
+    </dgm:style>
+  </dgm:styleLbl>
+  <dgm:styleLbl name="fgAcc3">
+    <dgm:scene3d>
+      <a:camera prst="orthographicFront"/>
+      <a:lightRig rig="threePt" dir="t">
+        <a:rot lat="0" lon="0" rev="7500000"/>
+      </a:lightRig>
+    </dgm:scene3d>
+    <dgm:sp3d z="152400" extrusionH="63500" prstMaterial="dkEdge">
+      <a:bevelT w="125400" h="36350" prst="relaxedInset"/>
+      <a:contourClr>
+        <a:schemeClr val="bg1"/>
+      </a:contourClr>
+    </dgm:sp3d>
+    <dgm:txPr/>
+    <dgm:style>
+      <a:lnRef idx="1">
+        <a:scrgbClr r="0" g="0" b="0"/>
+      </a:lnRef>
+      <a:fillRef idx="1">
+        <a:scrgbClr r="0" g="0" b="0"/>
+      </a:fillRef>
+      <a:effectRef idx="2">
+        <a:scrgbClr r="0" g="0" b="0"/>
+      </a:effectRef>
+      <a:fontRef idx="minor"/>
+    </dgm:style>
+  </dgm:styleLbl>
+  <dgm:styleLbl name="fgAcc4">
+    <dgm:scene3d>
+      <a:camera prst="orthographicFront"/>
+      <a:lightRig rig="threePt" dir="t">
+        <a:rot lat="0" lon="0" rev="7500000"/>
+      </a:lightRig>
+    </dgm:scene3d>
+    <dgm:sp3d z="152400" extrusionH="63500" prstMaterial="dkEdge">
+      <a:bevelT w="125400" h="36350" prst="relaxedInset"/>
+      <a:contourClr>
+        <a:schemeClr val="bg1"/>
+      </a:contourClr>
+    </dgm:sp3d>
+    <dgm:txPr/>
+    <dgm:style>
+      <a:lnRef idx="1">
+        <a:scrgbClr r="0" g="0" b="0"/>
+      </a:lnRef>
+      <a:fillRef idx="1">
+        <a:scrgbClr r="0" g="0" b="0"/>
+      </a:fillRef>
+      <a:effectRef idx="2">
+        <a:scrgbClr r="0" g="0" b="0"/>
+      </a:effectRef>
+      <a:fontRef idx="minor"/>
+    </dgm:style>
+  </dgm:styleLbl>
+  <dgm:styleLbl name="bgShp">
+    <dgm:scene3d>
+      <a:camera prst="orthographicFront"/>
+      <a:lightRig rig="threePt" dir="t">
+        <a:rot lat="0" lon="0" rev="7500000"/>
+      </a:lightRig>
+    </dgm:scene3d>
+    <dgm:sp3d z="-152400" extrusionH="63500" prstMaterial="matte">
+      <a:bevelT w="144450" h="6350" prst="relaxedInset"/>
+      <a:contourClr>
+        <a:schemeClr val="bg1"/>
+      </a:contourClr>
+    </dgm:sp3d>
+    <dgm:txPr/>
+    <dgm:style>
+      <a:lnRef idx="0">
+        <a:scrgbClr r="0" g="0" b="0"/>
+      </a:lnRef>
+      <a:fillRef idx="3">
+        <a:scrgbClr r="0" g="0" b="0"/>
+      </a:fillRef>
+      <a:effectRef idx="0">
+        <a:scrgbClr r="0" g="0" b="0"/>
+      </a:effectRef>
+      <a:fontRef idx="minor"/>
+    </dgm:style>
+  </dgm:styleLbl>
+  <dgm:styleLbl name="dkBgShp">
+    <dgm:scene3d>
+      <a:camera prst="orthographicFront"/>
+      <a:lightRig rig="threePt" dir="t">
+        <a:rot lat="0" lon="0" rev="7500000"/>
+      </a:lightRig>
+    </dgm:scene3d>
+    <dgm:sp3d prstMaterial="plastic">
+      <a:bevelT w="127000" h="25400" prst="relaxedInset"/>
+      <a:bevelB w="88900" h="121750" prst="angle"/>
+    </dgm:sp3d>
+    <dgm:txPr/>
+    <dgm:style>
+      <a:lnRef idx="0">
+        <a:scrgbClr r="0" g="0" b="0"/>
+      </a:lnRef>
+      <a:fillRef idx="1">
+        <a:scrgbClr r="0" g="0" b="0"/>
+      </a:fillRef>
+      <a:effectRef idx="2">
+        <a:scrgbClr r="0" g="0" b="0"/>
+      </a:effectRef>
+      <a:fontRef idx="minor">
+        <a:schemeClr val="lt1"/>
+      </a:fontRef>
+    </dgm:style>
+  </dgm:styleLbl>
+  <dgm:styleLbl name="trBgShp">
+    <dgm:scene3d>
+      <a:camera prst="orthographicFront"/>
+      <a:lightRig rig="threePt" dir="t"/>
+    </dgm:scene3d>
+    <dgm:sp3d z="-152400" prstMaterial="matte"/>
+    <dgm:txPr/>
+    <dgm:style>
+      <a:lnRef idx="0">
+        <a:scrgbClr r="0" g="0" b="0"/>
+      </a:lnRef>
+      <a:fillRef idx="1">
+        <a:scrgbClr r="0" g="0" b="0"/>
+      </a:fillRef>
+      <a:effectRef idx="0">
+        <a:scrgbClr r="0" g="0" b="0"/>
+      </a:effectRef>
+      <a:fontRef idx="minor"/>
+    </dgm:style>
+  </dgm:styleLbl>
+  <dgm:styleLbl name="fgShp">
+    <dgm:scene3d>
+      <a:camera prst="orthographicFront"/>
+      <a:lightRig rig="threePt" dir="t">
+        <a:rot lat="0" lon="0" rev="7500000"/>
+      </a:lightRig>
+    </dgm:scene3d>
+    <dgm:sp3d z="152400" extrusionH="63500" prstMaterial="matte">
+      <a:bevelT w="50800" h="19050" prst="relaxedInset"/>
+      <a:contourClr>
+        <a:schemeClr val="bg1"/>
+      </a:contourClr>
+    </dgm:sp3d>
+    <dgm:txPr/>
+    <dgm:style>
+      <a:lnRef idx="0">
+        <a:scrgbClr r="0" g="0" b="0"/>
+      </a:lnRef>
+      <a:fillRef idx="1">
+        <a:scrgbClr r="0" g="0" b="0"/>
+      </a:fillRef>
+      <a:effectRef idx="2">
+        <a:scrgbClr r="0" g="0" b="0"/>
+      </a:effectRef>
+      <a:fontRef idx="minor">
+        <a:schemeClr val="lt1"/>
+      </a:fontRef>
+    </dgm:style>
+  </dgm:styleLbl>
+  <dgm:styleLbl name="revTx">
+    <dgm:scene3d>
+      <a:camera prst="orthographicFront"/>
+      <a:lightRig rig="threePt" dir="t"/>
+    </dgm:scene3d>
+    <dgm:sp3d/>
+    <dgm:txPr/>
+    <dgm:style>
+      <a:lnRef idx="0">
+        <a:scrgbClr r="0" g="0" b="0"/>
+      </a:lnRef>
+      <a:fillRef idx="0">
+        <a:scrgbClr r="0" g="0" b="0"/>
+      </a:fillRef>
+      <a:effectRef idx="0">
+        <a:scrgbClr r="0" g="0" b="0"/>
+      </a:effectRef>
+      <a:fontRef idx="minor"/>
+    </dgm:style>
+  </dgm:styleLbl>
+</dgm:styleDef>
+</file>
+
 <file path=ppt/notesMasters/notesMaster1.xml><?xml version="1.0" encoding="utf-8"?>
 <p:notesMaster xmlns:a="http://schemas.openxmlformats.org/drawingml/2006/main" xmlns:r="http://schemas.openxmlformats.org/officeDocument/2006/relationships" xmlns:p="http://schemas.openxmlformats.org/presentationml/2006/main">
   <p:cSld>
@@ -210,7 +3516,7 @@
           <a:p>
             <a:fld id="{6029E663-3FAF-2C47-8ED6-385286F2FEBA}" type="datetimeFigureOut">
               <a:rPr lang="en-US" smtClean="0"/>
-              <a:t>8/21/25</a:t>
+              <a:t>8/22/25</a:t>
             </a:fld>
             <a:endParaRPr lang="en-US"/>
           </a:p>
@@ -605,7 +3911,19 @@
           <a:bodyPr/>
           <a:lstStyle/>
           <a:p>
+            <a:r>
+              <a:rPr lang="en-GB" dirty="0"/>
+              <a:t>So we thought of partitioning the SNPs. -&gt; We analyse the partitions-&gt; The found minimal cover is composed of some SNPs, we keep them and write the results to the next level-&gt; Again we partition-&gt; find a cover -&gt;go up one level-&gt; finally we can analyse it all in one go to find result</a:t>
+            </a:r>
+          </a:p>
+          <a:p>
             <a:endParaRPr lang="en-GB" dirty="0"/>
+          </a:p>
+          <a:p>
+            <a:r>
+              <a:rPr lang="en-GB" dirty="0"/>
+              <a:t>Still takes 20h hours for our dataset, too perfect overly influenced by wrong data/incomplete</a:t>
+            </a:r>
           </a:p>
         </p:txBody>
       </p:sp>
@@ -636,6 +3954,360 @@
     <p:extLst>
       <p:ext uri="{BB962C8B-B14F-4D97-AF65-F5344CB8AC3E}">
         <p14:creationId xmlns:p14="http://schemas.microsoft.com/office/powerpoint/2010/main" val="2224857122"/>
+      </p:ext>
+    </p:extLst>
+  </p:cSld>
+  <p:clrMapOvr>
+    <a:masterClrMapping/>
+  </p:clrMapOvr>
+</p:notes>
+</file>
+
+<file path=ppt/notesSlides/notesSlide11.xml><?xml version="1.0" encoding="utf-8"?>
+<p:notes xmlns:a="http://schemas.openxmlformats.org/drawingml/2006/main" xmlns:r="http://schemas.openxmlformats.org/officeDocument/2006/relationships" xmlns:p="http://schemas.openxmlformats.org/presentationml/2006/main">
+  <p:cSld>
+    <p:spTree>
+      <p:nvGrpSpPr>
+        <p:cNvPr id="1" name=""/>
+        <p:cNvGrpSpPr/>
+        <p:nvPr/>
+      </p:nvGrpSpPr>
+      <p:grpSpPr>
+        <a:xfrm>
+          <a:off x="0" y="0"/>
+          <a:ext cx="0" cy="0"/>
+          <a:chOff x="0" y="0"/>
+          <a:chExt cx="0" cy="0"/>
+        </a:xfrm>
+      </p:grpSpPr>
+      <p:sp>
+        <p:nvSpPr>
+          <p:cNvPr id="2" name="Slide Image Placeholder 1"/>
+          <p:cNvSpPr>
+            <a:spLocks noGrp="1" noRot="1" noChangeAspect="1"/>
+          </p:cNvSpPr>
+          <p:nvPr>
+            <p:ph type="sldImg"/>
+          </p:nvPr>
+        </p:nvSpPr>
+        <p:spPr/>
+      </p:sp>
+      <p:sp>
+        <p:nvSpPr>
+          <p:cNvPr id="3" name="Notes Placeholder 2"/>
+          <p:cNvSpPr>
+            <a:spLocks noGrp="1"/>
+          </p:cNvSpPr>
+          <p:nvPr>
+            <p:ph type="body" idx="1"/>
+          </p:nvPr>
+        </p:nvSpPr>
+        <p:spPr/>
+        <p:txBody>
+          <a:bodyPr/>
+          <a:lstStyle/>
+          <a:p>
+            <a:r>
+              <a:rPr lang="en-GB" dirty="0"/>
+              <a:t>We compared the results of our analysis with State-of-the-Art analysis.</a:t>
+            </a:r>
+          </a:p>
+        </p:txBody>
+      </p:sp>
+      <p:sp>
+        <p:nvSpPr>
+          <p:cNvPr id="4" name="Slide Number Placeholder 3"/>
+          <p:cNvSpPr>
+            <a:spLocks noGrp="1"/>
+          </p:cNvSpPr>
+          <p:nvPr>
+            <p:ph type="sldNum" sz="quarter" idx="5"/>
+          </p:nvPr>
+        </p:nvSpPr>
+        <p:spPr/>
+        <p:txBody>
+          <a:bodyPr/>
+          <a:lstStyle/>
+          <a:p>
+            <a:fld id="{D3E4D156-9788-E94C-969D-835AC55077E3}" type="slidenum">
+              <a:rPr lang="en-US" smtClean="0"/>
+              <a:t>11</a:t>
+            </a:fld>
+            <a:endParaRPr lang="en-US"/>
+          </a:p>
+        </p:txBody>
+      </p:sp>
+    </p:spTree>
+    <p:extLst>
+      <p:ext uri="{BB962C8B-B14F-4D97-AF65-F5344CB8AC3E}">
+        <p14:creationId xmlns:p14="http://schemas.microsoft.com/office/powerpoint/2010/main" val="836846686"/>
+      </p:ext>
+    </p:extLst>
+  </p:cSld>
+  <p:clrMapOvr>
+    <a:masterClrMapping/>
+  </p:clrMapOvr>
+</p:notes>
+</file>
+
+<file path=ppt/notesSlides/notesSlide12.xml><?xml version="1.0" encoding="utf-8"?>
+<p:notes xmlns:a="http://schemas.openxmlformats.org/drawingml/2006/main" xmlns:r="http://schemas.openxmlformats.org/officeDocument/2006/relationships" xmlns:p="http://schemas.openxmlformats.org/presentationml/2006/main">
+  <p:cSld>
+    <p:spTree>
+      <p:nvGrpSpPr>
+        <p:cNvPr id="1" name=""/>
+        <p:cNvGrpSpPr/>
+        <p:nvPr/>
+      </p:nvGrpSpPr>
+      <p:grpSpPr>
+        <a:xfrm>
+          <a:off x="0" y="0"/>
+          <a:ext cx="0" cy="0"/>
+          <a:chOff x="0" y="0"/>
+          <a:chExt cx="0" cy="0"/>
+        </a:xfrm>
+      </p:grpSpPr>
+      <p:sp>
+        <p:nvSpPr>
+          <p:cNvPr id="2" name="Slide Image Placeholder 1"/>
+          <p:cNvSpPr>
+            <a:spLocks noGrp="1" noRot="1" noChangeAspect="1"/>
+          </p:cNvSpPr>
+          <p:nvPr>
+            <p:ph type="sldImg"/>
+          </p:nvPr>
+        </p:nvSpPr>
+        <p:spPr/>
+      </p:sp>
+      <p:sp>
+        <p:nvSpPr>
+          <p:cNvPr id="3" name="Notes Placeholder 2"/>
+          <p:cNvSpPr>
+            <a:spLocks noGrp="1"/>
+          </p:cNvSpPr>
+          <p:nvPr>
+            <p:ph type="body" idx="1"/>
+          </p:nvPr>
+        </p:nvSpPr>
+        <p:spPr/>
+        <p:txBody>
+          <a:bodyPr/>
+          <a:lstStyle/>
+          <a:p>
+            <a:r>
+              <a:rPr lang="en-GB" dirty="0"/>
+              <a:t>We group individuals into different groups say 4 equal sized groups. On every level of the pyramid, we only include the data from this group. On the next level we change the group. We find cover for those people. </a:t>
+            </a:r>
+          </a:p>
+          <a:p>
+            <a:endParaRPr lang="en-GB" dirty="0"/>
+          </a:p>
+          <a:p>
+            <a:r>
+              <a:rPr lang="en-GB" dirty="0"/>
+              <a:t>This makes a single person have less influence as this person is not always included.  It also decreases the needed computing time significantly to about 3h. </a:t>
+            </a:r>
+          </a:p>
+        </p:txBody>
+      </p:sp>
+      <p:sp>
+        <p:nvSpPr>
+          <p:cNvPr id="4" name="Slide Number Placeholder 3"/>
+          <p:cNvSpPr>
+            <a:spLocks noGrp="1"/>
+          </p:cNvSpPr>
+          <p:nvPr>
+            <p:ph type="sldNum" sz="quarter" idx="5"/>
+          </p:nvPr>
+        </p:nvSpPr>
+        <p:spPr/>
+        <p:txBody>
+          <a:bodyPr/>
+          <a:lstStyle/>
+          <a:p>
+            <a:fld id="{D3E4D156-9788-E94C-969D-835AC55077E3}" type="slidenum">
+              <a:rPr lang="en-US" smtClean="0"/>
+              <a:t>12</a:t>
+            </a:fld>
+            <a:endParaRPr lang="en-US"/>
+          </a:p>
+        </p:txBody>
+      </p:sp>
+    </p:spTree>
+    <p:extLst>
+      <p:ext uri="{BB962C8B-B14F-4D97-AF65-F5344CB8AC3E}">
+        <p14:creationId xmlns:p14="http://schemas.microsoft.com/office/powerpoint/2010/main" val="2594800826"/>
+      </p:ext>
+    </p:extLst>
+  </p:cSld>
+  <p:clrMapOvr>
+    <a:masterClrMapping/>
+  </p:clrMapOvr>
+</p:notes>
+</file>
+
+<file path=ppt/notesSlides/notesSlide13.xml><?xml version="1.0" encoding="utf-8"?>
+<p:notes xmlns:a="http://schemas.openxmlformats.org/drawingml/2006/main" xmlns:r="http://schemas.openxmlformats.org/officeDocument/2006/relationships" xmlns:p="http://schemas.openxmlformats.org/presentationml/2006/main">
+  <p:cSld>
+    <p:spTree>
+      <p:nvGrpSpPr>
+        <p:cNvPr id="1" name=""/>
+        <p:cNvGrpSpPr/>
+        <p:nvPr/>
+      </p:nvGrpSpPr>
+      <p:grpSpPr>
+        <a:xfrm>
+          <a:off x="0" y="0"/>
+          <a:ext cx="0" cy="0"/>
+          <a:chOff x="0" y="0"/>
+          <a:chExt cx="0" cy="0"/>
+        </a:xfrm>
+      </p:grpSpPr>
+      <p:sp>
+        <p:nvSpPr>
+          <p:cNvPr id="2" name="Slide Image Placeholder 1"/>
+          <p:cNvSpPr>
+            <a:spLocks noGrp="1" noRot="1" noChangeAspect="1"/>
+          </p:cNvSpPr>
+          <p:nvPr>
+            <p:ph type="sldImg"/>
+          </p:nvPr>
+        </p:nvSpPr>
+        <p:spPr/>
+      </p:sp>
+      <p:sp>
+        <p:nvSpPr>
+          <p:cNvPr id="3" name="Notes Placeholder 2"/>
+          <p:cNvSpPr>
+            <a:spLocks noGrp="1"/>
+          </p:cNvSpPr>
+          <p:nvPr>
+            <p:ph type="body" idx="1"/>
+          </p:nvPr>
+        </p:nvSpPr>
+        <p:spPr/>
+        <p:txBody>
+          <a:bodyPr/>
+          <a:lstStyle/>
+          <a:p>
+            <a:r>
+              <a:rPr lang="en-GB" dirty="0"/>
+              <a:t>Repeated experiments with changed selections yield different results but also there exist reoccurring SNPs, which probably are important. </a:t>
+            </a:r>
+          </a:p>
+        </p:txBody>
+      </p:sp>
+      <p:sp>
+        <p:nvSpPr>
+          <p:cNvPr id="4" name="Slide Number Placeholder 3"/>
+          <p:cNvSpPr>
+            <a:spLocks noGrp="1"/>
+          </p:cNvSpPr>
+          <p:nvPr>
+            <p:ph type="sldNum" sz="quarter" idx="5"/>
+          </p:nvPr>
+        </p:nvSpPr>
+        <p:spPr/>
+        <p:txBody>
+          <a:bodyPr/>
+          <a:lstStyle/>
+          <a:p>
+            <a:fld id="{D3E4D156-9788-E94C-969D-835AC55077E3}" type="slidenum">
+              <a:rPr lang="en-US" smtClean="0"/>
+              <a:t>15</a:t>
+            </a:fld>
+            <a:endParaRPr lang="en-US"/>
+          </a:p>
+        </p:txBody>
+      </p:sp>
+    </p:spTree>
+    <p:extLst>
+      <p:ext uri="{BB962C8B-B14F-4D97-AF65-F5344CB8AC3E}">
+        <p14:creationId xmlns:p14="http://schemas.microsoft.com/office/powerpoint/2010/main" val="580977569"/>
+      </p:ext>
+    </p:extLst>
+  </p:cSld>
+  <p:clrMapOvr>
+    <a:masterClrMapping/>
+  </p:clrMapOvr>
+</p:notes>
+</file>
+
+<file path=ppt/notesSlides/notesSlide14.xml><?xml version="1.0" encoding="utf-8"?>
+<p:notes xmlns:a="http://schemas.openxmlformats.org/drawingml/2006/main" xmlns:r="http://schemas.openxmlformats.org/officeDocument/2006/relationships" xmlns:p="http://schemas.openxmlformats.org/presentationml/2006/main">
+  <p:cSld>
+    <p:spTree>
+      <p:nvGrpSpPr>
+        <p:cNvPr id="1" name=""/>
+        <p:cNvGrpSpPr/>
+        <p:nvPr/>
+      </p:nvGrpSpPr>
+      <p:grpSpPr>
+        <a:xfrm>
+          <a:off x="0" y="0"/>
+          <a:ext cx="0" cy="0"/>
+          <a:chOff x="0" y="0"/>
+          <a:chExt cx="0" cy="0"/>
+        </a:xfrm>
+      </p:grpSpPr>
+      <p:sp>
+        <p:nvSpPr>
+          <p:cNvPr id="2" name="Slide Image Placeholder 1"/>
+          <p:cNvSpPr>
+            <a:spLocks noGrp="1" noRot="1" noChangeAspect="1"/>
+          </p:cNvSpPr>
+          <p:nvPr>
+            <p:ph type="sldImg"/>
+          </p:nvPr>
+        </p:nvSpPr>
+        <p:spPr/>
+      </p:sp>
+      <p:sp>
+        <p:nvSpPr>
+          <p:cNvPr id="3" name="Notes Placeholder 2"/>
+          <p:cNvSpPr>
+            <a:spLocks noGrp="1"/>
+          </p:cNvSpPr>
+          <p:nvPr>
+            <p:ph type="body" idx="1"/>
+          </p:nvPr>
+        </p:nvSpPr>
+        <p:spPr/>
+        <p:txBody>
+          <a:bodyPr/>
+          <a:lstStyle/>
+          <a:p>
+            <a:endParaRPr lang="en-GB" dirty="0"/>
+          </a:p>
+        </p:txBody>
+      </p:sp>
+      <p:sp>
+        <p:nvSpPr>
+          <p:cNvPr id="4" name="Slide Number Placeholder 3"/>
+          <p:cNvSpPr>
+            <a:spLocks noGrp="1"/>
+          </p:cNvSpPr>
+          <p:nvPr>
+            <p:ph type="sldNum" sz="quarter" idx="5"/>
+          </p:nvPr>
+        </p:nvSpPr>
+        <p:spPr/>
+        <p:txBody>
+          <a:bodyPr/>
+          <a:lstStyle/>
+          <a:p>
+            <a:fld id="{D3E4D156-9788-E94C-969D-835AC55077E3}" type="slidenum">
+              <a:rPr lang="en-US" smtClean="0"/>
+              <a:t>17</a:t>
+            </a:fld>
+            <a:endParaRPr lang="en-US"/>
+          </a:p>
+        </p:txBody>
+      </p:sp>
+    </p:spTree>
+    <p:extLst>
+      <p:ext uri="{BB962C8B-B14F-4D97-AF65-F5344CB8AC3E}">
+        <p14:creationId xmlns:p14="http://schemas.microsoft.com/office/powerpoint/2010/main" val="3875882822"/>
       </p:ext>
     </p:extLst>
   </p:cSld>
@@ -691,13 +4363,7 @@
           <a:p>
             <a:r>
               <a:rPr lang="en-US" dirty="0"/>
-              <a:t>Ever heard of DNA, composed of A,C,G,T?</a:t>
-            </a:r>
-          </a:p>
-          <a:p>
-            <a:r>
-              <a:rPr lang="en-US" dirty="0"/>
-              <a:t>Genome is the building plan every cell on planet Earth. We, humans share about 99.9% of their genetic material. Actually, we share more than 60% with bananas and 87% with donkeys some maybe even a little bit more. But the most interesting is the remaining 0.1% which explains all the differences between us, they are mutations. Those small snippets of our DNA which generally only exist in two forms called SNPs are not only responsible for some people being able bigger or smaller than others, but also for genetic diseases such as certain cancer types, autism or colorblindness. </a:t>
+              <a:t>Genome is the building plan of every cell on planet Earth. We, humans share about 99.9% of their genetic material. Actually, we share more than 60% with bananas and 87% with donkeys some maybe even a little bit more. But the most interesting is the remaining 0.1% which explains all the differences between us, they are mutations. Those small snippets of our DNA which generally only exist in two forms called SNPs are not only responsible for some people being able bigger or smaller than others, but also for genetic diseases such as certain cancer types, autism or colorblindness. </a:t>
             </a:r>
           </a:p>
         </p:txBody>
@@ -979,24 +4645,19 @@
           <a:p>
             <a:r>
               <a:rPr lang="en-GB" dirty="0"/>
-              <a:t>First we have to translate the data: this we do through determining the allele’s types and we can then count the occurrence of the risk allele. We are not able to distinguish </a:t>
+              <a:t>The data we have in some form like this. We inherit one copy from both our parents. A phenotype can be recessive or dominant. There are two version possible, one mutating the other regular(risk/</a:t>
             </a:r>
             <a:r>
               <a:rPr lang="en-GB" dirty="0" err="1"/>
-              <a:t>aA</a:t>
+              <a:t>norisk</a:t>
             </a:r>
             <a:r>
               <a:rPr lang="en-GB" dirty="0"/>
-              <a:t> from Aa. We can only count the the </a:t>
-            </a:r>
-            <a:r>
-              <a:rPr lang="en-GB" dirty="0" err="1"/>
-              <a:t>occurences</a:t>
-            </a:r>
-            <a:r>
-              <a:rPr lang="en-GB" dirty="0"/>
-              <a:t> of A. We opted to encode this ternary information in a binary way but since Hamming distance between 10 and 01 is 2 instead of 1 while between 0/2 only 1 bit differs, we encoded with 11 as 2. </a:t>
-            </a:r>
+              <a:t>)</a:t>
+            </a:r>
+          </a:p>
+          <a:p>
+            <a:endParaRPr lang="en-GB" dirty="0"/>
           </a:p>
         </p:txBody>
       </p:sp>
@@ -1622,7 +5283,7 @@
           <a:p>
             <a:fld id="{C6E07786-2C51-4440-8C4C-8E5A537CA8A9}" type="datetimeFigureOut">
               <a:rPr lang="en-US" smtClean="0"/>
-              <a:t>8/21/25</a:t>
+              <a:t>8/22/25</a:t>
             </a:fld>
             <a:endParaRPr lang="en-US"/>
           </a:p>
@@ -1820,7 +5481,7 @@
           <a:p>
             <a:fld id="{C6E07786-2C51-4440-8C4C-8E5A537CA8A9}" type="datetimeFigureOut">
               <a:rPr lang="en-US" smtClean="0"/>
-              <a:t>8/21/25</a:t>
+              <a:t>8/22/25</a:t>
             </a:fld>
             <a:endParaRPr lang="en-US"/>
           </a:p>
@@ -2028,7 +5689,7 @@
           <a:p>
             <a:fld id="{C6E07786-2C51-4440-8C4C-8E5A537CA8A9}" type="datetimeFigureOut">
               <a:rPr lang="en-US" smtClean="0"/>
-              <a:t>8/21/25</a:t>
+              <a:t>8/22/25</a:t>
             </a:fld>
             <a:endParaRPr lang="en-US"/>
           </a:p>
@@ -2226,7 +5887,7 @@
           <a:p>
             <a:fld id="{C6E07786-2C51-4440-8C4C-8E5A537CA8A9}" type="datetimeFigureOut">
               <a:rPr lang="en-US" smtClean="0"/>
-              <a:t>8/21/25</a:t>
+              <a:t>8/22/25</a:t>
             </a:fld>
             <a:endParaRPr lang="en-US"/>
           </a:p>
@@ -2499,7 +6160,7 @@
           <a:p>
             <a:fld id="{C6E07786-2C51-4440-8C4C-8E5A537CA8A9}" type="datetimeFigureOut">
               <a:rPr lang="en-US" smtClean="0"/>
-              <a:t>8/21/25</a:t>
+              <a:t>8/22/25</a:t>
             </a:fld>
             <a:endParaRPr lang="en-US"/>
           </a:p>
@@ -2764,7 +6425,7 @@
           <a:p>
             <a:fld id="{C6E07786-2C51-4440-8C4C-8E5A537CA8A9}" type="datetimeFigureOut">
               <a:rPr lang="en-US" smtClean="0"/>
-              <a:t>8/21/25</a:t>
+              <a:t>8/22/25</a:t>
             </a:fld>
             <a:endParaRPr lang="en-US"/>
           </a:p>
@@ -3176,7 +6837,7 @@
           <a:p>
             <a:fld id="{C6E07786-2C51-4440-8C4C-8E5A537CA8A9}" type="datetimeFigureOut">
               <a:rPr lang="en-US" smtClean="0"/>
-              <a:t>8/21/25</a:t>
+              <a:t>8/22/25</a:t>
             </a:fld>
             <a:endParaRPr lang="en-US"/>
           </a:p>
@@ -3317,7 +6978,7 @@
           <a:p>
             <a:fld id="{C6E07786-2C51-4440-8C4C-8E5A537CA8A9}" type="datetimeFigureOut">
               <a:rPr lang="en-US" smtClean="0"/>
-              <a:t>8/21/25</a:t>
+              <a:t>8/22/25</a:t>
             </a:fld>
             <a:endParaRPr lang="en-US"/>
           </a:p>
@@ -3430,7 +7091,7 @@
           <a:p>
             <a:fld id="{C6E07786-2C51-4440-8C4C-8E5A537CA8A9}" type="datetimeFigureOut">
               <a:rPr lang="en-US" smtClean="0"/>
-              <a:t>8/21/25</a:t>
+              <a:t>8/22/25</a:t>
             </a:fld>
             <a:endParaRPr lang="en-US"/>
           </a:p>
@@ -3741,7 +7402,7 @@
           <a:p>
             <a:fld id="{C6E07786-2C51-4440-8C4C-8E5A537CA8A9}" type="datetimeFigureOut">
               <a:rPr lang="en-US" smtClean="0"/>
-              <a:t>8/21/25</a:t>
+              <a:t>8/22/25</a:t>
             </a:fld>
             <a:endParaRPr lang="en-US"/>
           </a:p>
@@ -4029,7 +7690,7 @@
           <a:p>
             <a:fld id="{C6E07786-2C51-4440-8C4C-8E5A537CA8A9}" type="datetimeFigureOut">
               <a:rPr lang="en-US" smtClean="0"/>
-              <a:t>8/21/25</a:t>
+              <a:t>8/22/25</a:t>
             </a:fld>
             <a:endParaRPr lang="en-US"/>
           </a:p>
@@ -4279,7 +7940,7 @@
           <a:p>
             <a:fld id="{C6E07786-2C51-4440-8C4C-8E5A537CA8A9}" type="datetimeFigureOut">
               <a:rPr lang="en-US" smtClean="0"/>
-              <a:t>8/21/25</a:t>
+              <a:t>8/22/25</a:t>
             </a:fld>
             <a:endParaRPr lang="en-US"/>
           </a:p>
@@ -6420,6 +10081,228 @@
           <p:cNvPr id="2" name="Title 1">
             <a:extLst>
               <a:ext uri="{FF2B5EF4-FFF2-40B4-BE49-F238E27FC236}">
+                <a16:creationId xmlns:a16="http://schemas.microsoft.com/office/drawing/2014/main" id="{0A280AAD-D661-4E87-A6B7-9703C0F13881}"/>
+              </a:ext>
+            </a:extLst>
+          </p:cNvPr>
+          <p:cNvSpPr>
+            <a:spLocks noGrp="1"/>
+          </p:cNvSpPr>
+          <p:nvPr>
+            <p:ph type="title"/>
+          </p:nvPr>
+        </p:nvSpPr>
+        <p:spPr>
+          <a:xfrm>
+            <a:off x="838200" y="365126"/>
+            <a:ext cx="10515600" cy="914400"/>
+          </a:xfrm>
+        </p:spPr>
+        <p:txBody>
+          <a:bodyPr/>
+          <a:lstStyle/>
+          <a:p>
+            <a:r>
+              <a:rPr lang="en-US" dirty="0"/>
+              <a:t>PRS analysis</a:t>
+            </a:r>
+          </a:p>
+        </p:txBody>
+      </p:sp>
+      <p:pic>
+        <p:nvPicPr>
+          <p:cNvPr id="4" name="Picture 3" descr="A diagram of a graph&#10;&#10;AI-generated content may be incorrect.">
+            <a:extLst>
+              <a:ext uri="{FF2B5EF4-FFF2-40B4-BE49-F238E27FC236}">
+                <a16:creationId xmlns:a16="http://schemas.microsoft.com/office/drawing/2014/main" id="{910D7FDA-2C49-E609-3CC7-B43C25B0683C}"/>
+              </a:ext>
+            </a:extLst>
+          </p:cNvPr>
+          <p:cNvPicPr>
+            <a:picLocks noChangeAspect="1"/>
+          </p:cNvPicPr>
+          <p:nvPr/>
+        </p:nvPicPr>
+        <p:blipFill>
+          <a:blip r:embed="rId3"/>
+          <a:stretch>
+            <a:fillRect/>
+          </a:stretch>
+        </p:blipFill>
+        <p:spPr>
+          <a:xfrm>
+            <a:off x="2355850" y="1279526"/>
+            <a:ext cx="7480300" cy="5610225"/>
+          </a:xfrm>
+          <a:prstGeom prst="rect">
+            <a:avLst/>
+          </a:prstGeom>
+        </p:spPr>
+      </p:pic>
+      <p:sp>
+        <p:nvSpPr>
+          <p:cNvPr id="7" name="TextBox 6">
+            <a:extLst>
+              <a:ext uri="{FF2B5EF4-FFF2-40B4-BE49-F238E27FC236}">
+                <a16:creationId xmlns:a16="http://schemas.microsoft.com/office/drawing/2014/main" id="{782A997A-5F77-706E-249D-FA56A950DAF9}"/>
+              </a:ext>
+            </a:extLst>
+          </p:cNvPr>
+          <p:cNvSpPr txBox="1"/>
+          <p:nvPr/>
+        </p:nvSpPr>
+        <p:spPr>
+          <a:xfrm>
+            <a:off x="3340100" y="5255308"/>
+            <a:ext cx="5181600" cy="646331"/>
+          </a:xfrm>
+          <a:prstGeom prst="rect">
+            <a:avLst/>
+          </a:prstGeom>
+          <a:noFill/>
+        </p:spPr>
+        <p:txBody>
+          <a:bodyPr wrap="square" rtlCol="0">
+            <a:spAutoFit/>
+          </a:bodyPr>
+          <a:lstStyle/>
+          <a:p>
+            <a:r>
+              <a:rPr lang="en-GB" sz="3600" dirty="0">
+                <a:solidFill>
+                  <a:srgbClr val="FF40FF"/>
+                </a:solidFill>
+              </a:rPr>
+              <a:t>p&lt;=0.0024%</a:t>
+            </a:r>
+          </a:p>
+        </p:txBody>
+      </p:sp>
+    </p:spTree>
+    <p:extLst>
+      <p:ext uri="{BB962C8B-B14F-4D97-AF65-F5344CB8AC3E}">
+        <p14:creationId xmlns:p14="http://schemas.microsoft.com/office/powerpoint/2010/main" val="2570781832"/>
+      </p:ext>
+    </p:extLst>
+  </p:cSld>
+  <p:clrMapOvr>
+    <a:masterClrMapping/>
+  </p:clrMapOvr>
+  <mc:AlternateContent xmlns:mc="http://schemas.openxmlformats.org/markup-compatibility/2006" xmlns:p159="http://schemas.microsoft.com/office/powerpoint/2015/09/main">
+    <mc:Choice Requires="p159">
+      <p:transition spd="slow">
+        <p159:morph option="byObject"/>
+      </p:transition>
+    </mc:Choice>
+    <mc:Fallback xmlns="">
+      <p:transition spd="slow">
+        <p:fade/>
+      </p:transition>
+    </mc:Fallback>
+  </mc:AlternateContent>
+  <p:timing>
+    <p:tnLst>
+      <p:par>
+        <p:cTn id="1" dur="indefinite" restart="never" nodeType="tmRoot">
+          <p:childTnLst>
+            <p:seq concurrent="1" nextAc="seek">
+              <p:cTn id="2" dur="indefinite" nodeType="mainSeq">
+                <p:childTnLst>
+                  <p:par>
+                    <p:cTn id="3" fill="hold">
+                      <p:stCondLst>
+                        <p:cond delay="indefinite"/>
+                      </p:stCondLst>
+                      <p:childTnLst>
+                        <p:par>
+                          <p:cTn id="4" fill="hold">
+                            <p:stCondLst>
+                              <p:cond delay="0"/>
+                            </p:stCondLst>
+                            <p:childTnLst>
+                              <p:par>
+                                <p:cTn id="5" presetID="1" presetClass="entr" presetSubtype="0" fill="hold" grpId="0" nodeType="clickEffect">
+                                  <p:stCondLst>
+                                    <p:cond delay="0"/>
+                                  </p:stCondLst>
+                                  <p:childTnLst>
+                                    <p:set>
+                                      <p:cBhvr>
+                                        <p:cTn id="6" dur="1" fill="hold">
+                                          <p:stCondLst>
+                                            <p:cond delay="0"/>
+                                          </p:stCondLst>
+                                        </p:cTn>
+                                        <p:tgtEl>
+                                          <p:spTgt spid="7"/>
+                                        </p:tgtEl>
+                                        <p:attrNameLst>
+                                          <p:attrName>style.visibility</p:attrName>
+                                        </p:attrNameLst>
+                                      </p:cBhvr>
+                                      <p:to>
+                                        <p:strVal val="visible"/>
+                                      </p:to>
+                                    </p:set>
+                                  </p:childTnLst>
+                                </p:cTn>
+                              </p:par>
+                            </p:childTnLst>
+                          </p:cTn>
+                        </p:par>
+                      </p:childTnLst>
+                    </p:cTn>
+                  </p:par>
+                </p:childTnLst>
+              </p:cTn>
+              <p:prevCondLst>
+                <p:cond evt="onPrev" delay="0">
+                  <p:tgtEl>
+                    <p:sldTgt/>
+                  </p:tgtEl>
+                </p:cond>
+              </p:prevCondLst>
+              <p:nextCondLst>
+                <p:cond evt="onNext" delay="0">
+                  <p:tgtEl>
+                    <p:sldTgt/>
+                  </p:tgtEl>
+                </p:cond>
+              </p:nextCondLst>
+            </p:seq>
+          </p:childTnLst>
+        </p:cTn>
+      </p:par>
+    </p:tnLst>
+    <p:bldLst>
+      <p:bldP spid="7" grpId="0"/>
+    </p:bldLst>
+  </p:timing>
+</p:sld>
+</file>
+
+<file path=ppt/slides/slide12.xml><?xml version="1.0" encoding="utf-8"?>
+<p:sld xmlns:a="http://schemas.openxmlformats.org/drawingml/2006/main" xmlns:r="http://schemas.openxmlformats.org/officeDocument/2006/relationships" xmlns:p="http://schemas.openxmlformats.org/presentationml/2006/main">
+  <p:cSld>
+    <p:spTree>
+      <p:nvGrpSpPr>
+        <p:cNvPr id="1" name=""/>
+        <p:cNvGrpSpPr/>
+        <p:nvPr/>
+      </p:nvGrpSpPr>
+      <p:grpSpPr>
+        <a:xfrm>
+          <a:off x="0" y="0"/>
+          <a:ext cx="0" cy="0"/>
+          <a:chOff x="0" y="0"/>
+          <a:chExt cx="0" cy="0"/>
+        </a:xfrm>
+      </p:grpSpPr>
+      <p:sp>
+        <p:nvSpPr>
+          <p:cNvPr id="2" name="Title 1">
+            <a:extLst>
+              <a:ext uri="{FF2B5EF4-FFF2-40B4-BE49-F238E27FC236}">
                 <a16:creationId xmlns:a16="http://schemas.microsoft.com/office/drawing/2014/main" id="{396077DE-5B3A-AFFA-EE46-B1EA21F30692}"/>
               </a:ext>
             </a:extLst>
@@ -6464,10 +10347,47 @@
           <a:bodyPr/>
           <a:lstStyle/>
           <a:p>
-            <a:endParaRPr lang="en-US"/>
+            <a:r>
+              <a:rPr lang="en-US" dirty="0"/>
+              <a:t>Group individuals </a:t>
+            </a:r>
+          </a:p>
+          <a:p>
+            <a:r>
+              <a:rPr lang="en-US" dirty="0"/>
+              <a:t>Each its own group of individuals </a:t>
+            </a:r>
           </a:p>
         </p:txBody>
       </p:sp>
+      <p:graphicFrame>
+        <p:nvGraphicFramePr>
+          <p:cNvPr id="5" name="Diagram 4">
+            <a:extLst>
+              <a:ext uri="{FF2B5EF4-FFF2-40B4-BE49-F238E27FC236}">
+                <a16:creationId xmlns:a16="http://schemas.microsoft.com/office/drawing/2014/main" id="{2E0FA9FD-685C-5E2D-A561-9FE5D9D2E56A}"/>
+              </a:ext>
+            </a:extLst>
+          </p:cNvPr>
+          <p:cNvGraphicFramePr/>
+          <p:nvPr>
+            <p:extLst>
+              <p:ext uri="{D42A27DB-BD31-4B8C-83A1-F6EECF244321}">
+                <p14:modId xmlns:p14="http://schemas.microsoft.com/office/powerpoint/2010/main" val="4004104602"/>
+              </p:ext>
+            </p:extLst>
+          </p:nvPr>
+        </p:nvGraphicFramePr>
+        <p:xfrm>
+          <a:off x="5677546" y="990387"/>
+          <a:ext cx="6282625" cy="4877226"/>
+        </p:xfrm>
+        <a:graphic>
+          <a:graphicData uri="http://schemas.openxmlformats.org/drawingml/2006/diagram">
+            <dgm:relIds xmlns:dgm="http://schemas.openxmlformats.org/drawingml/2006/diagram" xmlns:r="http://schemas.openxmlformats.org/officeDocument/2006/relationships" r:dm="rId3" r:lo="rId4" r:qs="rId5" r:cs="rId6"/>
+          </a:graphicData>
+        </a:graphic>
+      </p:graphicFrame>
     </p:spTree>
     <p:extLst>
       <p:ext uri="{BB962C8B-B14F-4D97-AF65-F5344CB8AC3E}">
@@ -6493,12 +10413,18 @@
 </p:sld>
 </file>
 
-<file path=ppt/slides/slide12.xml><?xml version="1.0" encoding="utf-8"?>
+<file path=ppt/slides/slide13.xml><?xml version="1.0" encoding="utf-8"?>
 <p:sld xmlns:a="http://schemas.openxmlformats.org/drawingml/2006/main" xmlns:r="http://schemas.openxmlformats.org/officeDocument/2006/relationships" xmlns:p="http://schemas.openxmlformats.org/presentationml/2006/main">
   <p:cSld>
     <p:spTree>
       <p:nvGrpSpPr>
-        <p:cNvPr id="1" name=""/>
+        <p:cNvPr id="1" name="">
+          <a:extLst>
+            <a:ext uri="{FF2B5EF4-FFF2-40B4-BE49-F238E27FC236}">
+              <a16:creationId xmlns:a16="http://schemas.microsoft.com/office/drawing/2014/main" id="{C695C113-48D2-E401-0632-16F0D012E2E8}"/>
+            </a:ext>
+          </a:extLst>
+        </p:cNvPr>
         <p:cNvGrpSpPr/>
         <p:nvPr/>
       </p:nvGrpSpPr>
@@ -6515,7 +10441,7 @@
           <p:cNvPr id="2" name="Title 1">
             <a:extLst>
               <a:ext uri="{FF2B5EF4-FFF2-40B4-BE49-F238E27FC236}">
-                <a16:creationId xmlns:a16="http://schemas.microsoft.com/office/drawing/2014/main" id="{0A280AAD-D661-4E87-A6B7-9703C0F13881}"/>
+                <a16:creationId xmlns:a16="http://schemas.microsoft.com/office/drawing/2014/main" id="{A00A5DED-5D1B-A32A-857E-27A1A467BE9B}"/>
               </a:ext>
             </a:extLst>
           </p:cNvPr>
@@ -6538,40 +10464,12 @@
           </a:p>
         </p:txBody>
       </p:sp>
-      <p:sp>
-        <p:nvSpPr>
-          <p:cNvPr id="3" name="Content Placeholder 2">
+      <p:pic>
+        <p:nvPicPr>
+          <p:cNvPr id="6" name="Picture 5">
             <a:extLst>
               <a:ext uri="{FF2B5EF4-FFF2-40B4-BE49-F238E27FC236}">
-                <a16:creationId xmlns:a16="http://schemas.microsoft.com/office/drawing/2014/main" id="{A0A4BC0B-C661-53AA-1E27-7AD714B04FC1}"/>
-              </a:ext>
-            </a:extLst>
-          </p:cNvPr>
-          <p:cNvSpPr>
-            <a:spLocks noGrp="1"/>
-          </p:cNvSpPr>
-          <p:nvPr>
-            <p:ph idx="1"/>
-          </p:nvPr>
-        </p:nvSpPr>
-        <p:spPr/>
-        <p:txBody>
-          <a:bodyPr/>
-          <a:lstStyle/>
-          <a:p>
-            <a:r>
-              <a:rPr lang="en-US" dirty="0"/>
-              <a:t>Highlight selected methods</a:t>
-            </a:r>
-          </a:p>
-        </p:txBody>
-      </p:sp>
-      <p:pic>
-        <p:nvPicPr>
-          <p:cNvPr id="4" name="Picture 3" descr="A diagram of a graph&#10;&#10;AI-generated content may be incorrect.">
-            <a:extLst>
-              <a:ext uri="{FF2B5EF4-FFF2-40B4-BE49-F238E27FC236}">
-                <a16:creationId xmlns:a16="http://schemas.microsoft.com/office/drawing/2014/main" id="{910D7FDA-2C49-E609-3CC7-B43C25B0683C}"/>
+                <a16:creationId xmlns:a16="http://schemas.microsoft.com/office/drawing/2014/main" id="{331ED2C8-9B5B-C8AD-F753-384F4231CCFD}"/>
               </a:ext>
             </a:extLst>
           </p:cNvPr>
@@ -6588,40 +10486,174 @@
         </p:blipFill>
         <p:spPr>
           <a:xfrm>
-            <a:off x="5782235" y="1135576"/>
-            <a:ext cx="6115797" cy="4586848"/>
+            <a:off x="1190625" y="1374776"/>
+            <a:ext cx="9810750" cy="4905375"/>
           </a:xfrm>
           <a:prstGeom prst="rect">
             <a:avLst/>
           </a:prstGeom>
         </p:spPr>
       </p:pic>
+      <p:sp>
+        <p:nvSpPr>
+          <p:cNvPr id="10" name="Oval 9">
+            <a:extLst>
+              <a:ext uri="{FF2B5EF4-FFF2-40B4-BE49-F238E27FC236}">
+                <a16:creationId xmlns:a16="http://schemas.microsoft.com/office/drawing/2014/main" id="{138DFDE9-7DE2-C9D5-C020-A1D927A89559}"/>
+              </a:ext>
+            </a:extLst>
+          </p:cNvPr>
+          <p:cNvSpPr/>
+          <p:nvPr/>
+        </p:nvSpPr>
+        <p:spPr>
+          <a:xfrm>
+            <a:off x="2501900" y="2235200"/>
+            <a:ext cx="1384300" cy="3848100"/>
+          </a:xfrm>
+          <a:prstGeom prst="ellipse">
+            <a:avLst/>
+          </a:prstGeom>
+          <a:solidFill>
+            <a:srgbClr val="FFFF00">
+              <a:alpha val="13305"/>
+            </a:srgbClr>
+          </a:solidFill>
+          <a:ln>
+            <a:solidFill>
+              <a:srgbClr val="FFFF00"/>
+            </a:solidFill>
+          </a:ln>
+        </p:spPr>
+        <p:style>
+          <a:lnRef idx="2">
+            <a:schemeClr val="accent1">
+              <a:shade val="15000"/>
+            </a:schemeClr>
+          </a:lnRef>
+          <a:fillRef idx="1">
+            <a:schemeClr val="accent1"/>
+          </a:fillRef>
+          <a:effectRef idx="0">
+            <a:schemeClr val="accent1"/>
+          </a:effectRef>
+          <a:fontRef idx="minor">
+            <a:schemeClr val="lt1"/>
+          </a:fontRef>
+        </p:style>
+        <p:txBody>
+          <a:bodyPr rtlCol="0" anchor="ctr"/>
+          <a:lstStyle/>
+          <a:p>
+            <a:pPr algn="ctr"/>
+            <a:endParaRPr lang="en-GB"/>
+          </a:p>
+        </p:txBody>
+      </p:sp>
     </p:spTree>
     <p:extLst>
       <p:ext uri="{BB962C8B-B14F-4D97-AF65-F5344CB8AC3E}">
-        <p14:creationId xmlns:p14="http://schemas.microsoft.com/office/powerpoint/2010/main" val="2570781832"/>
+        <p14:creationId xmlns:p14="http://schemas.microsoft.com/office/powerpoint/2010/main" val="2693030839"/>
       </p:ext>
     </p:extLst>
   </p:cSld>
   <p:clrMapOvr>
     <a:masterClrMapping/>
   </p:clrMapOvr>
-  <mc:AlternateContent xmlns:mc="http://schemas.openxmlformats.org/markup-compatibility/2006" xmlns:p159="http://schemas.microsoft.com/office/powerpoint/2015/09/main">
-    <mc:Choice Requires="p159">
+  <mc:AlternateContent xmlns:mc="http://schemas.openxmlformats.org/markup-compatibility/2006">
+    <mc:Choice xmlns:p159="http://schemas.microsoft.com/office/powerpoint/2015/09/main" Requires="p159">
       <p:transition spd="slow">
         <p159:morph option="byObject"/>
       </p:transition>
     </mc:Choice>
-    <mc:Fallback xmlns="">
+    <mc:Fallback>
       <p:transition spd="slow">
         <p:fade/>
       </p:transition>
     </mc:Fallback>
   </mc:AlternateContent>
+  <p:timing>
+    <p:tnLst>
+      <p:par>
+        <p:cTn id="1" dur="indefinite" restart="never" nodeType="tmRoot">
+          <p:childTnLst>
+            <p:seq concurrent="1" nextAc="seek">
+              <p:cTn id="2" dur="indefinite" nodeType="mainSeq">
+                <p:childTnLst>
+                  <p:par>
+                    <p:cTn id="3" fill="hold">
+                      <p:stCondLst>
+                        <p:cond delay="indefinite"/>
+                      </p:stCondLst>
+                      <p:childTnLst>
+                        <p:par>
+                          <p:cTn id="4" fill="hold">
+                            <p:stCondLst>
+                              <p:cond delay="0"/>
+                            </p:stCondLst>
+                            <p:childTnLst>
+                              <p:par>
+                                <p:cTn id="5" presetID="1" presetClass="entr" presetSubtype="0" fill="hold" grpId="0" nodeType="clickEffect">
+                                  <p:stCondLst>
+                                    <p:cond delay="0"/>
+                                  </p:stCondLst>
+                                  <p:childTnLst>
+                                    <p:set>
+                                      <p:cBhvr>
+                                        <p:cTn id="6" dur="1" fill="hold">
+                                          <p:stCondLst>
+                                            <p:cond delay="0"/>
+                                          </p:stCondLst>
+                                        </p:cTn>
+                                        <p:tgtEl>
+                                          <p:spTgt spid="10"/>
+                                        </p:tgtEl>
+                                        <p:attrNameLst>
+                                          <p:attrName>style.visibility</p:attrName>
+                                        </p:attrNameLst>
+                                      </p:cBhvr>
+                                      <p:to>
+                                        <p:strVal val="visible"/>
+                                      </p:to>
+                                    </p:set>
+                                  </p:childTnLst>
+                                </p:cTn>
+                              </p:par>
+                            </p:childTnLst>
+                          </p:cTn>
+                        </p:par>
+                      </p:childTnLst>
+                    </p:cTn>
+                  </p:par>
+                </p:childTnLst>
+              </p:cTn>
+              <p:prevCondLst>
+                <p:cond evt="onPrev" delay="0">
+                  <p:tgtEl>
+                    <p:sldTgt/>
+                  </p:tgtEl>
+                </p:cond>
+              </p:prevCondLst>
+              <p:nextCondLst>
+                <p:cond evt="onNext" delay="0">
+                  <p:tgtEl>
+                    <p:sldTgt/>
+                  </p:tgtEl>
+                </p:cond>
+              </p:nextCondLst>
+            </p:seq>
+          </p:childTnLst>
+        </p:cTn>
+      </p:par>
+    </p:tnLst>
+    <p:bldLst>
+      <p:bldP spid="10" grpId="0" animBg="1"/>
+    </p:bldLst>
+  </p:timing>
 </p:sld>
 </file>
 
-<file path=ppt/slides/slide13.xml><?xml version="1.0" encoding="utf-8"?>
+<file path=ppt/slides/slide14.xml><?xml version="1.0" encoding="utf-8"?>
 <p:sld xmlns:a="http://schemas.openxmlformats.org/drawingml/2006/main" xmlns:r="http://schemas.openxmlformats.org/officeDocument/2006/relationships" xmlns:p="http://schemas.openxmlformats.org/presentationml/2006/main">
   <p:cSld>
     <p:spTree>
@@ -6661,7 +10693,7 @@
           <a:p>
             <a:r>
               <a:rPr lang="en-US" dirty="0"/>
-              <a:t>Could our method work?</a:t>
+              <a:t>Evaluation</a:t>
             </a:r>
           </a:p>
         </p:txBody>
@@ -6689,8 +10721,11 @@
           <a:p>
             <a:r>
               <a:rPr lang="en-US" dirty="0"/>
-              <a:t>Add checks</a:t>
-            </a:r>
+              <a:t>Phenotype Shuffle</a:t>
+            </a:r>
+          </a:p>
+          <a:p>
+            <a:endParaRPr lang="en-US" dirty="0"/>
           </a:p>
         </p:txBody>
       </p:sp>
@@ -6719,7 +10754,204 @@
 </p:sld>
 </file>
 
-<file path=ppt/slides/slide14.xml><?xml version="1.0" encoding="utf-8"?>
+<file path=ppt/slides/slide15.xml><?xml version="1.0" encoding="utf-8"?>
+<p:sld xmlns:a="http://schemas.openxmlformats.org/drawingml/2006/main" xmlns:r="http://schemas.openxmlformats.org/officeDocument/2006/relationships" xmlns:p="http://schemas.openxmlformats.org/presentationml/2006/main">
+  <p:cSld>
+    <p:spTree>
+      <p:nvGrpSpPr>
+        <p:cNvPr id="1" name="">
+          <a:extLst>
+            <a:ext uri="{FF2B5EF4-FFF2-40B4-BE49-F238E27FC236}">
+              <a16:creationId xmlns:a16="http://schemas.microsoft.com/office/drawing/2014/main" id="{840DF9CF-2437-015D-88AD-9B106CA505F4}"/>
+            </a:ext>
+          </a:extLst>
+        </p:cNvPr>
+        <p:cNvGrpSpPr/>
+        <p:nvPr/>
+      </p:nvGrpSpPr>
+      <p:grpSpPr>
+        <a:xfrm>
+          <a:off x="0" y="0"/>
+          <a:ext cx="0" cy="0"/>
+          <a:chOff x="0" y="0"/>
+          <a:chExt cx="0" cy="0"/>
+        </a:xfrm>
+      </p:grpSpPr>
+      <p:sp>
+        <p:nvSpPr>
+          <p:cNvPr id="2" name="Title 1">
+            <a:extLst>
+              <a:ext uri="{FF2B5EF4-FFF2-40B4-BE49-F238E27FC236}">
+                <a16:creationId xmlns:a16="http://schemas.microsoft.com/office/drawing/2014/main" id="{EA86B89D-CFCD-AB71-DC70-0464459C1458}"/>
+              </a:ext>
+            </a:extLst>
+          </p:cNvPr>
+          <p:cNvSpPr>
+            <a:spLocks noGrp="1"/>
+          </p:cNvSpPr>
+          <p:nvPr>
+            <p:ph type="title"/>
+          </p:nvPr>
+        </p:nvSpPr>
+        <p:spPr/>
+        <p:txBody>
+          <a:bodyPr/>
+          <a:lstStyle/>
+          <a:p>
+            <a:r>
+              <a:rPr lang="en-US" dirty="0"/>
+              <a:t>Evaluation</a:t>
+            </a:r>
+          </a:p>
+        </p:txBody>
+      </p:sp>
+      <p:pic>
+        <p:nvPicPr>
+          <p:cNvPr id="6" name="Picture 5">
+            <a:extLst>
+              <a:ext uri="{FF2B5EF4-FFF2-40B4-BE49-F238E27FC236}">
+                <a16:creationId xmlns:a16="http://schemas.microsoft.com/office/drawing/2014/main" id="{1BBDB428-9D25-D48D-FFFA-BFCDA9C8EF3E}"/>
+              </a:ext>
+            </a:extLst>
+          </p:cNvPr>
+          <p:cNvPicPr>
+            <a:picLocks noChangeAspect="1"/>
+          </p:cNvPicPr>
+          <p:nvPr/>
+        </p:nvPicPr>
+        <p:blipFill>
+          <a:blip r:embed="rId3"/>
+          <a:srcRect/>
+          <a:stretch/>
+        </p:blipFill>
+        <p:spPr>
+          <a:xfrm>
+            <a:off x="1735667" y="1374776"/>
+            <a:ext cx="8720666" cy="4905375"/>
+          </a:xfrm>
+          <a:prstGeom prst="rect">
+            <a:avLst/>
+          </a:prstGeom>
+        </p:spPr>
+      </p:pic>
+    </p:spTree>
+    <p:extLst>
+      <p:ext uri="{BB962C8B-B14F-4D97-AF65-F5344CB8AC3E}">
+        <p14:creationId xmlns:p14="http://schemas.microsoft.com/office/powerpoint/2010/main" val="568318614"/>
+      </p:ext>
+    </p:extLst>
+  </p:cSld>
+  <p:clrMapOvr>
+    <a:masterClrMapping/>
+  </p:clrMapOvr>
+  <mc:AlternateContent xmlns:mc="http://schemas.openxmlformats.org/markup-compatibility/2006">
+    <mc:Choice xmlns:p159="http://schemas.microsoft.com/office/powerpoint/2015/09/main" Requires="p159">
+      <p:transition spd="slow">
+        <p159:morph option="byObject"/>
+      </p:transition>
+    </mc:Choice>
+    <mc:Fallback>
+      <p:transition spd="slow">
+        <p:fade/>
+      </p:transition>
+    </mc:Fallback>
+  </mc:AlternateContent>
+</p:sld>
+</file>
+
+<file path=ppt/slides/slide16.xml><?xml version="1.0" encoding="utf-8"?>
+<p:sld xmlns:a="http://schemas.openxmlformats.org/drawingml/2006/main" xmlns:r="http://schemas.openxmlformats.org/officeDocument/2006/relationships" xmlns:p="http://schemas.openxmlformats.org/presentationml/2006/main">
+  <p:cSld>
+    <p:spTree>
+      <p:nvGrpSpPr>
+        <p:cNvPr id="1" name=""/>
+        <p:cNvGrpSpPr/>
+        <p:nvPr/>
+      </p:nvGrpSpPr>
+      <p:grpSpPr>
+        <a:xfrm>
+          <a:off x="0" y="0"/>
+          <a:ext cx="0" cy="0"/>
+          <a:chOff x="0" y="0"/>
+          <a:chExt cx="0" cy="0"/>
+        </a:xfrm>
+      </p:grpSpPr>
+      <p:sp>
+        <p:nvSpPr>
+          <p:cNvPr id="2" name="Title 1">
+            <a:extLst>
+              <a:ext uri="{FF2B5EF4-FFF2-40B4-BE49-F238E27FC236}">
+                <a16:creationId xmlns:a16="http://schemas.microsoft.com/office/drawing/2014/main" id="{C3E1CCED-3DE6-33B6-58E6-7069F2047599}"/>
+              </a:ext>
+            </a:extLst>
+          </p:cNvPr>
+          <p:cNvSpPr>
+            <a:spLocks noGrp="1"/>
+          </p:cNvSpPr>
+          <p:nvPr>
+            <p:ph type="title"/>
+          </p:nvPr>
+        </p:nvSpPr>
+        <p:spPr/>
+        <p:txBody>
+          <a:bodyPr/>
+          <a:lstStyle/>
+          <a:p>
+            <a:r>
+              <a:rPr lang="en-GB" dirty="0"/>
+              <a:t>Could our method work</a:t>
+            </a:r>
+          </a:p>
+        </p:txBody>
+      </p:sp>
+      <p:sp>
+        <p:nvSpPr>
+          <p:cNvPr id="3" name="Content Placeholder 2">
+            <a:extLst>
+              <a:ext uri="{FF2B5EF4-FFF2-40B4-BE49-F238E27FC236}">
+                <a16:creationId xmlns:a16="http://schemas.microsoft.com/office/drawing/2014/main" id="{7EB9DC05-8209-6E9B-EEBB-F1ADC3584139}"/>
+              </a:ext>
+            </a:extLst>
+          </p:cNvPr>
+          <p:cNvSpPr>
+            <a:spLocks noGrp="1"/>
+          </p:cNvSpPr>
+          <p:nvPr>
+            <p:ph idx="1"/>
+          </p:nvPr>
+        </p:nvSpPr>
+        <p:spPr/>
+        <p:txBody>
+          <a:bodyPr/>
+          <a:lstStyle/>
+          <a:p>
+            <a:r>
+              <a:rPr lang="en-GB" dirty="0"/>
+              <a:t>Or testing</a:t>
+            </a:r>
+          </a:p>
+          <a:p>
+            <a:r>
+              <a:rPr lang="en-GB"/>
+              <a:t>Simulate Dataset</a:t>
+            </a:r>
+          </a:p>
+        </p:txBody>
+      </p:sp>
+    </p:spTree>
+    <p:extLst>
+      <p:ext uri="{BB962C8B-B14F-4D97-AF65-F5344CB8AC3E}">
+        <p14:creationId xmlns:p14="http://schemas.microsoft.com/office/powerpoint/2010/main" val="3737149436"/>
+      </p:ext>
+    </p:extLst>
+  </p:cSld>
+  <p:clrMapOvr>
+    <a:masterClrMapping/>
+  </p:clrMapOvr>
+</p:sld>
+</file>
+
+<file path=ppt/slides/slide17.xml><?xml version="1.0" encoding="utf-8"?>
 <p:sld xmlns:a="http://schemas.openxmlformats.org/drawingml/2006/main" xmlns:r="http://schemas.openxmlformats.org/officeDocument/2006/relationships" xmlns:p="http://schemas.openxmlformats.org/presentationml/2006/main">
   <p:cSld>
     <p:spTree>
@@ -6786,14 +11018,26 @@
           <a:lstStyle/>
           <a:p>
             <a:r>
-              <a:rPr lang="en-US" dirty="0"/>
-              <a:t>Towards SMT</a:t>
-            </a:r>
-          </a:p>
-          <a:p>
-            <a:r>
-              <a:rPr lang="en-US" dirty="0"/>
-              <a:t>Methods needs work</a:t>
+              <a:rPr lang="en-GB" noProof="0" dirty="0"/>
+              <a:t>Analyse relationships of SNPs</a:t>
+            </a:r>
+          </a:p>
+          <a:p>
+            <a:r>
+              <a:rPr lang="en-GB" noProof="0" dirty="0"/>
+              <a:t>Use SMT solver</a:t>
+            </a:r>
+          </a:p>
+          <a:p>
+            <a:r>
+              <a:rPr lang="en-GB" noProof="0" dirty="0"/>
+              <a:t>Encode ternary values</a:t>
+            </a:r>
+          </a:p>
+          <a:p>
+            <a:r>
+              <a:rPr lang="en-GB" noProof="0" dirty="0"/>
+              <a:t>Find better data</a:t>
             </a:r>
           </a:p>
         </p:txBody>
@@ -6820,6 +11064,89 @@
       </p:transition>
     </mc:Fallback>
   </mc:AlternateContent>
+</p:sld>
+</file>
+
+<file path=ppt/slides/slide18.xml><?xml version="1.0" encoding="utf-8"?>
+<p:sld xmlns:a="http://schemas.openxmlformats.org/drawingml/2006/main" xmlns:r="http://schemas.openxmlformats.org/officeDocument/2006/relationships" xmlns:p="http://schemas.openxmlformats.org/presentationml/2006/main">
+  <p:cSld>
+    <p:spTree>
+      <p:nvGrpSpPr>
+        <p:cNvPr id="1" name=""/>
+        <p:cNvGrpSpPr/>
+        <p:nvPr/>
+      </p:nvGrpSpPr>
+      <p:grpSpPr>
+        <a:xfrm>
+          <a:off x="0" y="0"/>
+          <a:ext cx="0" cy="0"/>
+          <a:chOff x="0" y="0"/>
+          <a:chExt cx="0" cy="0"/>
+        </a:xfrm>
+      </p:grpSpPr>
+      <p:sp>
+        <p:nvSpPr>
+          <p:cNvPr id="2" name="Title 1">
+            <a:extLst>
+              <a:ext uri="{FF2B5EF4-FFF2-40B4-BE49-F238E27FC236}">
+                <a16:creationId xmlns:a16="http://schemas.microsoft.com/office/drawing/2014/main" id="{6E432D14-D742-A2AC-C2A0-AC5F4AC90F4A}"/>
+              </a:ext>
+            </a:extLst>
+          </p:cNvPr>
+          <p:cNvSpPr>
+            <a:spLocks noGrp="1"/>
+          </p:cNvSpPr>
+          <p:nvPr>
+            <p:ph type="title"/>
+          </p:nvPr>
+        </p:nvSpPr>
+        <p:spPr/>
+        <p:txBody>
+          <a:bodyPr/>
+          <a:lstStyle/>
+          <a:p>
+            <a:r>
+              <a:rPr lang="en-GB" dirty="0"/>
+              <a:t>Questions?</a:t>
+            </a:r>
+          </a:p>
+        </p:txBody>
+      </p:sp>
+      <p:sp>
+        <p:nvSpPr>
+          <p:cNvPr id="3" name="Content Placeholder 2">
+            <a:extLst>
+              <a:ext uri="{FF2B5EF4-FFF2-40B4-BE49-F238E27FC236}">
+                <a16:creationId xmlns:a16="http://schemas.microsoft.com/office/drawing/2014/main" id="{D2C813BA-D727-6142-E2D2-4FD1648B3C60}"/>
+              </a:ext>
+            </a:extLst>
+          </p:cNvPr>
+          <p:cNvSpPr>
+            <a:spLocks noGrp="1"/>
+          </p:cNvSpPr>
+          <p:nvPr>
+            <p:ph idx="1"/>
+          </p:nvPr>
+        </p:nvSpPr>
+        <p:spPr/>
+        <p:txBody>
+          <a:bodyPr/>
+          <a:lstStyle/>
+          <a:p>
+            <a:endParaRPr lang="en-GB"/>
+          </a:p>
+        </p:txBody>
+      </p:sp>
+    </p:spTree>
+    <p:extLst>
+      <p:ext uri="{BB962C8B-B14F-4D97-AF65-F5344CB8AC3E}">
+        <p14:creationId xmlns:p14="http://schemas.microsoft.com/office/powerpoint/2010/main" val="1736318305"/>
+      </p:ext>
+    </p:extLst>
+  </p:cSld>
+  <p:clrMapOvr>
+    <a:masterClrMapping/>
+  </p:clrMapOvr>
 </p:sld>
 </file>
 
@@ -9288,8 +13615,8 @@
           <a:lstStyle/>
           <a:p>
             <a:r>
-              <a:rPr lang="en-US" dirty="0"/>
-              <a:t>State of the Art</a:t>
+              <a:rPr lang="en-GB" noProof="0" dirty="0"/>
+              <a:t>State-of-the-Art</a:t>
             </a:r>
           </a:p>
         </p:txBody>
@@ -9718,10 +14045,10 @@
         </p:nvGrpSpPr>
         <p:grpSpPr>
           <a:xfrm>
-            <a:off x="5442266" y="4605464"/>
-            <a:ext cx="2311846" cy="401559"/>
-            <a:chOff x="5356922" y="4039364"/>
-            <a:chExt cx="2311846" cy="401559"/>
+            <a:off x="5442266" y="5121771"/>
+            <a:ext cx="2329695" cy="400110"/>
+            <a:chOff x="5356922" y="4040813"/>
+            <a:chExt cx="2329695" cy="400110"/>
           </a:xfrm>
         </p:grpSpPr>
         <p:sp>
@@ -9792,7 +14119,7 @@
           </p:nvSpPr>
           <p:spPr>
             <a:xfrm>
-              <a:off x="6267311" y="4039364"/>
+              <a:off x="6285160" y="4040813"/>
               <a:ext cx="1401457" cy="400110"/>
             </a:xfrm>
             <a:prstGeom prst="rect">
@@ -9848,7 +14175,7 @@
         <p:spPr>
           <a:xfrm>
             <a:off x="664850" y="2459504"/>
-            <a:ext cx="8224986" cy="1938992"/>
+            <a:ext cx="8224986" cy="2862322"/>
           </a:xfrm>
           <a:prstGeom prst="rect">
             <a:avLst/>
@@ -9869,7 +14196,7 @@
                 <a:latin typeface="Courier New" panose="02070309020205020404" pitchFamily="49" charset="0"/>
                 <a:cs typeface="Courier New" panose="02070309020205020404" pitchFamily="49" charset="0"/>
               </a:rPr>
-              <a:t>Family	ID		PH	1	2	3   …</a:t>
+              <a:t>Family	ID		PH	SNP1	SNP2	SNP3   …</a:t>
             </a:r>
           </a:p>
           <a:p>
@@ -10571,6 +14898,8 @@
               </a:rPr>
               <a:t>0</a:t>
             </a:r>
+          </a:p>
+          <a:p>
             <a:r>
               <a:rPr lang="en-GB" sz="2000" dirty="0">
                 <a:solidFill>
@@ -10579,7 +14908,31 @@
                 <a:latin typeface="Courier New" panose="02070309020205020404" pitchFamily="49" charset="0"/>
                 <a:cs typeface="Courier New" panose="02070309020205020404" pitchFamily="49" charset="0"/>
               </a:rPr>
-              <a:t> …</a:t>
+              <a:t>				.</a:t>
+            </a:r>
+          </a:p>
+          <a:p>
+            <a:r>
+              <a:rPr lang="en-GB" sz="2000" dirty="0">
+                <a:solidFill>
+                  <a:schemeClr val="bg1"/>
+                </a:solidFill>
+                <a:latin typeface="Courier New" panose="02070309020205020404" pitchFamily="49" charset="0"/>
+                <a:cs typeface="Courier New" panose="02070309020205020404" pitchFamily="49" charset="0"/>
+              </a:rPr>
+              <a:t>				.</a:t>
+            </a:r>
+          </a:p>
+          <a:p>
+            <a:r>
+              <a:rPr lang="en-GB" sz="2000" dirty="0">
+                <a:solidFill>
+                  <a:schemeClr val="bg1"/>
+                </a:solidFill>
+                <a:latin typeface="Courier New" panose="02070309020205020404" pitchFamily="49" charset="0"/>
+                <a:cs typeface="Courier New" panose="02070309020205020404" pitchFamily="49" charset="0"/>
+              </a:rPr>
+              <a:t>				.</a:t>
             </a:r>
           </a:p>
         </p:txBody>
@@ -10674,7 +15027,7 @@
         </p:nvGrpSpPr>
         <p:grpSpPr>
           <a:xfrm>
-            <a:off x="838200" y="1492101"/>
+            <a:off x="3454400" y="1593701"/>
             <a:ext cx="5756986" cy="4524315"/>
             <a:chOff x="1028824" y="1930921"/>
             <a:chExt cx="5756986" cy="4524315"/>
@@ -11342,13 +15695,13 @@
   <p:clrMapOvr>
     <a:masterClrMapping/>
   </p:clrMapOvr>
-  <mc:AlternateContent xmlns:mc="http://schemas.openxmlformats.org/markup-compatibility/2006">
-    <mc:Choice xmlns:p159="http://schemas.microsoft.com/office/powerpoint/2015/09/main" Requires="p159">
+  <mc:AlternateContent xmlns:mc="http://schemas.openxmlformats.org/markup-compatibility/2006" xmlns:p159="http://schemas.microsoft.com/office/powerpoint/2015/09/main">
+    <mc:Choice Requires="p159">
       <p:transition spd="slow">
         <p159:morph option="byObject"/>
       </p:transition>
     </mc:Choice>
-    <mc:Fallback>
+    <mc:Fallback xmlns="">
       <p:transition spd="slow">
         <p:fade/>
       </p:transition>
@@ -11698,13 +16051,13 @@
   <p:clrMapOvr>
     <a:masterClrMapping/>
   </p:clrMapOvr>
-  <mc:AlternateContent xmlns:mc="http://schemas.openxmlformats.org/markup-compatibility/2006">
-    <mc:Choice xmlns:p159="http://schemas.microsoft.com/office/powerpoint/2015/09/main" Requires="p159">
+  <mc:AlternateContent xmlns:mc="http://schemas.openxmlformats.org/markup-compatibility/2006" xmlns:p159="http://schemas.microsoft.com/office/powerpoint/2015/09/main">
+    <mc:Choice Requires="p159">
       <p:transition spd="slow">
         <p159:morph option="byObject"/>
       </p:transition>
     </mc:Choice>
-    <mc:Fallback>
+    <mc:Fallback xmlns="">
       <p:transition spd="slow">
         <p:fade/>
       </p:transition>

</xml_diff>

<commit_message>
add sanity check slide
</commit_message>
<xml_diff>
--- a/Presentation/End_of_internship.pptx
+++ b/Presentation/End_of_internship.pptx
@@ -21,9 +21,9 @@
     <p:sldId id="261" r:id="rId12"/>
     <p:sldId id="259" r:id="rId13"/>
     <p:sldId id="274" r:id="rId14"/>
-    <p:sldId id="266" r:id="rId15"/>
-    <p:sldId id="276" r:id="rId16"/>
-    <p:sldId id="277" r:id="rId17"/>
+    <p:sldId id="276" r:id="rId15"/>
+    <p:sldId id="277" r:id="rId16"/>
+    <p:sldId id="278" r:id="rId17"/>
     <p:sldId id="267" r:id="rId18"/>
     <p:sldId id="273" r:id="rId19"/>
   </p:sldIdLst>
@@ -4192,7 +4192,7 @@
           <a:p>
             <a:r>
               <a:rPr lang="en-GB" dirty="0"/>
-              <a:t>Repeated experiments with changed selections yield different results but also there exist reoccurring SNPs, which probably are important. </a:t>
+              <a:t>Repeated experiments with changed selections yield different results but also there exist reoccurring SNPs, which probably are important. If we shuffle phenotypes and do the same analysis, we do not find repeating results. </a:t>
             </a:r>
           </a:p>
         </p:txBody>
@@ -4214,7 +4214,7 @@
           <a:p>
             <a:fld id="{D3E4D156-9788-E94C-969D-835AC55077E3}" type="slidenum">
               <a:rPr lang="en-US" smtClean="0"/>
-              <a:t>15</a:t>
+              <a:t>14</a:t>
             </a:fld>
             <a:endParaRPr lang="en-US"/>
           </a:p>
@@ -4234,6 +4234,90 @@
 </file>
 
 <file path=ppt/notesSlides/notesSlide14.xml><?xml version="1.0" encoding="utf-8"?>
+<p:notes xmlns:a="http://schemas.openxmlformats.org/drawingml/2006/main" xmlns:r="http://schemas.openxmlformats.org/officeDocument/2006/relationships" xmlns:p="http://schemas.openxmlformats.org/presentationml/2006/main">
+  <p:cSld>
+    <p:spTree>
+      <p:nvGrpSpPr>
+        <p:cNvPr id="1" name=""/>
+        <p:cNvGrpSpPr/>
+        <p:nvPr/>
+      </p:nvGrpSpPr>
+      <p:grpSpPr>
+        <a:xfrm>
+          <a:off x="0" y="0"/>
+          <a:ext cx="0" cy="0"/>
+          <a:chOff x="0" y="0"/>
+          <a:chExt cx="0" cy="0"/>
+        </a:xfrm>
+      </p:grpSpPr>
+      <p:sp>
+        <p:nvSpPr>
+          <p:cNvPr id="2" name="Slide Image Placeholder 1"/>
+          <p:cNvSpPr>
+            <a:spLocks noGrp="1" noRot="1" noChangeAspect="1"/>
+          </p:cNvSpPr>
+          <p:nvPr>
+            <p:ph type="sldImg"/>
+          </p:nvPr>
+        </p:nvSpPr>
+        <p:spPr/>
+      </p:sp>
+      <p:sp>
+        <p:nvSpPr>
+          <p:cNvPr id="3" name="Notes Placeholder 2"/>
+          <p:cNvSpPr>
+            <a:spLocks noGrp="1"/>
+          </p:cNvSpPr>
+          <p:nvPr>
+            <p:ph type="body" idx="1"/>
+          </p:nvPr>
+        </p:nvSpPr>
+        <p:spPr/>
+        <p:txBody>
+          <a:bodyPr/>
+          <a:lstStyle/>
+          <a:p>
+            <a:endParaRPr lang="en-GB" dirty="0"/>
+          </a:p>
+        </p:txBody>
+      </p:sp>
+      <p:sp>
+        <p:nvSpPr>
+          <p:cNvPr id="4" name="Slide Number Placeholder 3"/>
+          <p:cNvSpPr>
+            <a:spLocks noGrp="1"/>
+          </p:cNvSpPr>
+          <p:nvPr>
+            <p:ph type="sldNum" sz="quarter" idx="5"/>
+          </p:nvPr>
+        </p:nvSpPr>
+        <p:spPr/>
+        <p:txBody>
+          <a:bodyPr/>
+          <a:lstStyle/>
+          <a:p>
+            <a:fld id="{D3E4D156-9788-E94C-969D-835AC55077E3}" type="slidenum">
+              <a:rPr lang="en-US" smtClean="0"/>
+              <a:t>16</a:t>
+            </a:fld>
+            <a:endParaRPr lang="en-US"/>
+          </a:p>
+        </p:txBody>
+      </p:sp>
+    </p:spTree>
+    <p:extLst>
+      <p:ext uri="{BB962C8B-B14F-4D97-AF65-F5344CB8AC3E}">
+        <p14:creationId xmlns:p14="http://schemas.microsoft.com/office/powerpoint/2010/main" val="2550970925"/>
+      </p:ext>
+    </p:extLst>
+  </p:cSld>
+  <p:clrMapOvr>
+    <a:masterClrMapping/>
+  </p:clrMapOvr>
+</p:notes>
+</file>
+
+<file path=ppt/notesSlides/notesSlide15.xml><?xml version="1.0" encoding="utf-8"?>
 <p:notes xmlns:a="http://schemas.openxmlformats.org/drawingml/2006/main" xmlns:r="http://schemas.openxmlformats.org/officeDocument/2006/relationships" xmlns:p="http://schemas.openxmlformats.org/presentationml/2006/main">
   <p:cSld>
     <p:spTree>
@@ -10658,107 +10742,6 @@
   <p:cSld>
     <p:spTree>
       <p:nvGrpSpPr>
-        <p:cNvPr id="1" name=""/>
-        <p:cNvGrpSpPr/>
-        <p:nvPr/>
-      </p:nvGrpSpPr>
-      <p:grpSpPr>
-        <a:xfrm>
-          <a:off x="0" y="0"/>
-          <a:ext cx="0" cy="0"/>
-          <a:chOff x="0" y="0"/>
-          <a:chExt cx="0" cy="0"/>
-        </a:xfrm>
-      </p:grpSpPr>
-      <p:sp>
-        <p:nvSpPr>
-          <p:cNvPr id="2" name="Title 1">
-            <a:extLst>
-              <a:ext uri="{FF2B5EF4-FFF2-40B4-BE49-F238E27FC236}">
-                <a16:creationId xmlns:a16="http://schemas.microsoft.com/office/drawing/2014/main" id="{2D681C11-C626-5280-1C63-7411B46BB8DB}"/>
-              </a:ext>
-            </a:extLst>
-          </p:cNvPr>
-          <p:cNvSpPr>
-            <a:spLocks noGrp="1"/>
-          </p:cNvSpPr>
-          <p:nvPr>
-            <p:ph type="title"/>
-          </p:nvPr>
-        </p:nvSpPr>
-        <p:spPr/>
-        <p:txBody>
-          <a:bodyPr/>
-          <a:lstStyle/>
-          <a:p>
-            <a:r>
-              <a:rPr lang="en-US" dirty="0"/>
-              <a:t>Evaluation</a:t>
-            </a:r>
-          </a:p>
-        </p:txBody>
-      </p:sp>
-      <p:sp>
-        <p:nvSpPr>
-          <p:cNvPr id="3" name="Content Placeholder 2">
-            <a:extLst>
-              <a:ext uri="{FF2B5EF4-FFF2-40B4-BE49-F238E27FC236}">
-                <a16:creationId xmlns:a16="http://schemas.microsoft.com/office/drawing/2014/main" id="{7DC84414-2829-4767-AFAA-6157A4F676D4}"/>
-              </a:ext>
-            </a:extLst>
-          </p:cNvPr>
-          <p:cNvSpPr>
-            <a:spLocks noGrp="1"/>
-          </p:cNvSpPr>
-          <p:nvPr>
-            <p:ph idx="1"/>
-          </p:nvPr>
-        </p:nvSpPr>
-        <p:spPr/>
-        <p:txBody>
-          <a:bodyPr/>
-          <a:lstStyle/>
-          <a:p>
-            <a:r>
-              <a:rPr lang="en-US" dirty="0"/>
-              <a:t>Phenotype Shuffle</a:t>
-            </a:r>
-          </a:p>
-          <a:p>
-            <a:endParaRPr lang="en-US" dirty="0"/>
-          </a:p>
-        </p:txBody>
-      </p:sp>
-    </p:spTree>
-    <p:extLst>
-      <p:ext uri="{BB962C8B-B14F-4D97-AF65-F5344CB8AC3E}">
-        <p14:creationId xmlns:p14="http://schemas.microsoft.com/office/powerpoint/2010/main" val="2960842149"/>
-      </p:ext>
-    </p:extLst>
-  </p:cSld>
-  <p:clrMapOvr>
-    <a:masterClrMapping/>
-  </p:clrMapOvr>
-  <mc:AlternateContent xmlns:mc="http://schemas.openxmlformats.org/markup-compatibility/2006" xmlns:p159="http://schemas.microsoft.com/office/powerpoint/2015/09/main">
-    <mc:Choice Requires="p159">
-      <p:transition spd="slow">
-        <p159:morph option="byObject"/>
-      </p:transition>
-    </mc:Choice>
-    <mc:Fallback xmlns="">
-      <p:transition spd="slow">
-        <p:fade/>
-      </p:transition>
-    </mc:Fallback>
-  </mc:AlternateContent>
-</p:sld>
-</file>
-
-<file path=ppt/slides/slide15.xml><?xml version="1.0" encoding="utf-8"?>
-<p:sld xmlns:a="http://schemas.openxmlformats.org/drawingml/2006/main" xmlns:r="http://schemas.openxmlformats.org/officeDocument/2006/relationships" xmlns:p="http://schemas.openxmlformats.org/presentationml/2006/main">
-  <p:cSld>
-    <p:spTree>
-      <p:nvGrpSpPr>
         <p:cNvPr id="1" name="">
           <a:extLst>
             <a:ext uri="{FF2B5EF4-FFF2-40B4-BE49-F238E27FC236}">
@@ -10859,7 +10842,7 @@
 </p:sld>
 </file>
 
-<file path=ppt/slides/slide16.xml><?xml version="1.0" encoding="utf-8"?>
+<file path=ppt/slides/slide15.xml><?xml version="1.0" encoding="utf-8"?>
 <p:sld xmlns:a="http://schemas.openxmlformats.org/drawingml/2006/main" xmlns:r="http://schemas.openxmlformats.org/officeDocument/2006/relationships" xmlns:p="http://schemas.openxmlformats.org/presentationml/2006/main">
   <p:cSld>
     <p:spTree>
@@ -10899,7 +10882,7 @@
           <a:p>
             <a:r>
               <a:rPr lang="en-GB" dirty="0"/>
-              <a:t>Could our method work</a:t>
+              <a:t>Could our method work?</a:t>
             </a:r>
           </a:p>
         </p:txBody>
@@ -10931,10 +10914,270 @@
             </a:r>
           </a:p>
           <a:p>
-            <a:r>
-              <a:rPr lang="en-GB"/>
+            <a:endParaRPr lang="en-GB" dirty="0"/>
+          </a:p>
+          <a:p>
+            <a:endParaRPr lang="en-GB" dirty="0"/>
+          </a:p>
+          <a:p>
+            <a:r>
+              <a:rPr lang="en-GB" dirty="0"/>
               <a:t>Simulate Dataset</a:t>
             </a:r>
+          </a:p>
+          <a:p>
+            <a:endParaRPr lang="en-GB" dirty="0"/>
+          </a:p>
+          <a:p>
+            <a:r>
+              <a:rPr lang="en-GB" dirty="0"/>
+              <a:t>One product</a:t>
+            </a:r>
+          </a:p>
+          <a:p>
+            <a:endParaRPr lang="en-GB" dirty="0"/>
+          </a:p>
+          <a:p>
+            <a:r>
+              <a:rPr lang="en-GB" dirty="0"/>
+              <a:t>Multiple products</a:t>
+            </a:r>
+          </a:p>
+        </p:txBody>
+      </p:sp>
+      <p:sp>
+        <p:nvSpPr>
+          <p:cNvPr id="4" name="Multiply 3">
+            <a:extLst>
+              <a:ext uri="{FF2B5EF4-FFF2-40B4-BE49-F238E27FC236}">
+                <a16:creationId xmlns:a16="http://schemas.microsoft.com/office/drawing/2014/main" id="{C15A6EED-F590-C5E1-CF18-225E7713F508}"/>
+              </a:ext>
+            </a:extLst>
+          </p:cNvPr>
+          <p:cNvSpPr/>
+          <p:nvPr/>
+        </p:nvSpPr>
+        <p:spPr>
+          <a:xfrm>
+            <a:off x="3256554" y="1613602"/>
+            <a:ext cx="1057031" cy="873369"/>
+          </a:xfrm>
+          <a:prstGeom prst="mathMultiply">
+            <a:avLst/>
+          </a:prstGeom>
+          <a:solidFill>
+            <a:srgbClr val="FF0000"/>
+          </a:solidFill>
+        </p:spPr>
+        <p:style>
+          <a:lnRef idx="2">
+            <a:schemeClr val="accent1">
+              <a:shade val="15000"/>
+            </a:schemeClr>
+          </a:lnRef>
+          <a:fillRef idx="1">
+            <a:schemeClr val="accent1"/>
+          </a:fillRef>
+          <a:effectRef idx="0">
+            <a:schemeClr val="accent1"/>
+          </a:effectRef>
+          <a:fontRef idx="minor">
+            <a:schemeClr val="lt1"/>
+          </a:fontRef>
+        </p:style>
+        <p:txBody>
+          <a:bodyPr rtlCol="0" anchor="ctr"/>
+          <a:lstStyle/>
+          <a:p>
+            <a:pPr algn="ctr"/>
+            <a:endParaRPr lang="en-GB" dirty="0"/>
+          </a:p>
+        </p:txBody>
+      </p:sp>
+      <p:grpSp>
+        <p:nvGrpSpPr>
+          <p:cNvPr id="10" name="Group 9">
+            <a:extLst>
+              <a:ext uri="{FF2B5EF4-FFF2-40B4-BE49-F238E27FC236}">
+                <a16:creationId xmlns:a16="http://schemas.microsoft.com/office/drawing/2014/main" id="{3013C124-B204-E735-7094-B3454617AC0D}"/>
+              </a:ext>
+            </a:extLst>
+          </p:cNvPr>
+          <p:cNvGrpSpPr/>
+          <p:nvPr/>
+        </p:nvGrpSpPr>
+        <p:grpSpPr>
+          <a:xfrm rot="840000">
+            <a:off x="3449704" y="4240525"/>
+            <a:ext cx="781729" cy="775135"/>
+            <a:chOff x="4648721" y="3972077"/>
+            <a:chExt cx="715848" cy="735970"/>
+          </a:xfrm>
+        </p:grpSpPr>
+        <p:cxnSp>
+          <p:nvCxnSpPr>
+            <p:cNvPr id="6" name="Straight Connector 5">
+              <a:extLst>
+                <a:ext uri="{FF2B5EF4-FFF2-40B4-BE49-F238E27FC236}">
+                  <a16:creationId xmlns:a16="http://schemas.microsoft.com/office/drawing/2014/main" id="{925095ED-A50F-C3AA-5D7E-6994C6590695}"/>
+                </a:ext>
+              </a:extLst>
+            </p:cNvPr>
+            <p:cNvCxnSpPr>
+              <a:cxnSpLocks/>
+            </p:cNvCxnSpPr>
+            <p:nvPr/>
+          </p:nvCxnSpPr>
+          <p:spPr>
+            <a:xfrm rot="20760000">
+              <a:off x="4648721" y="4441048"/>
+              <a:ext cx="280361" cy="266999"/>
+            </a:xfrm>
+            <a:prstGeom prst="line">
+              <a:avLst/>
+            </a:prstGeom>
+            <a:ln w="133350"/>
+          </p:spPr>
+          <p:style>
+            <a:lnRef idx="1">
+              <a:schemeClr val="accent6"/>
+            </a:lnRef>
+            <a:fillRef idx="0">
+              <a:schemeClr val="accent6"/>
+            </a:fillRef>
+            <a:effectRef idx="0">
+              <a:schemeClr val="accent6"/>
+            </a:effectRef>
+            <a:fontRef idx="minor">
+              <a:schemeClr val="tx1"/>
+            </a:fontRef>
+          </p:style>
+        </p:cxnSp>
+        <p:cxnSp>
+          <p:nvCxnSpPr>
+            <p:cNvPr id="7" name="Straight Connector 6">
+              <a:extLst>
+                <a:ext uri="{FF2B5EF4-FFF2-40B4-BE49-F238E27FC236}">
+                  <a16:creationId xmlns:a16="http://schemas.microsoft.com/office/drawing/2014/main" id="{9B92C105-1CD6-6AB2-88A1-89EEFA58C5B8}"/>
+                </a:ext>
+              </a:extLst>
+            </p:cNvPr>
+            <p:cNvCxnSpPr>
+              <a:cxnSpLocks/>
+            </p:cNvCxnSpPr>
+            <p:nvPr/>
+          </p:nvCxnSpPr>
+          <p:spPr>
+            <a:xfrm rot="20760000" flipH="1">
+              <a:off x="4784000" y="3972077"/>
+              <a:ext cx="580569" cy="656236"/>
+            </a:xfrm>
+            <a:prstGeom prst="line">
+              <a:avLst/>
+            </a:prstGeom>
+            <a:ln w="133350"/>
+          </p:spPr>
+          <p:style>
+            <a:lnRef idx="1">
+              <a:schemeClr val="accent6"/>
+            </a:lnRef>
+            <a:fillRef idx="0">
+              <a:schemeClr val="accent6"/>
+            </a:fillRef>
+            <a:effectRef idx="0">
+              <a:schemeClr val="accent6"/>
+            </a:effectRef>
+            <a:fontRef idx="minor">
+              <a:schemeClr val="tx1"/>
+            </a:fontRef>
+          </p:style>
+        </p:cxnSp>
+      </p:grpSp>
+      <p:sp>
+        <p:nvSpPr>
+          <p:cNvPr id="16" name="TextBox 15">
+            <a:extLst>
+              <a:ext uri="{FF2B5EF4-FFF2-40B4-BE49-F238E27FC236}">
+                <a16:creationId xmlns:a16="http://schemas.microsoft.com/office/drawing/2014/main" id="{DF4C4205-AE03-5C9B-874D-BF5B7260F437}"/>
+              </a:ext>
+            </a:extLst>
+          </p:cNvPr>
+          <p:cNvSpPr txBox="1"/>
+          <p:nvPr/>
+        </p:nvSpPr>
+        <p:spPr>
+          <a:xfrm>
+            <a:off x="3785069" y="2978117"/>
+            <a:ext cx="2901461" cy="1200329"/>
+          </a:xfrm>
+          <a:prstGeom prst="rect">
+            <a:avLst/>
+          </a:prstGeom>
+          <a:noFill/>
+        </p:spPr>
+        <p:txBody>
+          <a:bodyPr wrap="square" rtlCol="0">
+            <a:spAutoFit/>
+          </a:bodyPr>
+          <a:lstStyle/>
+          <a:p>
+            <a:r>
+              <a:rPr lang="en-GB" sz="7200" dirty="0">
+                <a:solidFill>
+                  <a:schemeClr val="accent2"/>
+                </a:solidFill>
+              </a:rPr>
+              <a:t>?</a:t>
+            </a:r>
+          </a:p>
+        </p:txBody>
+      </p:sp>
+      <p:sp>
+        <p:nvSpPr>
+          <p:cNvPr id="17" name="Multiply 16">
+            <a:extLst>
+              <a:ext uri="{FF2B5EF4-FFF2-40B4-BE49-F238E27FC236}">
+                <a16:creationId xmlns:a16="http://schemas.microsoft.com/office/drawing/2014/main" id="{DA421139-F41D-7F56-7130-3ED4C4CBC21E}"/>
+              </a:ext>
+            </a:extLst>
+          </p:cNvPr>
+          <p:cNvSpPr/>
+          <p:nvPr/>
+        </p:nvSpPr>
+        <p:spPr>
+          <a:xfrm>
+            <a:off x="3922397" y="5244398"/>
+            <a:ext cx="1057031" cy="873369"/>
+          </a:xfrm>
+          <a:prstGeom prst="mathMultiply">
+            <a:avLst/>
+          </a:prstGeom>
+          <a:solidFill>
+            <a:srgbClr val="FF0000"/>
+          </a:solidFill>
+        </p:spPr>
+        <p:style>
+          <a:lnRef idx="2">
+            <a:schemeClr val="accent1">
+              <a:shade val="15000"/>
+            </a:schemeClr>
+          </a:lnRef>
+          <a:fillRef idx="1">
+            <a:schemeClr val="accent1"/>
+          </a:fillRef>
+          <a:effectRef idx="0">
+            <a:schemeClr val="accent1"/>
+          </a:effectRef>
+          <a:fontRef idx="minor">
+            <a:schemeClr val="lt1"/>
+          </a:fontRef>
+        </p:style>
+        <p:txBody>
+          <a:bodyPr rtlCol="0" anchor="ctr"/>
+          <a:lstStyle/>
+          <a:p>
+            <a:pPr algn="ctr"/>
+            <a:endParaRPr lang="en-GB" dirty="0"/>
           </a:p>
         </p:txBody>
       </p:sp>
@@ -10942,6 +11185,98 @@
     <p:extLst>
       <p:ext uri="{BB962C8B-B14F-4D97-AF65-F5344CB8AC3E}">
         <p14:creationId xmlns:p14="http://schemas.microsoft.com/office/powerpoint/2010/main" val="3737149436"/>
+      </p:ext>
+    </p:extLst>
+  </p:cSld>
+  <p:clrMapOvr>
+    <a:masterClrMapping/>
+  </p:clrMapOvr>
+</p:sld>
+</file>
+
+<file path=ppt/slides/slide16.xml><?xml version="1.0" encoding="utf-8"?>
+<p:sld xmlns:a="http://schemas.openxmlformats.org/drawingml/2006/main" xmlns:r="http://schemas.openxmlformats.org/officeDocument/2006/relationships" xmlns:p="http://schemas.openxmlformats.org/presentationml/2006/main">
+  <p:cSld>
+    <p:spTree>
+      <p:nvGrpSpPr>
+        <p:cNvPr id="1" name="">
+          <a:extLst>
+            <a:ext uri="{FF2B5EF4-FFF2-40B4-BE49-F238E27FC236}">
+              <a16:creationId xmlns:a16="http://schemas.microsoft.com/office/drawing/2014/main" id="{A2C5EB25-48B5-BD26-3F01-ACEC9AED6983}"/>
+            </a:ext>
+          </a:extLst>
+        </p:cNvPr>
+        <p:cNvGrpSpPr/>
+        <p:nvPr/>
+      </p:nvGrpSpPr>
+      <p:grpSpPr>
+        <a:xfrm>
+          <a:off x="0" y="0"/>
+          <a:ext cx="0" cy="0"/>
+          <a:chOff x="0" y="0"/>
+          <a:chExt cx="0" cy="0"/>
+        </a:xfrm>
+      </p:grpSpPr>
+      <p:sp>
+        <p:nvSpPr>
+          <p:cNvPr id="18" name="TextBox 17">
+            <a:extLst>
+              <a:ext uri="{FF2B5EF4-FFF2-40B4-BE49-F238E27FC236}">
+                <a16:creationId xmlns:a16="http://schemas.microsoft.com/office/drawing/2014/main" id="{B66F6FFF-3207-B781-48EE-E78443AE3860}"/>
+              </a:ext>
+            </a:extLst>
+          </p:cNvPr>
+          <p:cNvSpPr txBox="1"/>
+          <p:nvPr/>
+        </p:nvSpPr>
+        <p:spPr>
+          <a:xfrm>
+            <a:off x="184638" y="2028616"/>
+            <a:ext cx="11517923" cy="2800767"/>
+          </a:xfrm>
+          <a:prstGeom prst="rect">
+            <a:avLst/>
+          </a:prstGeom>
+          <a:noFill/>
+        </p:spPr>
+        <p:txBody>
+          <a:bodyPr wrap="square" rtlCol="0" anchor="ctr">
+            <a:spAutoFit/>
+          </a:bodyPr>
+          <a:lstStyle/>
+          <a:p>
+            <a:pPr algn="ctr"/>
+            <a:r>
+              <a:rPr lang="en-GB" sz="8800" dirty="0">
+                <a:solidFill>
+                  <a:schemeClr val="bg1"/>
+                </a:solidFill>
+              </a:rPr>
+              <a:t>Espresso </a:t>
+            </a:r>
+            <a:r>
+              <a:rPr lang="en-GB" sz="8800" noProof="0" dirty="0">
+                <a:solidFill>
+                  <a:schemeClr val="bg1"/>
+                </a:solidFill>
+              </a:rPr>
+              <a:t>can’t </a:t>
+            </a:r>
+            <a:r>
+              <a:rPr lang="en-GB" sz="8800" dirty="0">
+                <a:solidFill>
+                  <a:schemeClr val="bg1"/>
+                </a:solidFill>
+              </a:rPr>
+              <a:t>understand products!</a:t>
+            </a:r>
+          </a:p>
+        </p:txBody>
+      </p:sp>
+    </p:spTree>
+    <p:extLst>
+      <p:ext uri="{BB962C8B-B14F-4D97-AF65-F5344CB8AC3E}">
+        <p14:creationId xmlns:p14="http://schemas.microsoft.com/office/powerpoint/2010/main" val="945168558"/>
       </p:ext>
     </p:extLst>
   </p:cSld>
@@ -11100,40 +11435,22 @@
             <p:ph type="title"/>
           </p:nvPr>
         </p:nvSpPr>
-        <p:spPr/>
+        <p:spPr>
+          <a:xfrm>
+            <a:off x="658678" y="2366680"/>
+            <a:ext cx="10874644" cy="2124640"/>
+          </a:xfrm>
+        </p:spPr>
         <p:txBody>
-          <a:bodyPr/>
+          <a:bodyPr>
+            <a:normAutofit/>
+          </a:bodyPr>
           <a:lstStyle/>
           <a:p>
             <a:r>
-              <a:rPr lang="en-GB" dirty="0"/>
+              <a:rPr lang="en-GB" sz="9600" dirty="0"/>
               <a:t>Questions?</a:t>
             </a:r>
-          </a:p>
-        </p:txBody>
-      </p:sp>
-      <p:sp>
-        <p:nvSpPr>
-          <p:cNvPr id="3" name="Content Placeholder 2">
-            <a:extLst>
-              <a:ext uri="{FF2B5EF4-FFF2-40B4-BE49-F238E27FC236}">
-                <a16:creationId xmlns:a16="http://schemas.microsoft.com/office/drawing/2014/main" id="{D2C813BA-D727-6142-E2D2-4FD1648B3C60}"/>
-              </a:ext>
-            </a:extLst>
-          </p:cNvPr>
-          <p:cNvSpPr>
-            <a:spLocks noGrp="1"/>
-          </p:cNvSpPr>
-          <p:nvPr>
-            <p:ph idx="1"/>
-          </p:nvPr>
-        </p:nvSpPr>
-        <p:spPr/>
-        <p:txBody>
-          <a:bodyPr/>
-          <a:lstStyle/>
-          <a:p>
-            <a:endParaRPr lang="en-GB"/>
           </a:p>
         </p:txBody>
       </p:sp>

</xml_diff>

<commit_message>
fulll size + some notes
</commit_message>
<xml_diff>
--- a/Presentation/End_of_internship.pptx
+++ b/Presentation/End_of_internship.pptx
@@ -8727,13 +8727,13 @@
   <p:clrMapOvr>
     <a:masterClrMapping/>
   </p:clrMapOvr>
-  <mc:AlternateContent xmlns:mc="http://schemas.openxmlformats.org/markup-compatibility/2006" xmlns:p159="http://schemas.microsoft.com/office/powerpoint/2015/09/main">
-    <mc:Choice Requires="p159">
+  <mc:AlternateContent xmlns:mc="http://schemas.openxmlformats.org/markup-compatibility/2006">
+    <mc:Choice xmlns:p159="http://schemas.microsoft.com/office/powerpoint/2015/09/main" Requires="p159">
       <p:transition spd="slow">
         <p159:morph option="byObject"/>
       </p:transition>
     </mc:Choice>
-    <mc:Fallback xmlns="">
+    <mc:Fallback>
       <p:transition spd="slow">
         <p:fade/>
       </p:transition>
@@ -9944,13 +9944,13 @@
   <p:clrMapOvr>
     <a:masterClrMapping/>
   </p:clrMapOvr>
-  <mc:AlternateContent xmlns:mc="http://schemas.openxmlformats.org/markup-compatibility/2006" xmlns:p159="http://schemas.microsoft.com/office/powerpoint/2015/09/main">
-    <mc:Choice Requires="p159">
+  <mc:AlternateContent xmlns:mc="http://schemas.openxmlformats.org/markup-compatibility/2006">
+    <mc:Choice xmlns:p159="http://schemas.microsoft.com/office/powerpoint/2015/09/main" Requires="p159">
       <p:transition spd="slow">
         <p159:morph option="byObject"/>
       </p:transition>
     </mc:Choice>
-    <mc:Fallback xmlns="">
+    <mc:Fallback>
       <p:transition spd="slow">
         <p:fade/>
       </p:transition>
@@ -10492,13 +10492,13 @@
   <p:clrMapOvr>
     <a:masterClrMapping/>
   </p:clrMapOvr>
-  <mc:AlternateContent xmlns:mc="http://schemas.openxmlformats.org/markup-compatibility/2006" xmlns:p159="http://schemas.microsoft.com/office/powerpoint/2015/09/main">
-    <mc:Choice Requires="p159">
+  <mc:AlternateContent xmlns:mc="http://schemas.openxmlformats.org/markup-compatibility/2006">
+    <mc:Choice xmlns:p159="http://schemas.microsoft.com/office/powerpoint/2015/09/main" Requires="p159">
       <p:transition spd="slow">
         <p159:morph option="byObject"/>
       </p:transition>
     </mc:Choice>
-    <mc:Fallback xmlns="">
+    <mc:Fallback>
       <p:transition spd="slow">
         <p:fade/>
       </p:transition>
@@ -10702,13 +10702,13 @@
   <p:clrMapOvr>
     <a:masterClrMapping/>
   </p:clrMapOvr>
-  <mc:AlternateContent xmlns:mc="http://schemas.openxmlformats.org/markup-compatibility/2006" xmlns:p159="http://schemas.microsoft.com/office/powerpoint/2015/09/main">
-    <mc:Choice Requires="p159">
+  <mc:AlternateContent xmlns:mc="http://schemas.openxmlformats.org/markup-compatibility/2006">
+    <mc:Choice xmlns:p159="http://schemas.microsoft.com/office/powerpoint/2015/09/main" Requires="p159">
       <p:transition spd="slow">
         <p159:morph option="byObject"/>
       </p:transition>
     </mc:Choice>
-    <mc:Fallback xmlns="">
+    <mc:Fallback>
       <p:transition spd="slow">
         <p:fade/>
       </p:transition>
@@ -10864,13 +10864,13 @@
   <p:clrMapOvr>
     <a:masterClrMapping/>
   </p:clrMapOvr>
-  <mc:AlternateContent xmlns:mc="http://schemas.openxmlformats.org/markup-compatibility/2006" xmlns:p159="http://schemas.microsoft.com/office/powerpoint/2015/09/main">
-    <mc:Choice Requires="p159">
+  <mc:AlternateContent xmlns:mc="http://schemas.openxmlformats.org/markup-compatibility/2006">
+    <mc:Choice xmlns:p159="http://schemas.microsoft.com/office/powerpoint/2015/09/main" Requires="p159">
       <p:transition spd="slow">
         <p159:morph option="byObject"/>
       </p:transition>
     </mc:Choice>
-    <mc:Fallback xmlns="">
+    <mc:Fallback>
       <p:transition spd="slow">
         <p:fade/>
       </p:transition>
@@ -11047,13 +11047,13 @@
   <p:clrMapOvr>
     <a:masterClrMapping/>
   </p:clrMapOvr>
-  <mc:AlternateContent xmlns:mc="http://schemas.openxmlformats.org/markup-compatibility/2006" xmlns:p159="http://schemas.microsoft.com/office/powerpoint/2015/09/main">
-    <mc:Choice Requires="p159">
+  <mc:AlternateContent xmlns:mc="http://schemas.openxmlformats.org/markup-compatibility/2006">
+    <mc:Choice xmlns:p159="http://schemas.microsoft.com/office/powerpoint/2015/09/main" Requires="p159">
       <p:transition spd="slow">
         <p159:morph option="byObject"/>
       </p:transition>
     </mc:Choice>
-    <mc:Fallback xmlns="">
+    <mc:Fallback>
       <p:transition spd="slow">
         <p:fade/>
       </p:transition>
@@ -11411,13 +11411,13 @@
   <p:clrMapOvr>
     <a:masterClrMapping/>
   </p:clrMapOvr>
-  <mc:AlternateContent xmlns:mc="http://schemas.openxmlformats.org/markup-compatibility/2006" xmlns:p159="http://schemas.microsoft.com/office/powerpoint/2015/09/main">
-    <mc:Choice Requires="p159">
-      <p:transition xmlns:p14="http://schemas.microsoft.com/office/powerpoint/2010/main" spd="slow" p14:dur="2000">
+  <mc:AlternateContent xmlns:mc="http://schemas.openxmlformats.org/markup-compatibility/2006">
+    <mc:Choice xmlns:p159="http://schemas.microsoft.com/office/powerpoint/2015/09/main" Requires="p159">
+      <p:transition spd="slow">
         <p159:morph option="byObject"/>
       </p:transition>
     </mc:Choice>
-    <mc:Fallback xmlns="">
+    <mc:Fallback>
       <p:transition spd="slow">
         <p:fade/>
       </p:transition>
@@ -11730,13 +11730,13 @@
   <p:clrMapOvr>
     <a:masterClrMapping/>
   </p:clrMapOvr>
-  <mc:AlternateContent xmlns:mc="http://schemas.openxmlformats.org/markup-compatibility/2006" xmlns:p159="http://schemas.microsoft.com/office/powerpoint/2015/09/main">
-    <mc:Choice Requires="p159">
-      <p:transition xmlns:p14="http://schemas.microsoft.com/office/powerpoint/2010/main" spd="slow" p14:dur="2000">
+  <mc:AlternateContent xmlns:mc="http://schemas.openxmlformats.org/markup-compatibility/2006">
+    <mc:Choice xmlns:p159="http://schemas.microsoft.com/office/powerpoint/2015/09/main" Requires="p159">
+      <p:transition spd="slow">
         <p159:morph option="byObject"/>
       </p:transition>
     </mc:Choice>
-    <mc:Fallback xmlns="">
+    <mc:Fallback>
       <p:transition spd="slow">
         <p:fade/>
       </p:transition>
@@ -11846,13 +11846,13 @@
   <p:clrMapOvr>
     <a:masterClrMapping/>
   </p:clrMapOvr>
-  <mc:AlternateContent xmlns:mc="http://schemas.openxmlformats.org/markup-compatibility/2006" xmlns:p159="http://schemas.microsoft.com/office/powerpoint/2015/09/main">
-    <mc:Choice Requires="p159">
+  <mc:AlternateContent xmlns:mc="http://schemas.openxmlformats.org/markup-compatibility/2006">
+    <mc:Choice xmlns:p159="http://schemas.microsoft.com/office/powerpoint/2015/09/main" Requires="p159">
       <p:transition spd="slow">
         <p159:morph option="byObject"/>
       </p:transition>
     </mc:Choice>
-    <mc:Fallback xmlns="">
+    <mc:Fallback>
       <p:transition spd="slow">
         <p:fade/>
       </p:transition>
@@ -11923,6 +11923,7 @@
   <p:clrMapOvr>
     <a:masterClrMapping/>
   </p:clrMapOvr>
+  <p:transition spd="slow"/>
 </p:sld>
 </file>
 
@@ -13101,13 +13102,13 @@
   <p:clrMapOvr>
     <a:masterClrMapping/>
   </p:clrMapOvr>
-  <mc:AlternateContent xmlns:mc="http://schemas.openxmlformats.org/markup-compatibility/2006" xmlns:p159="http://schemas.microsoft.com/office/powerpoint/2015/09/main">
-    <mc:Choice Requires="p159">
+  <mc:AlternateContent xmlns:mc="http://schemas.openxmlformats.org/markup-compatibility/2006">
+    <mc:Choice xmlns:p159="http://schemas.microsoft.com/office/powerpoint/2015/09/main" Requires="p159">
       <p:transition spd="slow">
         <p159:morph option="byObject"/>
       </p:transition>
     </mc:Choice>
-    <mc:Fallback xmlns="">
+    <mc:Fallback>
       <p:transition spd="slow">
         <p:fade/>
       </p:transition>
@@ -14337,13 +14338,13 @@
   <p:clrMapOvr>
     <a:masterClrMapping/>
   </p:clrMapOvr>
-  <mc:AlternateContent xmlns:mc="http://schemas.openxmlformats.org/markup-compatibility/2006" xmlns:p159="http://schemas.microsoft.com/office/powerpoint/2015/09/main">
-    <mc:Choice Requires="p159">
+  <mc:AlternateContent xmlns:mc="http://schemas.openxmlformats.org/markup-compatibility/2006">
+    <mc:Choice xmlns:p159="http://schemas.microsoft.com/office/powerpoint/2015/09/main" Requires="p159">
       <p:transition spd="slow">
         <p159:morph option="byObject"/>
       </p:transition>
     </mc:Choice>
-    <mc:Fallback xmlns="">
+    <mc:Fallback>
       <p:transition spd="slow">
         <p:fade/>
       </p:transition>
@@ -14747,13 +14748,13 @@
   <p:clrMapOvr>
     <a:masterClrMapping/>
   </p:clrMapOvr>
-  <mc:AlternateContent xmlns:mc="http://schemas.openxmlformats.org/markup-compatibility/2006" xmlns:p159="http://schemas.microsoft.com/office/powerpoint/2015/09/main">
-    <mc:Choice Requires="p159">
+  <mc:AlternateContent xmlns:mc="http://schemas.openxmlformats.org/markup-compatibility/2006">
+    <mc:Choice xmlns:p159="http://schemas.microsoft.com/office/powerpoint/2015/09/main" Requires="p159">
       <p:transition spd="slow">
         <p159:morph option="byObject"/>
       </p:transition>
     </mc:Choice>
-    <mc:Fallback xmlns="">
+    <mc:Fallback>
       <p:transition spd="slow">
         <p:fade/>
       </p:transition>
@@ -15723,13 +15724,13 @@
   <p:clrMapOvr>
     <a:masterClrMapping/>
   </p:clrMapOvr>
-  <mc:AlternateContent xmlns:mc="http://schemas.openxmlformats.org/markup-compatibility/2006" xmlns:p159="http://schemas.microsoft.com/office/powerpoint/2015/09/main">
-    <mc:Choice Requires="p159">
+  <mc:AlternateContent xmlns:mc="http://schemas.openxmlformats.org/markup-compatibility/2006">
+    <mc:Choice xmlns:p159="http://schemas.microsoft.com/office/powerpoint/2015/09/main" Requires="p159">
       <p:transition spd="slow">
         <p159:morph option="byObject"/>
       </p:transition>
     </mc:Choice>
-    <mc:Fallback xmlns="">
+    <mc:Fallback>
       <p:transition spd="slow">
         <p:fade/>
       </p:transition>
@@ -16471,13 +16472,13 @@
   <p:clrMapOvr>
     <a:masterClrMapping/>
   </p:clrMapOvr>
-  <mc:AlternateContent xmlns:mc="http://schemas.openxmlformats.org/markup-compatibility/2006" xmlns:p159="http://schemas.microsoft.com/office/powerpoint/2015/09/main">
-    <mc:Choice Requires="p159">
+  <mc:AlternateContent xmlns:mc="http://schemas.openxmlformats.org/markup-compatibility/2006">
+    <mc:Choice xmlns:p159="http://schemas.microsoft.com/office/powerpoint/2015/09/main" Requires="p159">
       <p:transition spd="slow">
         <p159:morph option="byObject"/>
       </p:transition>
     </mc:Choice>
-    <mc:Fallback xmlns="">
+    <mc:Fallback>
       <p:transition spd="slow">
         <p:fade/>
       </p:transition>
@@ -16663,13 +16664,13 @@
   <p:clrMapOvr>
     <a:masterClrMapping/>
   </p:clrMapOvr>
-  <mc:AlternateContent xmlns:mc="http://schemas.openxmlformats.org/markup-compatibility/2006" xmlns:p159="http://schemas.microsoft.com/office/powerpoint/2015/09/main">
-    <mc:Choice Requires="p159">
+  <mc:AlternateContent xmlns:mc="http://schemas.openxmlformats.org/markup-compatibility/2006">
+    <mc:Choice xmlns:p159="http://schemas.microsoft.com/office/powerpoint/2015/09/main" Requires="p159">
       <p:transition spd="slow">
         <p159:morph option="byObject"/>
       </p:transition>
     </mc:Choice>
-    <mc:Fallback xmlns="">
+    <mc:Fallback>
       <p:transition spd="slow">
         <p:fade/>
       </p:transition>
@@ -16827,13 +16828,13 @@
   <p:clrMapOvr>
     <a:masterClrMapping/>
   </p:clrMapOvr>
-  <mc:AlternateContent xmlns:mc="http://schemas.openxmlformats.org/markup-compatibility/2006" xmlns:p159="http://schemas.microsoft.com/office/powerpoint/2015/09/main">
-    <mc:Choice Requires="p159">
+  <mc:AlternateContent xmlns:mc="http://schemas.openxmlformats.org/markup-compatibility/2006">
+    <mc:Choice xmlns:p159="http://schemas.microsoft.com/office/powerpoint/2015/09/main" Requires="p159">
       <p:transition spd="slow">
         <p159:morph option="byObject"/>
       </p:transition>
     </mc:Choice>
-    <mc:Fallback xmlns="">
+    <mc:Fallback>
       <p:transition spd="slow">
         <p:fade/>
       </p:transition>
@@ -16940,13 +16941,13 @@
   <p:clrMapOvr>
     <a:masterClrMapping/>
   </p:clrMapOvr>
-  <mc:AlternateContent xmlns:mc="http://schemas.openxmlformats.org/markup-compatibility/2006" xmlns:p159="http://schemas.microsoft.com/office/powerpoint/2015/09/main">
-    <mc:Choice Requires="p159">
+  <mc:AlternateContent xmlns:mc="http://schemas.openxmlformats.org/markup-compatibility/2006">
+    <mc:Choice xmlns:p159="http://schemas.microsoft.com/office/powerpoint/2015/09/main" Requires="p159">
       <p:transition spd="slow">
         <p159:morph option="byObject"/>
       </p:transition>
     </mc:Choice>
-    <mc:Fallback xmlns="">
+    <mc:Fallback>
       <p:transition spd="slow">
         <p:fade/>
       </p:transition>

</xml_diff>

<commit_message>
make PRS analysis slide white
</commit_message>
<xml_diff>
--- a/Presentation/End_of_internship.pptx
+++ b/Presentation/End_of_internship.pptx
@@ -10454,6 +10454,14 @@
 <file path=ppt/slides/slide11.xml><?xml version="1.0" encoding="utf-8"?>
 <p:sld xmlns:a="http://schemas.openxmlformats.org/drawingml/2006/main" xmlns:r="http://schemas.openxmlformats.org/officeDocument/2006/relationships" xmlns:p="http://schemas.openxmlformats.org/presentationml/2006/main">
   <p:cSld>
+    <p:bg>
+      <p:bgPr>
+        <a:solidFill>
+          <a:schemeClr val="bg1"/>
+        </a:solidFill>
+        <a:effectLst/>
+      </p:bgPr>
+    </p:bg>
     <p:spTree>
       <p:nvGrpSpPr>
         <p:cNvPr id="1" name=""/>
@@ -10523,8 +10531,8 @@
         </p:blipFill>
         <p:spPr>
           <a:xfrm>
-            <a:off x="2355850" y="1279526"/>
-            <a:ext cx="7480300" cy="5610225"/>
+            <a:off x="1012825" y="-259557"/>
+            <a:ext cx="9836150" cy="7377113"/>
           </a:xfrm>
           <a:prstGeom prst="rect">
             <a:avLst/>
@@ -10545,7 +10553,7 @@
         </p:nvSpPr>
         <p:spPr>
           <a:xfrm>
-            <a:off x="3340100" y="5255308"/>
+            <a:off x="2425700" y="5373296"/>
             <a:ext cx="5181600" cy="646331"/>
           </a:xfrm>
           <a:prstGeom prst="rect">

</xml_diff>

<commit_message>
slides at the end of ppt
</commit_message>
<xml_diff>
--- a/Presentation/End_of_internship.pptx
+++ b/Presentation/End_of_internship.pptx
@@ -5,7 +5,7 @@
     <p:sldMasterId id="2147483648" r:id="rId1"/>
   </p:sldMasterIdLst>
   <p:notesMasterIdLst>
-    <p:notesMasterId r:id="rId21"/>
+    <p:notesMasterId r:id="rId24"/>
   </p:notesMasterIdLst>
   <p:sldIdLst>
     <p:sldId id="256" r:id="rId2"/>
@@ -22,11 +22,14 @@
     <p:sldId id="259" r:id="rId13"/>
     <p:sldId id="274" r:id="rId14"/>
     <p:sldId id="276" r:id="rId15"/>
-    <p:sldId id="279" r:id="rId16"/>
-    <p:sldId id="277" r:id="rId17"/>
-    <p:sldId id="278" r:id="rId18"/>
-    <p:sldId id="267" r:id="rId19"/>
-    <p:sldId id="273" r:id="rId20"/>
+    <p:sldId id="277" r:id="rId16"/>
+    <p:sldId id="278" r:id="rId17"/>
+    <p:sldId id="267" r:id="rId18"/>
+    <p:sldId id="273" r:id="rId19"/>
+    <p:sldId id="280" r:id="rId20"/>
+    <p:sldId id="279" r:id="rId21"/>
+    <p:sldId id="281" r:id="rId22"/>
+    <p:sldId id="282" r:id="rId23"/>
   </p:sldIdLst>
   <p:sldSz cx="12192000" cy="6858000"/>
   <p:notesSz cx="6858000" cy="9144000"/>
@@ -4367,7 +4370,25 @@
           <a:p>
             <a:r>
               <a:rPr lang="en-GB" dirty="0"/>
-              <a:t>Spikes might correspond</a:t>
+              <a:t>Or the phenotype with another SNP, did not yield the expected result</a:t>
+            </a:r>
+          </a:p>
+          <a:p>
+            <a:endParaRPr lang="en-GB" dirty="0"/>
+          </a:p>
+          <a:p>
+            <a:r>
+              <a:rPr lang="en-GB" dirty="0"/>
+              <a:t>We went on to simulate datasets. With only one product, it works pretty well, but sometimes it doesn’t need all literals to find a cover. </a:t>
+            </a:r>
+          </a:p>
+          <a:p>
+            <a:endParaRPr lang="en-GB" dirty="0"/>
+          </a:p>
+          <a:p>
+            <a:r>
+              <a:rPr lang="en-GB" dirty="0"/>
+              <a:t>With multiple products, it start failing if there are more than 100 SNPs, sometimes even before. </a:t>
             </a:r>
           </a:p>
         </p:txBody>
@@ -4398,7 +4419,7 @@
     </p:spTree>
     <p:extLst>
       <p:ext uri="{BB962C8B-B14F-4D97-AF65-F5344CB8AC3E}">
-        <p14:creationId xmlns:p14="http://schemas.microsoft.com/office/powerpoint/2010/main" val="3872474374"/>
+        <p14:creationId xmlns:p14="http://schemas.microsoft.com/office/powerpoint/2010/main" val="145333548"/>
       </p:ext>
     </p:extLst>
   </p:cSld>
@@ -4452,28 +4473,7 @@
           <a:bodyPr/>
           <a:lstStyle/>
           <a:p>
-            <a:r>
-              <a:rPr lang="en-GB" dirty="0"/>
-              <a:t>Or the phenotype with another SNP, did not yield the expected result</a:t>
-            </a:r>
-          </a:p>
-          <a:p>
             <a:endParaRPr lang="en-GB" dirty="0"/>
-          </a:p>
-          <a:p>
-            <a:r>
-              <a:rPr lang="en-GB" dirty="0"/>
-              <a:t>We went on to simulate datasets. With only one product, it works pretty well, but sometimes it doesn’t need all literals to find a cover. </a:t>
-            </a:r>
-          </a:p>
-          <a:p>
-            <a:endParaRPr lang="en-GB" dirty="0"/>
-          </a:p>
-          <a:p>
-            <a:r>
-              <a:rPr lang="en-GB" dirty="0"/>
-              <a:t>With multiple products, it start failing if there are more than 100 SNPs, sometimes even before. </a:t>
-            </a:r>
           </a:p>
         </p:txBody>
       </p:sp>
@@ -4503,7 +4503,7 @@
     </p:spTree>
     <p:extLst>
       <p:ext uri="{BB962C8B-B14F-4D97-AF65-F5344CB8AC3E}">
-        <p14:creationId xmlns:p14="http://schemas.microsoft.com/office/powerpoint/2010/main" val="145333548"/>
+        <p14:creationId xmlns:p14="http://schemas.microsoft.com/office/powerpoint/2010/main" val="2550970925"/>
       </p:ext>
     </p:extLst>
   </p:cSld>
@@ -4557,6 +4557,14 @@
           <a:bodyPr/>
           <a:lstStyle/>
           <a:p>
+            <a:r>
+              <a:rPr lang="en-GB" dirty="0"/>
+              <a:t>We conclude that we need to replace Espresso for example with a SMT solver, in which we would also be able to encode the ternary values more naturally. Together with better data and computation power it should be possible to improve knowledge relating to relationships between SNPs. Especially with more data and also data which actually contain the relations we try to search for, should yield </a:t>
+            </a:r>
+            <a:r>
+              <a:rPr lang="en-GB"/>
+              <a:t>better results. </a:t>
+            </a:r>
             <a:endParaRPr lang="en-GB" dirty="0"/>
           </a:p>
         </p:txBody>
@@ -4587,7 +4595,7 @@
     </p:spTree>
     <p:extLst>
       <p:ext uri="{BB962C8B-B14F-4D97-AF65-F5344CB8AC3E}">
-        <p14:creationId xmlns:p14="http://schemas.microsoft.com/office/powerpoint/2010/main" val="2550970925"/>
+        <p14:creationId xmlns:p14="http://schemas.microsoft.com/office/powerpoint/2010/main" val="3875882822"/>
       </p:ext>
     </p:extLst>
   </p:cSld>
@@ -4643,13 +4651,8 @@
           <a:p>
             <a:r>
               <a:rPr lang="en-GB" dirty="0"/>
-              <a:t>We conclude that we need to replace Espresso for example with a SMT solver, in which we would also be able to encode the ternary values more naturally. Together with better data and computation power it should be possible to improve knowledge relating to relationships between SNPs. Especially with more data and also data which actually contain the relations we try to search for, should yield </a:t>
-            </a:r>
-            <a:r>
-              <a:rPr lang="en-GB"/>
-              <a:t>better results. </a:t>
-            </a:r>
-            <a:endParaRPr lang="en-GB" dirty="0"/>
+              <a:t>Spikes might correspond, but we discover also other SNPs which were disregarded before. </a:t>
+            </a:r>
           </a:p>
         </p:txBody>
       </p:sp>
@@ -4670,7 +4673,7 @@
           <a:p>
             <a:fld id="{D3E4D156-9788-E94C-969D-835AC55077E3}" type="slidenum">
               <a:rPr lang="en-US" smtClean="0"/>
-              <a:t>18</a:t>
+              <a:t>20</a:t>
             </a:fld>
             <a:endParaRPr lang="en-US"/>
           </a:p>
@@ -4679,7 +4682,7 @@
     </p:spTree>
     <p:extLst>
       <p:ext uri="{BB962C8B-B14F-4D97-AF65-F5344CB8AC3E}">
-        <p14:creationId xmlns:p14="http://schemas.microsoft.com/office/powerpoint/2010/main" val="3875882822"/>
+        <p14:creationId xmlns:p14="http://schemas.microsoft.com/office/powerpoint/2010/main" val="3872474374"/>
       </p:ext>
     </p:extLst>
   </p:cSld>
@@ -4918,7 +4921,7 @@
           <a:p>
             <a:r>
               <a:rPr lang="en-US" dirty="0"/>
-              <a:t>Today GWAS is done using the frequencies of appearance of the less common variant called risk allele. One can calculate an effect size for every SNP. Combining them gives us a polygenic risk score. This tells us how likely a person is to have the phenotype (prediction), which is just a fancy way of saying observing the disease. This methods does not directly identify SNPs responsible, but rather you can look at the effect sizes and take an educated guess. </a:t>
+              <a:t>Today GWAS is done using the frequencies of appearance of the less common variant called risk allele. One can calculate an effect size for every SNP. Combining them gives us a polygenic risk score. This tells us how likely a person is to have the phenotype (prediction), which is just a fancy way of saying observing the disease. This methods does not directly identify SNPs responsible, but rather you can look at the effect sizes and take an educated guess. They called this plot Manhattan plot and I do not know Manhattan but I believe there are many high buildings, so maybe just look for high building that good of an advice. </a:t>
             </a:r>
           </a:p>
           <a:p>
@@ -9116,9 +9119,9 @@
         <p:grpSpPr>
           <a:xfrm>
             <a:off x="1738098" y="4025505"/>
-            <a:ext cx="7198638" cy="1052147"/>
+            <a:ext cx="7198638" cy="1009848"/>
             <a:chOff x="1731458" y="3956758"/>
-            <a:chExt cx="7198638" cy="1052147"/>
+            <a:chExt cx="7198638" cy="1009848"/>
           </a:xfrm>
         </p:grpSpPr>
         <p:cxnSp>
@@ -9180,9 +9183,9 @@
             <p:nvPr/>
           </p:nvCxnSpPr>
           <p:spPr>
-            <a:xfrm flipH="1" flipV="1">
+            <a:xfrm flipV="1">
               <a:off x="4371200" y="3956758"/>
-              <a:ext cx="69004" cy="1052147"/>
+              <a:ext cx="0" cy="1009848"/>
             </a:xfrm>
             <a:prstGeom prst="straightConnector1">
               <a:avLst/>
@@ -10755,7 +10758,7 @@
           <a:p>
             <a:r>
               <a:rPr lang="en-US" dirty="0"/>
-              <a:t>Each its own group of individuals </a:t>
+              <a:t>Each level its own group of individuals </a:t>
             </a:r>
           </a:p>
         </p:txBody>
@@ -11147,231 +11150,6 @@
 </file>
 
 <file path=ppt/slides/slide15.xml><?xml version="1.0" encoding="utf-8"?>
-<p:sld xmlns:a="http://schemas.openxmlformats.org/drawingml/2006/main" xmlns:r="http://schemas.openxmlformats.org/officeDocument/2006/relationships" xmlns:p="http://schemas.openxmlformats.org/presentationml/2006/main">
-  <p:cSld>
-    <p:bg>
-      <p:bgPr>
-        <a:solidFill>
-          <a:schemeClr val="bg1"/>
-        </a:solidFill>
-        <a:effectLst/>
-      </p:bgPr>
-    </p:bg>
-    <p:spTree>
-      <p:nvGrpSpPr>
-        <p:cNvPr id="1" name=""/>
-        <p:cNvGrpSpPr/>
-        <p:nvPr/>
-      </p:nvGrpSpPr>
-      <p:grpSpPr>
-        <a:xfrm>
-          <a:off x="0" y="0"/>
-          <a:ext cx="0" cy="0"/>
-          <a:chOff x="0" y="0"/>
-          <a:chExt cx="0" cy="0"/>
-        </a:xfrm>
-      </p:grpSpPr>
-      <p:pic>
-        <p:nvPicPr>
-          <p:cNvPr id="4" name="Picture 3" descr="A graph of a number of dots&#10;&#10;AI-generated content may be incorrect.">
-            <a:extLst>
-              <a:ext uri="{FF2B5EF4-FFF2-40B4-BE49-F238E27FC236}">
-                <a16:creationId xmlns:a16="http://schemas.microsoft.com/office/drawing/2014/main" id="{9A65C79B-476C-4A1A-799A-588664B55122}"/>
-              </a:ext>
-            </a:extLst>
-          </p:cNvPr>
-          <p:cNvPicPr>
-            <a:picLocks noChangeAspect="1"/>
-          </p:cNvPicPr>
-          <p:nvPr/>
-        </p:nvPicPr>
-        <p:blipFill>
-          <a:blip r:embed="rId3"/>
-          <a:srcRect t="8405"/>
-          <a:stretch>
-            <a:fillRect/>
-          </a:stretch>
-        </p:blipFill>
-        <p:spPr>
-          <a:xfrm>
-            <a:off x="2572216" y="497541"/>
-            <a:ext cx="7047567" cy="6455242"/>
-          </a:xfrm>
-          <a:prstGeom prst="rect">
-            <a:avLst/>
-          </a:prstGeom>
-        </p:spPr>
-      </p:pic>
-      <p:sp>
-        <p:nvSpPr>
-          <p:cNvPr id="5" name="Oval 8">
-            <a:extLst>
-              <a:ext uri="{FF2B5EF4-FFF2-40B4-BE49-F238E27FC236}">
-                <a16:creationId xmlns:a16="http://schemas.microsoft.com/office/drawing/2014/main" id="{9DBA7F69-7A67-F57B-CD76-2C3A13DBB834}"/>
-              </a:ext>
-            </a:extLst>
-          </p:cNvPr>
-          <p:cNvSpPr>
-            <a:spLocks noChangeArrowheads="1"/>
-          </p:cNvSpPr>
-          <p:nvPr/>
-        </p:nvSpPr>
-        <p:spPr bwMode="auto">
-          <a:xfrm>
-            <a:off x="6233663" y="905986"/>
-            <a:ext cx="459468" cy="662782"/>
-          </a:xfrm>
-          <a:prstGeom prst="ellipse">
-            <a:avLst/>
-          </a:prstGeom>
-          <a:noFill/>
-          <a:ln w="28575">
-            <a:solidFill>
-              <a:srgbClr val="FF0000"/>
-            </a:solidFill>
-            <a:round/>
-            <a:headEnd/>
-            <a:tailEnd/>
-          </a:ln>
-          <a:effectLst/>
-          <a:extLst>
-            <a:ext uri="{909E8E84-426E-40DD-AFC4-6F175D3DCCD1}">
-              <a14:hiddenFill xmlns:a14="http://schemas.microsoft.com/office/drawing/2010/main">
-                <a:solidFill>
-                  <a:schemeClr val="accent1"/>
-                </a:solidFill>
-              </a14:hiddenFill>
-            </a:ext>
-            <a:ext uri="{AF507438-7753-43E0-B8FC-AC1667EBCBE1}">
-              <a14:hiddenEffects xmlns:a14="http://schemas.microsoft.com/office/drawing/2010/main">
-                <a:effectLst>
-                  <a:outerShdw dist="35921" dir="2700000" algn="ctr" rotWithShape="0">
-                    <a:schemeClr val="bg2"/>
-                  </a:outerShdw>
-                </a:effectLst>
-              </a14:hiddenEffects>
-            </a:ext>
-          </a:extLst>
-        </p:spPr>
-        <p:txBody>
-          <a:bodyPr wrap="none" anchor="ctr"/>
-          <a:lstStyle/>
-          <a:p>
-            <a:endParaRPr lang="en-US"/>
-          </a:p>
-        </p:txBody>
-      </p:sp>
-      <p:sp>
-        <p:nvSpPr>
-          <p:cNvPr id="6" name="Oval 8">
-            <a:extLst>
-              <a:ext uri="{FF2B5EF4-FFF2-40B4-BE49-F238E27FC236}">
-                <a16:creationId xmlns:a16="http://schemas.microsoft.com/office/drawing/2014/main" id="{C1B6BE33-1993-B454-92A2-8E13C0D6B60B}"/>
-              </a:ext>
-            </a:extLst>
-          </p:cNvPr>
-          <p:cNvSpPr>
-            <a:spLocks noChangeArrowheads="1"/>
-          </p:cNvSpPr>
-          <p:nvPr/>
-        </p:nvSpPr>
-        <p:spPr bwMode="auto">
-          <a:xfrm>
-            <a:off x="6452062" y="5410199"/>
-            <a:ext cx="259080" cy="251953"/>
-          </a:xfrm>
-          <a:prstGeom prst="ellipse">
-            <a:avLst/>
-          </a:prstGeom>
-          <a:noFill/>
-          <a:ln w="28575">
-            <a:solidFill>
-              <a:srgbClr val="FF0000"/>
-            </a:solidFill>
-            <a:round/>
-            <a:headEnd/>
-            <a:tailEnd/>
-          </a:ln>
-          <a:effectLst/>
-          <a:extLst>
-            <a:ext uri="{909E8E84-426E-40DD-AFC4-6F175D3DCCD1}">
-              <a14:hiddenFill xmlns:a14="http://schemas.microsoft.com/office/drawing/2010/main">
-                <a:solidFill>
-                  <a:schemeClr val="accent1"/>
-                </a:solidFill>
-              </a14:hiddenFill>
-            </a:ext>
-            <a:ext uri="{AF507438-7753-43E0-B8FC-AC1667EBCBE1}">
-              <a14:hiddenEffects xmlns:a14="http://schemas.microsoft.com/office/drawing/2010/main">
-                <a:effectLst>
-                  <a:outerShdw dist="35921" dir="2700000" algn="ctr" rotWithShape="0">
-                    <a:schemeClr val="bg2"/>
-                  </a:outerShdw>
-                </a:effectLst>
-              </a14:hiddenEffects>
-            </a:ext>
-          </a:extLst>
-        </p:spPr>
-        <p:txBody>
-          <a:bodyPr wrap="none" anchor="ctr"/>
-          <a:lstStyle/>
-          <a:p>
-            <a:endParaRPr lang="en-US"/>
-          </a:p>
-        </p:txBody>
-      </p:sp>
-      <p:sp>
-        <p:nvSpPr>
-          <p:cNvPr id="2" name="Title 1">
-            <a:extLst>
-              <a:ext uri="{FF2B5EF4-FFF2-40B4-BE49-F238E27FC236}">
-                <a16:creationId xmlns:a16="http://schemas.microsoft.com/office/drawing/2014/main" id="{95143D2C-E637-B60C-C5FE-A406BCD78DAC}"/>
-              </a:ext>
-            </a:extLst>
-          </p:cNvPr>
-          <p:cNvSpPr>
-            <a:spLocks noGrp="1"/>
-          </p:cNvSpPr>
-          <p:nvPr>
-            <p:ph type="title"/>
-          </p:nvPr>
-        </p:nvSpPr>
-        <p:spPr>
-          <a:xfrm>
-            <a:off x="838200" y="82179"/>
-            <a:ext cx="10515600" cy="830723"/>
-          </a:xfrm>
-        </p:spPr>
-        <p:txBody>
-          <a:bodyPr/>
-          <a:lstStyle/>
-          <a:p>
-            <a:pPr algn="ctr"/>
-            <a:r>
-              <a:rPr lang="en-GB" dirty="0">
-                <a:solidFill>
-                  <a:schemeClr val="tx1"/>
-                </a:solidFill>
-              </a:rPr>
-              <a:t>Manhattan plot (PRS)</a:t>
-            </a:r>
-          </a:p>
-        </p:txBody>
-      </p:sp>
-    </p:spTree>
-    <p:extLst>
-      <p:ext uri="{BB962C8B-B14F-4D97-AF65-F5344CB8AC3E}">
-        <p14:creationId xmlns:p14="http://schemas.microsoft.com/office/powerpoint/2010/main" val="2128241104"/>
-      </p:ext>
-    </p:extLst>
-  </p:cSld>
-  <p:clrMapOvr>
-    <a:masterClrMapping/>
-  </p:clrMapOvr>
-</p:sld>
-</file>
-
-<file path=ppt/slides/slide16.xml><?xml version="1.0" encoding="utf-8"?>
 <p:sld xmlns:a="http://schemas.openxmlformats.org/drawingml/2006/main" xmlns:r="http://schemas.openxmlformats.org/officeDocument/2006/relationships" xmlns:p="http://schemas.openxmlformats.org/presentationml/2006/main">
   <p:cSld>
     <p:spTree>
@@ -11950,7 +11728,7 @@
 </p:sld>
 </file>
 
-<file path=ppt/slides/slide17.xml><?xml version="1.0" encoding="utf-8"?>
+<file path=ppt/slides/slide16.xml><?xml version="1.0" encoding="utf-8"?>
 <p:sld xmlns:a="http://schemas.openxmlformats.org/drawingml/2006/main" xmlns:r="http://schemas.openxmlformats.org/officeDocument/2006/relationships" xmlns:p="http://schemas.openxmlformats.org/presentationml/2006/main">
   <p:cSld>
     <p:spTree>
@@ -12054,7 +11832,7 @@
 </p:sld>
 </file>
 
-<file path=ppt/slides/slide18.xml><?xml version="1.0" encoding="utf-8"?>
+<file path=ppt/slides/slide17.xml><?xml version="1.0" encoding="utf-8"?>
 <p:sld xmlns:a="http://schemas.openxmlformats.org/drawingml/2006/main" xmlns:r="http://schemas.openxmlformats.org/officeDocument/2006/relationships" xmlns:p="http://schemas.openxmlformats.org/presentationml/2006/main">
   <p:cSld>
     <p:spTree>
@@ -12170,7 +11948,7 @@
 </p:sld>
 </file>
 
-<file path=ppt/slides/slide19.xml><?xml version="1.0" encoding="utf-8"?>
+<file path=ppt/slides/slide18.xml><?xml version="1.0" encoding="utf-8"?>
 <p:sld xmlns:a="http://schemas.openxmlformats.org/drawingml/2006/main" xmlns:r="http://schemas.openxmlformats.org/officeDocument/2006/relationships" xmlns:p="http://schemas.openxmlformats.org/presentationml/2006/main">
   <p:cSld>
     <p:spTree>
@@ -12233,6 +12011,483 @@
     <a:masterClrMapping/>
   </p:clrMapOvr>
   <p:transition spd="slow"/>
+</p:sld>
+</file>
+
+<file path=ppt/slides/slide19.xml><?xml version="1.0" encoding="utf-8"?>
+<p:sld xmlns:a="http://schemas.openxmlformats.org/drawingml/2006/main" xmlns:r="http://schemas.openxmlformats.org/officeDocument/2006/relationships" xmlns:p="http://schemas.openxmlformats.org/presentationml/2006/main">
+  <p:cSld>
+    <p:spTree>
+      <p:nvGrpSpPr>
+        <p:cNvPr id="1" name=""/>
+        <p:cNvGrpSpPr/>
+        <p:nvPr/>
+      </p:nvGrpSpPr>
+      <p:grpSpPr>
+        <a:xfrm>
+          <a:off x="0" y="0"/>
+          <a:ext cx="0" cy="0"/>
+          <a:chOff x="0" y="0"/>
+          <a:chExt cx="0" cy="0"/>
+        </a:xfrm>
+      </p:grpSpPr>
+      <p:sp>
+        <p:nvSpPr>
+          <p:cNvPr id="2" name="Title 1">
+            <a:extLst>
+              <a:ext uri="{FF2B5EF4-FFF2-40B4-BE49-F238E27FC236}">
+                <a16:creationId xmlns:a16="http://schemas.microsoft.com/office/drawing/2014/main" id="{32308890-BE74-CD81-1758-BC7A7CDC8D46}"/>
+              </a:ext>
+            </a:extLst>
+          </p:cNvPr>
+          <p:cNvSpPr>
+            <a:spLocks noGrp="1"/>
+          </p:cNvSpPr>
+          <p:nvPr>
+            <p:ph type="title"/>
+          </p:nvPr>
+        </p:nvSpPr>
+        <p:spPr/>
+        <p:txBody>
+          <a:bodyPr/>
+          <a:lstStyle/>
+          <a:p>
+            <a:r>
+              <a:rPr lang="en-GB" dirty="0"/>
+              <a:t>Partial dataset results</a:t>
+            </a:r>
+          </a:p>
+        </p:txBody>
+      </p:sp>
+      <p:graphicFrame>
+        <p:nvGraphicFramePr>
+          <p:cNvPr id="4" name="Content Placeholder 3">
+            <a:extLst>
+              <a:ext uri="{FF2B5EF4-FFF2-40B4-BE49-F238E27FC236}">
+                <a16:creationId xmlns:a16="http://schemas.microsoft.com/office/drawing/2014/main" id="{8F0DB944-9D45-7333-9088-871FE1A73817}"/>
+              </a:ext>
+            </a:extLst>
+          </p:cNvPr>
+          <p:cNvGraphicFramePr>
+            <a:graphicFrameLocks noGrp="1"/>
+          </p:cNvGraphicFramePr>
+          <p:nvPr>
+            <p:ph idx="1"/>
+            <p:extLst>
+              <p:ext uri="{D42A27DB-BD31-4B8C-83A1-F6EECF244321}">
+                <p14:modId xmlns:p14="http://schemas.microsoft.com/office/powerpoint/2010/main" val="152431563"/>
+              </p:ext>
+            </p:extLst>
+          </p:nvPr>
+        </p:nvGraphicFramePr>
+        <p:xfrm>
+          <a:off x="838200" y="2316480"/>
+          <a:ext cx="10515600" cy="2225040"/>
+        </p:xfrm>
+        <a:graphic>
+          <a:graphicData uri="http://schemas.openxmlformats.org/drawingml/2006/table">
+            <a:tbl>
+              <a:tblPr firstRow="1" bandRow="1">
+                <a:tableStyleId>{5C22544A-7EE6-4342-B048-85BDC9FD1C3A}</a:tableStyleId>
+              </a:tblPr>
+              <a:tblGrid>
+                <a:gridCol w="2628900">
+                  <a:extLst>
+                    <a:ext uri="{9D8B030D-6E8A-4147-A177-3AD203B41FA5}">
+                      <a16:colId xmlns:a16="http://schemas.microsoft.com/office/drawing/2014/main" val="3726284961"/>
+                    </a:ext>
+                  </a:extLst>
+                </a:gridCol>
+                <a:gridCol w="2628900">
+                  <a:extLst>
+                    <a:ext uri="{9D8B030D-6E8A-4147-A177-3AD203B41FA5}">
+                      <a16:colId xmlns:a16="http://schemas.microsoft.com/office/drawing/2014/main" val="33042766"/>
+                    </a:ext>
+                  </a:extLst>
+                </a:gridCol>
+                <a:gridCol w="2628900">
+                  <a:extLst>
+                    <a:ext uri="{9D8B030D-6E8A-4147-A177-3AD203B41FA5}">
+                      <a16:colId xmlns:a16="http://schemas.microsoft.com/office/drawing/2014/main" val="3920823902"/>
+                    </a:ext>
+                  </a:extLst>
+                </a:gridCol>
+                <a:gridCol w="2628900">
+                  <a:extLst>
+                    <a:ext uri="{9D8B030D-6E8A-4147-A177-3AD203B41FA5}">
+                      <a16:colId xmlns:a16="http://schemas.microsoft.com/office/drawing/2014/main" val="3972018737"/>
+                    </a:ext>
+                  </a:extLst>
+                </a:gridCol>
+              </a:tblGrid>
+              <a:tr h="370840">
+                <a:tc>
+                  <a:txBody>
+                    <a:bodyPr/>
+                    <a:lstStyle/>
+                    <a:p>
+                      <a:r>
+                        <a:rPr lang="en-GB" dirty="0"/>
+                        <a:t>Input size</a:t>
+                      </a:r>
+                    </a:p>
+                  </a:txBody>
+                  <a:tcPr/>
+                </a:tc>
+                <a:tc>
+                  <a:txBody>
+                    <a:bodyPr/>
+                    <a:lstStyle/>
+                    <a:p>
+                      <a:r>
+                        <a:rPr lang="en-GB" dirty="0"/>
+                        <a:t>Products</a:t>
+                      </a:r>
+                    </a:p>
+                  </a:txBody>
+                  <a:tcPr/>
+                </a:tc>
+                <a:tc>
+                  <a:txBody>
+                    <a:bodyPr/>
+                    <a:lstStyle/>
+                    <a:p>
+                      <a:r>
+                        <a:rPr lang="en-GB" dirty="0"/>
+                        <a:t>Literals</a:t>
+                      </a:r>
+                    </a:p>
+                  </a:txBody>
+                  <a:tcPr/>
+                </a:tc>
+                <a:tc>
+                  <a:txBody>
+                    <a:bodyPr/>
+                    <a:lstStyle/>
+                    <a:p>
+                      <a:r>
+                        <a:rPr lang="en-GB" dirty="0"/>
+                        <a:t>Time </a:t>
+                      </a:r>
+                    </a:p>
+                  </a:txBody>
+                  <a:tcPr/>
+                </a:tc>
+                <a:extLst>
+                  <a:ext uri="{0D108BD9-81ED-4DB2-BD59-A6C34878D82A}">
+                    <a16:rowId xmlns:a16="http://schemas.microsoft.com/office/drawing/2014/main" val="3616726004"/>
+                  </a:ext>
+                </a:extLst>
+              </a:tr>
+              <a:tr h="370840">
+                <a:tc>
+                  <a:txBody>
+                    <a:bodyPr/>
+                    <a:lstStyle/>
+                    <a:p>
+                      <a:r>
+                        <a:rPr lang="en-GB" dirty="0"/>
+                        <a:t>&lt;120</a:t>
+                      </a:r>
+                    </a:p>
+                  </a:txBody>
+                  <a:tcPr/>
+                </a:tc>
+                <a:tc>
+                  <a:txBody>
+                    <a:bodyPr/>
+                    <a:lstStyle/>
+                    <a:p>
+                      <a:r>
+                        <a:rPr lang="en-GB" dirty="0"/>
+                        <a:t>-</a:t>
+                      </a:r>
+                    </a:p>
+                  </a:txBody>
+                  <a:tcPr/>
+                </a:tc>
+                <a:tc>
+                  <a:txBody>
+                    <a:bodyPr/>
+                    <a:lstStyle/>
+                    <a:p>
+                      <a:r>
+                        <a:rPr lang="en-GB" dirty="0"/>
+                        <a:t>-</a:t>
+                      </a:r>
+                    </a:p>
+                  </a:txBody>
+                  <a:tcPr/>
+                </a:tc>
+                <a:tc>
+                  <a:txBody>
+                    <a:bodyPr/>
+                    <a:lstStyle/>
+                    <a:p>
+                      <a:r>
+                        <a:rPr lang="en-GB" dirty="0"/>
+                        <a:t>&lt; 1 s</a:t>
+                      </a:r>
+                    </a:p>
+                  </a:txBody>
+                  <a:tcPr/>
+                </a:tc>
+                <a:extLst>
+                  <a:ext uri="{0D108BD9-81ED-4DB2-BD59-A6C34878D82A}">
+                    <a16:rowId xmlns:a16="http://schemas.microsoft.com/office/drawing/2014/main" val="828591374"/>
+                  </a:ext>
+                </a:extLst>
+              </a:tr>
+              <a:tr h="370840">
+                <a:tc>
+                  <a:txBody>
+                    <a:bodyPr/>
+                    <a:lstStyle/>
+                    <a:p>
+                      <a:r>
+                        <a:rPr lang="en-GB" dirty="0"/>
+                        <a:t>200</a:t>
+                      </a:r>
+                    </a:p>
+                  </a:txBody>
+                  <a:tcPr/>
+                </a:tc>
+                <a:tc>
+                  <a:txBody>
+                    <a:bodyPr/>
+                    <a:lstStyle/>
+                    <a:p>
+                      <a:r>
+                        <a:rPr lang="en-GB" dirty="0"/>
+                        <a:t>50</a:t>
+                      </a:r>
+                    </a:p>
+                  </a:txBody>
+                  <a:tcPr/>
+                </a:tc>
+                <a:tc>
+                  <a:txBody>
+                    <a:bodyPr/>
+                    <a:lstStyle/>
+                    <a:p>
+                      <a:r>
+                        <a:rPr lang="en-GB" dirty="0"/>
+                        <a:t>3-6</a:t>
+                      </a:r>
+                    </a:p>
+                  </a:txBody>
+                  <a:tcPr/>
+                </a:tc>
+                <a:tc>
+                  <a:txBody>
+                    <a:bodyPr/>
+                    <a:lstStyle/>
+                    <a:p>
+                      <a:r>
+                        <a:rPr lang="en-GB" dirty="0"/>
+                        <a:t>5 s</a:t>
+                      </a:r>
+                    </a:p>
+                  </a:txBody>
+                  <a:tcPr/>
+                </a:tc>
+                <a:extLst>
+                  <a:ext uri="{0D108BD9-81ED-4DB2-BD59-A6C34878D82A}">
+                    <a16:rowId xmlns:a16="http://schemas.microsoft.com/office/drawing/2014/main" val="835739776"/>
+                  </a:ext>
+                </a:extLst>
+              </a:tr>
+              <a:tr h="370840">
+                <a:tc>
+                  <a:txBody>
+                    <a:bodyPr/>
+                    <a:lstStyle/>
+                    <a:p>
+                      <a:r>
+                        <a:rPr lang="en-GB" dirty="0"/>
+                        <a:t>400</a:t>
+                      </a:r>
+                    </a:p>
+                  </a:txBody>
+                  <a:tcPr/>
+                </a:tc>
+                <a:tc>
+                  <a:txBody>
+                    <a:bodyPr/>
+                    <a:lstStyle/>
+                    <a:p>
+                      <a:r>
+                        <a:rPr lang="en-GB" dirty="0"/>
+                        <a:t>40</a:t>
+                      </a:r>
+                    </a:p>
+                  </a:txBody>
+                  <a:tcPr/>
+                </a:tc>
+                <a:tc>
+                  <a:txBody>
+                    <a:bodyPr/>
+                    <a:lstStyle/>
+                    <a:p>
+                      <a:r>
+                        <a:rPr lang="en-GB" dirty="0"/>
+                        <a:t>2-4</a:t>
+                      </a:r>
+                    </a:p>
+                  </a:txBody>
+                  <a:tcPr/>
+                </a:tc>
+                <a:tc>
+                  <a:txBody>
+                    <a:bodyPr/>
+                    <a:lstStyle/>
+                    <a:p>
+                      <a:r>
+                        <a:rPr lang="en-GB" dirty="0"/>
+                        <a:t>10 s</a:t>
+                      </a:r>
+                    </a:p>
+                  </a:txBody>
+                  <a:tcPr/>
+                </a:tc>
+                <a:extLst>
+                  <a:ext uri="{0D108BD9-81ED-4DB2-BD59-A6C34878D82A}">
+                    <a16:rowId xmlns:a16="http://schemas.microsoft.com/office/drawing/2014/main" val="2811638538"/>
+                  </a:ext>
+                </a:extLst>
+              </a:tr>
+              <a:tr h="370840">
+                <a:tc>
+                  <a:txBody>
+                    <a:bodyPr/>
+                    <a:lstStyle/>
+                    <a:p>
+                      <a:r>
+                        <a:rPr lang="en-GB" dirty="0"/>
+                        <a:t>1000</a:t>
+                      </a:r>
+                    </a:p>
+                  </a:txBody>
+                  <a:tcPr/>
+                </a:tc>
+                <a:tc>
+                  <a:txBody>
+                    <a:bodyPr/>
+                    <a:lstStyle/>
+                    <a:p>
+                      <a:r>
+                        <a:rPr lang="en-GB" dirty="0"/>
+                        <a:t>30</a:t>
+                      </a:r>
+                    </a:p>
+                  </a:txBody>
+                  <a:tcPr/>
+                </a:tc>
+                <a:tc>
+                  <a:txBody>
+                    <a:bodyPr/>
+                    <a:lstStyle/>
+                    <a:p>
+                      <a:r>
+                        <a:rPr lang="en-GB" dirty="0"/>
+                        <a:t>2-3</a:t>
+                      </a:r>
+                    </a:p>
+                  </a:txBody>
+                  <a:tcPr/>
+                </a:tc>
+                <a:tc>
+                  <a:txBody>
+                    <a:bodyPr/>
+                    <a:lstStyle/>
+                    <a:p>
+                      <a:r>
+                        <a:rPr lang="en-GB" dirty="0"/>
+                        <a:t>40 s</a:t>
+                      </a:r>
+                    </a:p>
+                  </a:txBody>
+                  <a:tcPr/>
+                </a:tc>
+                <a:extLst>
+                  <a:ext uri="{0D108BD9-81ED-4DB2-BD59-A6C34878D82A}">
+                    <a16:rowId xmlns:a16="http://schemas.microsoft.com/office/drawing/2014/main" val="3423496259"/>
+                  </a:ext>
+                </a:extLst>
+              </a:tr>
+              <a:tr h="370840">
+                <a:tc>
+                  <a:txBody>
+                    <a:bodyPr/>
+                    <a:lstStyle/>
+                    <a:p>
+                      <a:r>
+                        <a:rPr lang="en-GB" dirty="0"/>
+                        <a:t>2000</a:t>
+                      </a:r>
+                    </a:p>
+                  </a:txBody>
+                  <a:tcPr/>
+                </a:tc>
+                <a:tc>
+                  <a:txBody>
+                    <a:bodyPr/>
+                    <a:lstStyle/>
+                    <a:p>
+                      <a:r>
+                        <a:rPr lang="en-GB" dirty="0"/>
+                        <a:t>25</a:t>
+                      </a:r>
+                    </a:p>
+                  </a:txBody>
+                  <a:tcPr/>
+                </a:tc>
+                <a:tc>
+                  <a:txBody>
+                    <a:bodyPr/>
+                    <a:lstStyle/>
+                    <a:p>
+                      <a:r>
+                        <a:rPr lang="en-GB" dirty="0"/>
+                        <a:t>2</a:t>
+                      </a:r>
+                    </a:p>
+                  </a:txBody>
+                  <a:tcPr/>
+                </a:tc>
+                <a:tc>
+                  <a:txBody>
+                    <a:bodyPr/>
+                    <a:lstStyle/>
+                    <a:p>
+                      <a:r>
+                        <a:rPr lang="en-GB" dirty="0"/>
+                        <a:t>8 min</a:t>
+                      </a:r>
+                    </a:p>
+                  </a:txBody>
+                  <a:tcPr/>
+                </a:tc>
+                <a:extLst>
+                  <a:ext uri="{0D108BD9-81ED-4DB2-BD59-A6C34878D82A}">
+                    <a16:rowId xmlns:a16="http://schemas.microsoft.com/office/drawing/2014/main" val="839978800"/>
+                  </a:ext>
+                </a:extLst>
+              </a:tr>
+            </a:tbl>
+          </a:graphicData>
+        </a:graphic>
+      </p:graphicFrame>
+    </p:spTree>
+    <p:extLst>
+      <p:ext uri="{BB962C8B-B14F-4D97-AF65-F5344CB8AC3E}">
+        <p14:creationId xmlns:p14="http://schemas.microsoft.com/office/powerpoint/2010/main" val="1992335357"/>
+      </p:ext>
+    </p:extLst>
+  </p:cSld>
+  <p:clrMapOvr>
+    <a:masterClrMapping/>
+  </p:clrMapOvr>
 </p:sld>
 </file>
 
@@ -13423,6 +13678,381 @@
       </p:transition>
     </mc:Fallback>
   </mc:AlternateContent>
+</p:sld>
+</file>
+
+<file path=ppt/slides/slide20.xml><?xml version="1.0" encoding="utf-8"?>
+<p:sld xmlns:a="http://schemas.openxmlformats.org/drawingml/2006/main" xmlns:r="http://schemas.openxmlformats.org/officeDocument/2006/relationships" xmlns:p="http://schemas.openxmlformats.org/presentationml/2006/main">
+  <p:cSld>
+    <p:bg>
+      <p:bgPr>
+        <a:solidFill>
+          <a:schemeClr val="bg1"/>
+        </a:solidFill>
+        <a:effectLst/>
+      </p:bgPr>
+    </p:bg>
+    <p:spTree>
+      <p:nvGrpSpPr>
+        <p:cNvPr id="1" name=""/>
+        <p:cNvGrpSpPr/>
+        <p:nvPr/>
+      </p:nvGrpSpPr>
+      <p:grpSpPr>
+        <a:xfrm>
+          <a:off x="0" y="0"/>
+          <a:ext cx="0" cy="0"/>
+          <a:chOff x="0" y="0"/>
+          <a:chExt cx="0" cy="0"/>
+        </a:xfrm>
+      </p:grpSpPr>
+      <p:pic>
+        <p:nvPicPr>
+          <p:cNvPr id="4" name="Picture 3" descr="A graph of a number of dots&#10;&#10;AI-generated content may be incorrect.">
+            <a:extLst>
+              <a:ext uri="{FF2B5EF4-FFF2-40B4-BE49-F238E27FC236}">
+                <a16:creationId xmlns:a16="http://schemas.microsoft.com/office/drawing/2014/main" id="{9A65C79B-476C-4A1A-799A-588664B55122}"/>
+              </a:ext>
+            </a:extLst>
+          </p:cNvPr>
+          <p:cNvPicPr>
+            <a:picLocks noChangeAspect="1"/>
+          </p:cNvPicPr>
+          <p:nvPr/>
+        </p:nvPicPr>
+        <p:blipFill>
+          <a:blip r:embed="rId3"/>
+          <a:srcRect t="8405"/>
+          <a:stretch>
+            <a:fillRect/>
+          </a:stretch>
+        </p:blipFill>
+        <p:spPr>
+          <a:xfrm>
+            <a:off x="2572216" y="497541"/>
+            <a:ext cx="7047567" cy="6455242"/>
+          </a:xfrm>
+          <a:prstGeom prst="rect">
+            <a:avLst/>
+          </a:prstGeom>
+        </p:spPr>
+      </p:pic>
+      <p:sp>
+        <p:nvSpPr>
+          <p:cNvPr id="5" name="Oval 8">
+            <a:extLst>
+              <a:ext uri="{FF2B5EF4-FFF2-40B4-BE49-F238E27FC236}">
+                <a16:creationId xmlns:a16="http://schemas.microsoft.com/office/drawing/2014/main" id="{9DBA7F69-7A67-F57B-CD76-2C3A13DBB834}"/>
+              </a:ext>
+            </a:extLst>
+          </p:cNvPr>
+          <p:cNvSpPr>
+            <a:spLocks noChangeArrowheads="1"/>
+          </p:cNvSpPr>
+          <p:nvPr/>
+        </p:nvSpPr>
+        <p:spPr bwMode="auto">
+          <a:xfrm>
+            <a:off x="6233663" y="905986"/>
+            <a:ext cx="459468" cy="662782"/>
+          </a:xfrm>
+          <a:prstGeom prst="ellipse">
+            <a:avLst/>
+          </a:prstGeom>
+          <a:noFill/>
+          <a:ln w="28575">
+            <a:solidFill>
+              <a:srgbClr val="FF0000"/>
+            </a:solidFill>
+            <a:round/>
+            <a:headEnd/>
+            <a:tailEnd/>
+          </a:ln>
+          <a:effectLst/>
+          <a:extLst>
+            <a:ext uri="{909E8E84-426E-40DD-AFC4-6F175D3DCCD1}">
+              <a14:hiddenFill xmlns:a14="http://schemas.microsoft.com/office/drawing/2010/main">
+                <a:solidFill>
+                  <a:schemeClr val="accent1"/>
+                </a:solidFill>
+              </a14:hiddenFill>
+            </a:ext>
+            <a:ext uri="{AF507438-7753-43E0-B8FC-AC1667EBCBE1}">
+              <a14:hiddenEffects xmlns:a14="http://schemas.microsoft.com/office/drawing/2010/main">
+                <a:effectLst>
+                  <a:outerShdw dist="35921" dir="2700000" algn="ctr" rotWithShape="0">
+                    <a:schemeClr val="bg2"/>
+                  </a:outerShdw>
+                </a:effectLst>
+              </a14:hiddenEffects>
+            </a:ext>
+          </a:extLst>
+        </p:spPr>
+        <p:txBody>
+          <a:bodyPr wrap="none" anchor="ctr"/>
+          <a:lstStyle/>
+          <a:p>
+            <a:endParaRPr lang="en-US"/>
+          </a:p>
+        </p:txBody>
+      </p:sp>
+      <p:sp>
+        <p:nvSpPr>
+          <p:cNvPr id="6" name="Oval 8">
+            <a:extLst>
+              <a:ext uri="{FF2B5EF4-FFF2-40B4-BE49-F238E27FC236}">
+                <a16:creationId xmlns:a16="http://schemas.microsoft.com/office/drawing/2014/main" id="{C1B6BE33-1993-B454-92A2-8E13C0D6B60B}"/>
+              </a:ext>
+            </a:extLst>
+          </p:cNvPr>
+          <p:cNvSpPr>
+            <a:spLocks noChangeArrowheads="1"/>
+          </p:cNvSpPr>
+          <p:nvPr/>
+        </p:nvSpPr>
+        <p:spPr bwMode="auto">
+          <a:xfrm>
+            <a:off x="6452062" y="5410199"/>
+            <a:ext cx="259080" cy="251953"/>
+          </a:xfrm>
+          <a:prstGeom prst="ellipse">
+            <a:avLst/>
+          </a:prstGeom>
+          <a:noFill/>
+          <a:ln w="28575">
+            <a:solidFill>
+              <a:srgbClr val="FF0000"/>
+            </a:solidFill>
+            <a:round/>
+            <a:headEnd/>
+            <a:tailEnd/>
+          </a:ln>
+          <a:effectLst/>
+          <a:extLst>
+            <a:ext uri="{909E8E84-426E-40DD-AFC4-6F175D3DCCD1}">
+              <a14:hiddenFill xmlns:a14="http://schemas.microsoft.com/office/drawing/2010/main">
+                <a:solidFill>
+                  <a:schemeClr val="accent1"/>
+                </a:solidFill>
+              </a14:hiddenFill>
+            </a:ext>
+            <a:ext uri="{AF507438-7753-43E0-B8FC-AC1667EBCBE1}">
+              <a14:hiddenEffects xmlns:a14="http://schemas.microsoft.com/office/drawing/2010/main">
+                <a:effectLst>
+                  <a:outerShdw dist="35921" dir="2700000" algn="ctr" rotWithShape="0">
+                    <a:schemeClr val="bg2"/>
+                  </a:outerShdw>
+                </a:effectLst>
+              </a14:hiddenEffects>
+            </a:ext>
+          </a:extLst>
+        </p:spPr>
+        <p:txBody>
+          <a:bodyPr wrap="none" anchor="ctr"/>
+          <a:lstStyle/>
+          <a:p>
+            <a:endParaRPr lang="en-US"/>
+          </a:p>
+        </p:txBody>
+      </p:sp>
+      <p:sp>
+        <p:nvSpPr>
+          <p:cNvPr id="2" name="Title 1">
+            <a:extLst>
+              <a:ext uri="{FF2B5EF4-FFF2-40B4-BE49-F238E27FC236}">
+                <a16:creationId xmlns:a16="http://schemas.microsoft.com/office/drawing/2014/main" id="{95143D2C-E637-B60C-C5FE-A406BCD78DAC}"/>
+              </a:ext>
+            </a:extLst>
+          </p:cNvPr>
+          <p:cNvSpPr>
+            <a:spLocks noGrp="1"/>
+          </p:cNvSpPr>
+          <p:nvPr>
+            <p:ph type="title"/>
+          </p:nvPr>
+        </p:nvSpPr>
+        <p:spPr>
+          <a:xfrm>
+            <a:off x="838200" y="82179"/>
+            <a:ext cx="10515600" cy="830723"/>
+          </a:xfrm>
+        </p:spPr>
+        <p:txBody>
+          <a:bodyPr/>
+          <a:lstStyle/>
+          <a:p>
+            <a:pPr algn="ctr"/>
+            <a:r>
+              <a:rPr lang="en-GB" dirty="0">
+                <a:solidFill>
+                  <a:schemeClr val="tx1"/>
+                </a:solidFill>
+              </a:rPr>
+              <a:t>Manhattan plot (PRS)</a:t>
+            </a:r>
+          </a:p>
+        </p:txBody>
+      </p:sp>
+    </p:spTree>
+    <p:extLst>
+      <p:ext uri="{BB962C8B-B14F-4D97-AF65-F5344CB8AC3E}">
+        <p14:creationId xmlns:p14="http://schemas.microsoft.com/office/powerpoint/2010/main" val="2128241104"/>
+      </p:ext>
+    </p:extLst>
+  </p:cSld>
+  <p:clrMapOvr>
+    <a:masterClrMapping/>
+  </p:clrMapOvr>
+</p:sld>
+</file>
+
+<file path=ppt/slides/slide21.xml><?xml version="1.0" encoding="utf-8"?>
+<p:sld xmlns:a="http://schemas.openxmlformats.org/drawingml/2006/main" xmlns:r="http://schemas.openxmlformats.org/officeDocument/2006/relationships" xmlns:p="http://schemas.openxmlformats.org/presentationml/2006/main">
+  <p:cSld>
+    <p:bg>
+      <p:bgPr>
+        <a:solidFill>
+          <a:schemeClr val="bg1"/>
+        </a:solidFill>
+        <a:effectLst/>
+      </p:bgPr>
+    </p:bg>
+    <p:spTree>
+      <p:nvGrpSpPr>
+        <p:cNvPr id="1" name=""/>
+        <p:cNvGrpSpPr/>
+        <p:nvPr/>
+      </p:nvGrpSpPr>
+      <p:grpSpPr>
+        <a:xfrm>
+          <a:off x="0" y="0"/>
+          <a:ext cx="0" cy="0"/>
+          <a:chOff x="0" y="0"/>
+          <a:chExt cx="0" cy="0"/>
+        </a:xfrm>
+      </p:grpSpPr>
+      <p:pic>
+        <p:nvPicPr>
+          <p:cNvPr id="5" name="Content Placeholder 4">
+            <a:extLst>
+              <a:ext uri="{FF2B5EF4-FFF2-40B4-BE49-F238E27FC236}">
+                <a16:creationId xmlns:a16="http://schemas.microsoft.com/office/drawing/2014/main" id="{211E4DF5-AC49-3D40-F32A-61D32DF14223}"/>
+              </a:ext>
+            </a:extLst>
+          </p:cNvPr>
+          <p:cNvPicPr>
+            <a:picLocks noGrp="1" noChangeAspect="1"/>
+          </p:cNvPicPr>
+          <p:nvPr>
+            <p:ph idx="1"/>
+          </p:nvPr>
+        </p:nvPicPr>
+        <p:blipFill>
+          <a:blip r:embed="rId2"/>
+          <a:stretch>
+            <a:fillRect/>
+          </a:stretch>
+        </p:blipFill>
+        <p:spPr>
+          <a:xfrm>
+            <a:off x="-43908" y="274320"/>
+            <a:ext cx="12431790" cy="6233160"/>
+          </a:xfrm>
+          <a:prstGeom prst="rect">
+            <a:avLst/>
+          </a:prstGeom>
+        </p:spPr>
+      </p:pic>
+    </p:spTree>
+    <p:extLst>
+      <p:ext uri="{BB962C8B-B14F-4D97-AF65-F5344CB8AC3E}">
+        <p14:creationId xmlns:p14="http://schemas.microsoft.com/office/powerpoint/2010/main" val="2517334431"/>
+      </p:ext>
+    </p:extLst>
+  </p:cSld>
+  <p:clrMapOvr>
+    <a:masterClrMapping/>
+  </p:clrMapOvr>
+</p:sld>
+</file>
+
+<file path=ppt/slides/slide22.xml><?xml version="1.0" encoding="utf-8"?>
+<p:sld xmlns:a="http://schemas.openxmlformats.org/drawingml/2006/main" xmlns:r="http://schemas.openxmlformats.org/officeDocument/2006/relationships" xmlns:p="http://schemas.openxmlformats.org/presentationml/2006/main">
+  <p:cSld>
+    <p:spTree>
+      <p:nvGrpSpPr>
+        <p:cNvPr id="1" name=""/>
+        <p:cNvGrpSpPr/>
+        <p:nvPr/>
+      </p:nvGrpSpPr>
+      <p:grpSpPr>
+        <a:xfrm>
+          <a:off x="0" y="0"/>
+          <a:ext cx="0" cy="0"/>
+          <a:chOff x="0" y="0"/>
+          <a:chExt cx="0" cy="0"/>
+        </a:xfrm>
+      </p:grpSpPr>
+      <p:sp>
+        <p:nvSpPr>
+          <p:cNvPr id="2" name="Title 1">
+            <a:extLst>
+              <a:ext uri="{FF2B5EF4-FFF2-40B4-BE49-F238E27FC236}">
+                <a16:creationId xmlns:a16="http://schemas.microsoft.com/office/drawing/2014/main" id="{44898584-1DC3-17C4-DBAE-DEA856BE4969}"/>
+              </a:ext>
+            </a:extLst>
+          </p:cNvPr>
+          <p:cNvSpPr>
+            <a:spLocks noGrp="1"/>
+          </p:cNvSpPr>
+          <p:nvPr>
+            <p:ph type="title"/>
+          </p:nvPr>
+        </p:nvSpPr>
+        <p:spPr/>
+        <p:txBody>
+          <a:bodyPr/>
+          <a:lstStyle/>
+          <a:p>
+            <a:endParaRPr lang="en-GB"/>
+          </a:p>
+        </p:txBody>
+      </p:sp>
+      <p:sp>
+        <p:nvSpPr>
+          <p:cNvPr id="3" name="Content Placeholder 2">
+            <a:extLst>
+              <a:ext uri="{FF2B5EF4-FFF2-40B4-BE49-F238E27FC236}">
+                <a16:creationId xmlns:a16="http://schemas.microsoft.com/office/drawing/2014/main" id="{75D387BC-E200-3A7F-E2C2-C0B721845165}"/>
+              </a:ext>
+            </a:extLst>
+          </p:cNvPr>
+          <p:cNvSpPr>
+            <a:spLocks noGrp="1"/>
+          </p:cNvSpPr>
+          <p:nvPr>
+            <p:ph idx="1"/>
+          </p:nvPr>
+        </p:nvSpPr>
+        <p:spPr/>
+        <p:txBody>
+          <a:bodyPr/>
+          <a:lstStyle/>
+          <a:p>
+            <a:endParaRPr lang="en-GB"/>
+          </a:p>
+        </p:txBody>
+      </p:sp>
+    </p:spTree>
+    <p:extLst>
+      <p:ext uri="{BB962C8B-B14F-4D97-AF65-F5344CB8AC3E}">
+        <p14:creationId xmlns:p14="http://schemas.microsoft.com/office/powerpoint/2010/main" val="1582914183"/>
+      </p:ext>
+    </p:extLst>
+  </p:cSld>
+  <p:clrMapOvr>
+    <a:masterClrMapping/>
+  </p:clrMapOvr>
 </p:sld>
 </file>
 

</xml_diff>

<commit_message>
add donkey to ppp
</commit_message>
<xml_diff>
--- a/Presentation/End_of_internship.pptx
+++ b/Presentation/End_of_internship.pptx
@@ -5,7 +5,7 @@
     <p:sldMasterId id="2147483648" r:id="rId1"/>
   </p:sldMasterIdLst>
   <p:notesMasterIdLst>
-    <p:notesMasterId r:id="rId24"/>
+    <p:notesMasterId r:id="rId25"/>
   </p:notesMasterIdLst>
   <p:sldIdLst>
     <p:sldId id="256" r:id="rId2"/>
@@ -30,6 +30,7 @@
     <p:sldId id="279" r:id="rId21"/>
     <p:sldId id="281" r:id="rId22"/>
     <p:sldId id="282" r:id="rId23"/>
+    <p:sldId id="283" r:id="rId24"/>
   </p:sldIdLst>
   <p:sldSz cx="12192000" cy="6858000"/>
   <p:notesSz cx="6858000" cy="9144000"/>
@@ -12075,7 +12076,7 @@
             <p:ph idx="1"/>
             <p:extLst>
               <p:ext uri="{D42A27DB-BD31-4B8C-83A1-F6EECF244321}">
-                <p14:modId xmlns:p14="http://schemas.microsoft.com/office/powerpoint/2010/main" val="152431563"/>
+                <p14:modId xmlns:p14="http://schemas.microsoft.com/office/powerpoint/2010/main" val="2546456638"/>
               </p:ext>
             </p:extLst>
           </p:nvPr>
@@ -12128,7 +12129,7 @@
                     <a:p>
                       <a:r>
                         <a:rPr lang="en-GB" dirty="0"/>
-                        <a:t>Input size</a:t>
+                        <a:t>Input size (2n)</a:t>
                       </a:r>
                     </a:p>
                   </a:txBody>
@@ -12552,7 +12553,12 @@
             <p:ph idx="1"/>
           </p:nvPr>
         </p:nvSpPr>
-        <p:spPr/>
+        <p:spPr>
+          <a:xfrm>
+            <a:off x="838200" y="1825625"/>
+            <a:ext cx="10515600" cy="1817091"/>
+          </a:xfrm>
+        </p:spPr>
         <p:txBody>
           <a:bodyPr/>
           <a:lstStyle/>
@@ -12560,12 +12566,6 @@
             <a:r>
               <a:rPr lang="en-US" dirty="0"/>
               <a:t>Building plan for cells</a:t>
-            </a:r>
-          </a:p>
-          <a:p>
-            <a:r>
-              <a:rPr lang="en-US" dirty="0"/>
-              <a:t>Differences as SNPs</a:t>
             </a:r>
           </a:p>
           <a:p>
@@ -13656,6 +13656,237 @@
           </p:txBody>
         </p:sp>
       </p:grpSp>
+      <p:sp>
+        <p:nvSpPr>
+          <p:cNvPr id="30" name="TextBox 29">
+            <a:extLst>
+              <a:ext uri="{FF2B5EF4-FFF2-40B4-BE49-F238E27FC236}">
+                <a16:creationId xmlns:a16="http://schemas.microsoft.com/office/drawing/2014/main" id="{F8D35000-F523-EE28-D8C9-0ED30A87F970}"/>
+              </a:ext>
+            </a:extLst>
+          </p:cNvPr>
+          <p:cNvSpPr txBox="1"/>
+          <p:nvPr/>
+        </p:nvSpPr>
+        <p:spPr>
+          <a:xfrm>
+            <a:off x="441961" y="4475837"/>
+            <a:ext cx="8023136" cy="1938992"/>
+          </a:xfrm>
+          <a:prstGeom prst="rect">
+            <a:avLst/>
+          </a:prstGeom>
+          <a:noFill/>
+        </p:spPr>
+        <p:txBody>
+          <a:bodyPr wrap="square" rtlCol="0">
+            <a:spAutoFit/>
+          </a:bodyPr>
+          <a:lstStyle/>
+          <a:p>
+            <a:r>
+              <a:rPr lang="en-GB" sz="6000" dirty="0">
+                <a:solidFill>
+                  <a:schemeClr val="bg1"/>
+                </a:solidFill>
+              </a:rPr>
+              <a:t>Single nucleotide polymorphism (SNP)</a:t>
+            </a:r>
+          </a:p>
+        </p:txBody>
+      </p:sp>
+      <p:grpSp>
+        <p:nvGrpSpPr>
+          <p:cNvPr id="37" name="Group 36">
+            <a:extLst>
+              <a:ext uri="{FF2B5EF4-FFF2-40B4-BE49-F238E27FC236}">
+                <a16:creationId xmlns:a16="http://schemas.microsoft.com/office/drawing/2014/main" id="{1781E031-8558-C46C-251D-14C354CB6B9D}"/>
+              </a:ext>
+            </a:extLst>
+          </p:cNvPr>
+          <p:cNvGrpSpPr/>
+          <p:nvPr/>
+        </p:nvGrpSpPr>
+        <p:grpSpPr>
+          <a:xfrm>
+            <a:off x="5820593" y="-20784"/>
+            <a:ext cx="3611911" cy="2542583"/>
+            <a:chOff x="5820593" y="-20784"/>
+            <a:chExt cx="3611911" cy="2542583"/>
+          </a:xfrm>
+        </p:grpSpPr>
+        <p:pic>
+          <p:nvPicPr>
+            <p:cNvPr id="32" name="Picture 31" descr="A bunch of bananas&#10;&#10;AI-generated content may be incorrect.">
+              <a:extLst>
+                <a:ext uri="{FF2B5EF4-FFF2-40B4-BE49-F238E27FC236}">
+                  <a16:creationId xmlns:a16="http://schemas.microsoft.com/office/drawing/2014/main" id="{A5BD2555-A579-E9E8-9575-B891F5EC290E}"/>
+                </a:ext>
+              </a:extLst>
+            </p:cNvPr>
+            <p:cNvPicPr>
+              <a:picLocks noChangeAspect="1"/>
+            </p:cNvPicPr>
+            <p:nvPr/>
+          </p:nvPicPr>
+          <p:blipFill>
+            <a:blip r:embed="rId3">
+              <a:extLst>
+                <a:ext uri="{837473B0-CC2E-450A-ABE3-18F120FF3D39}">
+                  <a1611:picAttrSrcUrl xmlns:a1611="http://schemas.microsoft.com/office/drawing/2016/11/main" r:id="rId4"/>
+                </a:ext>
+              </a:extLst>
+            </a:blip>
+            <a:stretch>
+              <a:fillRect/>
+            </a:stretch>
+          </p:blipFill>
+          <p:spPr>
+            <a:xfrm>
+              <a:off x="5839151" y="-20784"/>
+              <a:ext cx="3593353" cy="2395568"/>
+            </a:xfrm>
+            <a:prstGeom prst="rect">
+              <a:avLst/>
+            </a:prstGeom>
+          </p:spPr>
+        </p:pic>
+        <p:sp>
+          <p:nvSpPr>
+            <p:cNvPr id="35" name="TextBox 34">
+              <a:extLst>
+                <a:ext uri="{FF2B5EF4-FFF2-40B4-BE49-F238E27FC236}">
+                  <a16:creationId xmlns:a16="http://schemas.microsoft.com/office/drawing/2014/main" id="{ECF98137-4BB8-5BD1-533C-A2AACA7258D9}"/>
+                </a:ext>
+              </a:extLst>
+            </p:cNvPr>
+            <p:cNvSpPr txBox="1"/>
+            <p:nvPr/>
+          </p:nvSpPr>
+          <p:spPr>
+            <a:xfrm>
+              <a:off x="5820593" y="1598469"/>
+              <a:ext cx="2100426" cy="923330"/>
+            </a:xfrm>
+            <a:prstGeom prst="rect">
+              <a:avLst/>
+            </a:prstGeom>
+            <a:noFill/>
+          </p:spPr>
+          <p:txBody>
+            <a:bodyPr wrap="square" rtlCol="0">
+              <a:spAutoFit/>
+            </a:bodyPr>
+            <a:lstStyle/>
+            <a:p>
+              <a:r>
+                <a:rPr lang="en-GB" sz="5400" dirty="0">
+                  <a:solidFill>
+                    <a:srgbClr val="FF40FF"/>
+                  </a:solidFill>
+                </a:rPr>
+                <a:t>60%</a:t>
+              </a:r>
+            </a:p>
+          </p:txBody>
+        </p:sp>
+      </p:grpSp>
+      <p:grpSp>
+        <p:nvGrpSpPr>
+          <p:cNvPr id="38" name="Group 37">
+            <a:extLst>
+              <a:ext uri="{FF2B5EF4-FFF2-40B4-BE49-F238E27FC236}">
+                <a16:creationId xmlns:a16="http://schemas.microsoft.com/office/drawing/2014/main" id="{8C7CD2A3-6E6E-CD5F-A427-FC883822109F}"/>
+              </a:ext>
+            </a:extLst>
+          </p:cNvPr>
+          <p:cNvGrpSpPr/>
+          <p:nvPr/>
+        </p:nvGrpSpPr>
+        <p:grpSpPr>
+          <a:xfrm>
+            <a:off x="9178158" y="2309523"/>
+            <a:ext cx="3017981" cy="4545152"/>
+            <a:chOff x="9178158" y="2309523"/>
+            <a:chExt cx="3017981" cy="4545152"/>
+          </a:xfrm>
+        </p:grpSpPr>
+        <p:pic>
+          <p:nvPicPr>
+            <p:cNvPr id="34" name="Picture 33" descr="A donkey standing in the woods&#10;&#10;AI-generated content may be incorrect.">
+              <a:extLst>
+                <a:ext uri="{FF2B5EF4-FFF2-40B4-BE49-F238E27FC236}">
+                  <a16:creationId xmlns:a16="http://schemas.microsoft.com/office/drawing/2014/main" id="{ECB57592-395C-EAC3-A223-7722F90407C2}"/>
+                </a:ext>
+              </a:extLst>
+            </p:cNvPr>
+            <p:cNvPicPr>
+              <a:picLocks noChangeAspect="1"/>
+            </p:cNvPicPr>
+            <p:nvPr/>
+          </p:nvPicPr>
+          <p:blipFill>
+            <a:blip r:embed="rId5">
+              <a:extLst>
+                <a:ext uri="{837473B0-CC2E-450A-ABE3-18F120FF3D39}">
+                  <a1611:picAttrSrcUrl xmlns:a1611="http://schemas.microsoft.com/office/drawing/2016/11/main" r:id="rId6"/>
+                </a:ext>
+              </a:extLst>
+            </a:blip>
+            <a:stretch>
+              <a:fillRect/>
+            </a:stretch>
+          </p:blipFill>
+          <p:spPr>
+            <a:xfrm>
+              <a:off x="9178158" y="2309523"/>
+              <a:ext cx="3017981" cy="4545152"/>
+            </a:xfrm>
+            <a:prstGeom prst="rect">
+              <a:avLst/>
+            </a:prstGeom>
+          </p:spPr>
+        </p:pic>
+        <p:sp>
+          <p:nvSpPr>
+            <p:cNvPr id="36" name="TextBox 35">
+              <a:extLst>
+                <a:ext uri="{FF2B5EF4-FFF2-40B4-BE49-F238E27FC236}">
+                  <a16:creationId xmlns:a16="http://schemas.microsoft.com/office/drawing/2014/main" id="{753E5E62-DF69-8050-1D75-8FED27E2EBC4}"/>
+                </a:ext>
+              </a:extLst>
+            </p:cNvPr>
+            <p:cNvSpPr txBox="1"/>
+            <p:nvPr/>
+          </p:nvSpPr>
+          <p:spPr>
+            <a:xfrm>
+              <a:off x="9371614" y="5225499"/>
+              <a:ext cx="2100426" cy="923330"/>
+            </a:xfrm>
+            <a:prstGeom prst="rect">
+              <a:avLst/>
+            </a:prstGeom>
+            <a:noFill/>
+          </p:spPr>
+          <p:txBody>
+            <a:bodyPr wrap="square" rtlCol="0">
+              <a:spAutoFit/>
+            </a:bodyPr>
+            <a:lstStyle/>
+            <a:p>
+              <a:r>
+                <a:rPr lang="en-GB" sz="5400" dirty="0">
+                  <a:solidFill>
+                    <a:srgbClr val="FF40FF"/>
+                  </a:solidFill>
+                </a:rPr>
+                <a:t>87%</a:t>
+              </a:r>
+            </a:p>
+          </p:txBody>
+        </p:sp>
+      </p:grpSp>
     </p:spTree>
     <p:extLst>
       <p:ext uri="{BB962C8B-B14F-4D97-AF65-F5344CB8AC3E}">
@@ -13678,6 +13909,174 @@
       </p:transition>
     </mc:Fallback>
   </mc:AlternateContent>
+  <p:timing>
+    <p:tnLst>
+      <p:par>
+        <p:cTn id="1" dur="indefinite" restart="never" nodeType="tmRoot">
+          <p:childTnLst>
+            <p:seq concurrent="1" nextAc="seek">
+              <p:cTn id="2" dur="indefinite" nodeType="mainSeq">
+                <p:childTnLst>
+                  <p:par>
+                    <p:cTn id="3" fill="hold">
+                      <p:stCondLst>
+                        <p:cond delay="indefinite"/>
+                      </p:stCondLst>
+                      <p:childTnLst>
+                        <p:par>
+                          <p:cTn id="4" fill="hold">
+                            <p:stCondLst>
+                              <p:cond delay="0"/>
+                            </p:stCondLst>
+                            <p:childTnLst>
+                              <p:par>
+                                <p:cTn id="5" presetID="1" presetClass="entr" presetSubtype="0" fill="hold" nodeType="clickEffect">
+                                  <p:stCondLst>
+                                    <p:cond delay="0"/>
+                                  </p:stCondLst>
+                                  <p:childTnLst>
+                                    <p:set>
+                                      <p:cBhvr>
+                                        <p:cTn id="6" dur="1" fill="hold">
+                                          <p:stCondLst>
+                                            <p:cond delay="0"/>
+                                          </p:stCondLst>
+                                        </p:cTn>
+                                        <p:tgtEl>
+                                          <p:spTgt spid="37"/>
+                                        </p:tgtEl>
+                                        <p:attrNameLst>
+                                          <p:attrName>style.visibility</p:attrName>
+                                        </p:attrNameLst>
+                                      </p:cBhvr>
+                                      <p:to>
+                                        <p:strVal val="visible"/>
+                                      </p:to>
+                                    </p:set>
+                                  </p:childTnLst>
+                                </p:cTn>
+                              </p:par>
+                            </p:childTnLst>
+                          </p:cTn>
+                        </p:par>
+                      </p:childTnLst>
+                    </p:cTn>
+                  </p:par>
+                  <p:par>
+                    <p:cTn id="7" fill="hold">
+                      <p:stCondLst>
+                        <p:cond delay="indefinite"/>
+                      </p:stCondLst>
+                      <p:childTnLst>
+                        <p:par>
+                          <p:cTn id="8" fill="hold">
+                            <p:stCondLst>
+                              <p:cond delay="0"/>
+                            </p:stCondLst>
+                            <p:childTnLst>
+                              <p:par>
+                                <p:cTn id="9" presetID="1" presetClass="entr" presetSubtype="0" fill="hold" nodeType="clickEffect">
+                                  <p:stCondLst>
+                                    <p:cond delay="0"/>
+                                  </p:stCondLst>
+                                  <p:childTnLst>
+                                    <p:set>
+                                      <p:cBhvr>
+                                        <p:cTn id="10" dur="1" fill="hold">
+                                          <p:stCondLst>
+                                            <p:cond delay="0"/>
+                                          </p:stCondLst>
+                                        </p:cTn>
+                                        <p:tgtEl>
+                                          <p:spTgt spid="38"/>
+                                        </p:tgtEl>
+                                        <p:attrNameLst>
+                                          <p:attrName>style.visibility</p:attrName>
+                                        </p:attrNameLst>
+                                      </p:cBhvr>
+                                      <p:to>
+                                        <p:strVal val="visible"/>
+                                      </p:to>
+                                    </p:set>
+                                  </p:childTnLst>
+                                </p:cTn>
+                              </p:par>
+                            </p:childTnLst>
+                          </p:cTn>
+                        </p:par>
+                      </p:childTnLst>
+                    </p:cTn>
+                  </p:par>
+                  <p:par>
+                    <p:cTn id="11" fill="hold">
+                      <p:stCondLst>
+                        <p:cond delay="indefinite"/>
+                      </p:stCondLst>
+                      <p:childTnLst>
+                        <p:par>
+                          <p:cTn id="12" fill="hold">
+                            <p:stCondLst>
+                              <p:cond delay="0"/>
+                            </p:stCondLst>
+                            <p:childTnLst>
+                              <p:par>
+                                <p:cTn id="13" presetID="1" presetClass="entr" presetSubtype="0" fill="hold" grpId="0" nodeType="clickEffect">
+                                  <p:stCondLst>
+                                    <p:cond delay="0"/>
+                                  </p:stCondLst>
+                                  <p:childTnLst>
+                                    <p:set>
+                                      <p:cBhvr>
+                                        <p:cTn id="14" dur="1" fill="hold">
+                                          <p:stCondLst>
+                                            <p:cond delay="0"/>
+                                          </p:stCondLst>
+                                        </p:cTn>
+                                        <p:tgtEl>
+                                          <p:spTgt spid="30"/>
+                                        </p:tgtEl>
+                                        <p:attrNameLst>
+                                          <p:attrName>style.visibility</p:attrName>
+                                        </p:attrNameLst>
+                                      </p:cBhvr>
+                                      <p:to>
+                                        <p:strVal val="visible"/>
+                                      </p:to>
+                                    </p:set>
+                                  </p:childTnLst>
+                                </p:cTn>
+                              </p:par>
+                            </p:childTnLst>
+                          </p:cTn>
+                        </p:par>
+                      </p:childTnLst>
+                    </p:cTn>
+                  </p:par>
+                </p:childTnLst>
+              </p:cTn>
+              <p:prevCondLst>
+                <p:cond evt="onPrev" delay="0">
+                  <p:tgtEl>
+                    <p:sldTgt/>
+                  </p:tgtEl>
+                </p:cond>
+              </p:prevCondLst>
+              <p:nextCondLst>
+                <p:cond evt="onNext" delay="0">
+                  <p:tgtEl>
+                    <p:sldTgt/>
+                  </p:tgtEl>
+                </p:cond>
+              </p:nextCondLst>
+            </p:seq>
+          </p:childTnLst>
+        </p:cTn>
+      </p:par>
+    </p:tnLst>
+    <p:bldLst>
+      <p:bldP spid="30" grpId="0"/>
+    </p:bldLst>
+  </p:timing>
 </p:sld>
 </file>
 
@@ -13979,6 +14378,76 @@
 <file path=ppt/slides/slide22.xml><?xml version="1.0" encoding="utf-8"?>
 <p:sld xmlns:a="http://schemas.openxmlformats.org/drawingml/2006/main" xmlns:r="http://schemas.openxmlformats.org/officeDocument/2006/relationships" xmlns:p="http://schemas.openxmlformats.org/presentationml/2006/main">
   <p:cSld>
+    <p:bg>
+      <p:bgPr>
+        <a:solidFill>
+          <a:schemeClr val="bg1"/>
+        </a:solidFill>
+        <a:effectLst/>
+      </p:bgPr>
+    </p:bg>
+    <p:spTree>
+      <p:nvGrpSpPr>
+        <p:cNvPr id="1" name=""/>
+        <p:cNvGrpSpPr/>
+        <p:nvPr/>
+      </p:nvGrpSpPr>
+      <p:grpSpPr>
+        <a:xfrm>
+          <a:off x="0" y="0"/>
+          <a:ext cx="0" cy="0"/>
+          <a:chOff x="0" y="0"/>
+          <a:chExt cx="0" cy="0"/>
+        </a:xfrm>
+      </p:grpSpPr>
+      <p:pic>
+        <p:nvPicPr>
+          <p:cNvPr id="5" name="Content Placeholder 4" descr="A graph of a number of individuals&#10;&#10;AI-generated content may be incorrect.">
+            <a:extLst>
+              <a:ext uri="{FF2B5EF4-FFF2-40B4-BE49-F238E27FC236}">
+                <a16:creationId xmlns:a16="http://schemas.microsoft.com/office/drawing/2014/main" id="{04C4954F-2D49-1B81-2936-C923C23F5D11}"/>
+              </a:ext>
+            </a:extLst>
+          </p:cNvPr>
+          <p:cNvPicPr>
+            <a:picLocks noGrp="1" noChangeAspect="1"/>
+          </p:cNvPicPr>
+          <p:nvPr>
+            <p:ph idx="1"/>
+          </p:nvPr>
+        </p:nvPicPr>
+        <p:blipFill>
+          <a:blip r:embed="rId2"/>
+          <a:stretch>
+            <a:fillRect/>
+          </a:stretch>
+        </p:blipFill>
+        <p:spPr>
+          <a:xfrm>
+            <a:off x="1615440" y="-45720"/>
+            <a:ext cx="9113520" cy="6835139"/>
+          </a:xfrm>
+          <a:prstGeom prst="rect">
+            <a:avLst/>
+          </a:prstGeom>
+        </p:spPr>
+      </p:pic>
+    </p:spTree>
+    <p:extLst>
+      <p:ext uri="{BB962C8B-B14F-4D97-AF65-F5344CB8AC3E}">
+        <p14:creationId xmlns:p14="http://schemas.microsoft.com/office/powerpoint/2010/main" val="1582914183"/>
+      </p:ext>
+    </p:extLst>
+  </p:cSld>
+  <p:clrMapOvr>
+    <a:masterClrMapping/>
+  </p:clrMapOvr>
+</p:sld>
+</file>
+
+<file path=ppt/slides/slide23.xml><?xml version="1.0" encoding="utf-8"?>
+<p:sld xmlns:a="http://schemas.openxmlformats.org/drawingml/2006/main" xmlns:r="http://schemas.openxmlformats.org/officeDocument/2006/relationships" xmlns:p="http://schemas.openxmlformats.org/presentationml/2006/main">
+  <p:cSld>
     <p:spTree>
       <p:nvGrpSpPr>
         <p:cNvPr id="1" name=""/>
@@ -13998,7 +14467,7 @@
           <p:cNvPr id="2" name="Title 1">
             <a:extLst>
               <a:ext uri="{FF2B5EF4-FFF2-40B4-BE49-F238E27FC236}">
-                <a16:creationId xmlns:a16="http://schemas.microsoft.com/office/drawing/2014/main" id="{44898584-1DC3-17C4-DBAE-DEA856BE4969}"/>
+                <a16:creationId xmlns:a16="http://schemas.microsoft.com/office/drawing/2014/main" id="{6FC6031D-552C-CBD6-1410-DD257AE1AC0B}"/>
               </a:ext>
             </a:extLst>
           </p:cNvPr>
@@ -14023,7 +14492,7 @@
           <p:cNvPr id="3" name="Content Placeholder 2">
             <a:extLst>
               <a:ext uri="{FF2B5EF4-FFF2-40B4-BE49-F238E27FC236}">
-                <a16:creationId xmlns:a16="http://schemas.microsoft.com/office/drawing/2014/main" id="{75D387BC-E200-3A7F-E2C2-C0B721845165}"/>
+                <a16:creationId xmlns:a16="http://schemas.microsoft.com/office/drawing/2014/main" id="{DDDB16CC-93A8-B3E2-376E-2C5076F8AF05}"/>
               </a:ext>
             </a:extLst>
           </p:cNvPr>
@@ -14046,7 +14515,7 @@
     </p:spTree>
     <p:extLst>
       <p:ext uri="{BB962C8B-B14F-4D97-AF65-F5344CB8AC3E}">
-        <p14:creationId xmlns:p14="http://schemas.microsoft.com/office/powerpoint/2010/main" val="1582914183"/>
+        <p14:creationId xmlns:p14="http://schemas.microsoft.com/office/powerpoint/2010/main" val="3832739396"/>
       </p:ext>
     </p:extLst>
   </p:cSld>
@@ -17815,7 +18284,12 @@
             <p:ph type="title"/>
           </p:nvPr>
         </p:nvSpPr>
-        <p:spPr/>
+        <p:spPr>
+          <a:xfrm>
+            <a:off x="838200" y="1"/>
+            <a:ext cx="10515600" cy="1813560"/>
+          </a:xfrm>
+        </p:spPr>
         <p:txBody>
           <a:bodyPr/>
           <a:lstStyle/>
@@ -17843,7 +18317,12 @@
             <p:ph idx="1"/>
           </p:nvPr>
         </p:nvSpPr>
-        <p:spPr/>
+        <p:spPr>
+          <a:xfrm>
+            <a:off x="838200" y="1630680"/>
+            <a:ext cx="10515600" cy="4546283"/>
+          </a:xfrm>
+        </p:spPr>
         <p:txBody>
           <a:bodyPr/>
           <a:lstStyle/>
@@ -17870,6 +18349,60 @@
           </a:p>
         </p:txBody>
       </p:sp>
+      <p:pic>
+        <p:nvPicPr>
+          <p:cNvPr id="1026" name="Picture 2" descr="Donkey - Free animals icons">
+            <a:extLst>
+              <a:ext uri="{FF2B5EF4-FFF2-40B4-BE49-F238E27FC236}">
+                <a16:creationId xmlns:a16="http://schemas.microsoft.com/office/drawing/2014/main" id="{561F3197-25DC-E875-7F10-B3E304A92177}"/>
+              </a:ext>
+            </a:extLst>
+          </p:cNvPr>
+          <p:cNvPicPr>
+            <a:picLocks noChangeAspect="1" noChangeArrowheads="1"/>
+          </p:cNvPicPr>
+          <p:nvPr/>
+        </p:nvPicPr>
+        <p:blipFill>
+          <a:blip r:embed="rId3">
+            <a:duotone>
+              <a:schemeClr val="accent2">
+                <a:shade val="45000"/>
+                <a:satMod val="135000"/>
+              </a:schemeClr>
+              <a:prstClr val="white"/>
+            </a:duotone>
+            <a:extLst>
+              <a:ext uri="{28A0092B-C50C-407E-A947-70E740481C1C}">
+                <a14:useLocalDpi xmlns:a14="http://schemas.microsoft.com/office/drawing/2010/main" val="0"/>
+              </a:ext>
+            </a:extLst>
+          </a:blip>
+          <a:srcRect/>
+          <a:stretch>
+            <a:fillRect/>
+          </a:stretch>
+        </p:blipFill>
+        <p:spPr bwMode="auto">
+          <a:xfrm rot="1080000">
+            <a:off x="5463900" y="308672"/>
+            <a:ext cx="2373734" cy="2373734"/>
+          </a:xfrm>
+          <a:prstGeom prst="rect">
+            <a:avLst/>
+          </a:prstGeom>
+          <a:noFill/>
+          <a:extLst>
+            <a:ext uri="{909E8E84-426E-40DD-AFC4-6F175D3DCCD1}">
+              <a14:hiddenFill xmlns:a14="http://schemas.microsoft.com/office/drawing/2010/main">
+                <a:solidFill>
+                  <a:srgbClr val="FFFFFF"/>
+                </a:solidFill>
+              </a14:hiddenFill>
+            </a:ext>
+          </a:extLst>
+        </p:spPr>
+      </p:pic>
     </p:spTree>
     <p:extLst>
       <p:ext uri="{BB962C8B-B14F-4D97-AF65-F5344CB8AC3E}">

</xml_diff>